<commit_message>
Added examples to the definition of the classifier
</commit_message>
<xml_diff>
--- a/DecisionTrees/DecisionTrees.pptx
+++ b/DecisionTrees/DecisionTrees.pptx
@@ -7,6 +7,11 @@
   <p:sldIdLst>
     <p:sldId id="256" r:id="rId2"/>
     <p:sldId id="257" r:id="rId3"/>
+    <p:sldId id="258" r:id="rId4"/>
+    <p:sldId id="259" r:id="rId5"/>
+    <p:sldId id="260" r:id="rId6"/>
+    <p:sldId id="261" r:id="rId7"/>
+    <p:sldId id="262" r:id="rId8"/>
   </p:sldIdLst>
   <p:sldSz cx="12192000" cy="6858000"/>
   <p:notesSz cx="6858000" cy="9144000"/>
@@ -105,6 +110,11 @@
       </a:defRPr>
     </a:lvl9pPr>
   </p:defaultTextStyle>
+  <p:extLst>
+    <p:ext uri="{EFAFB233-063F-42B5-8137-9DF3F51BA10A}">
+      <p15:sldGuideLst xmlns:p15="http://schemas.microsoft.com/office/powerpoint/2012/main"/>
+    </p:ext>
+  </p:extLst>
 </p:presentation>
 </file>
 
@@ -255,7 +265,7 @@
           <a:p>
             <a:fld id="{7E292AB8-5F8F-4402-9592-F9413DCC0C16}" type="datetimeFigureOut">
               <a:rPr lang="en-US" smtClean="0"/>
-              <a:t>7/1/2023</a:t>
+              <a:t>7/2/2023</a:t>
             </a:fld>
             <a:endParaRPr lang="en-US"/>
           </a:p>
@@ -453,7 +463,7 @@
           <a:p>
             <a:fld id="{7E292AB8-5F8F-4402-9592-F9413DCC0C16}" type="datetimeFigureOut">
               <a:rPr lang="en-US" smtClean="0"/>
-              <a:t>7/1/2023</a:t>
+              <a:t>7/2/2023</a:t>
             </a:fld>
             <a:endParaRPr lang="en-US"/>
           </a:p>
@@ -661,7 +671,7 @@
           <a:p>
             <a:fld id="{7E292AB8-5F8F-4402-9592-F9413DCC0C16}" type="datetimeFigureOut">
               <a:rPr lang="en-US" smtClean="0"/>
-              <a:t>7/1/2023</a:t>
+              <a:t>7/2/2023</a:t>
             </a:fld>
             <a:endParaRPr lang="en-US"/>
           </a:p>
@@ -859,7 +869,7 @@
           <a:p>
             <a:fld id="{7E292AB8-5F8F-4402-9592-F9413DCC0C16}" type="datetimeFigureOut">
               <a:rPr lang="en-US" smtClean="0"/>
-              <a:t>7/1/2023</a:t>
+              <a:t>7/2/2023</a:t>
             </a:fld>
             <a:endParaRPr lang="en-US"/>
           </a:p>
@@ -1134,7 +1144,7 @@
           <a:p>
             <a:fld id="{7E292AB8-5F8F-4402-9592-F9413DCC0C16}" type="datetimeFigureOut">
               <a:rPr lang="en-US" smtClean="0"/>
-              <a:t>7/1/2023</a:t>
+              <a:t>7/2/2023</a:t>
             </a:fld>
             <a:endParaRPr lang="en-US"/>
           </a:p>
@@ -1399,7 +1409,7 @@
           <a:p>
             <a:fld id="{7E292AB8-5F8F-4402-9592-F9413DCC0C16}" type="datetimeFigureOut">
               <a:rPr lang="en-US" smtClean="0"/>
-              <a:t>7/1/2023</a:t>
+              <a:t>7/2/2023</a:t>
             </a:fld>
             <a:endParaRPr lang="en-US"/>
           </a:p>
@@ -1811,7 +1821,7 @@
           <a:p>
             <a:fld id="{7E292AB8-5F8F-4402-9592-F9413DCC0C16}" type="datetimeFigureOut">
               <a:rPr lang="en-US" smtClean="0"/>
-              <a:t>7/1/2023</a:t>
+              <a:t>7/2/2023</a:t>
             </a:fld>
             <a:endParaRPr lang="en-US"/>
           </a:p>
@@ -1952,7 +1962,7 @@
           <a:p>
             <a:fld id="{7E292AB8-5F8F-4402-9592-F9413DCC0C16}" type="datetimeFigureOut">
               <a:rPr lang="en-US" smtClean="0"/>
-              <a:t>7/1/2023</a:t>
+              <a:t>7/2/2023</a:t>
             </a:fld>
             <a:endParaRPr lang="en-US"/>
           </a:p>
@@ -2065,7 +2075,7 @@
           <a:p>
             <a:fld id="{7E292AB8-5F8F-4402-9592-F9413DCC0C16}" type="datetimeFigureOut">
               <a:rPr lang="en-US" smtClean="0"/>
-              <a:t>7/1/2023</a:t>
+              <a:t>7/2/2023</a:t>
             </a:fld>
             <a:endParaRPr lang="en-US"/>
           </a:p>
@@ -2376,7 +2386,7 @@
           <a:p>
             <a:fld id="{7E292AB8-5F8F-4402-9592-F9413DCC0C16}" type="datetimeFigureOut">
               <a:rPr lang="en-US" smtClean="0"/>
-              <a:t>7/1/2023</a:t>
+              <a:t>7/2/2023</a:t>
             </a:fld>
             <a:endParaRPr lang="en-US"/>
           </a:p>
@@ -2664,7 +2674,7 @@
           <a:p>
             <a:fld id="{7E292AB8-5F8F-4402-9592-F9413DCC0C16}" type="datetimeFigureOut">
               <a:rPr lang="en-US" smtClean="0"/>
-              <a:t>7/1/2023</a:t>
+              <a:t>7/2/2023</a:t>
             </a:fld>
             <a:endParaRPr lang="en-US"/>
           </a:p>
@@ -2905,7 +2915,7 @@
           <a:p>
             <a:fld id="{7E292AB8-5F8F-4402-9592-F9413DCC0C16}" type="datetimeFigureOut">
               <a:rPr lang="en-US" smtClean="0"/>
-              <a:t>7/1/2023</a:t>
+              <a:t>7/2/2023</a:t>
             </a:fld>
             <a:endParaRPr lang="en-US"/>
           </a:p>
@@ -3459,13 +3469,13 @@
             </p:spPr>
             <p:txBody>
               <a:bodyPr>
-                <a:normAutofit lnSpcReduction="10000"/>
+                <a:normAutofit fontScale="92500"/>
               </a:bodyPr>
               <a:lstStyle/>
               <a:p>
                 <a:r>
                   <a:rPr lang="en-US" dirty="0"/>
-                  <a:t>A classification problem is one of finding a probability distribution that provides a probability of an input data point belonging to any class.</a:t>
+                  <a:t>The machine learning classification task is one of finding a probability distribution that provides a probability of an input data point belonging to any class.</a:t>
                 </a:r>
               </a:p>
               <a:p>
@@ -3473,16 +3483,16 @@
                   <a:rPr lang="en-US" dirty="0">
                     <a:ea typeface="Cambria Math" panose="02040503050406030204" pitchFamily="18" charset="0"/>
                   </a:rPr>
-                  <a:t>Input:  </a:t>
+                  <a:t>Input Data Point:  </a:t>
                 </a:r>
                 <a14:m>
                   <m:oMath xmlns:m="http://schemas.openxmlformats.org/officeDocument/2006/math">
                     <m:r>
-                      <a:rPr lang="en-US" b="0" i="1" smtClean="0">
+                      <a:rPr lang="en-US" b="1" i="1" smtClean="0">
                         <a:latin typeface="Cambria Math" panose="02040503050406030204" pitchFamily="18" charset="0"/>
                         <a:ea typeface="Cambria Math" panose="02040503050406030204" pitchFamily="18" charset="0"/>
                       </a:rPr>
-                      <m:t>𝑥</m:t>
+                      <m:t>𝒙</m:t>
                     </m:r>
                     <m:r>
                       <a:rPr lang="en-US" b="0" i="1" smtClean="0">
@@ -3509,20 +3519,20 @@
                   <a:rPr lang="en-US" dirty="0">
                     <a:ea typeface="Cambria Math" panose="02040503050406030204" pitchFamily="18" charset="0"/>
                   </a:rPr>
-                  <a:t>Output: </a:t>
+                  <a:t>Output Class: </a:t>
                 </a:r>
                 <a14:m>
                   <m:oMath xmlns:m="http://schemas.openxmlformats.org/officeDocument/2006/math">
                     <m:r>
-                      <a:rPr lang="en-US" b="0" i="1" smtClean="0">
+                      <a:rPr lang="en-US" b="1" i="1" smtClean="0">
                         <a:latin typeface="Cambria Math" panose="02040503050406030204" pitchFamily="18" charset="0"/>
                         <a:ea typeface="Cambria Math" panose="02040503050406030204" pitchFamily="18" charset="0"/>
                       </a:rPr>
-                      <m:t>𝑦</m:t>
+                      <m:t>𝒚</m:t>
                     </m:r>
                   </m:oMath>
                 </a14:m>
-                <a:endParaRPr lang="en-US" b="0" dirty="0">
+                <a:endParaRPr lang="en-US" b="1" dirty="0">
                   <a:ea typeface="Cambria Math" panose="02040503050406030204" pitchFamily="18" charset="0"/>
                 </a:endParaRPr>
               </a:p>
@@ -3536,11 +3546,11 @@
                 <a14:m>
                   <m:oMath xmlns:m="http://schemas.openxmlformats.org/officeDocument/2006/math">
                     <m:r>
-                      <a:rPr lang="en-US" b="0" i="1" dirty="0" smtClean="0">
+                      <a:rPr lang="en-US" b="1" i="1" dirty="0" smtClean="0">
                         <a:latin typeface="Cambria Math" panose="02040503050406030204" pitchFamily="18" charset="0"/>
                         <a:ea typeface="Cambria Math" panose="02040503050406030204" pitchFamily="18" charset="0"/>
                       </a:rPr>
-                      <m:t>𝐹</m:t>
+                      <m:t>𝑭</m:t>
                     </m:r>
                     <m:d>
                       <m:dPr>
@@ -3630,11 +3640,11 @@
                       </m:e>
                       <m:e>
                         <m:r>
-                          <a:rPr lang="en-US" b="0" i="1" dirty="0" smtClean="0">
+                          <a:rPr lang="en-US" b="1" i="1" dirty="0" smtClean="0">
                             <a:latin typeface="Cambria Math" panose="02040503050406030204" pitchFamily="18" charset="0"/>
                             <a:ea typeface="Cambria Math" panose="02040503050406030204" pitchFamily="18" charset="0"/>
                           </a:rPr>
-                          <m:t>𝑥</m:t>
+                          <m:t>𝒙</m:t>
                         </m:r>
                       </m:e>
                     </m:d>
@@ -3798,7 +3808,7 @@
               <a:blipFill>
                 <a:blip r:embed="rId2"/>
                 <a:stretch>
-                  <a:fillRect l="-2088" t="-3081" r="-3016"/>
+                  <a:fillRect l="-1856" t="-2101" r="-232"/>
                 </a:stretch>
               </a:blipFill>
             </p:spPr>
@@ -3817,10 +3827,1953 @@
           </p:sp>
         </mc:Fallback>
       </mc:AlternateContent>
+      <p:grpSp>
+        <p:nvGrpSpPr>
+          <p:cNvPr id="44" name="Group 43">
+            <a:extLst>
+              <a:ext uri="{FF2B5EF4-FFF2-40B4-BE49-F238E27FC236}">
+                <a16:creationId xmlns:a16="http://schemas.microsoft.com/office/drawing/2014/main" id="{F0D842A5-8065-E4F1-F954-583E52B57B7F}"/>
+              </a:ext>
+            </a:extLst>
+          </p:cNvPr>
+          <p:cNvGrpSpPr/>
+          <p:nvPr/>
+        </p:nvGrpSpPr>
+        <p:grpSpPr>
+          <a:xfrm>
+            <a:off x="7038363" y="1690688"/>
+            <a:ext cx="3726264" cy="1832382"/>
+            <a:chOff x="7038363" y="1690688"/>
+            <a:chExt cx="3726264" cy="1832382"/>
+          </a:xfrm>
+        </p:grpSpPr>
+        <p:pic>
+          <p:nvPicPr>
+            <p:cNvPr id="10" name="Picture 9">
+              <a:extLst>
+                <a:ext uri="{FF2B5EF4-FFF2-40B4-BE49-F238E27FC236}">
+                  <a16:creationId xmlns:a16="http://schemas.microsoft.com/office/drawing/2014/main" id="{20CA9D6D-1D7D-6EDD-B475-A6C162F32C3C}"/>
+                </a:ext>
+              </a:extLst>
+            </p:cNvPr>
+            <p:cNvPicPr>
+              <a:picLocks noChangeAspect="1"/>
+            </p:cNvPicPr>
+            <p:nvPr/>
+          </p:nvPicPr>
+          <p:blipFill>
+            <a:blip r:embed="rId3"/>
+            <a:stretch>
+              <a:fillRect/>
+            </a:stretch>
+          </p:blipFill>
+          <p:spPr>
+            <a:xfrm>
+              <a:off x="7038363" y="2225136"/>
+              <a:ext cx="755709" cy="755709"/>
+            </a:xfrm>
+            <a:prstGeom prst="rect">
+              <a:avLst/>
+            </a:prstGeom>
+          </p:spPr>
+        </p:pic>
+        <p:cxnSp>
+          <p:nvCxnSpPr>
+            <p:cNvPr id="12" name="Connector: Elbow 11">
+              <a:extLst>
+                <a:ext uri="{FF2B5EF4-FFF2-40B4-BE49-F238E27FC236}">
+                  <a16:creationId xmlns:a16="http://schemas.microsoft.com/office/drawing/2014/main" id="{36B2259E-CEA6-0277-65E4-79E648FE570D}"/>
+                </a:ext>
+              </a:extLst>
+            </p:cNvPr>
+            <p:cNvCxnSpPr>
+              <a:cxnSpLocks/>
+            </p:cNvCxnSpPr>
+            <p:nvPr/>
+          </p:nvCxnSpPr>
+          <p:spPr>
+            <a:xfrm flipV="1">
+              <a:off x="7786734" y="2068541"/>
+              <a:ext cx="1039536" cy="534449"/>
+            </a:xfrm>
+            <a:prstGeom prst="bentConnector3">
+              <a:avLst/>
+            </a:prstGeom>
+            <a:ln>
+              <a:tailEnd type="triangle"/>
+            </a:ln>
+          </p:spPr>
+          <p:style>
+            <a:lnRef idx="1">
+              <a:schemeClr val="accent1"/>
+            </a:lnRef>
+            <a:fillRef idx="0">
+              <a:schemeClr val="accent1"/>
+            </a:fillRef>
+            <a:effectRef idx="0">
+              <a:schemeClr val="accent1"/>
+            </a:effectRef>
+            <a:fontRef idx="minor">
+              <a:schemeClr val="tx1"/>
+            </a:fontRef>
+          </p:style>
+        </p:cxnSp>
+        <p:pic>
+          <p:nvPicPr>
+            <p:cNvPr id="15" name="Picture 14">
+              <a:extLst>
+                <a:ext uri="{FF2B5EF4-FFF2-40B4-BE49-F238E27FC236}">
+                  <a16:creationId xmlns:a16="http://schemas.microsoft.com/office/drawing/2014/main" id="{6A5B3C07-E382-64FB-FFCC-65A3F6D23337}"/>
+                </a:ext>
+              </a:extLst>
+            </p:cNvPr>
+            <p:cNvPicPr>
+              <a:picLocks noChangeAspect="1"/>
+            </p:cNvPicPr>
+            <p:nvPr/>
+          </p:nvPicPr>
+          <p:blipFill>
+            <a:blip r:embed="rId3"/>
+            <a:stretch>
+              <a:fillRect/>
+            </a:stretch>
+          </p:blipFill>
+          <p:spPr>
+            <a:xfrm>
+              <a:off x="8833608" y="1690688"/>
+              <a:ext cx="755709" cy="755709"/>
+            </a:xfrm>
+            <a:prstGeom prst="rect">
+              <a:avLst/>
+            </a:prstGeom>
+          </p:spPr>
+        </p:pic>
+        <p:sp>
+          <p:nvSpPr>
+            <p:cNvPr id="16" name="TextBox 15">
+              <a:extLst>
+                <a:ext uri="{FF2B5EF4-FFF2-40B4-BE49-F238E27FC236}">
+                  <a16:creationId xmlns:a16="http://schemas.microsoft.com/office/drawing/2014/main" id="{30692BA4-884A-AB9F-6811-B82E9FCE0E54}"/>
+                </a:ext>
+              </a:extLst>
+            </p:cNvPr>
+            <p:cNvSpPr txBox="1"/>
+            <p:nvPr/>
+          </p:nvSpPr>
+          <p:spPr>
+            <a:xfrm>
+              <a:off x="9637395" y="1883876"/>
+              <a:ext cx="718466" cy="369332"/>
+            </a:xfrm>
+            <a:prstGeom prst="rect">
+              <a:avLst/>
+            </a:prstGeom>
+            <a:noFill/>
+          </p:spPr>
+          <p:txBody>
+            <a:bodyPr wrap="none" rtlCol="0">
+              <a:spAutoFit/>
+            </a:bodyPr>
+            <a:lstStyle/>
+            <a:p>
+              <a:r>
+                <a:rPr lang="en-US" b="1" dirty="0">
+                  <a:solidFill>
+                    <a:schemeClr val="accent2">
+                      <a:lumMod val="75000"/>
+                    </a:schemeClr>
+                  </a:solidFill>
+                </a:rPr>
+                <a:t>Spam</a:t>
+              </a:r>
+            </a:p>
+          </p:txBody>
+        </p:sp>
+        <p:sp>
+          <p:nvSpPr>
+            <p:cNvPr id="17" name="&quot;Not Allowed&quot; Symbol 16">
+              <a:extLst>
+                <a:ext uri="{FF2B5EF4-FFF2-40B4-BE49-F238E27FC236}">
+                  <a16:creationId xmlns:a16="http://schemas.microsoft.com/office/drawing/2014/main" id="{CF03F71C-9490-79D8-BF1D-DE7C5F119830}"/>
+                </a:ext>
+              </a:extLst>
+            </p:cNvPr>
+            <p:cNvSpPr/>
+            <p:nvPr/>
+          </p:nvSpPr>
+          <p:spPr>
+            <a:xfrm>
+              <a:off x="9042981" y="1900061"/>
+              <a:ext cx="336962" cy="336962"/>
+            </a:xfrm>
+            <a:prstGeom prst="noSmoking">
+              <a:avLst/>
+            </a:prstGeom>
+            <a:solidFill>
+              <a:srgbClr val="C55A11"/>
+            </a:solidFill>
+          </p:spPr>
+          <p:style>
+            <a:lnRef idx="2">
+              <a:schemeClr val="accent1">
+                <a:shade val="15000"/>
+              </a:schemeClr>
+            </a:lnRef>
+            <a:fillRef idx="1">
+              <a:schemeClr val="accent1"/>
+            </a:fillRef>
+            <a:effectRef idx="0">
+              <a:schemeClr val="accent1"/>
+            </a:effectRef>
+            <a:fontRef idx="minor">
+              <a:schemeClr val="lt1"/>
+            </a:fontRef>
+          </p:style>
+          <p:txBody>
+            <a:bodyPr rtlCol="0" anchor="ctr"/>
+            <a:lstStyle/>
+            <a:p>
+              <a:pPr algn="ctr"/>
+              <a:endParaRPr lang="en-US">
+                <a:solidFill>
+                  <a:schemeClr val="tx1"/>
+                </a:solidFill>
+              </a:endParaRPr>
+            </a:p>
+          </p:txBody>
+        </p:sp>
+        <p:pic>
+          <p:nvPicPr>
+            <p:cNvPr id="18" name="Picture 17">
+              <a:extLst>
+                <a:ext uri="{FF2B5EF4-FFF2-40B4-BE49-F238E27FC236}">
+                  <a16:creationId xmlns:a16="http://schemas.microsoft.com/office/drawing/2014/main" id="{D87DB181-15CC-794C-0801-872520454CF5}"/>
+                </a:ext>
+              </a:extLst>
+            </p:cNvPr>
+            <p:cNvPicPr>
+              <a:picLocks noChangeAspect="1"/>
+            </p:cNvPicPr>
+            <p:nvPr/>
+          </p:nvPicPr>
+          <p:blipFill>
+            <a:blip r:embed="rId3"/>
+            <a:stretch>
+              <a:fillRect/>
+            </a:stretch>
+          </p:blipFill>
+          <p:spPr>
+            <a:xfrm>
+              <a:off x="8881686" y="2767361"/>
+              <a:ext cx="755709" cy="755709"/>
+            </a:xfrm>
+            <a:prstGeom prst="rect">
+              <a:avLst/>
+            </a:prstGeom>
+          </p:spPr>
+        </p:pic>
+        <p:sp>
+          <p:nvSpPr>
+            <p:cNvPr id="19" name="TextBox 18">
+              <a:extLst>
+                <a:ext uri="{FF2B5EF4-FFF2-40B4-BE49-F238E27FC236}">
+                  <a16:creationId xmlns:a16="http://schemas.microsoft.com/office/drawing/2014/main" id="{90D965C6-F3C2-D81C-C6A1-0F6E7C00F520}"/>
+                </a:ext>
+              </a:extLst>
+            </p:cNvPr>
+            <p:cNvSpPr txBox="1"/>
+            <p:nvPr/>
+          </p:nvSpPr>
+          <p:spPr>
+            <a:xfrm>
+              <a:off x="9637395" y="2951548"/>
+              <a:ext cx="1127232" cy="369332"/>
+            </a:xfrm>
+            <a:prstGeom prst="rect">
+              <a:avLst/>
+            </a:prstGeom>
+            <a:noFill/>
+          </p:spPr>
+          <p:txBody>
+            <a:bodyPr wrap="none" rtlCol="0">
+              <a:spAutoFit/>
+            </a:bodyPr>
+            <a:lstStyle/>
+            <a:p>
+              <a:r>
+                <a:rPr lang="en-US" b="1" dirty="0"/>
+                <a:t>Not Spam</a:t>
+              </a:r>
+            </a:p>
+          </p:txBody>
+        </p:sp>
+        <p:cxnSp>
+          <p:nvCxnSpPr>
+            <p:cNvPr id="21" name="Connector: Elbow 20">
+              <a:extLst>
+                <a:ext uri="{FF2B5EF4-FFF2-40B4-BE49-F238E27FC236}">
+                  <a16:creationId xmlns:a16="http://schemas.microsoft.com/office/drawing/2014/main" id="{2BF4E997-D05A-7B0E-663E-D1EE4C11B0EF}"/>
+                </a:ext>
+              </a:extLst>
+            </p:cNvPr>
+            <p:cNvCxnSpPr>
+              <a:cxnSpLocks/>
+            </p:cNvCxnSpPr>
+            <p:nvPr/>
+          </p:nvCxnSpPr>
+          <p:spPr>
+            <a:xfrm>
+              <a:off x="7786734" y="2601765"/>
+              <a:ext cx="1039536" cy="534449"/>
+            </a:xfrm>
+            <a:prstGeom prst="bentConnector3">
+              <a:avLst/>
+            </a:prstGeom>
+            <a:ln>
+              <a:tailEnd type="triangle"/>
+            </a:ln>
+          </p:spPr>
+          <p:style>
+            <a:lnRef idx="1">
+              <a:schemeClr val="accent1"/>
+            </a:lnRef>
+            <a:fillRef idx="0">
+              <a:schemeClr val="accent1"/>
+            </a:fillRef>
+            <a:effectRef idx="0">
+              <a:schemeClr val="accent1"/>
+            </a:effectRef>
+            <a:fontRef idx="minor">
+              <a:schemeClr val="tx1"/>
+            </a:fontRef>
+          </p:style>
+        </p:cxnSp>
+        <p:sp>
+          <p:nvSpPr>
+            <p:cNvPr id="23" name="TextBox 22">
+              <a:extLst>
+                <a:ext uri="{FF2B5EF4-FFF2-40B4-BE49-F238E27FC236}">
+                  <a16:creationId xmlns:a16="http://schemas.microsoft.com/office/drawing/2014/main" id="{ECB8BE79-55D2-A8AA-6C69-5355C222D0EA}"/>
+                </a:ext>
+              </a:extLst>
+            </p:cNvPr>
+            <p:cNvSpPr txBox="1"/>
+            <p:nvPr/>
+          </p:nvSpPr>
+          <p:spPr>
+            <a:xfrm>
+              <a:off x="7060991" y="2868989"/>
+              <a:ext cx="710451" cy="369332"/>
+            </a:xfrm>
+            <a:prstGeom prst="rect">
+              <a:avLst/>
+            </a:prstGeom>
+            <a:noFill/>
+          </p:spPr>
+          <p:txBody>
+            <a:bodyPr wrap="none" rtlCol="0">
+              <a:spAutoFit/>
+            </a:bodyPr>
+            <a:lstStyle/>
+            <a:p>
+              <a:r>
+                <a:rPr lang="en-US" b="1" dirty="0"/>
+                <a:t>Email</a:t>
+              </a:r>
+            </a:p>
+          </p:txBody>
+        </p:sp>
+      </p:grpSp>
+      <p:grpSp>
+        <p:nvGrpSpPr>
+          <p:cNvPr id="45" name="Group 44">
+            <a:extLst>
+              <a:ext uri="{FF2B5EF4-FFF2-40B4-BE49-F238E27FC236}">
+                <a16:creationId xmlns:a16="http://schemas.microsoft.com/office/drawing/2014/main" id="{E8A923D0-8ABD-CE23-5249-D667899BCCE8}"/>
+              </a:ext>
+            </a:extLst>
+          </p:cNvPr>
+          <p:cNvGrpSpPr/>
+          <p:nvPr/>
+        </p:nvGrpSpPr>
+        <p:grpSpPr>
+          <a:xfrm>
+            <a:off x="7060991" y="4242687"/>
+            <a:ext cx="3478959" cy="1524873"/>
+            <a:chOff x="7060991" y="4242687"/>
+            <a:chExt cx="3478959" cy="1524873"/>
+          </a:xfrm>
+        </p:grpSpPr>
+        <p:sp>
+          <p:nvSpPr>
+            <p:cNvPr id="43" name="TextBox 42">
+              <a:extLst>
+                <a:ext uri="{FF2B5EF4-FFF2-40B4-BE49-F238E27FC236}">
+                  <a16:creationId xmlns:a16="http://schemas.microsoft.com/office/drawing/2014/main" id="{26132BD2-058D-E6F1-2CA5-3D0E59D15DC0}"/>
+                </a:ext>
+              </a:extLst>
+            </p:cNvPr>
+            <p:cNvSpPr txBox="1"/>
+            <p:nvPr/>
+          </p:nvSpPr>
+          <p:spPr>
+            <a:xfrm>
+              <a:off x="7067974" y="5354294"/>
+              <a:ext cx="770852" cy="369332"/>
+            </a:xfrm>
+            <a:prstGeom prst="rect">
+              <a:avLst/>
+            </a:prstGeom>
+            <a:noFill/>
+          </p:spPr>
+          <p:txBody>
+            <a:bodyPr wrap="none" rtlCol="0">
+              <a:spAutoFit/>
+            </a:bodyPr>
+            <a:lstStyle/>
+            <a:p>
+              <a:r>
+                <a:rPr lang="en-US" b="1" dirty="0"/>
+                <a:t>Tweet</a:t>
+              </a:r>
+            </a:p>
+          </p:txBody>
+        </p:sp>
+        <p:pic>
+          <p:nvPicPr>
+            <p:cNvPr id="27" name="Picture 26">
+              <a:extLst>
+                <a:ext uri="{FF2B5EF4-FFF2-40B4-BE49-F238E27FC236}">
+                  <a16:creationId xmlns:a16="http://schemas.microsoft.com/office/drawing/2014/main" id="{35A508BB-0EEE-F343-7329-154A860930D0}"/>
+                </a:ext>
+              </a:extLst>
+            </p:cNvPr>
+            <p:cNvPicPr>
+              <a:picLocks noChangeAspect="1"/>
+            </p:cNvPicPr>
+            <p:nvPr/>
+          </p:nvPicPr>
+          <p:blipFill>
+            <a:blip r:embed="rId4"/>
+            <a:stretch>
+              <a:fillRect/>
+            </a:stretch>
+          </p:blipFill>
+          <p:spPr>
+            <a:xfrm>
+              <a:off x="7060991" y="4738512"/>
+              <a:ext cx="724418" cy="585572"/>
+            </a:xfrm>
+            <a:prstGeom prst="rect">
+              <a:avLst/>
+            </a:prstGeom>
+          </p:spPr>
+        </p:pic>
+        <p:cxnSp>
+          <p:nvCxnSpPr>
+            <p:cNvPr id="28" name="Connector: Elbow 27">
+              <a:extLst>
+                <a:ext uri="{FF2B5EF4-FFF2-40B4-BE49-F238E27FC236}">
+                  <a16:creationId xmlns:a16="http://schemas.microsoft.com/office/drawing/2014/main" id="{094DC763-8225-61A3-465D-631309CED24A}"/>
+                </a:ext>
+              </a:extLst>
+            </p:cNvPr>
+            <p:cNvCxnSpPr>
+              <a:cxnSpLocks/>
+            </p:cNvCxnSpPr>
+            <p:nvPr/>
+          </p:nvCxnSpPr>
+          <p:spPr>
+            <a:xfrm flipV="1">
+              <a:off x="7842150" y="4471287"/>
+              <a:ext cx="1039536" cy="534449"/>
+            </a:xfrm>
+            <a:prstGeom prst="bentConnector3">
+              <a:avLst/>
+            </a:prstGeom>
+            <a:ln>
+              <a:tailEnd type="triangle"/>
+            </a:ln>
+          </p:spPr>
+          <p:style>
+            <a:lnRef idx="1">
+              <a:schemeClr val="accent1"/>
+            </a:lnRef>
+            <a:fillRef idx="0">
+              <a:schemeClr val="accent1"/>
+            </a:fillRef>
+            <a:effectRef idx="0">
+              <a:schemeClr val="accent1"/>
+            </a:effectRef>
+            <a:fontRef idx="minor">
+              <a:schemeClr val="tx1"/>
+            </a:fontRef>
+          </p:style>
+        </p:cxnSp>
+        <p:cxnSp>
+          <p:nvCxnSpPr>
+            <p:cNvPr id="29" name="Connector: Elbow 28">
+              <a:extLst>
+                <a:ext uri="{FF2B5EF4-FFF2-40B4-BE49-F238E27FC236}">
+                  <a16:creationId xmlns:a16="http://schemas.microsoft.com/office/drawing/2014/main" id="{EB4508A7-DA55-97EF-82CF-99220B17FC90}"/>
+                </a:ext>
+              </a:extLst>
+            </p:cNvPr>
+            <p:cNvCxnSpPr>
+              <a:cxnSpLocks/>
+            </p:cNvCxnSpPr>
+            <p:nvPr/>
+          </p:nvCxnSpPr>
+          <p:spPr>
+            <a:xfrm>
+              <a:off x="7842150" y="5004511"/>
+              <a:ext cx="1039536" cy="534449"/>
+            </a:xfrm>
+            <a:prstGeom prst="bentConnector3">
+              <a:avLst/>
+            </a:prstGeom>
+            <a:ln>
+              <a:tailEnd type="triangle"/>
+            </a:ln>
+          </p:spPr>
+          <p:style>
+            <a:lnRef idx="1">
+              <a:schemeClr val="accent1"/>
+            </a:lnRef>
+            <a:fillRef idx="0">
+              <a:schemeClr val="accent1"/>
+            </a:fillRef>
+            <a:effectRef idx="0">
+              <a:schemeClr val="accent1"/>
+            </a:effectRef>
+            <a:fontRef idx="minor">
+              <a:schemeClr val="tx1"/>
+            </a:fontRef>
+          </p:style>
+        </p:cxnSp>
+        <p:cxnSp>
+          <p:nvCxnSpPr>
+            <p:cNvPr id="32" name="Straight Connector 31">
+              <a:extLst>
+                <a:ext uri="{FF2B5EF4-FFF2-40B4-BE49-F238E27FC236}">
+                  <a16:creationId xmlns:a16="http://schemas.microsoft.com/office/drawing/2014/main" id="{0C23917A-DAD6-3582-3659-EF61A0B2B77F}"/>
+                </a:ext>
+              </a:extLst>
+            </p:cNvPr>
+            <p:cNvCxnSpPr/>
+            <p:nvPr/>
+          </p:nvCxnSpPr>
+          <p:spPr>
+            <a:xfrm>
+              <a:off x="7842150" y="5004691"/>
+              <a:ext cx="1039536" cy="0"/>
+            </a:xfrm>
+            <a:prstGeom prst="line">
+              <a:avLst/>
+            </a:prstGeom>
+            <a:ln>
+              <a:headEnd type="none" w="med" len="med"/>
+              <a:tailEnd type="triangle" w="med" len="med"/>
+            </a:ln>
+          </p:spPr>
+          <p:style>
+            <a:lnRef idx="1">
+              <a:schemeClr val="accent1"/>
+            </a:lnRef>
+            <a:fillRef idx="0">
+              <a:schemeClr val="accent1"/>
+            </a:fillRef>
+            <a:effectRef idx="0">
+              <a:schemeClr val="accent1"/>
+            </a:effectRef>
+            <a:fontRef idx="minor">
+              <a:schemeClr val="tx1"/>
+            </a:fontRef>
+          </p:style>
+        </p:cxnSp>
+        <p:pic>
+          <p:nvPicPr>
+            <p:cNvPr id="35" name="Picture 34">
+              <a:extLst>
+                <a:ext uri="{FF2B5EF4-FFF2-40B4-BE49-F238E27FC236}">
+                  <a16:creationId xmlns:a16="http://schemas.microsoft.com/office/drawing/2014/main" id="{64EE5603-52C9-B95A-56A7-09AFC92F7C92}"/>
+                </a:ext>
+              </a:extLst>
+            </p:cNvPr>
+            <p:cNvPicPr>
+              <a:picLocks noChangeAspect="1"/>
+            </p:cNvPicPr>
+            <p:nvPr/>
+          </p:nvPicPr>
+          <p:blipFill>
+            <a:blip r:embed="rId5">
+              <a:duotone>
+                <a:prstClr val="black"/>
+                <a:srgbClr val="D5D5D5">
+                  <a:tint val="45000"/>
+                  <a:satMod val="400000"/>
+                </a:srgbClr>
+              </a:duotone>
+            </a:blip>
+            <a:stretch>
+              <a:fillRect/>
+            </a:stretch>
+          </p:blipFill>
+          <p:spPr>
+            <a:xfrm>
+              <a:off x="8933472" y="4242687"/>
+              <a:ext cx="457200" cy="457200"/>
+            </a:xfrm>
+            <a:prstGeom prst="rect">
+              <a:avLst/>
+            </a:prstGeom>
+          </p:spPr>
+        </p:pic>
+        <p:pic>
+          <p:nvPicPr>
+            <p:cNvPr id="37" name="Picture 36">
+              <a:extLst>
+                <a:ext uri="{FF2B5EF4-FFF2-40B4-BE49-F238E27FC236}">
+                  <a16:creationId xmlns:a16="http://schemas.microsoft.com/office/drawing/2014/main" id="{B6F92CDD-94F1-BD7D-D823-ECE4546078DE}"/>
+                </a:ext>
+              </a:extLst>
+            </p:cNvPr>
+            <p:cNvPicPr>
+              <a:picLocks noChangeAspect="1"/>
+            </p:cNvPicPr>
+            <p:nvPr/>
+          </p:nvPicPr>
+          <p:blipFill>
+            <a:blip r:embed="rId6">
+              <a:duotone>
+                <a:prstClr val="black"/>
+                <a:srgbClr val="C6C6C6">
+                  <a:tint val="45000"/>
+                  <a:satMod val="400000"/>
+                </a:srgbClr>
+              </a:duotone>
+            </a:blip>
+            <a:stretch>
+              <a:fillRect/>
+            </a:stretch>
+          </p:blipFill>
+          <p:spPr>
+            <a:xfrm rot="21400440">
+              <a:off x="8946343" y="4775911"/>
+              <a:ext cx="465498" cy="457200"/>
+            </a:xfrm>
+            <a:prstGeom prst="rect">
+              <a:avLst/>
+            </a:prstGeom>
+          </p:spPr>
+        </p:pic>
+        <p:pic>
+          <p:nvPicPr>
+            <p:cNvPr id="39" name="Picture 38">
+              <a:extLst>
+                <a:ext uri="{FF2B5EF4-FFF2-40B4-BE49-F238E27FC236}">
+                  <a16:creationId xmlns:a16="http://schemas.microsoft.com/office/drawing/2014/main" id="{AC79C009-8F99-F6EB-5B15-AB511CD1ADEF}"/>
+                </a:ext>
+              </a:extLst>
+            </p:cNvPr>
+            <p:cNvPicPr>
+              <a:picLocks noChangeAspect="1"/>
+            </p:cNvPicPr>
+            <p:nvPr/>
+          </p:nvPicPr>
+          <p:blipFill>
+            <a:blip r:embed="rId7">
+              <a:duotone>
+                <a:prstClr val="black"/>
+                <a:srgbClr val="C6C6C6">
+                  <a:tint val="45000"/>
+                  <a:satMod val="400000"/>
+                </a:srgbClr>
+              </a:duotone>
+            </a:blip>
+            <a:stretch>
+              <a:fillRect/>
+            </a:stretch>
+          </p:blipFill>
+          <p:spPr>
+            <a:xfrm>
+              <a:off x="8950492" y="5310360"/>
+              <a:ext cx="457200" cy="457200"/>
+            </a:xfrm>
+            <a:prstGeom prst="rect">
+              <a:avLst/>
+            </a:prstGeom>
+          </p:spPr>
+        </p:pic>
+        <p:sp>
+          <p:nvSpPr>
+            <p:cNvPr id="40" name="TextBox 39">
+              <a:extLst>
+                <a:ext uri="{FF2B5EF4-FFF2-40B4-BE49-F238E27FC236}">
+                  <a16:creationId xmlns:a16="http://schemas.microsoft.com/office/drawing/2014/main" id="{ECC41FA1-FE70-B758-FF4A-2C1CC8AC7242}"/>
+                </a:ext>
+              </a:extLst>
+            </p:cNvPr>
+            <p:cNvSpPr txBox="1"/>
+            <p:nvPr/>
+          </p:nvSpPr>
+          <p:spPr>
+            <a:xfrm>
+              <a:off x="9637395" y="4286621"/>
+              <a:ext cx="799001" cy="369332"/>
+            </a:xfrm>
+            <a:prstGeom prst="rect">
+              <a:avLst/>
+            </a:prstGeom>
+            <a:noFill/>
+          </p:spPr>
+          <p:txBody>
+            <a:bodyPr wrap="none" rtlCol="0">
+              <a:spAutoFit/>
+            </a:bodyPr>
+            <a:lstStyle/>
+            <a:p>
+              <a:r>
+                <a:rPr lang="en-US" b="1" dirty="0"/>
+                <a:t>Happy</a:t>
+              </a:r>
+            </a:p>
+          </p:txBody>
+        </p:sp>
+        <p:sp>
+          <p:nvSpPr>
+            <p:cNvPr id="41" name="TextBox 40">
+              <a:extLst>
+                <a:ext uri="{FF2B5EF4-FFF2-40B4-BE49-F238E27FC236}">
+                  <a16:creationId xmlns:a16="http://schemas.microsoft.com/office/drawing/2014/main" id="{9709DB41-8379-CDA1-9278-7538F9AAA666}"/>
+                </a:ext>
+              </a:extLst>
+            </p:cNvPr>
+            <p:cNvSpPr txBox="1"/>
+            <p:nvPr/>
+          </p:nvSpPr>
+          <p:spPr>
+            <a:xfrm>
+              <a:off x="9637395" y="4762792"/>
+              <a:ext cx="902555" cy="369332"/>
+            </a:xfrm>
+            <a:prstGeom prst="rect">
+              <a:avLst/>
+            </a:prstGeom>
+            <a:noFill/>
+          </p:spPr>
+          <p:txBody>
+            <a:bodyPr wrap="none" rtlCol="0">
+              <a:spAutoFit/>
+            </a:bodyPr>
+            <a:lstStyle/>
+            <a:p>
+              <a:r>
+                <a:rPr lang="en-US" b="1" dirty="0"/>
+                <a:t>Neutral</a:t>
+              </a:r>
+            </a:p>
+          </p:txBody>
+        </p:sp>
+        <p:sp>
+          <p:nvSpPr>
+            <p:cNvPr id="42" name="TextBox 41">
+              <a:extLst>
+                <a:ext uri="{FF2B5EF4-FFF2-40B4-BE49-F238E27FC236}">
+                  <a16:creationId xmlns:a16="http://schemas.microsoft.com/office/drawing/2014/main" id="{6A9AB0F0-48A9-7CDB-C3F3-51FE7996D5DF}"/>
+                </a:ext>
+              </a:extLst>
+            </p:cNvPr>
+            <p:cNvSpPr txBox="1"/>
+            <p:nvPr/>
+          </p:nvSpPr>
+          <p:spPr>
+            <a:xfrm>
+              <a:off x="9637394" y="5354294"/>
+              <a:ext cx="530915" cy="369332"/>
+            </a:xfrm>
+            <a:prstGeom prst="rect">
+              <a:avLst/>
+            </a:prstGeom>
+            <a:noFill/>
+          </p:spPr>
+          <p:txBody>
+            <a:bodyPr wrap="none" rtlCol="0">
+              <a:spAutoFit/>
+            </a:bodyPr>
+            <a:lstStyle/>
+            <a:p>
+              <a:r>
+                <a:rPr lang="en-US" b="1" dirty="0"/>
+                <a:t>Sad</a:t>
+              </a:r>
+            </a:p>
+          </p:txBody>
+        </p:sp>
+      </p:grpSp>
     </p:spTree>
     <p:extLst>
       <p:ext uri="{BB962C8B-B14F-4D97-AF65-F5344CB8AC3E}">
         <p14:creationId xmlns:p14="http://schemas.microsoft.com/office/powerpoint/2010/main" val="1613563730"/>
+      </p:ext>
+    </p:extLst>
+  </p:cSld>
+  <p:clrMapOvr>
+    <a:masterClrMapping/>
+  </p:clrMapOvr>
+</p:sld>
+</file>
+
+<file path=ppt/slides/slide3.xml><?xml version="1.0" encoding="utf-8"?>
+<p:sld xmlns:a="http://schemas.openxmlformats.org/drawingml/2006/main" xmlns:r="http://schemas.openxmlformats.org/officeDocument/2006/relationships" xmlns:p="http://schemas.openxmlformats.org/presentationml/2006/main">
+  <p:cSld>
+    <p:spTree>
+      <p:nvGrpSpPr>
+        <p:cNvPr id="1" name=""/>
+        <p:cNvGrpSpPr/>
+        <p:nvPr/>
+      </p:nvGrpSpPr>
+      <p:grpSpPr>
+        <a:xfrm>
+          <a:off x="0" y="0"/>
+          <a:ext cx="0" cy="0"/>
+          <a:chOff x="0" y="0"/>
+          <a:chExt cx="0" cy="0"/>
+        </a:xfrm>
+      </p:grpSpPr>
+      <p:sp>
+        <p:nvSpPr>
+          <p:cNvPr id="2" name="Title 1">
+            <a:extLst>
+              <a:ext uri="{FF2B5EF4-FFF2-40B4-BE49-F238E27FC236}">
+                <a16:creationId xmlns:a16="http://schemas.microsoft.com/office/drawing/2014/main" id="{192D8086-4787-1459-456D-6E66571842E3}"/>
+              </a:ext>
+            </a:extLst>
+          </p:cNvPr>
+          <p:cNvSpPr>
+            <a:spLocks noGrp="1"/>
+          </p:cNvSpPr>
+          <p:nvPr>
+            <p:ph type="title"/>
+          </p:nvPr>
+        </p:nvSpPr>
+        <p:spPr/>
+        <p:txBody>
+          <a:bodyPr/>
+          <a:lstStyle/>
+          <a:p>
+            <a:r>
+              <a:rPr lang="en-US" dirty="0"/>
+              <a:t>Decision Tree</a:t>
+            </a:r>
+          </a:p>
+        </p:txBody>
+      </p:sp>
+      <p:grpSp>
+        <p:nvGrpSpPr>
+          <p:cNvPr id="3" name="Group 2">
+            <a:extLst>
+              <a:ext uri="{FF2B5EF4-FFF2-40B4-BE49-F238E27FC236}">
+                <a16:creationId xmlns:a16="http://schemas.microsoft.com/office/drawing/2014/main" id="{E876497F-78F8-8A32-326F-578487D54BE3}"/>
+              </a:ext>
+            </a:extLst>
+          </p:cNvPr>
+          <p:cNvGrpSpPr/>
+          <p:nvPr/>
+        </p:nvGrpSpPr>
+        <p:grpSpPr>
+          <a:xfrm>
+            <a:off x="7211332" y="322340"/>
+            <a:ext cx="3894818" cy="6213320"/>
+            <a:chOff x="6287550" y="242604"/>
+            <a:chExt cx="4008832" cy="6395204"/>
+          </a:xfrm>
+        </p:grpSpPr>
+        <p:sp>
+          <p:nvSpPr>
+            <p:cNvPr id="4" name="Oval 3">
+              <a:extLst>
+                <a:ext uri="{FF2B5EF4-FFF2-40B4-BE49-F238E27FC236}">
+                  <a16:creationId xmlns:a16="http://schemas.microsoft.com/office/drawing/2014/main" id="{413B9216-00C1-4BF5-06A6-32EA17997C54}"/>
+                </a:ext>
+              </a:extLst>
+            </p:cNvPr>
+            <p:cNvSpPr/>
+            <p:nvPr/>
+          </p:nvSpPr>
+          <p:spPr>
+            <a:xfrm>
+              <a:off x="7214533" y="618381"/>
+              <a:ext cx="1350627" cy="1249960"/>
+            </a:xfrm>
+            <a:prstGeom prst="ellipse">
+              <a:avLst/>
+            </a:prstGeom>
+          </p:spPr>
+          <p:style>
+            <a:lnRef idx="2">
+              <a:schemeClr val="accent1">
+                <a:shade val="15000"/>
+              </a:schemeClr>
+            </a:lnRef>
+            <a:fillRef idx="1">
+              <a:schemeClr val="accent1"/>
+            </a:fillRef>
+            <a:effectRef idx="0">
+              <a:schemeClr val="accent1"/>
+            </a:effectRef>
+            <a:fontRef idx="minor">
+              <a:schemeClr val="lt1"/>
+            </a:fontRef>
+          </p:style>
+          <p:txBody>
+            <a:bodyPr rtlCol="0" anchor="ctr"/>
+            <a:lstStyle/>
+            <a:p>
+              <a:pPr algn="ctr"/>
+              <a:r>
+                <a:rPr lang="en-US" dirty="0"/>
+                <a:t>Sunny?</a:t>
+              </a:r>
+            </a:p>
+          </p:txBody>
+        </p:sp>
+        <p:cxnSp>
+          <p:nvCxnSpPr>
+            <p:cNvPr id="6" name="Straight Arrow Connector 5">
+              <a:extLst>
+                <a:ext uri="{FF2B5EF4-FFF2-40B4-BE49-F238E27FC236}">
+                  <a16:creationId xmlns:a16="http://schemas.microsoft.com/office/drawing/2014/main" id="{C8B74276-07CE-D41C-0237-792824E8219B}"/>
+                </a:ext>
+              </a:extLst>
+            </p:cNvPr>
+            <p:cNvCxnSpPr>
+              <a:cxnSpLocks/>
+              <a:stCxn id="4" idx="4"/>
+            </p:cNvCxnSpPr>
+            <p:nvPr/>
+          </p:nvCxnSpPr>
+          <p:spPr>
+            <a:xfrm flipH="1">
+              <a:off x="6962863" y="1868341"/>
+              <a:ext cx="926984" cy="922789"/>
+            </a:xfrm>
+            <a:prstGeom prst="straightConnector1">
+              <a:avLst/>
+            </a:prstGeom>
+            <a:ln>
+              <a:tailEnd type="triangle"/>
+            </a:ln>
+          </p:spPr>
+          <p:style>
+            <a:lnRef idx="1">
+              <a:schemeClr val="accent1"/>
+            </a:lnRef>
+            <a:fillRef idx="0">
+              <a:schemeClr val="accent1"/>
+            </a:fillRef>
+            <a:effectRef idx="0">
+              <a:schemeClr val="accent1"/>
+            </a:effectRef>
+            <a:fontRef idx="minor">
+              <a:schemeClr val="tx1"/>
+            </a:fontRef>
+          </p:style>
+        </p:cxnSp>
+        <p:cxnSp>
+          <p:nvCxnSpPr>
+            <p:cNvPr id="7" name="Straight Arrow Connector 6">
+              <a:extLst>
+                <a:ext uri="{FF2B5EF4-FFF2-40B4-BE49-F238E27FC236}">
+                  <a16:creationId xmlns:a16="http://schemas.microsoft.com/office/drawing/2014/main" id="{89927F93-B2EF-F5EF-9DB8-FE58AF54EB4F}"/>
+                </a:ext>
+              </a:extLst>
+            </p:cNvPr>
+            <p:cNvCxnSpPr>
+              <a:cxnSpLocks/>
+              <a:stCxn id="4" idx="4"/>
+            </p:cNvCxnSpPr>
+            <p:nvPr/>
+          </p:nvCxnSpPr>
+          <p:spPr>
+            <a:xfrm>
+              <a:off x="7889847" y="1868341"/>
+              <a:ext cx="843093" cy="922789"/>
+            </a:xfrm>
+            <a:prstGeom prst="straightConnector1">
+              <a:avLst/>
+            </a:prstGeom>
+            <a:ln>
+              <a:tailEnd type="triangle"/>
+            </a:ln>
+          </p:spPr>
+          <p:style>
+            <a:lnRef idx="1">
+              <a:schemeClr val="accent1"/>
+            </a:lnRef>
+            <a:fillRef idx="0">
+              <a:schemeClr val="accent1"/>
+            </a:fillRef>
+            <a:effectRef idx="0">
+              <a:schemeClr val="accent1"/>
+            </a:effectRef>
+            <a:fontRef idx="minor">
+              <a:schemeClr val="tx1"/>
+            </a:fontRef>
+          </p:style>
+        </p:cxnSp>
+        <p:sp>
+          <p:nvSpPr>
+            <p:cNvPr id="10" name="TextBox 9">
+              <a:extLst>
+                <a:ext uri="{FF2B5EF4-FFF2-40B4-BE49-F238E27FC236}">
+                  <a16:creationId xmlns:a16="http://schemas.microsoft.com/office/drawing/2014/main" id="{C97386FD-A153-80F4-14CD-BD045CDF76A7}"/>
+                </a:ext>
+              </a:extLst>
+            </p:cNvPr>
+            <p:cNvSpPr txBox="1"/>
+            <p:nvPr/>
+          </p:nvSpPr>
+          <p:spPr>
+            <a:xfrm>
+              <a:off x="6940837" y="2086347"/>
+              <a:ext cx="485519" cy="369332"/>
+            </a:xfrm>
+            <a:prstGeom prst="rect">
+              <a:avLst/>
+            </a:prstGeom>
+            <a:noFill/>
+          </p:spPr>
+          <p:txBody>
+            <a:bodyPr wrap="none" rtlCol="0">
+              <a:spAutoFit/>
+            </a:bodyPr>
+            <a:lstStyle/>
+            <a:p>
+              <a:r>
+                <a:rPr lang="en-US" dirty="0"/>
+                <a:t>Yes</a:t>
+              </a:r>
+            </a:p>
+          </p:txBody>
+        </p:sp>
+        <p:sp>
+          <p:nvSpPr>
+            <p:cNvPr id="11" name="TextBox 10">
+              <a:extLst>
+                <a:ext uri="{FF2B5EF4-FFF2-40B4-BE49-F238E27FC236}">
+                  <a16:creationId xmlns:a16="http://schemas.microsoft.com/office/drawing/2014/main" id="{FD361A44-8B92-41BF-3738-0D173084D20D}"/>
+                </a:ext>
+              </a:extLst>
+            </p:cNvPr>
+            <p:cNvSpPr txBox="1"/>
+            <p:nvPr/>
+          </p:nvSpPr>
+          <p:spPr>
+            <a:xfrm>
+              <a:off x="8490181" y="2086347"/>
+              <a:ext cx="455574" cy="369332"/>
+            </a:xfrm>
+            <a:prstGeom prst="rect">
+              <a:avLst/>
+            </a:prstGeom>
+            <a:noFill/>
+          </p:spPr>
+          <p:txBody>
+            <a:bodyPr wrap="none" rtlCol="0">
+              <a:spAutoFit/>
+            </a:bodyPr>
+            <a:lstStyle/>
+            <a:p>
+              <a:r>
+                <a:rPr lang="en-US" dirty="0"/>
+                <a:t>No</a:t>
+              </a:r>
+            </a:p>
+          </p:txBody>
+        </p:sp>
+        <p:sp>
+          <p:nvSpPr>
+            <p:cNvPr id="12" name="Oval 11">
+              <a:extLst>
+                <a:ext uri="{FF2B5EF4-FFF2-40B4-BE49-F238E27FC236}">
+                  <a16:creationId xmlns:a16="http://schemas.microsoft.com/office/drawing/2014/main" id="{8E1917C3-FB6B-E7E7-4CBC-1BE7F5575A1E}"/>
+                </a:ext>
+              </a:extLst>
+            </p:cNvPr>
+            <p:cNvSpPr/>
+            <p:nvPr/>
+          </p:nvSpPr>
+          <p:spPr>
+            <a:xfrm>
+              <a:off x="8057626" y="2804020"/>
+              <a:ext cx="1350627" cy="1249960"/>
+            </a:xfrm>
+            <a:prstGeom prst="ellipse">
+              <a:avLst/>
+            </a:prstGeom>
+          </p:spPr>
+          <p:style>
+            <a:lnRef idx="2">
+              <a:schemeClr val="accent1">
+                <a:shade val="15000"/>
+              </a:schemeClr>
+            </a:lnRef>
+            <a:fillRef idx="1">
+              <a:schemeClr val="accent1"/>
+            </a:fillRef>
+            <a:effectRef idx="0">
+              <a:schemeClr val="accent1"/>
+            </a:effectRef>
+            <a:fontRef idx="minor">
+              <a:schemeClr val="lt1"/>
+            </a:fontRef>
+          </p:style>
+          <p:txBody>
+            <a:bodyPr rtlCol="0" anchor="ctr"/>
+            <a:lstStyle/>
+            <a:p>
+              <a:pPr algn="ctr"/>
+              <a:r>
+                <a:rPr lang="en-US" dirty="0"/>
+                <a:t>Rainy?</a:t>
+              </a:r>
+            </a:p>
+          </p:txBody>
+        </p:sp>
+        <p:cxnSp>
+          <p:nvCxnSpPr>
+            <p:cNvPr id="13" name="Straight Arrow Connector 12">
+              <a:extLst>
+                <a:ext uri="{FF2B5EF4-FFF2-40B4-BE49-F238E27FC236}">
+                  <a16:creationId xmlns:a16="http://schemas.microsoft.com/office/drawing/2014/main" id="{F64FA0D8-4568-D129-94A2-14C34ADDDE6B}"/>
+                </a:ext>
+              </a:extLst>
+            </p:cNvPr>
+            <p:cNvCxnSpPr/>
+            <p:nvPr/>
+          </p:nvCxnSpPr>
+          <p:spPr>
+            <a:xfrm flipH="1">
+              <a:off x="7807060" y="4053980"/>
+              <a:ext cx="926984" cy="922789"/>
+            </a:xfrm>
+            <a:prstGeom prst="straightConnector1">
+              <a:avLst/>
+            </a:prstGeom>
+            <a:ln>
+              <a:tailEnd type="triangle"/>
+            </a:ln>
+          </p:spPr>
+          <p:style>
+            <a:lnRef idx="1">
+              <a:schemeClr val="accent1"/>
+            </a:lnRef>
+            <a:fillRef idx="0">
+              <a:schemeClr val="accent1"/>
+            </a:fillRef>
+            <a:effectRef idx="0">
+              <a:schemeClr val="accent1"/>
+            </a:effectRef>
+            <a:fontRef idx="minor">
+              <a:schemeClr val="tx1"/>
+            </a:fontRef>
+          </p:style>
+        </p:cxnSp>
+        <p:sp>
+          <p:nvSpPr>
+            <p:cNvPr id="14" name="TextBox 13">
+              <a:extLst>
+                <a:ext uri="{FF2B5EF4-FFF2-40B4-BE49-F238E27FC236}">
+                  <a16:creationId xmlns:a16="http://schemas.microsoft.com/office/drawing/2014/main" id="{DDD51714-3221-D97C-A02A-A23496FD7D07}"/>
+                </a:ext>
+              </a:extLst>
+            </p:cNvPr>
+            <p:cNvSpPr txBox="1"/>
+            <p:nvPr/>
+          </p:nvSpPr>
+          <p:spPr>
+            <a:xfrm>
+              <a:off x="7889846" y="4082836"/>
+              <a:ext cx="485519" cy="369332"/>
+            </a:xfrm>
+            <a:prstGeom prst="rect">
+              <a:avLst/>
+            </a:prstGeom>
+            <a:noFill/>
+          </p:spPr>
+          <p:txBody>
+            <a:bodyPr wrap="none" rtlCol="0">
+              <a:spAutoFit/>
+            </a:bodyPr>
+            <a:lstStyle/>
+            <a:p>
+              <a:r>
+                <a:rPr lang="en-US" dirty="0"/>
+                <a:t>Yes</a:t>
+              </a:r>
+            </a:p>
+          </p:txBody>
+        </p:sp>
+        <p:cxnSp>
+          <p:nvCxnSpPr>
+            <p:cNvPr id="15" name="Straight Arrow Connector 14">
+              <a:extLst>
+                <a:ext uri="{FF2B5EF4-FFF2-40B4-BE49-F238E27FC236}">
+                  <a16:creationId xmlns:a16="http://schemas.microsoft.com/office/drawing/2014/main" id="{D3EA4DD5-7BE8-BDDE-40DC-7B5729CF0B95}"/>
+                </a:ext>
+              </a:extLst>
+            </p:cNvPr>
+            <p:cNvCxnSpPr>
+              <a:cxnSpLocks/>
+            </p:cNvCxnSpPr>
+            <p:nvPr/>
+          </p:nvCxnSpPr>
+          <p:spPr>
+            <a:xfrm>
+              <a:off x="8716684" y="3990774"/>
+              <a:ext cx="843093" cy="922789"/>
+            </a:xfrm>
+            <a:prstGeom prst="straightConnector1">
+              <a:avLst/>
+            </a:prstGeom>
+            <a:ln>
+              <a:tailEnd type="triangle"/>
+            </a:ln>
+          </p:spPr>
+          <p:style>
+            <a:lnRef idx="1">
+              <a:schemeClr val="accent1"/>
+            </a:lnRef>
+            <a:fillRef idx="0">
+              <a:schemeClr val="accent1"/>
+            </a:fillRef>
+            <a:effectRef idx="0">
+              <a:schemeClr val="accent1"/>
+            </a:effectRef>
+            <a:fontRef idx="minor">
+              <a:schemeClr val="tx1"/>
+            </a:fontRef>
+          </p:style>
+        </p:cxnSp>
+        <p:sp>
+          <p:nvSpPr>
+            <p:cNvPr id="16" name="TextBox 15">
+              <a:extLst>
+                <a:ext uri="{FF2B5EF4-FFF2-40B4-BE49-F238E27FC236}">
+                  <a16:creationId xmlns:a16="http://schemas.microsoft.com/office/drawing/2014/main" id="{8429B965-74F4-134C-9E0E-A1E3ABB11A45}"/>
+                </a:ext>
+              </a:extLst>
+            </p:cNvPr>
+            <p:cNvSpPr txBox="1"/>
+            <p:nvPr/>
+          </p:nvSpPr>
+          <p:spPr>
+            <a:xfrm>
+              <a:off x="9317016" y="4208780"/>
+              <a:ext cx="455574" cy="369332"/>
+            </a:xfrm>
+            <a:prstGeom prst="rect">
+              <a:avLst/>
+            </a:prstGeom>
+            <a:noFill/>
+          </p:spPr>
+          <p:txBody>
+            <a:bodyPr wrap="none" rtlCol="0">
+              <a:spAutoFit/>
+            </a:bodyPr>
+            <a:lstStyle/>
+            <a:p>
+              <a:r>
+                <a:rPr lang="en-US" dirty="0"/>
+                <a:t>No</a:t>
+              </a:r>
+            </a:p>
+          </p:txBody>
+        </p:sp>
+        <p:sp>
+          <p:nvSpPr>
+            <p:cNvPr id="18" name="Oval 17">
+              <a:extLst>
+                <a:ext uri="{FF2B5EF4-FFF2-40B4-BE49-F238E27FC236}">
+                  <a16:creationId xmlns:a16="http://schemas.microsoft.com/office/drawing/2014/main" id="{2E12593E-62BB-AEAB-7E16-B8A92DE6B379}"/>
+                </a:ext>
+              </a:extLst>
+            </p:cNvPr>
+            <p:cNvSpPr/>
+            <p:nvPr/>
+          </p:nvSpPr>
+          <p:spPr>
+            <a:xfrm>
+              <a:off x="6287550" y="2791130"/>
+              <a:ext cx="1350627" cy="1249960"/>
+            </a:xfrm>
+            <a:prstGeom prst="ellipse">
+              <a:avLst/>
+            </a:prstGeom>
+            <a:solidFill>
+              <a:schemeClr val="accent2"/>
+            </a:solidFill>
+          </p:spPr>
+          <p:style>
+            <a:lnRef idx="2">
+              <a:schemeClr val="accent1">
+                <a:shade val="15000"/>
+              </a:schemeClr>
+            </a:lnRef>
+            <a:fillRef idx="1">
+              <a:schemeClr val="accent1"/>
+            </a:fillRef>
+            <a:effectRef idx="0">
+              <a:schemeClr val="accent1"/>
+            </a:effectRef>
+            <a:fontRef idx="minor">
+              <a:schemeClr val="lt1"/>
+            </a:fontRef>
+          </p:style>
+          <p:txBody>
+            <a:bodyPr rtlCol="0" anchor="ctr"/>
+            <a:lstStyle/>
+            <a:p>
+              <a:pPr algn="ctr"/>
+              <a:r>
+                <a:rPr lang="en-US" dirty="0"/>
+                <a:t>Ice Cream</a:t>
+              </a:r>
+            </a:p>
+          </p:txBody>
+        </p:sp>
+        <p:sp>
+          <p:nvSpPr>
+            <p:cNvPr id="19" name="Oval 18">
+              <a:extLst>
+                <a:ext uri="{FF2B5EF4-FFF2-40B4-BE49-F238E27FC236}">
+                  <a16:creationId xmlns:a16="http://schemas.microsoft.com/office/drawing/2014/main" id="{3C277521-CF21-9DBB-33F8-1D3AC12CDEDB}"/>
+                </a:ext>
+              </a:extLst>
+            </p:cNvPr>
+            <p:cNvSpPr/>
+            <p:nvPr/>
+          </p:nvSpPr>
+          <p:spPr>
+            <a:xfrm>
+              <a:off x="7183596" y="4976769"/>
+              <a:ext cx="1350627" cy="1249960"/>
+            </a:xfrm>
+            <a:prstGeom prst="ellipse">
+              <a:avLst/>
+            </a:prstGeom>
+            <a:solidFill>
+              <a:schemeClr val="accent2"/>
+            </a:solidFill>
+          </p:spPr>
+          <p:style>
+            <a:lnRef idx="2">
+              <a:schemeClr val="accent1">
+                <a:shade val="15000"/>
+              </a:schemeClr>
+            </a:lnRef>
+            <a:fillRef idx="1">
+              <a:schemeClr val="accent1"/>
+            </a:fillRef>
+            <a:effectRef idx="0">
+              <a:schemeClr val="accent1"/>
+            </a:effectRef>
+            <a:fontRef idx="minor">
+              <a:schemeClr val="lt1"/>
+            </a:fontRef>
+          </p:style>
+          <p:txBody>
+            <a:bodyPr rtlCol="0" anchor="ctr"/>
+            <a:lstStyle/>
+            <a:p>
+              <a:pPr algn="ctr"/>
+              <a:r>
+                <a:rPr lang="en-US" dirty="0" err="1"/>
+                <a:t>Bajji</a:t>
+              </a:r>
+              <a:endParaRPr lang="en-US" dirty="0"/>
+            </a:p>
+          </p:txBody>
+        </p:sp>
+        <p:sp>
+          <p:nvSpPr>
+            <p:cNvPr id="20" name="Oval 19">
+              <a:extLst>
+                <a:ext uri="{FF2B5EF4-FFF2-40B4-BE49-F238E27FC236}">
+                  <a16:creationId xmlns:a16="http://schemas.microsoft.com/office/drawing/2014/main" id="{A7C428C6-AB59-E290-E95A-310C63863744}"/>
+                </a:ext>
+              </a:extLst>
+            </p:cNvPr>
+            <p:cNvSpPr/>
+            <p:nvPr/>
+          </p:nvSpPr>
+          <p:spPr>
+            <a:xfrm>
+              <a:off x="8945755" y="4913563"/>
+              <a:ext cx="1350627" cy="1249960"/>
+            </a:xfrm>
+            <a:prstGeom prst="ellipse">
+              <a:avLst/>
+            </a:prstGeom>
+            <a:solidFill>
+              <a:schemeClr val="accent2"/>
+            </a:solidFill>
+          </p:spPr>
+          <p:style>
+            <a:lnRef idx="2">
+              <a:schemeClr val="accent1">
+                <a:shade val="15000"/>
+              </a:schemeClr>
+            </a:lnRef>
+            <a:fillRef idx="1">
+              <a:schemeClr val="accent1"/>
+            </a:fillRef>
+            <a:effectRef idx="0">
+              <a:schemeClr val="accent1"/>
+            </a:effectRef>
+            <a:fontRef idx="minor">
+              <a:schemeClr val="lt1"/>
+            </a:fontRef>
+          </p:style>
+          <p:txBody>
+            <a:bodyPr rtlCol="0" anchor="ctr"/>
+            <a:lstStyle/>
+            <a:p>
+              <a:pPr algn="ctr"/>
+              <a:r>
+                <a:rPr lang="en-US" dirty="0"/>
+                <a:t>Tea</a:t>
+              </a:r>
+            </a:p>
+          </p:txBody>
+        </p:sp>
+        <p:sp>
+          <p:nvSpPr>
+            <p:cNvPr id="21" name="TextBox 20">
+              <a:extLst>
+                <a:ext uri="{FF2B5EF4-FFF2-40B4-BE49-F238E27FC236}">
+                  <a16:creationId xmlns:a16="http://schemas.microsoft.com/office/drawing/2014/main" id="{94D825B0-F275-0F56-726F-F4A042F342B1}"/>
+                </a:ext>
+              </a:extLst>
+            </p:cNvPr>
+            <p:cNvSpPr txBox="1"/>
+            <p:nvPr/>
+          </p:nvSpPr>
+          <p:spPr>
+            <a:xfrm>
+              <a:off x="7296542" y="242604"/>
+              <a:ext cx="1186607" cy="369332"/>
+            </a:xfrm>
+            <a:prstGeom prst="rect">
+              <a:avLst/>
+            </a:prstGeom>
+            <a:noFill/>
+          </p:spPr>
+          <p:txBody>
+            <a:bodyPr wrap="none" rtlCol="0">
+              <a:spAutoFit/>
+            </a:bodyPr>
+            <a:lstStyle/>
+            <a:p>
+              <a:r>
+                <a:rPr lang="en-US" dirty="0"/>
+                <a:t>Root Node</a:t>
+              </a:r>
+            </a:p>
+          </p:txBody>
+        </p:sp>
+        <p:sp>
+          <p:nvSpPr>
+            <p:cNvPr id="22" name="TextBox 21">
+              <a:extLst>
+                <a:ext uri="{FF2B5EF4-FFF2-40B4-BE49-F238E27FC236}">
+                  <a16:creationId xmlns:a16="http://schemas.microsoft.com/office/drawing/2014/main" id="{EAF840FB-AFE1-EC4E-166F-A3481068D24B}"/>
+                </a:ext>
+              </a:extLst>
+            </p:cNvPr>
+            <p:cNvSpPr txBox="1"/>
+            <p:nvPr/>
+          </p:nvSpPr>
+          <p:spPr>
+            <a:xfrm>
+              <a:off x="6328967" y="3961377"/>
+              <a:ext cx="1138711" cy="369332"/>
+            </a:xfrm>
+            <a:prstGeom prst="rect">
+              <a:avLst/>
+            </a:prstGeom>
+            <a:noFill/>
+          </p:spPr>
+          <p:txBody>
+            <a:bodyPr wrap="none" rtlCol="0">
+              <a:spAutoFit/>
+            </a:bodyPr>
+            <a:lstStyle/>
+            <a:p>
+              <a:r>
+                <a:rPr lang="en-US" dirty="0"/>
+                <a:t>Leaf Node</a:t>
+              </a:r>
+            </a:p>
+          </p:txBody>
+        </p:sp>
+        <p:sp>
+          <p:nvSpPr>
+            <p:cNvPr id="23" name="TextBox 22">
+              <a:extLst>
+                <a:ext uri="{FF2B5EF4-FFF2-40B4-BE49-F238E27FC236}">
+                  <a16:creationId xmlns:a16="http://schemas.microsoft.com/office/drawing/2014/main" id="{A38BCD8E-CF41-BC15-073A-F5B16DCA6394}"/>
+                </a:ext>
+              </a:extLst>
+            </p:cNvPr>
+            <p:cNvSpPr txBox="1"/>
+            <p:nvPr/>
+          </p:nvSpPr>
+          <p:spPr>
+            <a:xfrm>
+              <a:off x="7068822" y="6268476"/>
+              <a:ext cx="1138711" cy="369332"/>
+            </a:xfrm>
+            <a:prstGeom prst="rect">
+              <a:avLst/>
+            </a:prstGeom>
+            <a:noFill/>
+          </p:spPr>
+          <p:txBody>
+            <a:bodyPr wrap="none" rtlCol="0">
+              <a:spAutoFit/>
+            </a:bodyPr>
+            <a:lstStyle/>
+            <a:p>
+              <a:r>
+                <a:rPr lang="en-US" dirty="0"/>
+                <a:t>Leaf Node</a:t>
+              </a:r>
+            </a:p>
+          </p:txBody>
+        </p:sp>
+        <p:sp>
+          <p:nvSpPr>
+            <p:cNvPr id="24" name="TextBox 23">
+              <a:extLst>
+                <a:ext uri="{FF2B5EF4-FFF2-40B4-BE49-F238E27FC236}">
+                  <a16:creationId xmlns:a16="http://schemas.microsoft.com/office/drawing/2014/main" id="{E52AA769-8BC8-E39E-081D-B7D2A2EA2827}"/>
+                </a:ext>
+              </a:extLst>
+            </p:cNvPr>
+            <p:cNvSpPr txBox="1"/>
+            <p:nvPr/>
+          </p:nvSpPr>
+          <p:spPr>
+            <a:xfrm>
+              <a:off x="9157670" y="6228755"/>
+              <a:ext cx="1138710" cy="369332"/>
+            </a:xfrm>
+            <a:prstGeom prst="rect">
+              <a:avLst/>
+            </a:prstGeom>
+            <a:noFill/>
+          </p:spPr>
+          <p:txBody>
+            <a:bodyPr wrap="none" rtlCol="0">
+              <a:spAutoFit/>
+            </a:bodyPr>
+            <a:lstStyle/>
+            <a:p>
+              <a:r>
+                <a:rPr lang="en-US" dirty="0"/>
+                <a:t>Leaf Node</a:t>
+              </a:r>
+            </a:p>
+          </p:txBody>
+        </p:sp>
+      </p:grpSp>
+    </p:spTree>
+    <p:extLst>
+      <p:ext uri="{BB962C8B-B14F-4D97-AF65-F5344CB8AC3E}">
+        <p14:creationId xmlns:p14="http://schemas.microsoft.com/office/powerpoint/2010/main" val="1221890830"/>
+      </p:ext>
+    </p:extLst>
+  </p:cSld>
+  <p:clrMapOvr>
+    <a:masterClrMapping/>
+  </p:clrMapOvr>
+</p:sld>
+</file>
+
+<file path=ppt/slides/slide4.xml><?xml version="1.0" encoding="utf-8"?>
+<p:sld xmlns:a="http://schemas.openxmlformats.org/drawingml/2006/main" xmlns:r="http://schemas.openxmlformats.org/officeDocument/2006/relationships" xmlns:p="http://schemas.openxmlformats.org/presentationml/2006/main">
+  <p:cSld>
+    <p:spTree>
+      <p:nvGrpSpPr>
+        <p:cNvPr id="1" name=""/>
+        <p:cNvGrpSpPr/>
+        <p:nvPr/>
+      </p:nvGrpSpPr>
+      <p:grpSpPr>
+        <a:xfrm>
+          <a:off x="0" y="0"/>
+          <a:ext cx="0" cy="0"/>
+          <a:chOff x="0" y="0"/>
+          <a:chExt cx="0" cy="0"/>
+        </a:xfrm>
+      </p:grpSpPr>
+      <p:sp>
+        <p:nvSpPr>
+          <p:cNvPr id="2" name="Title 1">
+            <a:extLst>
+              <a:ext uri="{FF2B5EF4-FFF2-40B4-BE49-F238E27FC236}">
+                <a16:creationId xmlns:a16="http://schemas.microsoft.com/office/drawing/2014/main" id="{3D125364-4385-6331-2E0E-02C1915293E0}"/>
+              </a:ext>
+            </a:extLst>
+          </p:cNvPr>
+          <p:cNvSpPr>
+            <a:spLocks noGrp="1"/>
+          </p:cNvSpPr>
+          <p:nvPr>
+            <p:ph type="title"/>
+          </p:nvPr>
+        </p:nvSpPr>
+        <p:spPr/>
+        <p:txBody>
+          <a:bodyPr/>
+          <a:lstStyle/>
+          <a:p>
+            <a:r>
+              <a:rPr lang="en-US" dirty="0"/>
+              <a:t>Understanding Success</a:t>
+            </a:r>
+          </a:p>
+        </p:txBody>
+      </p:sp>
+      <p:sp>
+        <p:nvSpPr>
+          <p:cNvPr id="3" name="Content Placeholder 2">
+            <a:extLst>
+              <a:ext uri="{FF2B5EF4-FFF2-40B4-BE49-F238E27FC236}">
+                <a16:creationId xmlns:a16="http://schemas.microsoft.com/office/drawing/2014/main" id="{D45CFC62-A670-21F7-0A1B-08F4DCC6C8DE}"/>
+              </a:ext>
+            </a:extLst>
+          </p:cNvPr>
+          <p:cNvSpPr>
+            <a:spLocks noGrp="1"/>
+          </p:cNvSpPr>
+          <p:nvPr>
+            <p:ph idx="1"/>
+          </p:nvPr>
+        </p:nvSpPr>
+        <p:spPr/>
+        <p:txBody>
+          <a:bodyPr/>
+          <a:lstStyle/>
+          <a:p>
+            <a:r>
+              <a:rPr lang="en-US" dirty="0"/>
+              <a:t>Effectiveness of a decision tree classifier is measured by using a dataset that has existing class labels. </a:t>
+            </a:r>
+          </a:p>
+          <a:p>
+            <a:r>
+              <a:rPr lang="en-US" dirty="0"/>
+              <a:t>Indicators:</a:t>
+            </a:r>
+          </a:p>
+          <a:p>
+            <a:pPr lvl="1"/>
+            <a:r>
+              <a:rPr lang="en-US" dirty="0"/>
+              <a:t>Degree of misclassification</a:t>
+            </a:r>
+          </a:p>
+          <a:p>
+            <a:pPr lvl="2"/>
+            <a:r>
+              <a:rPr lang="en-US" dirty="0"/>
+              <a:t>Accuracy</a:t>
+            </a:r>
+          </a:p>
+          <a:p>
+            <a:pPr lvl="2"/>
+            <a:r>
+              <a:rPr lang="en-US" dirty="0"/>
+              <a:t>Recall/Sensitivity - TPR</a:t>
+            </a:r>
+          </a:p>
+          <a:p>
+            <a:pPr lvl="2"/>
+            <a:r>
+              <a:rPr lang="en-US" dirty="0"/>
+              <a:t>Precision</a:t>
+            </a:r>
+          </a:p>
+          <a:p>
+            <a:pPr lvl="2"/>
+            <a:r>
+              <a:rPr lang="en-US" dirty="0"/>
+              <a:t>FPR</a:t>
+            </a:r>
+          </a:p>
+          <a:p>
+            <a:pPr lvl="1"/>
+            <a:endParaRPr lang="en-US" dirty="0"/>
+          </a:p>
+        </p:txBody>
+      </p:sp>
+    </p:spTree>
+    <p:extLst>
+      <p:ext uri="{BB962C8B-B14F-4D97-AF65-F5344CB8AC3E}">
+        <p14:creationId xmlns:p14="http://schemas.microsoft.com/office/powerpoint/2010/main" val="2081715045"/>
+      </p:ext>
+    </p:extLst>
+  </p:cSld>
+  <p:clrMapOvr>
+    <a:masterClrMapping/>
+  </p:clrMapOvr>
+</p:sld>
+</file>
+
+<file path=ppt/slides/slide5.xml><?xml version="1.0" encoding="utf-8"?>
+<p:sld xmlns:a="http://schemas.openxmlformats.org/drawingml/2006/main" xmlns:r="http://schemas.openxmlformats.org/officeDocument/2006/relationships" xmlns:p="http://schemas.openxmlformats.org/presentationml/2006/main">
+  <p:cSld>
+    <p:spTree>
+      <p:nvGrpSpPr>
+        <p:cNvPr id="1" name=""/>
+        <p:cNvGrpSpPr/>
+        <p:nvPr/>
+      </p:nvGrpSpPr>
+      <p:grpSpPr>
+        <a:xfrm>
+          <a:off x="0" y="0"/>
+          <a:ext cx="0" cy="0"/>
+          <a:chOff x="0" y="0"/>
+          <a:chExt cx="0" cy="0"/>
+        </a:xfrm>
+      </p:grpSpPr>
+      <p:sp>
+        <p:nvSpPr>
+          <p:cNvPr id="2" name="Title 1">
+            <a:extLst>
+              <a:ext uri="{FF2B5EF4-FFF2-40B4-BE49-F238E27FC236}">
+                <a16:creationId xmlns:a16="http://schemas.microsoft.com/office/drawing/2014/main" id="{8E5880B9-3062-A96C-307C-4559348E1CAC}"/>
+              </a:ext>
+            </a:extLst>
+          </p:cNvPr>
+          <p:cNvSpPr>
+            <a:spLocks noGrp="1"/>
+          </p:cNvSpPr>
+          <p:nvPr>
+            <p:ph type="title"/>
+          </p:nvPr>
+        </p:nvSpPr>
+        <p:spPr/>
+        <p:txBody>
+          <a:bodyPr/>
+          <a:lstStyle/>
+          <a:p>
+            <a:r>
+              <a:rPr lang="en-US"/>
+              <a:t>Misclassification Metric</a:t>
+            </a:r>
+            <a:endParaRPr lang="en-US" dirty="0"/>
+          </a:p>
+        </p:txBody>
+      </p:sp>
+      <p:sp>
+        <p:nvSpPr>
+          <p:cNvPr id="3" name="Content Placeholder 2">
+            <a:extLst>
+              <a:ext uri="{FF2B5EF4-FFF2-40B4-BE49-F238E27FC236}">
+                <a16:creationId xmlns:a16="http://schemas.microsoft.com/office/drawing/2014/main" id="{D240EB75-D57C-BDBA-67D8-83BC08B6FD9A}"/>
+              </a:ext>
+            </a:extLst>
+          </p:cNvPr>
+          <p:cNvSpPr>
+            <a:spLocks noGrp="1"/>
+          </p:cNvSpPr>
+          <p:nvPr>
+            <p:ph idx="1"/>
+          </p:nvPr>
+        </p:nvSpPr>
+        <p:spPr/>
+        <p:txBody>
+          <a:bodyPr/>
+          <a:lstStyle/>
+          <a:p>
+            <a:endParaRPr lang="en-US"/>
+          </a:p>
+        </p:txBody>
+      </p:sp>
+    </p:spTree>
+    <p:extLst>
+      <p:ext uri="{BB962C8B-B14F-4D97-AF65-F5344CB8AC3E}">
+        <p14:creationId xmlns:p14="http://schemas.microsoft.com/office/powerpoint/2010/main" val="1274289020"/>
+      </p:ext>
+    </p:extLst>
+  </p:cSld>
+  <p:clrMapOvr>
+    <a:masterClrMapping/>
+  </p:clrMapOvr>
+</p:sld>
+</file>
+
+<file path=ppt/slides/slide6.xml><?xml version="1.0" encoding="utf-8"?>
+<p:sld xmlns:a="http://schemas.openxmlformats.org/drawingml/2006/main" xmlns:r="http://schemas.openxmlformats.org/officeDocument/2006/relationships" xmlns:p="http://schemas.openxmlformats.org/presentationml/2006/main">
+  <p:cSld>
+    <p:spTree>
+      <p:nvGrpSpPr>
+        <p:cNvPr id="1" name=""/>
+        <p:cNvGrpSpPr/>
+        <p:nvPr/>
+      </p:nvGrpSpPr>
+      <p:grpSpPr>
+        <a:xfrm>
+          <a:off x="0" y="0"/>
+          <a:ext cx="0" cy="0"/>
+          <a:chOff x="0" y="0"/>
+          <a:chExt cx="0" cy="0"/>
+        </a:xfrm>
+      </p:grpSpPr>
+      <p:sp>
+        <p:nvSpPr>
+          <p:cNvPr id="2" name="Title 1">
+            <a:extLst>
+              <a:ext uri="{FF2B5EF4-FFF2-40B4-BE49-F238E27FC236}">
+                <a16:creationId xmlns:a16="http://schemas.microsoft.com/office/drawing/2014/main" id="{C84B770B-7928-4294-938C-54F566403029}"/>
+              </a:ext>
+            </a:extLst>
+          </p:cNvPr>
+          <p:cNvSpPr>
+            <a:spLocks noGrp="1"/>
+          </p:cNvSpPr>
+          <p:nvPr>
+            <p:ph type="title"/>
+          </p:nvPr>
+        </p:nvSpPr>
+        <p:spPr/>
+        <p:txBody>
+          <a:bodyPr/>
+          <a:lstStyle/>
+          <a:p>
+            <a:r>
+              <a:rPr lang="en-US" dirty="0"/>
+              <a:t>Entropy Metric</a:t>
+            </a:r>
+          </a:p>
+        </p:txBody>
+      </p:sp>
+      <p:sp>
+        <p:nvSpPr>
+          <p:cNvPr id="3" name="Content Placeholder 2">
+            <a:extLst>
+              <a:ext uri="{FF2B5EF4-FFF2-40B4-BE49-F238E27FC236}">
+                <a16:creationId xmlns:a16="http://schemas.microsoft.com/office/drawing/2014/main" id="{369D591D-FB53-0999-0AC9-06E05CE59713}"/>
+              </a:ext>
+            </a:extLst>
+          </p:cNvPr>
+          <p:cNvSpPr>
+            <a:spLocks noGrp="1"/>
+          </p:cNvSpPr>
+          <p:nvPr>
+            <p:ph idx="1"/>
+          </p:nvPr>
+        </p:nvSpPr>
+        <p:spPr/>
+        <p:txBody>
+          <a:bodyPr/>
+          <a:lstStyle/>
+          <a:p>
+            <a:endParaRPr lang="en-US"/>
+          </a:p>
+        </p:txBody>
+      </p:sp>
+    </p:spTree>
+    <p:extLst>
+      <p:ext uri="{BB962C8B-B14F-4D97-AF65-F5344CB8AC3E}">
+        <p14:creationId xmlns:p14="http://schemas.microsoft.com/office/powerpoint/2010/main" val="1680382787"/>
+      </p:ext>
+    </p:extLst>
+  </p:cSld>
+  <p:clrMapOvr>
+    <a:masterClrMapping/>
+  </p:clrMapOvr>
+</p:sld>
+</file>
+
+<file path=ppt/slides/slide7.xml><?xml version="1.0" encoding="utf-8"?>
+<p:sld xmlns:a="http://schemas.openxmlformats.org/drawingml/2006/main" xmlns:r="http://schemas.openxmlformats.org/officeDocument/2006/relationships" xmlns:p="http://schemas.openxmlformats.org/presentationml/2006/main">
+  <p:cSld>
+    <p:spTree>
+      <p:nvGrpSpPr>
+        <p:cNvPr id="1" name=""/>
+        <p:cNvGrpSpPr/>
+        <p:nvPr/>
+      </p:nvGrpSpPr>
+      <p:grpSpPr>
+        <a:xfrm>
+          <a:off x="0" y="0"/>
+          <a:ext cx="0" cy="0"/>
+          <a:chOff x="0" y="0"/>
+          <a:chExt cx="0" cy="0"/>
+        </a:xfrm>
+      </p:grpSpPr>
+      <p:sp>
+        <p:nvSpPr>
+          <p:cNvPr id="2" name="Title 1">
+            <a:extLst>
+              <a:ext uri="{FF2B5EF4-FFF2-40B4-BE49-F238E27FC236}">
+                <a16:creationId xmlns:a16="http://schemas.microsoft.com/office/drawing/2014/main" id="{4F1261DB-738A-7255-D20B-EBC43962B8AC}"/>
+              </a:ext>
+            </a:extLst>
+          </p:cNvPr>
+          <p:cNvSpPr>
+            <a:spLocks noGrp="1"/>
+          </p:cNvSpPr>
+          <p:nvPr>
+            <p:ph type="title"/>
+          </p:nvPr>
+        </p:nvSpPr>
+        <p:spPr/>
+        <p:txBody>
+          <a:bodyPr/>
+          <a:lstStyle/>
+          <a:p>
+            <a:r>
+              <a:rPr lang="en-US" dirty="0"/>
+              <a:t>Gini Metric</a:t>
+            </a:r>
+          </a:p>
+        </p:txBody>
+      </p:sp>
+      <p:sp>
+        <p:nvSpPr>
+          <p:cNvPr id="3" name="Content Placeholder 2">
+            <a:extLst>
+              <a:ext uri="{FF2B5EF4-FFF2-40B4-BE49-F238E27FC236}">
+                <a16:creationId xmlns:a16="http://schemas.microsoft.com/office/drawing/2014/main" id="{1902F06A-DBBA-FAC1-6F16-EDA8BADAA57F}"/>
+              </a:ext>
+            </a:extLst>
+          </p:cNvPr>
+          <p:cNvSpPr>
+            <a:spLocks noGrp="1"/>
+          </p:cNvSpPr>
+          <p:nvPr>
+            <p:ph idx="1"/>
+          </p:nvPr>
+        </p:nvSpPr>
+        <p:spPr/>
+        <p:txBody>
+          <a:bodyPr/>
+          <a:lstStyle/>
+          <a:p>
+            <a:endParaRPr lang="en-US"/>
+          </a:p>
+        </p:txBody>
+      </p:sp>
+    </p:spTree>
+    <p:extLst>
+      <p:ext uri="{BB962C8B-B14F-4D97-AF65-F5344CB8AC3E}">
+        <p14:creationId xmlns:p14="http://schemas.microsoft.com/office/powerpoint/2010/main" val="1156644528"/>
       </p:ext>
     </p:extLst>
   </p:cSld>

</xml_diff>

<commit_message>
Adding some content: what is decision tree and important concepts in confusion matrix
</commit_message>
<xml_diff>
--- a/DecisionTrees/DecisionTrees.pptx
+++ b/DecisionTrees/DecisionTrees.pptx
@@ -265,7 +265,7 @@
           <a:p>
             <a:fld id="{7E292AB8-5F8F-4402-9592-F9413DCC0C16}" type="datetimeFigureOut">
               <a:rPr lang="en-US" smtClean="0"/>
-              <a:t>7/2/2023</a:t>
+              <a:t>7/3/2023</a:t>
             </a:fld>
             <a:endParaRPr lang="en-US"/>
           </a:p>
@@ -463,7 +463,7 @@
           <a:p>
             <a:fld id="{7E292AB8-5F8F-4402-9592-F9413DCC0C16}" type="datetimeFigureOut">
               <a:rPr lang="en-US" smtClean="0"/>
-              <a:t>7/2/2023</a:t>
+              <a:t>7/3/2023</a:t>
             </a:fld>
             <a:endParaRPr lang="en-US"/>
           </a:p>
@@ -671,7 +671,7 @@
           <a:p>
             <a:fld id="{7E292AB8-5F8F-4402-9592-F9413DCC0C16}" type="datetimeFigureOut">
               <a:rPr lang="en-US" smtClean="0"/>
-              <a:t>7/2/2023</a:t>
+              <a:t>7/3/2023</a:t>
             </a:fld>
             <a:endParaRPr lang="en-US"/>
           </a:p>
@@ -869,7 +869,7 @@
           <a:p>
             <a:fld id="{7E292AB8-5F8F-4402-9592-F9413DCC0C16}" type="datetimeFigureOut">
               <a:rPr lang="en-US" smtClean="0"/>
-              <a:t>7/2/2023</a:t>
+              <a:t>7/3/2023</a:t>
             </a:fld>
             <a:endParaRPr lang="en-US"/>
           </a:p>
@@ -1144,7 +1144,7 @@
           <a:p>
             <a:fld id="{7E292AB8-5F8F-4402-9592-F9413DCC0C16}" type="datetimeFigureOut">
               <a:rPr lang="en-US" smtClean="0"/>
-              <a:t>7/2/2023</a:t>
+              <a:t>7/3/2023</a:t>
             </a:fld>
             <a:endParaRPr lang="en-US"/>
           </a:p>
@@ -1409,7 +1409,7 @@
           <a:p>
             <a:fld id="{7E292AB8-5F8F-4402-9592-F9413DCC0C16}" type="datetimeFigureOut">
               <a:rPr lang="en-US" smtClean="0"/>
-              <a:t>7/2/2023</a:t>
+              <a:t>7/3/2023</a:t>
             </a:fld>
             <a:endParaRPr lang="en-US"/>
           </a:p>
@@ -1821,7 +1821,7 @@
           <a:p>
             <a:fld id="{7E292AB8-5F8F-4402-9592-F9413DCC0C16}" type="datetimeFigureOut">
               <a:rPr lang="en-US" smtClean="0"/>
-              <a:t>7/2/2023</a:t>
+              <a:t>7/3/2023</a:t>
             </a:fld>
             <a:endParaRPr lang="en-US"/>
           </a:p>
@@ -1962,7 +1962,7 @@
           <a:p>
             <a:fld id="{7E292AB8-5F8F-4402-9592-F9413DCC0C16}" type="datetimeFigureOut">
               <a:rPr lang="en-US" smtClean="0"/>
-              <a:t>7/2/2023</a:t>
+              <a:t>7/3/2023</a:t>
             </a:fld>
             <a:endParaRPr lang="en-US"/>
           </a:p>
@@ -2075,7 +2075,7 @@
           <a:p>
             <a:fld id="{7E292AB8-5F8F-4402-9592-F9413DCC0C16}" type="datetimeFigureOut">
               <a:rPr lang="en-US" smtClean="0"/>
-              <a:t>7/2/2023</a:t>
+              <a:t>7/3/2023</a:t>
             </a:fld>
             <a:endParaRPr lang="en-US"/>
           </a:p>
@@ -2386,7 +2386,7 @@
           <a:p>
             <a:fld id="{7E292AB8-5F8F-4402-9592-F9413DCC0C16}" type="datetimeFigureOut">
               <a:rPr lang="en-US" smtClean="0"/>
-              <a:t>7/2/2023</a:t>
+              <a:t>7/3/2023</a:t>
             </a:fld>
             <a:endParaRPr lang="en-US"/>
           </a:p>
@@ -2674,7 +2674,7 @@
           <a:p>
             <a:fld id="{7E292AB8-5F8F-4402-9592-F9413DCC0C16}" type="datetimeFigureOut">
               <a:rPr lang="en-US" smtClean="0"/>
-              <a:t>7/2/2023</a:t>
+              <a:t>7/3/2023</a:t>
             </a:fld>
             <a:endParaRPr lang="en-US"/>
           </a:p>
@@ -2915,7 +2915,7 @@
           <a:p>
             <a:fld id="{7E292AB8-5F8F-4402-9592-F9413DCC0C16}" type="datetimeFigureOut">
               <a:rPr lang="en-US" smtClean="0"/>
-              <a:t>7/2/2023</a:t>
+              <a:t>7/3/2023</a:t>
             </a:fld>
             <a:endParaRPr lang="en-US"/>
           </a:p>
@@ -3443,8 +3443,8 @@
           </a:p>
         </p:txBody>
       </p:sp>
-      <mc:AlternateContent xmlns:mc="http://schemas.openxmlformats.org/markup-compatibility/2006">
-        <mc:Choice xmlns:a14="http://schemas.microsoft.com/office/drawing/2010/main" Requires="a14">
+      <mc:AlternateContent xmlns:mc="http://schemas.openxmlformats.org/markup-compatibility/2006" xmlns:a14="http://schemas.microsoft.com/office/drawing/2010/main">
+        <mc:Choice Requires="a14">
           <p:sp>
             <p:nvSpPr>
               <p:cNvPr id="3" name="Content Placeholder 2">
@@ -3783,7 +3783,7 @@
             </p:txBody>
           </p:sp>
         </mc:Choice>
-        <mc:Fallback>
+        <mc:Fallback xmlns="">
           <p:sp>
             <p:nvSpPr>
               <p:cNvPr id="3" name="Content Placeholder 2">
@@ -4665,6 +4665,108 @@
             <a:r>
               <a:rPr lang="en-US" dirty="0"/>
               <a:t>Decision Tree</a:t>
+            </a:r>
+          </a:p>
+        </p:txBody>
+      </p:sp>
+      <p:sp>
+        <p:nvSpPr>
+          <p:cNvPr id="5" name="Content Placeholder 4">
+            <a:extLst>
+              <a:ext uri="{FF2B5EF4-FFF2-40B4-BE49-F238E27FC236}">
+                <a16:creationId xmlns:a16="http://schemas.microsoft.com/office/drawing/2014/main" id="{B6551173-A73A-CB52-A954-90FC88F23E27}"/>
+              </a:ext>
+            </a:extLst>
+          </p:cNvPr>
+          <p:cNvSpPr>
+            <a:spLocks noGrp="1"/>
+          </p:cNvSpPr>
+          <p:nvPr>
+            <p:ph idx="1"/>
+          </p:nvPr>
+        </p:nvSpPr>
+        <p:spPr/>
+        <p:txBody>
+          <a:bodyPr/>
+          <a:lstStyle/>
+          <a:p>
+            <a:r>
+              <a:rPr lang="en-AU" dirty="0"/>
+              <a:t>What is Decision Tree:</a:t>
+            </a:r>
+          </a:p>
+          <a:p>
+            <a:pPr lvl="1"/>
+            <a:r>
+              <a:rPr lang="en-AU" dirty="0"/>
+              <a:t>Supervised ML algorithm</a:t>
+            </a:r>
+          </a:p>
+          <a:p>
+            <a:pPr lvl="1"/>
+            <a:r>
+              <a:rPr lang="en-AU" dirty="0"/>
+              <a:t>Tree structure</a:t>
+            </a:r>
+          </a:p>
+          <a:p>
+            <a:pPr lvl="1"/>
+            <a:r>
+              <a:rPr lang="en-AU" dirty="0"/>
+              <a:t> It have root, internal and terminal nodes</a:t>
+            </a:r>
+          </a:p>
+          <a:p>
+            <a:pPr lvl="1"/>
+            <a:r>
+              <a:rPr lang="en-AU" dirty="0"/>
+              <a:t>Construction:</a:t>
+            </a:r>
+          </a:p>
+          <a:p>
+            <a:pPr lvl="2"/>
+            <a:r>
+              <a:rPr lang="en-AU" dirty="0"/>
+              <a:t>Recursively splitting train data set into subsets</a:t>
+            </a:r>
+          </a:p>
+          <a:p>
+            <a:pPr marL="914400" lvl="2" indent="0">
+              <a:buNone/>
+            </a:pPr>
+            <a:r>
+              <a:rPr lang="en-AU" dirty="0"/>
+              <a:t>     based on the values of the attributes until</a:t>
+            </a:r>
+          </a:p>
+          <a:p>
+            <a:pPr marL="914400" lvl="2" indent="0">
+              <a:buNone/>
+            </a:pPr>
+            <a:r>
+              <a:rPr lang="en-AU" dirty="0"/>
+              <a:t>     a stopping criterion is met</a:t>
+            </a:r>
+          </a:p>
+          <a:p>
+            <a:pPr lvl="2"/>
+            <a:r>
+              <a:rPr lang="en-AU" dirty="0"/>
+              <a:t>Stopping criterion:</a:t>
+            </a:r>
+          </a:p>
+          <a:p>
+            <a:pPr lvl="3"/>
+            <a:r>
+              <a:rPr lang="en-AU" dirty="0"/>
+              <a:t>Maximum depth of the tree</a:t>
+            </a:r>
+          </a:p>
+          <a:p>
+            <a:pPr lvl="3"/>
+            <a:r>
+              <a:rPr lang="en-AU" dirty="0"/>
+              <a:t>Minimum number of samples required to split a node</a:t>
             </a:r>
           </a:p>
         </p:txBody>
@@ -5463,9 +5565,16 @@
             <p:ph idx="1"/>
           </p:nvPr>
         </p:nvSpPr>
-        <p:spPr/>
-        <p:txBody>
-          <a:bodyPr/>
+        <p:spPr>
+          <a:xfrm>
+            <a:off x="838200" y="1825625"/>
+            <a:ext cx="10515600" cy="4564542"/>
+          </a:xfrm>
+        </p:spPr>
+        <p:txBody>
+          <a:bodyPr>
+            <a:normAutofit fontScale="85000" lnSpcReduction="10000"/>
+          </a:bodyPr>
           <a:lstStyle/>
           <a:p>
             <a:r>
@@ -5490,29 +5599,71 @@
             <a:pPr lvl="2"/>
             <a:r>
               <a:rPr lang="en-US" dirty="0"/>
-              <a:t>Accuracy</a:t>
+              <a:t>Accuracy: Ratio between the number of all correct predictions to the total number of data points.</a:t>
             </a:r>
           </a:p>
           <a:p>
             <a:pPr lvl="2"/>
+            <a:endParaRPr lang="en-US" dirty="0"/>
+          </a:p>
+          <a:p>
+            <a:pPr lvl="2"/>
             <a:r>
               <a:rPr lang="en-US" dirty="0"/>
-              <a:t>Recall/Sensitivity - TPR</a:t>
-            </a:r>
+              <a:t>Recall/Sensitivity – TPR: Ratio between </a:t>
+            </a:r>
+            <a:r>
+              <a:rPr lang="en-AU" dirty="0"/>
+              <a:t>the number of correct positive predictions to the total number of positives</a:t>
+            </a:r>
+            <a:endParaRPr lang="en-US" dirty="0"/>
           </a:p>
           <a:p>
             <a:pPr lvl="2"/>
+            <a:endParaRPr lang="en-US" dirty="0"/>
+          </a:p>
+          <a:p>
+            <a:pPr lvl="2"/>
             <a:r>
               <a:rPr lang="en-US" dirty="0"/>
-              <a:t>Precision</a:t>
-            </a:r>
+              <a:t>Precision: Ratio between </a:t>
+            </a:r>
+            <a:r>
+              <a:rPr lang="en-AU" dirty="0"/>
+              <a:t>the number of correct positive predictions to the total number of positive predictions</a:t>
+            </a:r>
+            <a:endParaRPr lang="en-US" dirty="0"/>
           </a:p>
           <a:p>
             <a:pPr lvl="2"/>
+            <a:endParaRPr lang="en-US" dirty="0"/>
+          </a:p>
+          <a:p>
+            <a:pPr lvl="2"/>
             <a:r>
               <a:rPr lang="en-US" dirty="0"/>
-              <a:t>FPR</a:t>
-            </a:r>
+              <a:t>FPR: Ratio between </a:t>
+            </a:r>
+            <a:r>
+              <a:rPr lang="en-AU" dirty="0"/>
+              <a:t>the number of incorrect positive predictions to the total number of negatives</a:t>
+            </a:r>
+          </a:p>
+          <a:p>
+            <a:pPr lvl="2"/>
+            <a:endParaRPr lang="en-US" dirty="0"/>
+          </a:p>
+          <a:p>
+            <a:pPr lvl="2"/>
+            <a:r>
+              <a:rPr lang="en-US" dirty="0"/>
+              <a:t>Specificity: Ratio between </a:t>
+            </a:r>
+            <a:r>
+              <a:rPr lang="en-AU" dirty="0"/>
+              <a:t>the number of correct negative predictions to the total number of negatives</a:t>
+            </a:r>
+            <a:endParaRPr lang="en-US" dirty="0"/>
           </a:p>
           <a:p>
             <a:pPr lvl="1"/>

</xml_diff>

<commit_message>
Corrected the Indicators of Success of a Classification System. Generalized it for multi class classification
</commit_message>
<xml_diff>
--- a/DecisionTrees/DecisionTrees.pptx
+++ b/DecisionTrees/DecisionTrees.pptx
@@ -7,8 +7,8 @@
   <p:sldIdLst>
     <p:sldId id="256" r:id="rId2"/>
     <p:sldId id="257" r:id="rId3"/>
-    <p:sldId id="258" r:id="rId4"/>
-    <p:sldId id="259" r:id="rId5"/>
+    <p:sldId id="259" r:id="rId4"/>
+    <p:sldId id="258" r:id="rId5"/>
     <p:sldId id="260" r:id="rId6"/>
     <p:sldId id="261" r:id="rId7"/>
     <p:sldId id="262" r:id="rId8"/>
@@ -4625,6 +4625,888 @@
 </file>
 
 <file path=ppt/slides/slide3.xml><?xml version="1.0" encoding="utf-8"?>
+<p:sld xmlns:a="http://schemas.openxmlformats.org/drawingml/2006/main" xmlns:r="http://schemas.openxmlformats.org/officeDocument/2006/relationships" xmlns:p="http://schemas.openxmlformats.org/presentationml/2006/main">
+  <p:cSld>
+    <p:spTree>
+      <p:nvGrpSpPr>
+        <p:cNvPr id="1" name=""/>
+        <p:cNvGrpSpPr/>
+        <p:nvPr/>
+      </p:nvGrpSpPr>
+      <p:grpSpPr>
+        <a:xfrm>
+          <a:off x="0" y="0"/>
+          <a:ext cx="0" cy="0"/>
+          <a:chOff x="0" y="0"/>
+          <a:chExt cx="0" cy="0"/>
+        </a:xfrm>
+      </p:grpSpPr>
+      <p:sp>
+        <p:nvSpPr>
+          <p:cNvPr id="2" name="Title 1">
+            <a:extLst>
+              <a:ext uri="{FF2B5EF4-FFF2-40B4-BE49-F238E27FC236}">
+                <a16:creationId xmlns:a16="http://schemas.microsoft.com/office/drawing/2014/main" id="{3D125364-4385-6331-2E0E-02C1915293E0}"/>
+              </a:ext>
+            </a:extLst>
+          </p:cNvPr>
+          <p:cNvSpPr>
+            <a:spLocks noGrp="1"/>
+          </p:cNvSpPr>
+          <p:nvPr>
+            <p:ph type="title"/>
+          </p:nvPr>
+        </p:nvSpPr>
+        <p:spPr/>
+        <p:txBody>
+          <a:bodyPr/>
+          <a:lstStyle/>
+          <a:p>
+            <a:r>
+              <a:rPr lang="en-US" dirty="0"/>
+              <a:t>Understanding Success</a:t>
+            </a:r>
+          </a:p>
+        </p:txBody>
+      </p:sp>
+      <p:sp>
+        <p:nvSpPr>
+          <p:cNvPr id="3" name="Content Placeholder 2">
+            <a:extLst>
+              <a:ext uri="{FF2B5EF4-FFF2-40B4-BE49-F238E27FC236}">
+                <a16:creationId xmlns:a16="http://schemas.microsoft.com/office/drawing/2014/main" id="{D45CFC62-A670-21F7-0A1B-08F4DCC6C8DE}"/>
+              </a:ext>
+            </a:extLst>
+          </p:cNvPr>
+          <p:cNvSpPr>
+            <a:spLocks noGrp="1"/>
+          </p:cNvSpPr>
+          <p:nvPr>
+            <p:ph idx="1"/>
+          </p:nvPr>
+        </p:nvSpPr>
+        <p:spPr>
+          <a:xfrm>
+            <a:off x="838200" y="1825625"/>
+            <a:ext cx="10515600" cy="1446081"/>
+          </a:xfrm>
+        </p:spPr>
+        <p:txBody>
+          <a:bodyPr>
+            <a:normAutofit/>
+          </a:bodyPr>
+          <a:lstStyle/>
+          <a:p>
+            <a:r>
+              <a:rPr lang="en-US" dirty="0"/>
+              <a:t>Effectiveness of a classification system is measured by using a dataset that has existing class labels. </a:t>
+            </a:r>
+          </a:p>
+          <a:p>
+            <a:r>
+              <a:rPr lang="en-US" dirty="0"/>
+              <a:t>Indicators:</a:t>
+            </a:r>
+          </a:p>
+        </p:txBody>
+      </p:sp>
+      <mc:AlternateContent xmlns:mc="http://schemas.openxmlformats.org/markup-compatibility/2006">
+        <mc:Choice xmlns:a14="http://schemas.microsoft.com/office/drawing/2010/main" Requires="a14">
+          <p:sp>
+            <p:nvSpPr>
+              <p:cNvPr id="5" name="TextBox 4">
+                <a:extLst>
+                  <a:ext uri="{FF2B5EF4-FFF2-40B4-BE49-F238E27FC236}">
+                    <a16:creationId xmlns:a16="http://schemas.microsoft.com/office/drawing/2014/main" id="{3ECB4C24-4F98-E772-A8BC-A22E9F7D878E}"/>
+                  </a:ext>
+                </a:extLst>
+              </p:cNvPr>
+              <p:cNvSpPr txBox="1"/>
+              <p:nvPr/>
+            </p:nvSpPr>
+            <p:spPr>
+              <a:xfrm>
+                <a:off x="2036427" y="3429000"/>
+                <a:ext cx="6094602" cy="618311"/>
+              </a:xfrm>
+              <a:prstGeom prst="rect">
+                <a:avLst/>
+              </a:prstGeom>
+              <a:noFill/>
+            </p:spPr>
+            <p:txBody>
+              <a:bodyPr wrap="square">
+                <a:spAutoFit/>
+              </a:bodyPr>
+              <a:lstStyle/>
+              <a:p>
+                <a:pPr/>
+                <a14:m>
+                  <m:oMathPara xmlns:m="http://schemas.openxmlformats.org/officeDocument/2006/math">
+                    <m:oMathParaPr>
+                      <m:jc m:val="left"/>
+                    </m:oMathParaPr>
+                    <m:oMath xmlns:m="http://schemas.openxmlformats.org/officeDocument/2006/math">
+                      <m:r>
+                        <a:rPr lang="en-US" sz="1800" b="0" i="1" smtClean="0">
+                          <a:latin typeface="Cambria Math" panose="02040503050406030204" pitchFamily="18" charset="0"/>
+                        </a:rPr>
+                        <m:t>𝐴𝑐𝑐𝑢𝑟𝑎𝑐𝑦</m:t>
+                      </m:r>
+                      <m:r>
+                        <a:rPr lang="en-US" sz="1800" b="0" i="1" smtClean="0">
+                          <a:latin typeface="Cambria Math" panose="02040503050406030204" pitchFamily="18" charset="0"/>
+                        </a:rPr>
+                        <m:t>=</m:t>
+                      </m:r>
+                      <m:f>
+                        <m:fPr>
+                          <m:ctrlPr>
+                            <a:rPr lang="en-US" sz="1800" b="0" i="1" smtClean="0">
+                              <a:latin typeface="Cambria Math" panose="02040503050406030204" pitchFamily="18" charset="0"/>
+                            </a:rPr>
+                          </m:ctrlPr>
+                        </m:fPr>
+                        <m:num>
+                          <m:r>
+                            <a:rPr lang="en-US" sz="1800" i="1">
+                              <a:latin typeface="Cambria Math" panose="02040503050406030204" pitchFamily="18" charset="0"/>
+                            </a:rPr>
+                            <m:t># </m:t>
+                          </m:r>
+                          <m:r>
+                            <a:rPr lang="en-US" sz="1800" i="1">
+                              <a:latin typeface="Cambria Math" panose="02040503050406030204" pitchFamily="18" charset="0"/>
+                            </a:rPr>
+                            <m:t>𝐶𝑜𝑟𝑟𝑒𝑐𝑡</m:t>
+                          </m:r>
+                          <m:r>
+                            <a:rPr lang="en-US" sz="1800" b="0" i="1" smtClean="0">
+                              <a:latin typeface="Cambria Math" panose="02040503050406030204" pitchFamily="18" charset="0"/>
+                            </a:rPr>
+                            <m:t> </m:t>
+                          </m:r>
+                          <m:r>
+                            <a:rPr lang="en-US" sz="1800" b="0" i="1" smtClean="0">
+                              <a:latin typeface="Cambria Math" panose="02040503050406030204" pitchFamily="18" charset="0"/>
+                            </a:rPr>
+                            <m:t>𝑃𝑟𝑒𝑑𝑖𝑐𝑡𝑖𝑜𝑛𝑠</m:t>
+                          </m:r>
+                        </m:num>
+                        <m:den>
+                          <m:r>
+                            <a:rPr lang="en-US" sz="1800" b="0" i="1" smtClean="0">
+                              <a:latin typeface="Cambria Math" panose="02040503050406030204" pitchFamily="18" charset="0"/>
+                            </a:rPr>
+                            <m:t># </m:t>
+                          </m:r>
+                          <m:r>
+                            <a:rPr lang="en-US" sz="1800" b="0" i="1" smtClean="0">
+                              <a:latin typeface="Cambria Math" panose="02040503050406030204" pitchFamily="18" charset="0"/>
+                            </a:rPr>
+                            <m:t>𝐷𝑎𝑡𝑎</m:t>
+                          </m:r>
+                          <m:r>
+                            <a:rPr lang="en-US" sz="1800" b="0" i="1" smtClean="0">
+                              <a:latin typeface="Cambria Math" panose="02040503050406030204" pitchFamily="18" charset="0"/>
+                            </a:rPr>
+                            <m:t> </m:t>
+                          </m:r>
+                          <m:r>
+                            <a:rPr lang="en-US" sz="1800" b="0" i="1" smtClean="0">
+                              <a:latin typeface="Cambria Math" panose="02040503050406030204" pitchFamily="18" charset="0"/>
+                            </a:rPr>
+                            <m:t>𝑃𝑜𝑖𝑛𝑡𝑠</m:t>
+                          </m:r>
+                        </m:den>
+                      </m:f>
+                    </m:oMath>
+                  </m:oMathPara>
+                </a14:m>
+                <a:endParaRPr lang="en-US" dirty="0"/>
+              </a:p>
+            </p:txBody>
+          </p:sp>
+        </mc:Choice>
+        <mc:Fallback>
+          <p:sp>
+            <p:nvSpPr>
+              <p:cNvPr id="5" name="TextBox 4">
+                <a:extLst>
+                  <a:ext uri="{FF2B5EF4-FFF2-40B4-BE49-F238E27FC236}">
+                    <a16:creationId xmlns:a16="http://schemas.microsoft.com/office/drawing/2014/main" id="{3ECB4C24-4F98-E772-A8BC-A22E9F7D878E}"/>
+                  </a:ext>
+                </a:extLst>
+              </p:cNvPr>
+              <p:cNvSpPr txBox="1">
+                <a:spLocks noRot="1" noChangeAspect="1" noMove="1" noResize="1" noEditPoints="1" noAdjustHandles="1" noChangeArrowheads="1" noChangeShapeType="1" noTextEdit="1"/>
+              </p:cNvSpPr>
+              <p:nvPr/>
+            </p:nvSpPr>
+            <p:spPr>
+              <a:xfrm>
+                <a:off x="2036427" y="3429000"/>
+                <a:ext cx="6094602" cy="618311"/>
+              </a:xfrm>
+              <a:prstGeom prst="rect">
+                <a:avLst/>
+              </a:prstGeom>
+              <a:blipFill>
+                <a:blip r:embed="rId2"/>
+                <a:stretch>
+                  <a:fillRect/>
+                </a:stretch>
+              </a:blipFill>
+            </p:spPr>
+            <p:txBody>
+              <a:bodyPr/>
+              <a:lstStyle/>
+              <a:p>
+                <a:r>
+                  <a:rPr lang="en-US">
+                    <a:noFill/>
+                  </a:rPr>
+                  <a:t> </a:t>
+                </a:r>
+              </a:p>
+            </p:txBody>
+          </p:sp>
+        </mc:Fallback>
+      </mc:AlternateContent>
+      <mc:AlternateContent xmlns:mc="http://schemas.openxmlformats.org/markup-compatibility/2006">
+        <mc:Choice xmlns:a14="http://schemas.microsoft.com/office/drawing/2010/main" Requires="a14">
+          <p:sp>
+            <p:nvSpPr>
+              <p:cNvPr id="7" name="TextBox 6">
+                <a:extLst>
+                  <a:ext uri="{FF2B5EF4-FFF2-40B4-BE49-F238E27FC236}">
+                    <a16:creationId xmlns:a16="http://schemas.microsoft.com/office/drawing/2014/main" id="{E644D50E-30AC-B0ED-E9EC-DE126F5DF01D}"/>
+                  </a:ext>
+                </a:extLst>
+              </p:cNvPr>
+              <p:cNvSpPr txBox="1"/>
+              <p:nvPr/>
+            </p:nvSpPr>
+            <p:spPr>
+              <a:xfrm>
+                <a:off x="2036427" y="4334919"/>
+                <a:ext cx="6094602" cy="665760"/>
+              </a:xfrm>
+              <a:prstGeom prst="rect">
+                <a:avLst/>
+              </a:prstGeom>
+              <a:noFill/>
+            </p:spPr>
+            <p:txBody>
+              <a:bodyPr wrap="square">
+                <a:spAutoFit/>
+              </a:bodyPr>
+              <a:lstStyle/>
+              <a:p>
+                <a:pPr/>
+                <a14:m>
+                  <m:oMathPara xmlns:m="http://schemas.openxmlformats.org/officeDocument/2006/math">
+                    <m:oMathParaPr>
+                      <m:jc m:val="left"/>
+                    </m:oMathParaPr>
+                    <m:oMath xmlns:m="http://schemas.openxmlformats.org/officeDocument/2006/math">
+                      <m:r>
+                        <a:rPr lang="en-US" sz="1800" b="0" i="1" smtClean="0">
+                          <a:latin typeface="Cambria Math" panose="02040503050406030204" pitchFamily="18" charset="0"/>
+                        </a:rPr>
+                        <m:t>𝑅𝑒𝑐𝑎𝑙𝑙</m:t>
+                      </m:r>
+                      <m:r>
+                        <a:rPr lang="en-US" sz="1800" b="0" i="1" smtClean="0">
+                          <a:latin typeface="Cambria Math" panose="02040503050406030204" pitchFamily="18" charset="0"/>
+                        </a:rPr>
+                        <m:t> </m:t>
+                      </m:r>
+                      <m:r>
+                        <a:rPr lang="en-US" sz="1800" b="0" i="1" smtClean="0">
+                          <a:latin typeface="Cambria Math" panose="02040503050406030204" pitchFamily="18" charset="0"/>
+                        </a:rPr>
+                        <m:t>𝑓𝑜𝑟</m:t>
+                      </m:r>
+                      <m:r>
+                        <a:rPr lang="en-US" sz="1800" b="0" i="1" smtClean="0">
+                          <a:latin typeface="Cambria Math" panose="02040503050406030204" pitchFamily="18" charset="0"/>
+                        </a:rPr>
+                        <m:t> </m:t>
+                      </m:r>
+                      <m:sSub>
+                        <m:sSubPr>
+                          <m:ctrlPr>
+                            <a:rPr lang="en-US" sz="1800" b="0" i="1" smtClean="0">
+                              <a:latin typeface="Cambria Math" panose="02040503050406030204" pitchFamily="18" charset="0"/>
+                            </a:rPr>
+                          </m:ctrlPr>
+                        </m:sSubPr>
+                        <m:e>
+                          <m:r>
+                            <a:rPr lang="en-US" sz="1800" b="0" i="1" smtClean="0">
+                              <a:latin typeface="Cambria Math" panose="02040503050406030204" pitchFamily="18" charset="0"/>
+                            </a:rPr>
+                            <m:t>𝐶</m:t>
+                          </m:r>
+                        </m:e>
+                        <m:sub>
+                          <m:r>
+                            <a:rPr lang="en-US" sz="1800" b="0" i="1" smtClean="0">
+                              <a:latin typeface="Cambria Math" panose="02040503050406030204" pitchFamily="18" charset="0"/>
+                            </a:rPr>
+                            <m:t>𝑖</m:t>
+                          </m:r>
+                        </m:sub>
+                      </m:sSub>
+                      <m:r>
+                        <a:rPr lang="en-US" sz="1800" b="0" i="1" smtClean="0">
+                          <a:latin typeface="Cambria Math" panose="02040503050406030204" pitchFamily="18" charset="0"/>
+                        </a:rPr>
+                        <m:t>=</m:t>
+                      </m:r>
+                      <m:f>
+                        <m:fPr>
+                          <m:ctrlPr>
+                            <a:rPr lang="en-US" sz="1800" b="0" i="1" smtClean="0">
+                              <a:latin typeface="Cambria Math" panose="02040503050406030204" pitchFamily="18" charset="0"/>
+                            </a:rPr>
+                          </m:ctrlPr>
+                        </m:fPr>
+                        <m:num>
+                          <m:r>
+                            <a:rPr lang="en-US" sz="1800" b="0" i="1" smtClean="0">
+                              <a:latin typeface="Cambria Math" panose="02040503050406030204" pitchFamily="18" charset="0"/>
+                            </a:rPr>
+                            <m:t># </m:t>
+                          </m:r>
+                          <m:r>
+                            <a:rPr lang="en-US" sz="1800" b="0" i="1" smtClean="0">
+                              <a:latin typeface="Cambria Math" panose="02040503050406030204" pitchFamily="18" charset="0"/>
+                            </a:rPr>
+                            <m:t>𝐶𝑜𝑟𝑟𝑒𝑐𝑡</m:t>
+                          </m:r>
+                          <m:r>
+                            <a:rPr lang="en-US" sz="1800" b="0" i="1" smtClean="0">
+                              <a:latin typeface="Cambria Math" panose="02040503050406030204" pitchFamily="18" charset="0"/>
+                            </a:rPr>
+                            <m:t> </m:t>
+                          </m:r>
+                          <m:r>
+                            <a:rPr lang="en-US" sz="1800" b="0" i="1" smtClean="0">
+                              <a:latin typeface="Cambria Math" panose="02040503050406030204" pitchFamily="18" charset="0"/>
+                            </a:rPr>
+                            <m:t>𝐶𝑙𝑎𝑠𝑠</m:t>
+                          </m:r>
+                          <m:r>
+                            <a:rPr lang="en-US" sz="1800" b="0" i="1" smtClean="0">
+                              <a:latin typeface="Cambria Math" panose="02040503050406030204" pitchFamily="18" charset="0"/>
+                            </a:rPr>
+                            <m:t> </m:t>
+                          </m:r>
+                          <m:r>
+                            <a:rPr lang="en-US" sz="1800" b="0" i="1" smtClean="0">
+                              <a:latin typeface="Cambria Math" panose="02040503050406030204" pitchFamily="18" charset="0"/>
+                            </a:rPr>
+                            <m:t>𝑃𝑟𝑒𝑑𝑖𝑐𝑡𝑖𝑜𝑛𝑠</m:t>
+                          </m:r>
+                          <m:r>
+                            <a:rPr lang="en-US" sz="1800" b="0" i="1" smtClean="0">
+                              <a:latin typeface="Cambria Math" panose="02040503050406030204" pitchFamily="18" charset="0"/>
+                            </a:rPr>
+                            <m:t> </m:t>
+                          </m:r>
+                          <m:r>
+                            <a:rPr lang="en-US" sz="1800" b="0" i="1" smtClean="0">
+                              <a:latin typeface="Cambria Math" panose="02040503050406030204" pitchFamily="18" charset="0"/>
+                            </a:rPr>
+                            <m:t>𝑓𝑜𝑟</m:t>
+                          </m:r>
+                          <m:r>
+                            <a:rPr lang="en-US" sz="1800" b="0" i="1" smtClean="0">
+                              <a:latin typeface="Cambria Math" panose="02040503050406030204" pitchFamily="18" charset="0"/>
+                            </a:rPr>
+                            <m:t> </m:t>
+                          </m:r>
+                          <m:r>
+                            <a:rPr lang="en-US" sz="1800" b="0" i="1" smtClean="0">
+                              <a:latin typeface="Cambria Math" panose="02040503050406030204" pitchFamily="18" charset="0"/>
+                            </a:rPr>
+                            <m:t>𝐶𝑙𝑎𝑠𝑠</m:t>
+                          </m:r>
+                          <m:r>
+                            <a:rPr lang="en-US" sz="1800" b="0" i="1" smtClean="0">
+                              <a:latin typeface="Cambria Math" panose="02040503050406030204" pitchFamily="18" charset="0"/>
+                            </a:rPr>
+                            <m:t> </m:t>
+                          </m:r>
+                          <m:sSub>
+                            <m:sSubPr>
+                              <m:ctrlPr>
+                                <a:rPr lang="en-US" sz="1800" b="0" i="1" smtClean="0">
+                                  <a:latin typeface="Cambria Math" panose="02040503050406030204" pitchFamily="18" charset="0"/>
+                                </a:rPr>
+                              </m:ctrlPr>
+                            </m:sSubPr>
+                            <m:e>
+                              <m:r>
+                                <a:rPr lang="en-US" sz="1800" b="0" i="1" smtClean="0">
+                                  <a:latin typeface="Cambria Math" panose="02040503050406030204" pitchFamily="18" charset="0"/>
+                                </a:rPr>
+                                <m:t>𝐶</m:t>
+                              </m:r>
+                            </m:e>
+                            <m:sub>
+                              <m:r>
+                                <a:rPr lang="en-US" sz="1800" b="0" i="1" smtClean="0">
+                                  <a:latin typeface="Cambria Math" panose="02040503050406030204" pitchFamily="18" charset="0"/>
+                                </a:rPr>
+                                <m:t>𝑖</m:t>
+                              </m:r>
+                            </m:sub>
+                          </m:sSub>
+                        </m:num>
+                        <m:den>
+                          <m:r>
+                            <a:rPr lang="en-US" sz="1800" b="0" i="1" smtClean="0">
+                              <a:latin typeface="Cambria Math" panose="02040503050406030204" pitchFamily="18" charset="0"/>
+                            </a:rPr>
+                            <m:t># </m:t>
+                          </m:r>
+                          <m:r>
+                            <a:rPr lang="en-US" sz="1800" b="0" i="1" smtClean="0">
+                              <a:latin typeface="Cambria Math" panose="02040503050406030204" pitchFamily="18" charset="0"/>
+                            </a:rPr>
+                            <m:t>𝐶𝑙𝑎𝑠𝑠</m:t>
+                          </m:r>
+                          <m:r>
+                            <a:rPr lang="en-US" sz="1800" b="0" i="1" smtClean="0">
+                              <a:latin typeface="Cambria Math" panose="02040503050406030204" pitchFamily="18" charset="0"/>
+                            </a:rPr>
+                            <m:t> </m:t>
+                          </m:r>
+                          <m:sSub>
+                            <m:sSubPr>
+                              <m:ctrlPr>
+                                <a:rPr lang="en-US" sz="1800" b="0" i="1" smtClean="0">
+                                  <a:latin typeface="Cambria Math" panose="02040503050406030204" pitchFamily="18" charset="0"/>
+                                </a:rPr>
+                              </m:ctrlPr>
+                            </m:sSubPr>
+                            <m:e>
+                              <m:r>
+                                <a:rPr lang="en-US" sz="1800" b="0" i="1" smtClean="0">
+                                  <a:latin typeface="Cambria Math" panose="02040503050406030204" pitchFamily="18" charset="0"/>
+                                </a:rPr>
+                                <m:t>𝐶</m:t>
+                              </m:r>
+                            </m:e>
+                            <m:sub>
+                              <m:r>
+                                <a:rPr lang="en-US" sz="1800" b="0" i="1" smtClean="0">
+                                  <a:latin typeface="Cambria Math" panose="02040503050406030204" pitchFamily="18" charset="0"/>
+                                </a:rPr>
+                                <m:t>𝑖</m:t>
+                              </m:r>
+                            </m:sub>
+                          </m:sSub>
+                          <m:r>
+                            <a:rPr lang="en-US" sz="1800" b="0" i="1" smtClean="0">
+                              <a:latin typeface="Cambria Math" panose="02040503050406030204" pitchFamily="18" charset="0"/>
+                            </a:rPr>
+                            <m:t> </m:t>
+                          </m:r>
+                          <m:r>
+                            <a:rPr lang="en-US" sz="1800" b="0" i="1" smtClean="0">
+                              <a:latin typeface="Cambria Math" panose="02040503050406030204" pitchFamily="18" charset="0"/>
+                            </a:rPr>
+                            <m:t>𝐷𝑎𝑡𝑎</m:t>
+                          </m:r>
+                          <m:r>
+                            <a:rPr lang="en-US" sz="1800" b="0" i="1" smtClean="0">
+                              <a:latin typeface="Cambria Math" panose="02040503050406030204" pitchFamily="18" charset="0"/>
+                            </a:rPr>
+                            <m:t> </m:t>
+                          </m:r>
+                          <m:r>
+                            <a:rPr lang="en-US" sz="1800" b="0" i="1" smtClean="0">
+                              <a:latin typeface="Cambria Math" panose="02040503050406030204" pitchFamily="18" charset="0"/>
+                            </a:rPr>
+                            <m:t>𝑃𝑜𝑖𝑛𝑡𝑠</m:t>
+                          </m:r>
+                        </m:den>
+                      </m:f>
+                    </m:oMath>
+                  </m:oMathPara>
+                </a14:m>
+                <a:endParaRPr lang="en-US" dirty="0"/>
+              </a:p>
+            </p:txBody>
+          </p:sp>
+        </mc:Choice>
+        <mc:Fallback>
+          <p:sp>
+            <p:nvSpPr>
+              <p:cNvPr id="7" name="TextBox 6">
+                <a:extLst>
+                  <a:ext uri="{FF2B5EF4-FFF2-40B4-BE49-F238E27FC236}">
+                    <a16:creationId xmlns:a16="http://schemas.microsoft.com/office/drawing/2014/main" id="{E644D50E-30AC-B0ED-E9EC-DE126F5DF01D}"/>
+                  </a:ext>
+                </a:extLst>
+              </p:cNvPr>
+              <p:cNvSpPr txBox="1">
+                <a:spLocks noRot="1" noChangeAspect="1" noMove="1" noResize="1" noEditPoints="1" noAdjustHandles="1" noChangeArrowheads="1" noChangeShapeType="1" noTextEdit="1"/>
+              </p:cNvSpPr>
+              <p:nvPr/>
+            </p:nvSpPr>
+            <p:spPr>
+              <a:xfrm>
+                <a:off x="2036427" y="4334919"/>
+                <a:ext cx="6094602" cy="665760"/>
+              </a:xfrm>
+              <a:prstGeom prst="rect">
+                <a:avLst/>
+              </a:prstGeom>
+              <a:blipFill>
+                <a:blip r:embed="rId3"/>
+                <a:stretch>
+                  <a:fillRect/>
+                </a:stretch>
+              </a:blipFill>
+            </p:spPr>
+            <p:txBody>
+              <a:bodyPr/>
+              <a:lstStyle/>
+              <a:p>
+                <a:r>
+                  <a:rPr lang="en-US">
+                    <a:noFill/>
+                  </a:rPr>
+                  <a:t> </a:t>
+                </a:r>
+              </a:p>
+            </p:txBody>
+          </p:sp>
+        </mc:Fallback>
+      </mc:AlternateContent>
+      <mc:AlternateContent xmlns:mc="http://schemas.openxmlformats.org/markup-compatibility/2006">
+        <mc:Choice xmlns:a14="http://schemas.microsoft.com/office/drawing/2010/main" Requires="a14">
+          <p:sp>
+            <p:nvSpPr>
+              <p:cNvPr id="9" name="TextBox 8">
+                <a:extLst>
+                  <a:ext uri="{FF2B5EF4-FFF2-40B4-BE49-F238E27FC236}">
+                    <a16:creationId xmlns:a16="http://schemas.microsoft.com/office/drawing/2014/main" id="{B29ABD4C-3B77-B5C9-0DC5-B371E4EC40B2}"/>
+                  </a:ext>
+                </a:extLst>
+              </p:cNvPr>
+              <p:cNvSpPr txBox="1"/>
+              <p:nvPr/>
+            </p:nvSpPr>
+            <p:spPr>
+              <a:xfrm>
+                <a:off x="2036427" y="5401027"/>
+                <a:ext cx="7725562" cy="665760"/>
+              </a:xfrm>
+              <a:prstGeom prst="rect">
+                <a:avLst/>
+              </a:prstGeom>
+              <a:noFill/>
+            </p:spPr>
+            <p:txBody>
+              <a:bodyPr wrap="square">
+                <a:spAutoFit/>
+              </a:bodyPr>
+              <a:lstStyle/>
+              <a:p>
+                <a:pPr/>
+                <a14:m>
+                  <m:oMathPara xmlns:m="http://schemas.openxmlformats.org/officeDocument/2006/math">
+                    <m:oMathParaPr>
+                      <m:jc m:val="left"/>
+                    </m:oMathParaPr>
+                    <m:oMath xmlns:m="http://schemas.openxmlformats.org/officeDocument/2006/math">
+                      <m:r>
+                        <a:rPr lang="en-US" sz="1800" b="0" i="1" smtClean="0">
+                          <a:latin typeface="Cambria Math" panose="02040503050406030204" pitchFamily="18" charset="0"/>
+                        </a:rPr>
+                        <m:t>𝑃𝑟𝑒𝑐𝑖𝑠𝑖𝑜𝑛</m:t>
+                      </m:r>
+                      <m:r>
+                        <a:rPr lang="en-US" sz="1800" b="0" i="1" smtClean="0">
+                          <a:latin typeface="Cambria Math" panose="02040503050406030204" pitchFamily="18" charset="0"/>
+                        </a:rPr>
+                        <m:t> </m:t>
+                      </m:r>
+                      <m:r>
+                        <a:rPr lang="en-US" sz="1800" b="0" i="1" smtClean="0">
+                          <a:latin typeface="Cambria Math" panose="02040503050406030204" pitchFamily="18" charset="0"/>
+                        </a:rPr>
+                        <m:t>𝑓𝑜𝑟</m:t>
+                      </m:r>
+                      <m:r>
+                        <a:rPr lang="en-US" sz="1800" b="0" i="1" smtClean="0">
+                          <a:latin typeface="Cambria Math" panose="02040503050406030204" pitchFamily="18" charset="0"/>
+                        </a:rPr>
+                        <m:t> </m:t>
+                      </m:r>
+                      <m:sSub>
+                        <m:sSubPr>
+                          <m:ctrlPr>
+                            <a:rPr lang="en-US" sz="1800" b="0" i="1" smtClean="0">
+                              <a:latin typeface="Cambria Math" panose="02040503050406030204" pitchFamily="18" charset="0"/>
+                            </a:rPr>
+                          </m:ctrlPr>
+                        </m:sSubPr>
+                        <m:e>
+                          <m:r>
+                            <a:rPr lang="en-US" sz="1800" b="0" i="1" smtClean="0">
+                              <a:latin typeface="Cambria Math" panose="02040503050406030204" pitchFamily="18" charset="0"/>
+                            </a:rPr>
+                            <m:t>𝐶</m:t>
+                          </m:r>
+                        </m:e>
+                        <m:sub>
+                          <m:r>
+                            <a:rPr lang="en-US" sz="1800" b="0" i="1" smtClean="0">
+                              <a:latin typeface="Cambria Math" panose="02040503050406030204" pitchFamily="18" charset="0"/>
+                            </a:rPr>
+                            <m:t>𝑖</m:t>
+                          </m:r>
+                        </m:sub>
+                      </m:sSub>
+                      <m:r>
+                        <a:rPr lang="en-US" sz="1800" b="0" i="1" smtClean="0">
+                          <a:latin typeface="Cambria Math" panose="02040503050406030204" pitchFamily="18" charset="0"/>
+                        </a:rPr>
+                        <m:t>=</m:t>
+                      </m:r>
+                      <m:f>
+                        <m:fPr>
+                          <m:ctrlPr>
+                            <a:rPr lang="en-US" sz="1800" b="0" i="1" smtClean="0">
+                              <a:latin typeface="Cambria Math" panose="02040503050406030204" pitchFamily="18" charset="0"/>
+                            </a:rPr>
+                          </m:ctrlPr>
+                        </m:fPr>
+                        <m:num>
+                          <m:r>
+                            <a:rPr lang="en-US" sz="1800" b="0" i="1" smtClean="0">
+                              <a:latin typeface="Cambria Math" panose="02040503050406030204" pitchFamily="18" charset="0"/>
+                            </a:rPr>
+                            <m:t># </m:t>
+                          </m:r>
+                          <m:r>
+                            <a:rPr lang="en-US" sz="1800" b="0" i="1" smtClean="0">
+                              <a:latin typeface="Cambria Math" panose="02040503050406030204" pitchFamily="18" charset="0"/>
+                            </a:rPr>
+                            <m:t>𝐶𝑜𝑟𝑟𝑒𝑐𝑡</m:t>
+                          </m:r>
+                          <m:r>
+                            <a:rPr lang="en-US" sz="1800" b="0" i="1" smtClean="0">
+                              <a:latin typeface="Cambria Math" panose="02040503050406030204" pitchFamily="18" charset="0"/>
+                            </a:rPr>
+                            <m:t> </m:t>
+                          </m:r>
+                          <m:r>
+                            <a:rPr lang="en-US" sz="1800" b="0" i="1" smtClean="0">
+                              <a:latin typeface="Cambria Math" panose="02040503050406030204" pitchFamily="18" charset="0"/>
+                            </a:rPr>
+                            <m:t>𝐶𝑙𝑎𝑠𝑠</m:t>
+                          </m:r>
+                          <m:r>
+                            <a:rPr lang="en-US" sz="1800" b="0" i="1" smtClean="0">
+                              <a:latin typeface="Cambria Math" panose="02040503050406030204" pitchFamily="18" charset="0"/>
+                            </a:rPr>
+                            <m:t> </m:t>
+                          </m:r>
+                          <m:r>
+                            <a:rPr lang="en-US" sz="1800" b="0" i="1" smtClean="0">
+                              <a:latin typeface="Cambria Math" panose="02040503050406030204" pitchFamily="18" charset="0"/>
+                            </a:rPr>
+                            <m:t>𝑃𝑟𝑒𝑑𝑖𝑐𝑡𝑖𝑜𝑛𝑠</m:t>
+                          </m:r>
+                          <m:r>
+                            <a:rPr lang="en-US" sz="1800" b="0" i="1" smtClean="0">
+                              <a:latin typeface="Cambria Math" panose="02040503050406030204" pitchFamily="18" charset="0"/>
+                            </a:rPr>
+                            <m:t> </m:t>
+                          </m:r>
+                          <m:r>
+                            <a:rPr lang="en-US" sz="1800" b="0" i="1" smtClean="0">
+                              <a:latin typeface="Cambria Math" panose="02040503050406030204" pitchFamily="18" charset="0"/>
+                            </a:rPr>
+                            <m:t>𝑓𝑜𝑟</m:t>
+                          </m:r>
+                          <m:r>
+                            <a:rPr lang="en-US" sz="1800" b="0" i="1" smtClean="0">
+                              <a:latin typeface="Cambria Math" panose="02040503050406030204" pitchFamily="18" charset="0"/>
+                            </a:rPr>
+                            <m:t> </m:t>
+                          </m:r>
+                          <m:r>
+                            <a:rPr lang="en-US" sz="1800" b="0" i="1" smtClean="0">
+                              <a:latin typeface="Cambria Math" panose="02040503050406030204" pitchFamily="18" charset="0"/>
+                            </a:rPr>
+                            <m:t>𝐶𝑙𝑎𝑠𝑠</m:t>
+                          </m:r>
+                          <m:r>
+                            <a:rPr lang="en-US" sz="1800" b="0" i="1" smtClean="0">
+                              <a:latin typeface="Cambria Math" panose="02040503050406030204" pitchFamily="18" charset="0"/>
+                            </a:rPr>
+                            <m:t> </m:t>
+                          </m:r>
+                          <m:sSub>
+                            <m:sSubPr>
+                              <m:ctrlPr>
+                                <a:rPr lang="en-US" sz="1800" b="0" i="1" smtClean="0">
+                                  <a:latin typeface="Cambria Math" panose="02040503050406030204" pitchFamily="18" charset="0"/>
+                                </a:rPr>
+                              </m:ctrlPr>
+                            </m:sSubPr>
+                            <m:e>
+                              <m:r>
+                                <a:rPr lang="en-US" sz="1800" b="0" i="1" smtClean="0">
+                                  <a:latin typeface="Cambria Math" panose="02040503050406030204" pitchFamily="18" charset="0"/>
+                                </a:rPr>
+                                <m:t>𝐶</m:t>
+                              </m:r>
+                            </m:e>
+                            <m:sub>
+                              <m:r>
+                                <a:rPr lang="en-US" sz="1800" b="0" i="1" smtClean="0">
+                                  <a:latin typeface="Cambria Math" panose="02040503050406030204" pitchFamily="18" charset="0"/>
+                                </a:rPr>
+                                <m:t>𝑖</m:t>
+                              </m:r>
+                            </m:sub>
+                          </m:sSub>
+                        </m:num>
+                        <m:den>
+                          <m:r>
+                            <a:rPr lang="en-US" sz="1800" b="0" i="1" smtClean="0">
+                              <a:latin typeface="Cambria Math" panose="02040503050406030204" pitchFamily="18" charset="0"/>
+                            </a:rPr>
+                            <m:t># </m:t>
+                          </m:r>
+                          <m:r>
+                            <a:rPr lang="en-US" sz="1800" b="0" i="1" smtClean="0">
+                              <a:latin typeface="Cambria Math" panose="02040503050406030204" pitchFamily="18" charset="0"/>
+                            </a:rPr>
+                            <m:t>𝐶𝑙𝑎𝑠𝑠</m:t>
+                          </m:r>
+                          <m:r>
+                            <a:rPr lang="en-US" sz="1800" b="0" i="1" smtClean="0">
+                              <a:latin typeface="Cambria Math" panose="02040503050406030204" pitchFamily="18" charset="0"/>
+                            </a:rPr>
+                            <m:t> </m:t>
+                          </m:r>
+                          <m:sSub>
+                            <m:sSubPr>
+                              <m:ctrlPr>
+                                <a:rPr lang="en-US" sz="1800" b="0" i="1" smtClean="0">
+                                  <a:latin typeface="Cambria Math" panose="02040503050406030204" pitchFamily="18" charset="0"/>
+                                </a:rPr>
+                              </m:ctrlPr>
+                            </m:sSubPr>
+                            <m:e>
+                              <m:r>
+                                <a:rPr lang="en-US" sz="1800" b="0" i="1" smtClean="0">
+                                  <a:latin typeface="Cambria Math" panose="02040503050406030204" pitchFamily="18" charset="0"/>
+                                </a:rPr>
+                                <m:t>𝐶</m:t>
+                              </m:r>
+                            </m:e>
+                            <m:sub>
+                              <m:r>
+                                <a:rPr lang="en-US" sz="1800" b="0" i="1" smtClean="0">
+                                  <a:latin typeface="Cambria Math" panose="02040503050406030204" pitchFamily="18" charset="0"/>
+                                </a:rPr>
+                                <m:t>𝑖</m:t>
+                              </m:r>
+                            </m:sub>
+                          </m:sSub>
+                          <m:r>
+                            <a:rPr lang="en-US" sz="1800" b="0" i="1" smtClean="0">
+                              <a:latin typeface="Cambria Math" panose="02040503050406030204" pitchFamily="18" charset="0"/>
+                            </a:rPr>
+                            <m:t> </m:t>
+                          </m:r>
+                          <m:r>
+                            <a:rPr lang="en-US" sz="1800" b="0" i="1" smtClean="0">
+                              <a:latin typeface="Cambria Math" panose="02040503050406030204" pitchFamily="18" charset="0"/>
+                            </a:rPr>
+                            <m:t>𝑃𝑟𝑒𝑑𝑖𝑐𝑡𝑖𝑜𝑛𝑠</m:t>
+                          </m:r>
+                        </m:den>
+                      </m:f>
+                    </m:oMath>
+                  </m:oMathPara>
+                </a14:m>
+                <a:endParaRPr lang="en-US" dirty="0"/>
+              </a:p>
+            </p:txBody>
+          </p:sp>
+        </mc:Choice>
+        <mc:Fallback>
+          <p:sp>
+            <p:nvSpPr>
+              <p:cNvPr id="9" name="TextBox 8">
+                <a:extLst>
+                  <a:ext uri="{FF2B5EF4-FFF2-40B4-BE49-F238E27FC236}">
+                    <a16:creationId xmlns:a16="http://schemas.microsoft.com/office/drawing/2014/main" id="{B29ABD4C-3B77-B5C9-0DC5-B371E4EC40B2}"/>
+                  </a:ext>
+                </a:extLst>
+              </p:cNvPr>
+              <p:cNvSpPr txBox="1">
+                <a:spLocks noRot="1" noChangeAspect="1" noMove="1" noResize="1" noEditPoints="1" noAdjustHandles="1" noChangeArrowheads="1" noChangeShapeType="1" noTextEdit="1"/>
+              </p:cNvSpPr>
+              <p:nvPr/>
+            </p:nvSpPr>
+            <p:spPr>
+              <a:xfrm>
+                <a:off x="2036427" y="5401027"/>
+                <a:ext cx="7725562" cy="665760"/>
+              </a:xfrm>
+              <a:prstGeom prst="rect">
+                <a:avLst/>
+              </a:prstGeom>
+              <a:blipFill>
+                <a:blip r:embed="rId4"/>
+                <a:stretch>
+                  <a:fillRect/>
+                </a:stretch>
+              </a:blipFill>
+            </p:spPr>
+            <p:txBody>
+              <a:bodyPr/>
+              <a:lstStyle/>
+              <a:p>
+                <a:r>
+                  <a:rPr lang="en-US">
+                    <a:noFill/>
+                  </a:rPr>
+                  <a:t> </a:t>
+                </a:r>
+              </a:p>
+            </p:txBody>
+          </p:sp>
+        </mc:Fallback>
+      </mc:AlternateContent>
+    </p:spTree>
+    <p:extLst>
+      <p:ext uri="{BB962C8B-B14F-4D97-AF65-F5344CB8AC3E}">
+        <p14:creationId xmlns:p14="http://schemas.microsoft.com/office/powerpoint/2010/main" val="2081715045"/>
+      </p:ext>
+    </p:extLst>
+  </p:cSld>
+  <p:clrMapOvr>
+    <a:masterClrMapping/>
+  </p:clrMapOvr>
+</p:sld>
+</file>
+
+<file path=ppt/slides/slide4.xml><?xml version="1.0" encoding="utf-8"?>
 <p:sld xmlns:a="http://schemas.openxmlformats.org/drawingml/2006/main" xmlns:r="http://schemas.openxmlformats.org/officeDocument/2006/relationships" xmlns:p="http://schemas.openxmlformats.org/presentationml/2006/main">
   <p:cSld>
     <p:spTree>
@@ -5504,186 +6386,6 @@
 </p:sld>
 </file>
 
-<file path=ppt/slides/slide4.xml><?xml version="1.0" encoding="utf-8"?>
-<p:sld xmlns:a="http://schemas.openxmlformats.org/drawingml/2006/main" xmlns:r="http://schemas.openxmlformats.org/officeDocument/2006/relationships" xmlns:p="http://schemas.openxmlformats.org/presentationml/2006/main">
-  <p:cSld>
-    <p:spTree>
-      <p:nvGrpSpPr>
-        <p:cNvPr id="1" name=""/>
-        <p:cNvGrpSpPr/>
-        <p:nvPr/>
-      </p:nvGrpSpPr>
-      <p:grpSpPr>
-        <a:xfrm>
-          <a:off x="0" y="0"/>
-          <a:ext cx="0" cy="0"/>
-          <a:chOff x="0" y="0"/>
-          <a:chExt cx="0" cy="0"/>
-        </a:xfrm>
-      </p:grpSpPr>
-      <p:sp>
-        <p:nvSpPr>
-          <p:cNvPr id="2" name="Title 1">
-            <a:extLst>
-              <a:ext uri="{FF2B5EF4-FFF2-40B4-BE49-F238E27FC236}">
-                <a16:creationId xmlns:a16="http://schemas.microsoft.com/office/drawing/2014/main" id="{3D125364-4385-6331-2E0E-02C1915293E0}"/>
-              </a:ext>
-            </a:extLst>
-          </p:cNvPr>
-          <p:cNvSpPr>
-            <a:spLocks noGrp="1"/>
-          </p:cNvSpPr>
-          <p:nvPr>
-            <p:ph type="title"/>
-          </p:nvPr>
-        </p:nvSpPr>
-        <p:spPr/>
-        <p:txBody>
-          <a:bodyPr/>
-          <a:lstStyle/>
-          <a:p>
-            <a:r>
-              <a:rPr lang="en-US" dirty="0"/>
-              <a:t>Understanding Success</a:t>
-            </a:r>
-          </a:p>
-        </p:txBody>
-      </p:sp>
-      <p:sp>
-        <p:nvSpPr>
-          <p:cNvPr id="3" name="Content Placeholder 2">
-            <a:extLst>
-              <a:ext uri="{FF2B5EF4-FFF2-40B4-BE49-F238E27FC236}">
-                <a16:creationId xmlns:a16="http://schemas.microsoft.com/office/drawing/2014/main" id="{D45CFC62-A670-21F7-0A1B-08F4DCC6C8DE}"/>
-              </a:ext>
-            </a:extLst>
-          </p:cNvPr>
-          <p:cNvSpPr>
-            <a:spLocks noGrp="1"/>
-          </p:cNvSpPr>
-          <p:nvPr>
-            <p:ph idx="1"/>
-          </p:nvPr>
-        </p:nvSpPr>
-        <p:spPr>
-          <a:xfrm>
-            <a:off x="838200" y="1825625"/>
-            <a:ext cx="10515600" cy="4564542"/>
-          </a:xfrm>
-        </p:spPr>
-        <p:txBody>
-          <a:bodyPr>
-            <a:normAutofit fontScale="85000" lnSpcReduction="10000"/>
-          </a:bodyPr>
-          <a:lstStyle/>
-          <a:p>
-            <a:r>
-              <a:rPr lang="en-US" dirty="0"/>
-              <a:t>Effectiveness of a decision tree classifier is measured by using a dataset that has existing class labels. </a:t>
-            </a:r>
-          </a:p>
-          <a:p>
-            <a:r>
-              <a:rPr lang="en-US" dirty="0"/>
-              <a:t>Indicators:</a:t>
-            </a:r>
-          </a:p>
-          <a:p>
-            <a:pPr lvl="1"/>
-            <a:r>
-              <a:rPr lang="en-US" dirty="0"/>
-              <a:t>Degree of misclassification</a:t>
-            </a:r>
-          </a:p>
-          <a:p>
-            <a:pPr lvl="2"/>
-            <a:r>
-              <a:rPr lang="en-US" dirty="0"/>
-              <a:t>Accuracy: Ratio between the number of all correct predictions to the total number of data points.</a:t>
-            </a:r>
-          </a:p>
-          <a:p>
-            <a:pPr lvl="2"/>
-            <a:endParaRPr lang="en-US" dirty="0"/>
-          </a:p>
-          <a:p>
-            <a:pPr lvl="2"/>
-            <a:r>
-              <a:rPr lang="en-US" dirty="0"/>
-              <a:t>Recall/Sensitivity – TPR: Ratio between </a:t>
-            </a:r>
-            <a:r>
-              <a:rPr lang="en-AU" dirty="0"/>
-              <a:t>the number of correct positive predictions to the total number of positives</a:t>
-            </a:r>
-            <a:endParaRPr lang="en-US" dirty="0"/>
-          </a:p>
-          <a:p>
-            <a:pPr lvl="2"/>
-            <a:endParaRPr lang="en-US" dirty="0"/>
-          </a:p>
-          <a:p>
-            <a:pPr lvl="2"/>
-            <a:r>
-              <a:rPr lang="en-US" dirty="0"/>
-              <a:t>Precision: Ratio between </a:t>
-            </a:r>
-            <a:r>
-              <a:rPr lang="en-AU" dirty="0"/>
-              <a:t>the number of correct positive predictions to the total number of positive predictions</a:t>
-            </a:r>
-            <a:endParaRPr lang="en-US" dirty="0"/>
-          </a:p>
-          <a:p>
-            <a:pPr lvl="2"/>
-            <a:endParaRPr lang="en-US" dirty="0"/>
-          </a:p>
-          <a:p>
-            <a:pPr lvl="2"/>
-            <a:r>
-              <a:rPr lang="en-US" dirty="0"/>
-              <a:t>FPR: Ratio between </a:t>
-            </a:r>
-            <a:r>
-              <a:rPr lang="en-AU" dirty="0"/>
-              <a:t>the number of incorrect positive predictions to the total number of negatives</a:t>
-            </a:r>
-          </a:p>
-          <a:p>
-            <a:pPr lvl="2"/>
-            <a:endParaRPr lang="en-US" dirty="0"/>
-          </a:p>
-          <a:p>
-            <a:pPr lvl="2"/>
-            <a:r>
-              <a:rPr lang="en-US" dirty="0"/>
-              <a:t>Specificity: Ratio between </a:t>
-            </a:r>
-            <a:r>
-              <a:rPr lang="en-AU" dirty="0"/>
-              <a:t>the number of correct negative predictions to the total number of negatives</a:t>
-            </a:r>
-            <a:endParaRPr lang="en-US" dirty="0"/>
-          </a:p>
-          <a:p>
-            <a:pPr lvl="1"/>
-            <a:endParaRPr lang="en-US" dirty="0"/>
-          </a:p>
-        </p:txBody>
-      </p:sp>
-    </p:spTree>
-    <p:extLst>
-      <p:ext uri="{BB962C8B-B14F-4D97-AF65-F5344CB8AC3E}">
-        <p14:creationId xmlns:p14="http://schemas.microsoft.com/office/powerpoint/2010/main" val="2081715045"/>
-      </p:ext>
-    </p:extLst>
-  </p:cSld>
-  <p:clrMapOvr>
-    <a:masterClrMapping/>
-  </p:clrMapOvr>
-</p:sld>
-</file>
-
 <file path=ppt/slides/slide5.xml><?xml version="1.0" encoding="utf-8"?>
 <p:sld xmlns:a="http://schemas.openxmlformats.org/drawingml/2006/main" xmlns:r="http://schemas.openxmlformats.org/officeDocument/2006/relationships" xmlns:p="http://schemas.openxmlformats.org/presentationml/2006/main">
   <p:cSld>

</xml_diff>

<commit_message>
Calculate precision for balanced and unbalanced data points
</commit_message>
<xml_diff>
--- a/DecisionTrees/DecisionTrees.pptx
+++ b/DecisionTrees/DecisionTrees.pptx
@@ -272,7 +272,7 @@
           <a:p>
             <a:fld id="{7E292AB8-5F8F-4402-9592-F9413DCC0C16}" type="datetimeFigureOut">
               <a:rPr lang="en-US" smtClean="0"/>
-              <a:t>7/4/2023</a:t>
+              <a:t>7/5/2023</a:t>
             </a:fld>
             <a:endParaRPr lang="en-US"/>
           </a:p>
@@ -470,7 +470,7 @@
           <a:p>
             <a:fld id="{7E292AB8-5F8F-4402-9592-F9413DCC0C16}" type="datetimeFigureOut">
               <a:rPr lang="en-US" smtClean="0"/>
-              <a:t>7/4/2023</a:t>
+              <a:t>7/5/2023</a:t>
             </a:fld>
             <a:endParaRPr lang="en-US"/>
           </a:p>
@@ -678,7 +678,7 @@
           <a:p>
             <a:fld id="{7E292AB8-5F8F-4402-9592-F9413DCC0C16}" type="datetimeFigureOut">
               <a:rPr lang="en-US" smtClean="0"/>
-              <a:t>7/4/2023</a:t>
+              <a:t>7/5/2023</a:t>
             </a:fld>
             <a:endParaRPr lang="en-US"/>
           </a:p>
@@ -876,7 +876,7 @@
           <a:p>
             <a:fld id="{7E292AB8-5F8F-4402-9592-F9413DCC0C16}" type="datetimeFigureOut">
               <a:rPr lang="en-US" smtClean="0"/>
-              <a:t>7/4/2023</a:t>
+              <a:t>7/5/2023</a:t>
             </a:fld>
             <a:endParaRPr lang="en-US"/>
           </a:p>
@@ -1151,7 +1151,7 @@
           <a:p>
             <a:fld id="{7E292AB8-5F8F-4402-9592-F9413DCC0C16}" type="datetimeFigureOut">
               <a:rPr lang="en-US" smtClean="0"/>
-              <a:t>7/4/2023</a:t>
+              <a:t>7/5/2023</a:t>
             </a:fld>
             <a:endParaRPr lang="en-US"/>
           </a:p>
@@ -1416,7 +1416,7 @@
           <a:p>
             <a:fld id="{7E292AB8-5F8F-4402-9592-F9413DCC0C16}" type="datetimeFigureOut">
               <a:rPr lang="en-US" smtClean="0"/>
-              <a:t>7/4/2023</a:t>
+              <a:t>7/5/2023</a:t>
             </a:fld>
             <a:endParaRPr lang="en-US"/>
           </a:p>
@@ -1828,7 +1828,7 @@
           <a:p>
             <a:fld id="{7E292AB8-5F8F-4402-9592-F9413DCC0C16}" type="datetimeFigureOut">
               <a:rPr lang="en-US" smtClean="0"/>
-              <a:t>7/4/2023</a:t>
+              <a:t>7/5/2023</a:t>
             </a:fld>
             <a:endParaRPr lang="en-US"/>
           </a:p>
@@ -1969,7 +1969,7 @@
           <a:p>
             <a:fld id="{7E292AB8-5F8F-4402-9592-F9413DCC0C16}" type="datetimeFigureOut">
               <a:rPr lang="en-US" smtClean="0"/>
-              <a:t>7/4/2023</a:t>
+              <a:t>7/5/2023</a:t>
             </a:fld>
             <a:endParaRPr lang="en-US"/>
           </a:p>
@@ -2082,7 +2082,7 @@
           <a:p>
             <a:fld id="{7E292AB8-5F8F-4402-9592-F9413DCC0C16}" type="datetimeFigureOut">
               <a:rPr lang="en-US" smtClean="0"/>
-              <a:t>7/4/2023</a:t>
+              <a:t>7/5/2023</a:t>
             </a:fld>
             <a:endParaRPr lang="en-US"/>
           </a:p>
@@ -2393,7 +2393,7 @@
           <a:p>
             <a:fld id="{7E292AB8-5F8F-4402-9592-F9413DCC0C16}" type="datetimeFigureOut">
               <a:rPr lang="en-US" smtClean="0"/>
-              <a:t>7/4/2023</a:t>
+              <a:t>7/5/2023</a:t>
             </a:fld>
             <a:endParaRPr lang="en-US"/>
           </a:p>
@@ -2681,7 +2681,7 @@
           <a:p>
             <a:fld id="{7E292AB8-5F8F-4402-9592-F9413DCC0C16}" type="datetimeFigureOut">
               <a:rPr lang="en-US" smtClean="0"/>
-              <a:t>7/4/2023</a:t>
+              <a:t>7/5/2023</a:t>
             </a:fld>
             <a:endParaRPr lang="en-US"/>
           </a:p>
@@ -2922,7 +2922,7 @@
           <a:p>
             <a:fld id="{7E292AB8-5F8F-4402-9592-F9413DCC0C16}" type="datetimeFigureOut">
               <a:rPr lang="en-US" smtClean="0"/>
-              <a:t>7/4/2023</a:t>
+              <a:t>7/5/2023</a:t>
             </a:fld>
             <a:endParaRPr lang="en-US"/>
           </a:p>
@@ -3367,31 +3367,6 @@
           </a:p>
         </p:txBody>
       </p:sp>
-      <p:sp>
-        <p:nvSpPr>
-          <p:cNvPr id="3" name="Subtitle 2">
-            <a:extLst>
-              <a:ext uri="{FF2B5EF4-FFF2-40B4-BE49-F238E27FC236}">
-                <a16:creationId xmlns:a16="http://schemas.microsoft.com/office/drawing/2014/main" id="{7729F8B8-870D-9802-021D-E1FD5607346C}"/>
-              </a:ext>
-            </a:extLst>
-          </p:cNvPr>
-          <p:cNvSpPr>
-            <a:spLocks noGrp="1"/>
-          </p:cNvSpPr>
-          <p:nvPr>
-            <p:ph type="subTitle" idx="1"/>
-          </p:nvPr>
-        </p:nvSpPr>
-        <p:spPr/>
-        <p:txBody>
-          <a:bodyPr/>
-          <a:lstStyle/>
-          <a:p>
-            <a:endParaRPr lang="en-US"/>
-          </a:p>
-        </p:txBody>
-      </p:sp>
     </p:spTree>
     <p:extLst>
       <p:ext uri="{BB962C8B-B14F-4D97-AF65-F5344CB8AC3E}">
@@ -3450,8 +3425,8 @@
           </a:p>
         </p:txBody>
       </p:sp>
-      <mc:AlternateContent xmlns:mc="http://schemas.openxmlformats.org/markup-compatibility/2006">
-        <mc:Choice xmlns:a14="http://schemas.microsoft.com/office/drawing/2010/main" Requires="a14">
+      <mc:AlternateContent xmlns:mc="http://schemas.openxmlformats.org/markup-compatibility/2006" xmlns:a14="http://schemas.microsoft.com/office/drawing/2010/main">
+        <mc:Choice Requires="a14">
           <p:sp>
             <p:nvSpPr>
               <p:cNvPr id="9" name="TextBox 8">
@@ -3709,7 +3684,7 @@
             </p:txBody>
           </p:sp>
         </mc:Choice>
-        <mc:Fallback>
+        <mc:Fallback xmlns="">
           <p:sp>
             <p:nvSpPr>
               <p:cNvPr id="9" name="TextBox 8">
@@ -3756,10 +3731,10 @@
       </mc:AlternateContent>
       <p:sp>
         <p:nvSpPr>
-          <p:cNvPr id="4" name="Content Placeholder 2">
+          <p:cNvPr id="3" name="Content Placeholder 2">
             <a:extLst>
               <a:ext uri="{FF2B5EF4-FFF2-40B4-BE49-F238E27FC236}">
-                <a16:creationId xmlns:a16="http://schemas.microsoft.com/office/drawing/2014/main" id="{481A5329-54CD-C0DB-4845-5149572E47C3}"/>
+                <a16:creationId xmlns:a16="http://schemas.microsoft.com/office/drawing/2014/main" id="{BA480F88-B039-25C0-D223-15880DE4DDB6}"/>
               </a:ext>
             </a:extLst>
           </p:cNvPr>
@@ -3770,12 +3745,16 @@
         </p:nvSpPr>
         <p:spPr>
           <a:xfrm>
-            <a:off x="838200" y="4225253"/>
-            <a:ext cx="4019026" cy="1959146"/>
+            <a:off x="838199" y="6096967"/>
+            <a:ext cx="2691003" cy="431177"/>
           </a:xfrm>
           <a:prstGeom prst="rect">
             <a:avLst/>
           </a:prstGeom>
+          <a:noFill/>
+          <a:ln>
+            <a:noFill/>
+          </a:ln>
         </p:spPr>
         <p:style>
           <a:lnRef idx="2">
@@ -3793,7 +3772,7 @@
         </p:style>
         <p:txBody>
           <a:bodyPr vert="horz" lIns="91440" tIns="45720" rIns="91440" bIns="45720" rtlCol="0">
-            <a:normAutofit/>
+            <a:normAutofit fontScale="55000" lnSpcReduction="20000"/>
           </a:bodyPr>
           <a:lstStyle>
             <a:lvl1pPr marL="228600" indent="-228600" algn="l" defTabSz="914400" rtl="0" eaLnBrk="1" latinLnBrk="0" hangingPunct="1">
@@ -3960,226 +3939,926 @@
             </a:lvl9pPr>
           </a:lstStyle>
           <a:p>
+            <a:pPr marL="0" indent="0">
+              <a:buNone/>
+            </a:pPr>
             <a:r>
               <a:rPr lang="en-US" dirty="0"/>
-              <a:t>Ex: Balanced Data</a:t>
+              <a:t>Unbalanced Data: More dogs in comparison to cats or birds</a:t>
             </a:r>
           </a:p>
         </p:txBody>
       </p:sp>
-      <p:sp>
-        <p:nvSpPr>
-          <p:cNvPr id="6" name="Content Placeholder 2">
+      <p:graphicFrame>
+        <p:nvGraphicFramePr>
+          <p:cNvPr id="5" name="Table 10">
             <a:extLst>
               <a:ext uri="{FF2B5EF4-FFF2-40B4-BE49-F238E27FC236}">
-                <a16:creationId xmlns:a16="http://schemas.microsoft.com/office/drawing/2014/main" id="{DFB373DA-FF69-1F71-C69D-0A42C80B80CE}"/>
+                <a16:creationId xmlns:a16="http://schemas.microsoft.com/office/drawing/2014/main" id="{D1AD9EB1-79DA-06A4-95E1-1934AA3B9EC3}"/>
               </a:ext>
             </a:extLst>
           </p:cNvPr>
-          <p:cNvSpPr txBox="1">
-            <a:spLocks/>
-          </p:cNvSpPr>
-          <p:nvPr/>
-        </p:nvSpPr>
-        <p:spPr>
-          <a:xfrm>
-            <a:off x="7334776" y="4225253"/>
-            <a:ext cx="4019026" cy="1959146"/>
-          </a:xfrm>
-          <a:prstGeom prst="rect">
-            <a:avLst/>
-          </a:prstGeom>
-        </p:spPr>
-        <p:style>
-          <a:lnRef idx="2">
-            <a:schemeClr val="accent5"/>
-          </a:lnRef>
-          <a:fillRef idx="1">
-            <a:schemeClr val="lt1"/>
-          </a:fillRef>
-          <a:effectRef idx="0">
-            <a:schemeClr val="accent5"/>
-          </a:effectRef>
-          <a:fontRef idx="minor">
-            <a:schemeClr val="dk1"/>
-          </a:fontRef>
-        </p:style>
-        <p:txBody>
-          <a:bodyPr vert="horz" lIns="91440" tIns="45720" rIns="91440" bIns="45720" rtlCol="0">
-            <a:normAutofit/>
-          </a:bodyPr>
-          <a:lstStyle>
-            <a:lvl1pPr marL="228600" indent="-228600" algn="l" defTabSz="914400" rtl="0" eaLnBrk="1" latinLnBrk="0" hangingPunct="1">
-              <a:lnSpc>
-                <a:spcPct val="90000"/>
-              </a:lnSpc>
-              <a:spcBef>
-                <a:spcPts val="1000"/>
-              </a:spcBef>
-              <a:buFont typeface="Arial" panose="020B0604020202020204" pitchFamily="34" charset="0"/>
-              <a:buChar char="•"/>
-              <a:defRPr sz="2800" kern="1200">
-                <a:solidFill>
-                  <a:schemeClr val="tx1"/>
-                </a:solidFill>
-                <a:latin typeface="+mn-lt"/>
-                <a:ea typeface="+mn-ea"/>
-                <a:cs typeface="+mn-cs"/>
-              </a:defRPr>
-            </a:lvl1pPr>
-            <a:lvl2pPr marL="685800" indent="-228600" algn="l" defTabSz="914400" rtl="0" eaLnBrk="1" latinLnBrk="0" hangingPunct="1">
-              <a:lnSpc>
-                <a:spcPct val="90000"/>
-              </a:lnSpc>
-              <a:spcBef>
-                <a:spcPts val="500"/>
-              </a:spcBef>
-              <a:buFont typeface="Arial" panose="020B0604020202020204" pitchFamily="34" charset="0"/>
-              <a:buChar char="•"/>
-              <a:defRPr sz="2400" kern="1200">
-                <a:solidFill>
-                  <a:schemeClr val="tx1"/>
-                </a:solidFill>
-                <a:latin typeface="+mn-lt"/>
-                <a:ea typeface="+mn-ea"/>
-                <a:cs typeface="+mn-cs"/>
-              </a:defRPr>
-            </a:lvl2pPr>
-            <a:lvl3pPr marL="1143000" indent="-228600" algn="l" defTabSz="914400" rtl="0" eaLnBrk="1" latinLnBrk="0" hangingPunct="1">
-              <a:lnSpc>
-                <a:spcPct val="90000"/>
-              </a:lnSpc>
-              <a:spcBef>
-                <a:spcPts val="500"/>
-              </a:spcBef>
-              <a:buFont typeface="Arial" panose="020B0604020202020204" pitchFamily="34" charset="0"/>
-              <a:buChar char="•"/>
-              <a:defRPr sz="2000" kern="1200">
-                <a:solidFill>
-                  <a:schemeClr val="tx1"/>
-                </a:solidFill>
-                <a:latin typeface="+mn-lt"/>
-                <a:ea typeface="+mn-ea"/>
-                <a:cs typeface="+mn-cs"/>
-              </a:defRPr>
-            </a:lvl3pPr>
-            <a:lvl4pPr marL="1600200" indent="-228600" algn="l" defTabSz="914400" rtl="0" eaLnBrk="1" latinLnBrk="0" hangingPunct="1">
-              <a:lnSpc>
-                <a:spcPct val="90000"/>
-              </a:lnSpc>
-              <a:spcBef>
-                <a:spcPts val="500"/>
-              </a:spcBef>
-              <a:buFont typeface="Arial" panose="020B0604020202020204" pitchFamily="34" charset="0"/>
-              <a:buChar char="•"/>
-              <a:defRPr sz="1800" kern="1200">
-                <a:solidFill>
-                  <a:schemeClr val="tx1"/>
-                </a:solidFill>
-                <a:latin typeface="+mn-lt"/>
-                <a:ea typeface="+mn-ea"/>
-                <a:cs typeface="+mn-cs"/>
-              </a:defRPr>
-            </a:lvl4pPr>
-            <a:lvl5pPr marL="2057400" indent="-228600" algn="l" defTabSz="914400" rtl="0" eaLnBrk="1" latinLnBrk="0" hangingPunct="1">
-              <a:lnSpc>
-                <a:spcPct val="90000"/>
-              </a:lnSpc>
-              <a:spcBef>
-                <a:spcPts val="500"/>
-              </a:spcBef>
-              <a:buFont typeface="Arial" panose="020B0604020202020204" pitchFamily="34" charset="0"/>
-              <a:buChar char="•"/>
-              <a:defRPr sz="1800" kern="1200">
-                <a:solidFill>
-                  <a:schemeClr val="tx1"/>
-                </a:solidFill>
-                <a:latin typeface="+mn-lt"/>
-                <a:ea typeface="+mn-ea"/>
-                <a:cs typeface="+mn-cs"/>
-              </a:defRPr>
-            </a:lvl5pPr>
-            <a:lvl6pPr marL="2514600" indent="-228600" algn="l" defTabSz="914400" rtl="0" eaLnBrk="1" latinLnBrk="0" hangingPunct="1">
-              <a:lnSpc>
-                <a:spcPct val="90000"/>
-              </a:lnSpc>
-              <a:spcBef>
-                <a:spcPts val="500"/>
-              </a:spcBef>
-              <a:buFont typeface="Arial" panose="020B0604020202020204" pitchFamily="34" charset="0"/>
-              <a:buChar char="•"/>
-              <a:defRPr sz="1800" kern="1200">
-                <a:solidFill>
-                  <a:schemeClr val="tx1"/>
-                </a:solidFill>
-                <a:latin typeface="+mn-lt"/>
-                <a:ea typeface="+mn-ea"/>
-                <a:cs typeface="+mn-cs"/>
-              </a:defRPr>
-            </a:lvl6pPr>
-            <a:lvl7pPr marL="2971800" indent="-228600" algn="l" defTabSz="914400" rtl="0" eaLnBrk="1" latinLnBrk="0" hangingPunct="1">
-              <a:lnSpc>
-                <a:spcPct val="90000"/>
-              </a:lnSpc>
-              <a:spcBef>
-                <a:spcPts val="500"/>
-              </a:spcBef>
-              <a:buFont typeface="Arial" panose="020B0604020202020204" pitchFamily="34" charset="0"/>
-              <a:buChar char="•"/>
-              <a:defRPr sz="1800" kern="1200">
-                <a:solidFill>
-                  <a:schemeClr val="tx1"/>
-                </a:solidFill>
-                <a:latin typeface="+mn-lt"/>
-                <a:ea typeface="+mn-ea"/>
-                <a:cs typeface="+mn-cs"/>
-              </a:defRPr>
-            </a:lvl7pPr>
-            <a:lvl8pPr marL="3429000" indent="-228600" algn="l" defTabSz="914400" rtl="0" eaLnBrk="1" latinLnBrk="0" hangingPunct="1">
-              <a:lnSpc>
-                <a:spcPct val="90000"/>
-              </a:lnSpc>
-              <a:spcBef>
-                <a:spcPts val="500"/>
-              </a:spcBef>
-              <a:buFont typeface="Arial" panose="020B0604020202020204" pitchFamily="34" charset="0"/>
-              <a:buChar char="•"/>
-              <a:defRPr sz="1800" kern="1200">
-                <a:solidFill>
-                  <a:schemeClr val="tx1"/>
-                </a:solidFill>
-                <a:latin typeface="+mn-lt"/>
-                <a:ea typeface="+mn-ea"/>
-                <a:cs typeface="+mn-cs"/>
-              </a:defRPr>
-            </a:lvl8pPr>
-            <a:lvl9pPr marL="3886200" indent="-228600" algn="l" defTabSz="914400" rtl="0" eaLnBrk="1" latinLnBrk="0" hangingPunct="1">
-              <a:lnSpc>
-                <a:spcPct val="90000"/>
-              </a:lnSpc>
-              <a:spcBef>
-                <a:spcPts val="500"/>
-              </a:spcBef>
-              <a:buFont typeface="Arial" panose="020B0604020202020204" pitchFamily="34" charset="0"/>
-              <a:buChar char="•"/>
-              <a:defRPr sz="1800" kern="1200">
-                <a:solidFill>
-                  <a:schemeClr val="tx1"/>
-                </a:solidFill>
-                <a:latin typeface="+mn-lt"/>
-                <a:ea typeface="+mn-ea"/>
-                <a:cs typeface="+mn-cs"/>
-              </a:defRPr>
-            </a:lvl9pPr>
-          </a:lstStyle>
-          <a:p>
-            <a:r>
-              <a:rPr lang="en-US" dirty="0"/>
-              <a:t>Ex: Imbalanced Data</a:t>
-            </a:r>
-          </a:p>
-        </p:txBody>
-      </p:sp>
+          <p:cNvGraphicFramePr>
+            <a:graphicFrameLocks noGrp="1"/>
+          </p:cNvGraphicFramePr>
+          <p:nvPr>
+            <p:extLst>
+              <p:ext uri="{D42A27DB-BD31-4B8C-83A1-F6EECF244321}">
+                <p14:modId xmlns:p14="http://schemas.microsoft.com/office/powerpoint/2010/main" val="171563460"/>
+              </p:ext>
+            </p:extLst>
+          </p:nvPr>
+        </p:nvGraphicFramePr>
+        <p:xfrm>
+          <a:off x="838198" y="3921583"/>
+          <a:ext cx="2691004" cy="2124504"/>
+        </p:xfrm>
+        <a:graphic>
+          <a:graphicData uri="http://schemas.openxmlformats.org/drawingml/2006/table">
+            <a:tbl>
+              <a:tblPr firstRow="1" bandRow="1">
+                <a:tableStyleId>{5C22544A-7EE6-4342-B048-85BDC9FD1C3A}</a:tableStyleId>
+              </a:tblPr>
+              <a:tblGrid>
+                <a:gridCol w="672751">
+                  <a:extLst>
+                    <a:ext uri="{9D8B030D-6E8A-4147-A177-3AD203B41FA5}">
+                      <a16:colId xmlns:a16="http://schemas.microsoft.com/office/drawing/2014/main" val="3779047369"/>
+                    </a:ext>
+                  </a:extLst>
+                </a:gridCol>
+                <a:gridCol w="672751">
+                  <a:extLst>
+                    <a:ext uri="{9D8B030D-6E8A-4147-A177-3AD203B41FA5}">
+                      <a16:colId xmlns:a16="http://schemas.microsoft.com/office/drawing/2014/main" val="2587912599"/>
+                    </a:ext>
+                  </a:extLst>
+                </a:gridCol>
+                <a:gridCol w="672751">
+                  <a:extLst>
+                    <a:ext uri="{9D8B030D-6E8A-4147-A177-3AD203B41FA5}">
+                      <a16:colId xmlns:a16="http://schemas.microsoft.com/office/drawing/2014/main" val="617498338"/>
+                    </a:ext>
+                  </a:extLst>
+                </a:gridCol>
+                <a:gridCol w="672751">
+                  <a:extLst>
+                    <a:ext uri="{9D8B030D-6E8A-4147-A177-3AD203B41FA5}">
+                      <a16:colId xmlns:a16="http://schemas.microsoft.com/office/drawing/2014/main" val="1361611942"/>
+                    </a:ext>
+                  </a:extLst>
+                </a:gridCol>
+              </a:tblGrid>
+              <a:tr h="517477">
+                <a:tc>
+                  <a:txBody>
+                    <a:bodyPr/>
+                    <a:lstStyle/>
+                    <a:p>
+                      <a:pPr algn="ctr"/>
+                      <a:endParaRPr lang="en-US" sz="1500" b="1" dirty="0">
+                        <a:solidFill>
+                          <a:schemeClr val="bg1"/>
+                        </a:solidFill>
+                      </a:endParaRPr>
+                    </a:p>
+                  </a:txBody>
+                  <a:tcPr marL="73925" marR="73925" marT="36963" marB="36963">
+                    <a:solidFill>
+                      <a:srgbClr val="4472C4"/>
+                    </a:solidFill>
+                  </a:tcPr>
+                </a:tc>
+                <a:tc>
+                  <a:txBody>
+                    <a:bodyPr/>
+                    <a:lstStyle/>
+                    <a:p>
+                      <a:pPr algn="ctr"/>
+                      <a:r>
+                        <a:rPr lang="en-US" sz="1500" dirty="0"/>
+                        <a:t>Model Cat</a:t>
+                      </a:r>
+                    </a:p>
+                  </a:txBody>
+                  <a:tcPr marL="73925" marR="73925" marT="36963" marB="36963"/>
+                </a:tc>
+                <a:tc>
+                  <a:txBody>
+                    <a:bodyPr/>
+                    <a:lstStyle/>
+                    <a:p>
+                      <a:pPr algn="ctr"/>
+                      <a:r>
+                        <a:rPr lang="en-US" sz="1500" dirty="0"/>
+                        <a:t>Model Dog</a:t>
+                      </a:r>
+                    </a:p>
+                  </a:txBody>
+                  <a:tcPr marL="73925" marR="73925" marT="36963" marB="36963"/>
+                </a:tc>
+                <a:tc>
+                  <a:txBody>
+                    <a:bodyPr/>
+                    <a:lstStyle/>
+                    <a:p>
+                      <a:pPr algn="ctr"/>
+                      <a:r>
+                        <a:rPr lang="en-US" sz="1500" dirty="0"/>
+                        <a:t>Model Bird</a:t>
+                      </a:r>
+                    </a:p>
+                  </a:txBody>
+                  <a:tcPr marL="73925" marR="73925" marT="36963" marB="36963"/>
+                </a:tc>
+                <a:extLst>
+                  <a:ext uri="{0D108BD9-81ED-4DB2-BD59-A6C34878D82A}">
+                    <a16:rowId xmlns:a16="http://schemas.microsoft.com/office/drawing/2014/main" val="2688480762"/>
+                  </a:ext>
+                </a:extLst>
+              </a:tr>
+              <a:tr h="517477">
+                <a:tc>
+                  <a:txBody>
+                    <a:bodyPr/>
+                    <a:lstStyle/>
+                    <a:p>
+                      <a:pPr algn="ctr"/>
+                      <a:r>
+                        <a:rPr lang="en-US" sz="1500" b="1" dirty="0">
+                          <a:solidFill>
+                            <a:schemeClr val="bg1"/>
+                          </a:solidFill>
+                        </a:rPr>
+                        <a:t>Data Cat</a:t>
+                      </a:r>
+                    </a:p>
+                  </a:txBody>
+                  <a:tcPr marL="73925" marR="73925" marT="36963" marB="36963">
+                    <a:solidFill>
+                      <a:srgbClr val="4472C4"/>
+                    </a:solidFill>
+                  </a:tcPr>
+                </a:tc>
+                <a:tc>
+                  <a:txBody>
+                    <a:bodyPr/>
+                    <a:lstStyle/>
+                    <a:p>
+                      <a:r>
+                        <a:rPr lang="en-US" sz="1500" dirty="0"/>
+                        <a:t>76</a:t>
+                      </a:r>
+                    </a:p>
+                  </a:txBody>
+                  <a:tcPr marL="73925" marR="73925" marT="36963" marB="36963"/>
+                </a:tc>
+                <a:tc>
+                  <a:txBody>
+                    <a:bodyPr/>
+                    <a:lstStyle/>
+                    <a:p>
+                      <a:r>
+                        <a:rPr lang="en-US" sz="1500" dirty="0"/>
+                        <a:t>20</a:t>
+                      </a:r>
+                    </a:p>
+                  </a:txBody>
+                  <a:tcPr marL="73925" marR="73925" marT="36963" marB="36963"/>
+                </a:tc>
+                <a:tc>
+                  <a:txBody>
+                    <a:bodyPr/>
+                    <a:lstStyle/>
+                    <a:p>
+                      <a:r>
+                        <a:rPr lang="en-US" sz="1500" dirty="0"/>
+                        <a:t>12</a:t>
+                      </a:r>
+                    </a:p>
+                  </a:txBody>
+                  <a:tcPr marL="73925" marR="73925" marT="36963" marB="36963"/>
+                </a:tc>
+                <a:extLst>
+                  <a:ext uri="{0D108BD9-81ED-4DB2-BD59-A6C34878D82A}">
+                    <a16:rowId xmlns:a16="http://schemas.microsoft.com/office/drawing/2014/main" val="1617891110"/>
+                  </a:ext>
+                </a:extLst>
+              </a:tr>
+              <a:tr h="517477">
+                <a:tc>
+                  <a:txBody>
+                    <a:bodyPr/>
+                    <a:lstStyle/>
+                    <a:p>
+                      <a:pPr algn="ctr"/>
+                      <a:r>
+                        <a:rPr lang="en-US" sz="1500" b="1" dirty="0">
+                          <a:solidFill>
+                            <a:schemeClr val="bg1"/>
+                          </a:solidFill>
+                        </a:rPr>
+                        <a:t>Data Dog</a:t>
+                      </a:r>
+                    </a:p>
+                  </a:txBody>
+                  <a:tcPr marL="73925" marR="73925" marT="36963" marB="36963">
+                    <a:solidFill>
+                      <a:srgbClr val="4472C4"/>
+                    </a:solidFill>
+                  </a:tcPr>
+                </a:tc>
+                <a:tc>
+                  <a:txBody>
+                    <a:bodyPr/>
+                    <a:lstStyle/>
+                    <a:p>
+                      <a:r>
+                        <a:rPr lang="en-US" sz="1500" dirty="0"/>
+                        <a:t>27</a:t>
+                      </a:r>
+                    </a:p>
+                  </a:txBody>
+                  <a:tcPr marL="73925" marR="73925" marT="36963" marB="36963"/>
+                </a:tc>
+                <a:tc>
+                  <a:txBody>
+                    <a:bodyPr/>
+                    <a:lstStyle/>
+                    <a:p>
+                      <a:r>
+                        <a:rPr lang="en-US" sz="1500" dirty="0"/>
+                        <a:t>180</a:t>
+                      </a:r>
+                    </a:p>
+                  </a:txBody>
+                  <a:tcPr marL="73925" marR="73925" marT="36963" marB="36963"/>
+                </a:tc>
+                <a:tc>
+                  <a:txBody>
+                    <a:bodyPr/>
+                    <a:lstStyle/>
+                    <a:p>
+                      <a:r>
+                        <a:rPr lang="en-US" sz="1500" dirty="0"/>
+                        <a:t>11</a:t>
+                      </a:r>
+                    </a:p>
+                  </a:txBody>
+                  <a:tcPr marL="73925" marR="73925" marT="36963" marB="36963"/>
+                </a:tc>
+                <a:extLst>
+                  <a:ext uri="{0D108BD9-81ED-4DB2-BD59-A6C34878D82A}">
+                    <a16:rowId xmlns:a16="http://schemas.microsoft.com/office/drawing/2014/main" val="842711822"/>
+                  </a:ext>
+                </a:extLst>
+              </a:tr>
+              <a:tr h="517477">
+                <a:tc>
+                  <a:txBody>
+                    <a:bodyPr/>
+                    <a:lstStyle/>
+                    <a:p>
+                      <a:pPr algn="ctr"/>
+                      <a:r>
+                        <a:rPr lang="en-US" sz="1500" b="1" dirty="0">
+                          <a:solidFill>
+                            <a:schemeClr val="bg1"/>
+                          </a:solidFill>
+                        </a:rPr>
+                        <a:t>Data Bird</a:t>
+                      </a:r>
+                    </a:p>
+                  </a:txBody>
+                  <a:tcPr marL="73925" marR="73925" marT="36963" marB="36963">
+                    <a:solidFill>
+                      <a:srgbClr val="4472C4"/>
+                    </a:solidFill>
+                  </a:tcPr>
+                </a:tc>
+                <a:tc>
+                  <a:txBody>
+                    <a:bodyPr/>
+                    <a:lstStyle/>
+                    <a:p>
+                      <a:r>
+                        <a:rPr lang="en-US" sz="1500" dirty="0"/>
+                        <a:t>16</a:t>
+                      </a:r>
+                    </a:p>
+                  </a:txBody>
+                  <a:tcPr marL="73925" marR="73925" marT="36963" marB="36963"/>
+                </a:tc>
+                <a:tc>
+                  <a:txBody>
+                    <a:bodyPr/>
+                    <a:lstStyle/>
+                    <a:p>
+                      <a:r>
+                        <a:rPr lang="en-US" sz="1500" dirty="0"/>
+                        <a:t>3</a:t>
+                      </a:r>
+                    </a:p>
+                  </a:txBody>
+                  <a:tcPr marL="73925" marR="73925" marT="36963" marB="36963"/>
+                </a:tc>
+                <a:tc>
+                  <a:txBody>
+                    <a:bodyPr/>
+                    <a:lstStyle/>
+                    <a:p>
+                      <a:r>
+                        <a:rPr lang="en-US" sz="1500" dirty="0"/>
+                        <a:t>25</a:t>
+                      </a:r>
+                    </a:p>
+                  </a:txBody>
+                  <a:tcPr marL="73925" marR="73925" marT="36963" marB="36963"/>
+                </a:tc>
+                <a:extLst>
+                  <a:ext uri="{0D108BD9-81ED-4DB2-BD59-A6C34878D82A}">
+                    <a16:rowId xmlns:a16="http://schemas.microsoft.com/office/drawing/2014/main" val="1343416302"/>
+                  </a:ext>
+                </a:extLst>
+              </a:tr>
+            </a:tbl>
+          </a:graphicData>
+        </a:graphic>
+      </p:graphicFrame>
+      <mc:AlternateContent xmlns:mc="http://schemas.openxmlformats.org/markup-compatibility/2006">
+        <mc:Choice xmlns:a14="http://schemas.microsoft.com/office/drawing/2010/main" Requires="a14">
+          <p:sp>
+            <p:nvSpPr>
+              <p:cNvPr id="7" name="Content Placeholder 2">
+                <a:extLst>
+                  <a:ext uri="{FF2B5EF4-FFF2-40B4-BE49-F238E27FC236}">
+                    <a16:creationId xmlns:a16="http://schemas.microsoft.com/office/drawing/2014/main" id="{D1D096CE-A263-2C72-AB73-D9F9E8D98767}"/>
+                  </a:ext>
+                </a:extLst>
+              </p:cNvPr>
+              <p:cNvSpPr txBox="1">
+                <a:spLocks/>
+              </p:cNvSpPr>
+              <p:nvPr/>
+            </p:nvSpPr>
+            <p:spPr>
+              <a:xfrm>
+                <a:off x="3905540" y="3356746"/>
+                <a:ext cx="6790423" cy="2661379"/>
+              </a:xfrm>
+              <a:prstGeom prst="rect">
+                <a:avLst/>
+              </a:prstGeom>
+              <a:noFill/>
+              <a:ln>
+                <a:noFill/>
+              </a:ln>
+            </p:spPr>
+            <p:style>
+              <a:lnRef idx="2">
+                <a:schemeClr val="accent5"/>
+              </a:lnRef>
+              <a:fillRef idx="1">
+                <a:schemeClr val="lt1"/>
+              </a:fillRef>
+              <a:effectRef idx="0">
+                <a:schemeClr val="accent5"/>
+              </a:effectRef>
+              <a:fontRef idx="minor">
+                <a:schemeClr val="dk1"/>
+              </a:fontRef>
+            </p:style>
+            <p:txBody>
+              <a:bodyPr vert="horz" lIns="91440" tIns="45720" rIns="91440" bIns="45720" rtlCol="0">
+                <a:noAutofit/>
+              </a:bodyPr>
+              <a:lstStyle>
+                <a:lvl1pPr marL="228600" indent="-228600" algn="l" defTabSz="914400" rtl="0" eaLnBrk="1" latinLnBrk="0" hangingPunct="1">
+                  <a:lnSpc>
+                    <a:spcPct val="90000"/>
+                  </a:lnSpc>
+                  <a:spcBef>
+                    <a:spcPts val="1000"/>
+                  </a:spcBef>
+                  <a:buFont typeface="Arial" panose="020B0604020202020204" pitchFamily="34" charset="0"/>
+                  <a:buChar char="•"/>
+                  <a:defRPr sz="2800" kern="1200">
+                    <a:solidFill>
+                      <a:schemeClr val="tx1"/>
+                    </a:solidFill>
+                    <a:latin typeface="+mn-lt"/>
+                    <a:ea typeface="+mn-ea"/>
+                    <a:cs typeface="+mn-cs"/>
+                  </a:defRPr>
+                </a:lvl1pPr>
+                <a:lvl2pPr marL="685800" indent="-228600" algn="l" defTabSz="914400" rtl="0" eaLnBrk="1" latinLnBrk="0" hangingPunct="1">
+                  <a:lnSpc>
+                    <a:spcPct val="90000"/>
+                  </a:lnSpc>
+                  <a:spcBef>
+                    <a:spcPts val="500"/>
+                  </a:spcBef>
+                  <a:buFont typeface="Arial" panose="020B0604020202020204" pitchFamily="34" charset="0"/>
+                  <a:buChar char="•"/>
+                  <a:defRPr sz="2400" kern="1200">
+                    <a:solidFill>
+                      <a:schemeClr val="tx1"/>
+                    </a:solidFill>
+                    <a:latin typeface="+mn-lt"/>
+                    <a:ea typeface="+mn-ea"/>
+                    <a:cs typeface="+mn-cs"/>
+                  </a:defRPr>
+                </a:lvl2pPr>
+                <a:lvl3pPr marL="1143000" indent="-228600" algn="l" defTabSz="914400" rtl="0" eaLnBrk="1" latinLnBrk="0" hangingPunct="1">
+                  <a:lnSpc>
+                    <a:spcPct val="90000"/>
+                  </a:lnSpc>
+                  <a:spcBef>
+                    <a:spcPts val="500"/>
+                  </a:spcBef>
+                  <a:buFont typeface="Arial" panose="020B0604020202020204" pitchFamily="34" charset="0"/>
+                  <a:buChar char="•"/>
+                  <a:defRPr sz="2000" kern="1200">
+                    <a:solidFill>
+                      <a:schemeClr val="tx1"/>
+                    </a:solidFill>
+                    <a:latin typeface="+mn-lt"/>
+                    <a:ea typeface="+mn-ea"/>
+                    <a:cs typeface="+mn-cs"/>
+                  </a:defRPr>
+                </a:lvl3pPr>
+                <a:lvl4pPr marL="1600200" indent="-228600" algn="l" defTabSz="914400" rtl="0" eaLnBrk="1" latinLnBrk="0" hangingPunct="1">
+                  <a:lnSpc>
+                    <a:spcPct val="90000"/>
+                  </a:lnSpc>
+                  <a:spcBef>
+                    <a:spcPts val="500"/>
+                  </a:spcBef>
+                  <a:buFont typeface="Arial" panose="020B0604020202020204" pitchFamily="34" charset="0"/>
+                  <a:buChar char="•"/>
+                  <a:defRPr sz="1800" kern="1200">
+                    <a:solidFill>
+                      <a:schemeClr val="tx1"/>
+                    </a:solidFill>
+                    <a:latin typeface="+mn-lt"/>
+                    <a:ea typeface="+mn-ea"/>
+                    <a:cs typeface="+mn-cs"/>
+                  </a:defRPr>
+                </a:lvl4pPr>
+                <a:lvl5pPr marL="2057400" indent="-228600" algn="l" defTabSz="914400" rtl="0" eaLnBrk="1" latinLnBrk="0" hangingPunct="1">
+                  <a:lnSpc>
+                    <a:spcPct val="90000"/>
+                  </a:lnSpc>
+                  <a:spcBef>
+                    <a:spcPts val="500"/>
+                  </a:spcBef>
+                  <a:buFont typeface="Arial" panose="020B0604020202020204" pitchFamily="34" charset="0"/>
+                  <a:buChar char="•"/>
+                  <a:defRPr sz="1800" kern="1200">
+                    <a:solidFill>
+                      <a:schemeClr val="tx1"/>
+                    </a:solidFill>
+                    <a:latin typeface="+mn-lt"/>
+                    <a:ea typeface="+mn-ea"/>
+                    <a:cs typeface="+mn-cs"/>
+                  </a:defRPr>
+                </a:lvl5pPr>
+                <a:lvl6pPr marL="2514600" indent="-228600" algn="l" defTabSz="914400" rtl="0" eaLnBrk="1" latinLnBrk="0" hangingPunct="1">
+                  <a:lnSpc>
+                    <a:spcPct val="90000"/>
+                  </a:lnSpc>
+                  <a:spcBef>
+                    <a:spcPts val="500"/>
+                  </a:spcBef>
+                  <a:buFont typeface="Arial" panose="020B0604020202020204" pitchFamily="34" charset="0"/>
+                  <a:buChar char="•"/>
+                  <a:defRPr sz="1800" kern="1200">
+                    <a:solidFill>
+                      <a:schemeClr val="tx1"/>
+                    </a:solidFill>
+                    <a:latin typeface="+mn-lt"/>
+                    <a:ea typeface="+mn-ea"/>
+                    <a:cs typeface="+mn-cs"/>
+                  </a:defRPr>
+                </a:lvl6pPr>
+                <a:lvl7pPr marL="2971800" indent="-228600" algn="l" defTabSz="914400" rtl="0" eaLnBrk="1" latinLnBrk="0" hangingPunct="1">
+                  <a:lnSpc>
+                    <a:spcPct val="90000"/>
+                  </a:lnSpc>
+                  <a:spcBef>
+                    <a:spcPts val="500"/>
+                  </a:spcBef>
+                  <a:buFont typeface="Arial" panose="020B0604020202020204" pitchFamily="34" charset="0"/>
+                  <a:buChar char="•"/>
+                  <a:defRPr sz="1800" kern="1200">
+                    <a:solidFill>
+                      <a:schemeClr val="tx1"/>
+                    </a:solidFill>
+                    <a:latin typeface="+mn-lt"/>
+                    <a:ea typeface="+mn-ea"/>
+                    <a:cs typeface="+mn-cs"/>
+                  </a:defRPr>
+                </a:lvl7pPr>
+                <a:lvl8pPr marL="3429000" indent="-228600" algn="l" defTabSz="914400" rtl="0" eaLnBrk="1" latinLnBrk="0" hangingPunct="1">
+                  <a:lnSpc>
+                    <a:spcPct val="90000"/>
+                  </a:lnSpc>
+                  <a:spcBef>
+                    <a:spcPts val="500"/>
+                  </a:spcBef>
+                  <a:buFont typeface="Arial" panose="020B0604020202020204" pitchFamily="34" charset="0"/>
+                  <a:buChar char="•"/>
+                  <a:defRPr sz="1800" kern="1200">
+                    <a:solidFill>
+                      <a:schemeClr val="tx1"/>
+                    </a:solidFill>
+                    <a:latin typeface="+mn-lt"/>
+                    <a:ea typeface="+mn-ea"/>
+                    <a:cs typeface="+mn-cs"/>
+                  </a:defRPr>
+                </a:lvl8pPr>
+                <a:lvl9pPr marL="3886200" indent="-228600" algn="l" defTabSz="914400" rtl="0" eaLnBrk="1" latinLnBrk="0" hangingPunct="1">
+                  <a:lnSpc>
+                    <a:spcPct val="90000"/>
+                  </a:lnSpc>
+                  <a:spcBef>
+                    <a:spcPts val="500"/>
+                  </a:spcBef>
+                  <a:buFont typeface="Arial" panose="020B0604020202020204" pitchFamily="34" charset="0"/>
+                  <a:buChar char="•"/>
+                  <a:defRPr sz="1800" kern="1200">
+                    <a:solidFill>
+                      <a:schemeClr val="tx1"/>
+                    </a:solidFill>
+                    <a:latin typeface="+mn-lt"/>
+                    <a:ea typeface="+mn-ea"/>
+                    <a:cs typeface="+mn-cs"/>
+                  </a:defRPr>
+                </a:lvl9pPr>
+              </a:lstStyle>
+              <a:p>
+                <a:pPr marL="0" indent="0" algn="ctr">
+                  <a:lnSpc>
+                    <a:spcPct val="150000"/>
+                  </a:lnSpc>
+                  <a:buNone/>
+                </a:pPr>
+                <a14:m>
+                  <m:oMathPara xmlns:m="http://schemas.openxmlformats.org/officeDocument/2006/math">
+                    <m:oMathParaPr>
+                      <m:jc m:val="centerGroup"/>
+                    </m:oMathParaPr>
+                    <m:oMath xmlns:m="http://schemas.openxmlformats.org/officeDocument/2006/math">
+                      <m:r>
+                        <a:rPr lang="en-AU" sz="1800" b="0" i="1" dirty="0" smtClean="0">
+                          <a:latin typeface="Cambria Math" panose="02040503050406030204" pitchFamily="18" charset="0"/>
+                        </a:rPr>
+                        <m:t>𝑃𝑟𝑒𝑐𝑖𝑠𝑖𝑜</m:t>
+                      </m:r>
+                      <m:sSub>
+                        <m:sSubPr>
+                          <m:ctrlPr>
+                            <a:rPr lang="en-AU" sz="1800" b="0" i="1" dirty="0" smtClean="0">
+                              <a:latin typeface="Cambria Math" panose="02040503050406030204" pitchFamily="18" charset="0"/>
+                            </a:rPr>
+                          </m:ctrlPr>
+                        </m:sSubPr>
+                        <m:e>
+                          <m:r>
+                            <a:rPr lang="en-AU" sz="1800" b="0" i="1" dirty="0" smtClean="0">
+                              <a:latin typeface="Cambria Math" panose="02040503050406030204" pitchFamily="18" charset="0"/>
+                            </a:rPr>
+                            <m:t>𝑛</m:t>
+                          </m:r>
+                        </m:e>
+                        <m:sub>
+                          <m:r>
+                            <a:rPr lang="en-AU" sz="1800" b="0" i="1" dirty="0" smtClean="0">
+                              <a:latin typeface="Cambria Math" panose="02040503050406030204" pitchFamily="18" charset="0"/>
+                            </a:rPr>
+                            <m:t>𝐶𝑎𝑡</m:t>
+                          </m:r>
+                        </m:sub>
+                      </m:sSub>
+                      <m:r>
+                        <a:rPr lang="en-US" sz="1800" i="1" dirty="0" smtClean="0">
+                          <a:latin typeface="Cambria Math" panose="02040503050406030204" pitchFamily="18" charset="0"/>
+                        </a:rPr>
+                        <m:t> =</m:t>
+                      </m:r>
+                      <m:f>
+                        <m:fPr>
+                          <m:ctrlPr>
+                            <a:rPr lang="en-US" sz="1800" b="0" i="1" dirty="0" smtClean="0">
+                              <a:latin typeface="Cambria Math" panose="02040503050406030204" pitchFamily="18" charset="0"/>
+                            </a:rPr>
+                          </m:ctrlPr>
+                        </m:fPr>
+                        <m:num>
+                          <m:r>
+                            <a:rPr lang="en-AU" sz="1800" b="0" i="1" dirty="0" smtClean="0">
+                              <a:latin typeface="Cambria Math" panose="02040503050406030204" pitchFamily="18" charset="0"/>
+                            </a:rPr>
+                            <m:t>76</m:t>
+                          </m:r>
+                        </m:num>
+                        <m:den>
+                          <m:r>
+                            <a:rPr lang="en-AU" sz="1800" b="0" i="1" dirty="0" smtClean="0">
+                              <a:latin typeface="Cambria Math" panose="02040503050406030204" pitchFamily="18" charset="0"/>
+                            </a:rPr>
+                            <m:t>76+27+16</m:t>
+                          </m:r>
+                        </m:den>
+                      </m:f>
+                      <m:r>
+                        <a:rPr lang="en-US" sz="1800" b="0" i="1" dirty="0" smtClean="0">
+                          <a:latin typeface="Cambria Math" panose="02040503050406030204" pitchFamily="18" charset="0"/>
+                        </a:rPr>
+                        <m:t>=</m:t>
+                      </m:r>
+                      <m:r>
+                        <a:rPr lang="en-AU" sz="1800" b="0" i="1" dirty="0" smtClean="0">
+                          <a:latin typeface="Cambria Math" panose="02040503050406030204" pitchFamily="18" charset="0"/>
+                        </a:rPr>
+                        <m:t>63.86</m:t>
+                      </m:r>
+                      <m:r>
+                        <a:rPr lang="en-US" sz="1800" b="0" i="1" dirty="0" smtClean="0">
+                          <a:latin typeface="Cambria Math" panose="02040503050406030204" pitchFamily="18" charset="0"/>
+                        </a:rPr>
+                        <m:t>%</m:t>
+                      </m:r>
+                    </m:oMath>
+                  </m:oMathPara>
+                </a14:m>
+                <a:endParaRPr lang="en-US" sz="1800" b="0" dirty="0"/>
+              </a:p>
+              <a:p>
+                <a:pPr marL="0" indent="0" algn="ctr">
+                  <a:lnSpc>
+                    <a:spcPct val="150000"/>
+                  </a:lnSpc>
+                  <a:buNone/>
+                </a:pPr>
+                <a14:m>
+                  <m:oMathPara xmlns:m="http://schemas.openxmlformats.org/officeDocument/2006/math">
+                    <m:oMathParaPr>
+                      <m:jc m:val="centerGroup"/>
+                    </m:oMathParaPr>
+                    <m:oMath xmlns:m="http://schemas.openxmlformats.org/officeDocument/2006/math">
+                      <m:sSub>
+                        <m:sSubPr>
+                          <m:ctrlPr>
+                            <a:rPr lang="en-US" sz="1800" i="1">
+                              <a:latin typeface="Cambria Math" panose="02040503050406030204" pitchFamily="18" charset="0"/>
+                            </a:rPr>
+                          </m:ctrlPr>
+                        </m:sSubPr>
+                        <m:e>
+                          <m:r>
+                            <a:rPr lang="en-AU" sz="1800" b="0" i="1" smtClean="0">
+                              <a:latin typeface="Cambria Math" panose="02040503050406030204" pitchFamily="18" charset="0"/>
+                            </a:rPr>
+                            <m:t>𝑃𝑟𝑒𝑐𝑖𝑠𝑖𝑜𝑛</m:t>
+                          </m:r>
+                        </m:e>
+                        <m:sub>
+                          <m:r>
+                            <a:rPr lang="en-US" sz="1800" i="1">
+                              <a:latin typeface="Cambria Math" panose="02040503050406030204" pitchFamily="18" charset="0"/>
+                            </a:rPr>
+                            <m:t>𝐷𝑜𝑔</m:t>
+                          </m:r>
+                        </m:sub>
+                      </m:sSub>
+                      <m:r>
+                        <a:rPr lang="en-US" sz="1800" i="1">
+                          <a:latin typeface="Cambria Math" panose="02040503050406030204" pitchFamily="18" charset="0"/>
+                        </a:rPr>
+                        <m:t>=</m:t>
+                      </m:r>
+                      <m:f>
+                        <m:fPr>
+                          <m:ctrlPr>
+                            <a:rPr lang="en-US" sz="1800" i="1">
+                              <a:latin typeface="Cambria Math" panose="02040503050406030204" pitchFamily="18" charset="0"/>
+                            </a:rPr>
+                          </m:ctrlPr>
+                        </m:fPr>
+                        <m:num>
+                          <m:r>
+                            <a:rPr lang="en-AU" sz="1800" b="0" i="1" smtClean="0">
+                              <a:latin typeface="Cambria Math" panose="02040503050406030204" pitchFamily="18" charset="0"/>
+                            </a:rPr>
+                            <m:t>180</m:t>
+                          </m:r>
+                        </m:num>
+                        <m:den>
+                          <m:r>
+                            <a:rPr lang="en-AU" sz="1800" b="0" i="1" smtClean="0">
+                              <a:latin typeface="Cambria Math" panose="02040503050406030204" pitchFamily="18" charset="0"/>
+                            </a:rPr>
+                            <m:t>180+20+3</m:t>
+                          </m:r>
+                        </m:den>
+                      </m:f>
+                      <m:r>
+                        <a:rPr lang="en-US" sz="1800" i="1">
+                          <a:latin typeface="Cambria Math" panose="02040503050406030204" pitchFamily="18" charset="0"/>
+                        </a:rPr>
+                        <m:t>=</m:t>
+                      </m:r>
+                      <m:r>
+                        <a:rPr lang="en-AU" sz="1800" b="0" i="1" smtClean="0">
+                          <a:latin typeface="Cambria Math" panose="02040503050406030204" pitchFamily="18" charset="0"/>
+                        </a:rPr>
+                        <m:t>88</m:t>
+                      </m:r>
+                      <m:r>
+                        <a:rPr lang="en-US" sz="1800" i="1">
+                          <a:latin typeface="Cambria Math" panose="02040503050406030204" pitchFamily="18" charset="0"/>
+                        </a:rPr>
+                        <m:t>.</m:t>
+                      </m:r>
+                      <m:r>
+                        <a:rPr lang="en-AU" sz="1800" b="0" i="1" smtClean="0">
+                          <a:latin typeface="Cambria Math" panose="02040503050406030204" pitchFamily="18" charset="0"/>
+                        </a:rPr>
+                        <m:t>66</m:t>
+                      </m:r>
+                      <m:r>
+                        <a:rPr lang="en-US" sz="1800" i="1">
+                          <a:latin typeface="Cambria Math" panose="02040503050406030204" pitchFamily="18" charset="0"/>
+                        </a:rPr>
+                        <m:t>%</m:t>
+                      </m:r>
+                    </m:oMath>
+                  </m:oMathPara>
+                </a14:m>
+                <a:endParaRPr lang="en-US" sz="1800" b="0" dirty="0"/>
+              </a:p>
+              <a:p>
+                <a:pPr marL="0" indent="0" algn="ctr">
+                  <a:lnSpc>
+                    <a:spcPct val="150000"/>
+                  </a:lnSpc>
+                  <a:buNone/>
+                </a:pPr>
+                <a14:m>
+                  <m:oMathPara xmlns:m="http://schemas.openxmlformats.org/officeDocument/2006/math">
+                    <m:oMathParaPr>
+                      <m:jc m:val="centerGroup"/>
+                    </m:oMathParaPr>
+                    <m:oMath xmlns:m="http://schemas.openxmlformats.org/officeDocument/2006/math">
+                      <m:r>
+                        <a:rPr lang="en-AU" sz="1800" b="0" i="1" smtClean="0">
+                          <a:latin typeface="Cambria Math" panose="02040503050406030204" pitchFamily="18" charset="0"/>
+                        </a:rPr>
+                        <m:t>𝑃𝑟𝑒𝑐𝑖𝑠𝑖𝑜</m:t>
+                      </m:r>
+                      <m:sSub>
+                        <m:sSubPr>
+                          <m:ctrlPr>
+                            <a:rPr lang="en-AU" sz="1800" b="0" i="1" smtClean="0">
+                              <a:latin typeface="Cambria Math" panose="02040503050406030204" pitchFamily="18" charset="0"/>
+                            </a:rPr>
+                          </m:ctrlPr>
+                        </m:sSubPr>
+                        <m:e>
+                          <m:r>
+                            <a:rPr lang="en-AU" sz="1800" b="0" i="1" smtClean="0">
+                              <a:latin typeface="Cambria Math" panose="02040503050406030204" pitchFamily="18" charset="0"/>
+                            </a:rPr>
+                            <m:t>𝑛</m:t>
+                          </m:r>
+                        </m:e>
+                        <m:sub>
+                          <m:r>
+                            <a:rPr lang="en-AU" sz="1800" b="0" i="1" smtClean="0">
+                              <a:latin typeface="Cambria Math" panose="02040503050406030204" pitchFamily="18" charset="0"/>
+                            </a:rPr>
+                            <m:t>𝐵𝑖𝑟𝑑</m:t>
+                          </m:r>
+                        </m:sub>
+                      </m:sSub>
+                      <m:r>
+                        <a:rPr lang="en-US" sz="1800" b="0" i="1" smtClean="0">
+                          <a:latin typeface="Cambria Math" panose="02040503050406030204" pitchFamily="18" charset="0"/>
+                        </a:rPr>
+                        <m:t>=</m:t>
+                      </m:r>
+                      <m:f>
+                        <m:fPr>
+                          <m:ctrlPr>
+                            <a:rPr lang="en-US" sz="1800" b="0" i="1" smtClean="0">
+                              <a:latin typeface="Cambria Math" panose="02040503050406030204" pitchFamily="18" charset="0"/>
+                            </a:rPr>
+                          </m:ctrlPr>
+                        </m:fPr>
+                        <m:num>
+                          <m:r>
+                            <a:rPr lang="en-AU" sz="1800" b="0" i="1" smtClean="0">
+                              <a:latin typeface="Cambria Math" panose="02040503050406030204" pitchFamily="18" charset="0"/>
+                            </a:rPr>
+                            <m:t>25</m:t>
+                          </m:r>
+                        </m:num>
+                        <m:den>
+                          <m:r>
+                            <a:rPr lang="en-AU" sz="1800" b="0" i="1" smtClean="0">
+                              <a:latin typeface="Cambria Math" panose="02040503050406030204" pitchFamily="18" charset="0"/>
+                            </a:rPr>
+                            <m:t>12+11+25</m:t>
+                          </m:r>
+                        </m:den>
+                      </m:f>
+                      <m:r>
+                        <a:rPr lang="en-US" sz="1800" b="0" i="1" smtClean="0">
+                          <a:latin typeface="Cambria Math" panose="02040503050406030204" pitchFamily="18" charset="0"/>
+                        </a:rPr>
+                        <m:t>=</m:t>
+                      </m:r>
+                      <m:r>
+                        <a:rPr lang="en-AU" sz="1800" b="0" i="1" smtClean="0">
+                          <a:latin typeface="Cambria Math" panose="02040503050406030204" pitchFamily="18" charset="0"/>
+                        </a:rPr>
+                        <m:t>52</m:t>
+                      </m:r>
+                      <m:r>
+                        <a:rPr lang="en-US" sz="1800" b="0" i="1" smtClean="0">
+                          <a:latin typeface="Cambria Math" panose="02040503050406030204" pitchFamily="18" charset="0"/>
+                        </a:rPr>
+                        <m:t>.</m:t>
+                      </m:r>
+                      <m:r>
+                        <a:rPr lang="en-AU" sz="1800" b="0" i="1" smtClean="0">
+                          <a:latin typeface="Cambria Math" panose="02040503050406030204" pitchFamily="18" charset="0"/>
+                        </a:rPr>
+                        <m:t>08</m:t>
+                      </m:r>
+                      <m:r>
+                        <a:rPr lang="en-US" sz="1800" b="0" i="1" smtClean="0">
+                          <a:latin typeface="Cambria Math" panose="02040503050406030204" pitchFamily="18" charset="0"/>
+                        </a:rPr>
+                        <m:t>%</m:t>
+                      </m:r>
+                    </m:oMath>
+                  </m:oMathPara>
+                </a14:m>
+                <a:endParaRPr lang="en-US" sz="1800" b="0" dirty="0"/>
+              </a:p>
+            </p:txBody>
+          </p:sp>
+        </mc:Choice>
+        <mc:Fallback>
+          <p:sp>
+            <p:nvSpPr>
+              <p:cNvPr id="7" name="Content Placeholder 2">
+                <a:extLst>
+                  <a:ext uri="{FF2B5EF4-FFF2-40B4-BE49-F238E27FC236}">
+                    <a16:creationId xmlns:a16="http://schemas.microsoft.com/office/drawing/2014/main" id="{D1D096CE-A263-2C72-AB73-D9F9E8D98767}"/>
+                  </a:ext>
+                </a:extLst>
+              </p:cNvPr>
+              <p:cNvSpPr txBox="1">
+                <a:spLocks noRot="1" noChangeAspect="1" noMove="1" noResize="1" noEditPoints="1" noAdjustHandles="1" noChangeArrowheads="1" noChangeShapeType="1" noTextEdit="1"/>
+              </p:cNvSpPr>
+              <p:nvPr/>
+            </p:nvSpPr>
+            <p:spPr>
+              <a:xfrm>
+                <a:off x="3905540" y="3356746"/>
+                <a:ext cx="6790423" cy="2661379"/>
+              </a:xfrm>
+              <a:prstGeom prst="rect">
+                <a:avLst/>
+              </a:prstGeom>
+              <a:blipFill>
+                <a:blip r:embed="rId3"/>
+                <a:stretch>
+                  <a:fillRect/>
+                </a:stretch>
+              </a:blipFill>
+              <a:ln>
+                <a:noFill/>
+              </a:ln>
+            </p:spPr>
+            <p:txBody>
+              <a:bodyPr/>
+              <a:lstStyle/>
+              <a:p>
+                <a:r>
+                  <a:rPr lang="en-AU">
+                    <a:noFill/>
+                  </a:rPr>
+                  <a:t> </a:t>
+                </a:r>
+              </a:p>
+            </p:txBody>
+          </p:sp>
+        </mc:Fallback>
+      </mc:AlternateContent>
     </p:spTree>
     <p:extLst>
       <p:ext uri="{BB962C8B-B14F-4D97-AF65-F5344CB8AC3E}">
@@ -10014,8 +10693,8 @@
           </a:graphicData>
         </a:graphic>
       </p:graphicFrame>
-      <mc:AlternateContent xmlns:mc="http://schemas.openxmlformats.org/markup-compatibility/2006">
-        <mc:Choice xmlns:a14="http://schemas.microsoft.com/office/drawing/2010/main" Requires="a14">
+      <mc:AlternateContent xmlns:mc="http://schemas.openxmlformats.org/markup-compatibility/2006" xmlns:a14="http://schemas.microsoft.com/office/drawing/2010/main">
+        <mc:Choice Requires="a14">
           <p:sp>
             <p:nvSpPr>
               <p:cNvPr id="6" name="Content Placeholder 2">
@@ -10304,31 +10983,7 @@
                         <a:rPr lang="en-US" sz="1800" b="0" i="1" dirty="0" smtClean="0">
                           <a:latin typeface="Cambria Math" panose="02040503050406030204" pitchFamily="18" charset="0"/>
                         </a:rPr>
-                        <m:t>=7</m:t>
-                      </m:r>
-                      <m:r>
-                        <a:rPr lang="en-US" sz="1800" b="0" i="1" dirty="0" smtClean="0">
-                          <a:latin typeface="Cambria Math" panose="02040503050406030204" pitchFamily="18" charset="0"/>
-                        </a:rPr>
-                        <m:t>7</m:t>
-                      </m:r>
-                      <m:r>
-                        <a:rPr lang="en-US" sz="1800" b="0" i="1" dirty="0" smtClean="0">
-                          <a:latin typeface="Cambria Math" panose="02040503050406030204" pitchFamily="18" charset="0"/>
-                        </a:rPr>
-                        <m:t>.</m:t>
-                      </m:r>
-                      <m:r>
-                        <a:rPr lang="en-US" sz="1800" b="0" i="1" dirty="0" smtClean="0">
-                          <a:latin typeface="Cambria Math" panose="02040503050406030204" pitchFamily="18" charset="0"/>
-                        </a:rPr>
-                        <m:t>55</m:t>
-                      </m:r>
-                      <m:r>
-                        <a:rPr lang="en-US" sz="1800" b="0" i="1" dirty="0" smtClean="0">
-                          <a:latin typeface="Cambria Math" panose="02040503050406030204" pitchFamily="18" charset="0"/>
-                        </a:rPr>
-                        <m:t>%</m:t>
+                        <m:t>=77.55%</m:t>
                       </m:r>
                     </m:oMath>
                   </m:oMathPara>
@@ -10510,7 +11165,7 @@
             </p:txBody>
           </p:sp>
         </mc:Choice>
-        <mc:Fallback>
+        <mc:Fallback xmlns="">
           <p:sp>
             <p:nvSpPr>
               <p:cNvPr id="6" name="Content Placeholder 2">
@@ -10588,8 +11243,8 @@
           <a:chExt cx="0" cy="0"/>
         </a:xfrm>
       </p:grpSpPr>
-      <mc:AlternateContent xmlns:mc="http://schemas.openxmlformats.org/markup-compatibility/2006">
-        <mc:Choice xmlns:a14="http://schemas.microsoft.com/office/drawing/2010/main" Requires="a14">
+      <mc:AlternateContent xmlns:mc="http://schemas.openxmlformats.org/markup-compatibility/2006" xmlns:a14="http://schemas.microsoft.com/office/drawing/2010/main">
+        <mc:Choice Requires="a14">
           <p:sp>
             <p:nvSpPr>
               <p:cNvPr id="6" name="Content Placeholder 2">
@@ -10870,19 +11525,7 @@
                             <a:rPr lang="en-US" sz="1800" b="0" i="1" dirty="0" smtClean="0">
                               <a:latin typeface="Cambria Math" panose="02040503050406030204" pitchFamily="18" charset="0"/>
                             </a:rPr>
-                            <m:t>76+</m:t>
-                          </m:r>
-                          <m:r>
-                            <a:rPr lang="en-US" sz="1800" b="0" i="1" dirty="0" smtClean="0">
-                              <a:latin typeface="Cambria Math" panose="02040503050406030204" pitchFamily="18" charset="0"/>
-                            </a:rPr>
-                            <m:t>2</m:t>
-                          </m:r>
-                          <m:r>
-                            <a:rPr lang="en-US" sz="1800" b="0" i="1" dirty="0" smtClean="0">
-                              <a:latin typeface="Cambria Math" panose="02040503050406030204" pitchFamily="18" charset="0"/>
-                            </a:rPr>
-                            <m:t>0+12</m:t>
+                            <m:t>76+20+12</m:t>
                           </m:r>
                         </m:den>
                       </m:f>
@@ -10890,31 +11533,7 @@
                         <a:rPr lang="en-US" sz="1800" b="0" i="1" dirty="0" smtClean="0">
                           <a:latin typeface="Cambria Math" panose="02040503050406030204" pitchFamily="18" charset="0"/>
                         </a:rPr>
-                        <m:t>=7</m:t>
-                      </m:r>
-                      <m:r>
-                        <a:rPr lang="en-US" sz="1800" b="0" i="1" dirty="0" smtClean="0">
-                          <a:latin typeface="Cambria Math" panose="02040503050406030204" pitchFamily="18" charset="0"/>
-                        </a:rPr>
-                        <m:t>0</m:t>
-                      </m:r>
-                      <m:r>
-                        <a:rPr lang="en-US" sz="1800" b="0" i="1" dirty="0" smtClean="0">
-                          <a:latin typeface="Cambria Math" panose="02040503050406030204" pitchFamily="18" charset="0"/>
-                        </a:rPr>
-                        <m:t>.</m:t>
-                      </m:r>
-                      <m:r>
-                        <a:rPr lang="en-US" sz="1800" b="0" i="1" dirty="0" smtClean="0">
-                          <a:latin typeface="Cambria Math" panose="02040503050406030204" pitchFamily="18" charset="0"/>
-                        </a:rPr>
-                        <m:t>37</m:t>
-                      </m:r>
-                      <m:r>
-                        <a:rPr lang="en-US" sz="1800" b="0" i="1" dirty="0" smtClean="0">
-                          <a:latin typeface="Cambria Math" panose="02040503050406030204" pitchFamily="18" charset="0"/>
-                        </a:rPr>
-                        <m:t>%</m:t>
+                        <m:t>=70.37%</m:t>
                       </m:r>
                     </m:oMath>
                   </m:oMathPara>
@@ -11114,31 +11733,7 @@
                             <a:rPr lang="en-US" sz="1800" b="0" i="1" smtClean="0">
                               <a:latin typeface="Cambria Math" panose="02040503050406030204" pitchFamily="18" charset="0"/>
                             </a:rPr>
-                            <m:t>16</m:t>
-                          </m:r>
-                          <m:r>
-                            <a:rPr lang="en-US" sz="1800" b="0" i="1" smtClean="0">
-                              <a:latin typeface="Cambria Math" panose="02040503050406030204" pitchFamily="18" charset="0"/>
-                            </a:rPr>
-                            <m:t>+</m:t>
-                          </m:r>
-                          <m:r>
-                            <a:rPr lang="en-US" sz="1800" b="0" i="1" smtClean="0">
-                              <a:latin typeface="Cambria Math" panose="02040503050406030204" pitchFamily="18" charset="0"/>
-                            </a:rPr>
-                            <m:t>3</m:t>
-                          </m:r>
-                          <m:r>
-                            <a:rPr lang="en-US" sz="1800" b="0" i="1" smtClean="0">
-                              <a:latin typeface="Cambria Math" panose="02040503050406030204" pitchFamily="18" charset="0"/>
-                            </a:rPr>
-                            <m:t>+</m:t>
-                          </m:r>
-                          <m:r>
-                            <a:rPr lang="en-US" sz="1800" b="0" i="1" smtClean="0">
-                              <a:latin typeface="Cambria Math" panose="02040503050406030204" pitchFamily="18" charset="0"/>
-                            </a:rPr>
-                            <m:t>25</m:t>
+                            <m:t>16+3+25</m:t>
                           </m:r>
                         </m:den>
                       </m:f>
@@ -11146,31 +11741,7 @@
                         <a:rPr lang="en-US" sz="1800" b="0" i="1" smtClean="0">
                           <a:latin typeface="Cambria Math" panose="02040503050406030204" pitchFamily="18" charset="0"/>
                         </a:rPr>
-                        <m:t>=</m:t>
-                      </m:r>
-                      <m:r>
-                        <a:rPr lang="en-US" sz="1800" b="0" i="1" smtClean="0">
-                          <a:latin typeface="Cambria Math" panose="02040503050406030204" pitchFamily="18" charset="0"/>
-                        </a:rPr>
-                        <m:t>56</m:t>
-                      </m:r>
-                      <m:r>
-                        <a:rPr lang="en-US" sz="1800" b="0" i="1" smtClean="0">
-                          <a:latin typeface="Cambria Math" panose="02040503050406030204" pitchFamily="18" charset="0"/>
-                        </a:rPr>
-                        <m:t>.</m:t>
-                      </m:r>
-                      <m:r>
-                        <a:rPr lang="en-US" sz="1800" b="0" i="1" smtClean="0">
-                          <a:latin typeface="Cambria Math" panose="02040503050406030204" pitchFamily="18" charset="0"/>
-                        </a:rPr>
-                        <m:t>81</m:t>
-                      </m:r>
-                      <m:r>
-                        <a:rPr lang="en-US" sz="1800" b="0" i="1" smtClean="0">
-                          <a:latin typeface="Cambria Math" panose="02040503050406030204" pitchFamily="18" charset="0"/>
-                        </a:rPr>
-                        <m:t>%</m:t>
+                        <m:t>=56.81%</m:t>
                       </m:r>
                     </m:oMath>
                   </m:oMathPara>
@@ -11180,7 +11751,7 @@
             </p:txBody>
           </p:sp>
         </mc:Choice>
-        <mc:Fallback>
+        <mc:Fallback xmlns="">
           <p:sp>
             <p:nvSpPr>
               <p:cNvPr id="6" name="Content Placeholder 2">
@@ -11294,8 +11865,8 @@
           </a:p>
         </p:txBody>
       </p:sp>
-      <mc:AlternateContent xmlns:mc="http://schemas.openxmlformats.org/markup-compatibility/2006">
-        <mc:Choice xmlns:a14="http://schemas.microsoft.com/office/drawing/2010/main" Requires="a14">
+      <mc:AlternateContent xmlns:mc="http://schemas.openxmlformats.org/markup-compatibility/2006" xmlns:a14="http://schemas.microsoft.com/office/drawing/2010/main">
+        <mc:Choice Requires="a14">
           <p:sp>
             <p:nvSpPr>
               <p:cNvPr id="7" name="TextBox 6">
@@ -11565,7 +12136,7 @@
             </p:txBody>
           </p:sp>
         </mc:Choice>
-        <mc:Fallback>
+        <mc:Fallback xmlns="">
           <p:sp>
             <p:nvSpPr>
               <p:cNvPr id="7" name="TextBox 6">
@@ -12426,8 +12997,8 @@
           </a:p>
         </p:txBody>
       </p:sp>
-      <mc:AlternateContent xmlns:mc="http://schemas.openxmlformats.org/markup-compatibility/2006">
-        <mc:Choice xmlns:a14="http://schemas.microsoft.com/office/drawing/2010/main" Requires="a14">
+      <mc:AlternateContent xmlns:mc="http://schemas.openxmlformats.org/markup-compatibility/2006" xmlns:a14="http://schemas.microsoft.com/office/drawing/2010/main">
+        <mc:Choice Requires="a14">
           <p:sp>
             <p:nvSpPr>
               <p:cNvPr id="7" name="TextBox 6">
@@ -12733,7 +13304,7 @@
             </p:txBody>
           </p:sp>
         </mc:Choice>
-        <mc:Fallback>
+        <mc:Fallback xmlns="">
           <p:sp>
             <p:nvSpPr>
               <p:cNvPr id="7" name="TextBox 6">
@@ -13372,8 +13943,8 @@
           </a:p>
         </p:txBody>
       </p:sp>
-      <mc:AlternateContent xmlns:mc="http://schemas.openxmlformats.org/markup-compatibility/2006">
-        <mc:Choice xmlns:a14="http://schemas.microsoft.com/office/drawing/2010/main" Requires="a14">
+      <mc:AlternateContent xmlns:mc="http://schemas.openxmlformats.org/markup-compatibility/2006" xmlns:a14="http://schemas.microsoft.com/office/drawing/2010/main">
+        <mc:Choice Requires="a14">
           <p:sp>
             <p:nvSpPr>
               <p:cNvPr id="9" name="Content Placeholder 2">
@@ -13646,13 +14217,7 @@
                             <a:rPr lang="en-US" sz="1800" b="0" i="1" dirty="0" smtClean="0">
                               <a:latin typeface="Cambria Math" panose="02040503050406030204" pitchFamily="18" charset="0"/>
                             </a:rPr>
-                            <m:t>27</m:t>
-                          </m:r>
-                          <m:r>
-                            <a:rPr lang="en-US" sz="1800" b="0" i="1" dirty="0" smtClean="0">
-                              <a:latin typeface="Cambria Math" panose="02040503050406030204" pitchFamily="18" charset="0"/>
-                            </a:rPr>
-                            <m:t>+6</m:t>
+                            <m:t>27+6</m:t>
                           </m:r>
                         </m:num>
                         <m:den>
@@ -13660,31 +14225,7 @@
                             <a:rPr lang="en-US" sz="1800" b="0" i="1" dirty="0" smtClean="0">
                               <a:latin typeface="Cambria Math" panose="02040503050406030204" pitchFamily="18" charset="0"/>
                             </a:rPr>
-                            <m:t>2</m:t>
-                          </m:r>
-                          <m:r>
-                            <a:rPr lang="en-US" sz="1800" b="0" i="1" dirty="0" smtClean="0">
-                              <a:latin typeface="Cambria Math" panose="02040503050406030204" pitchFamily="18" charset="0"/>
-                            </a:rPr>
-                            <m:t>7+</m:t>
-                          </m:r>
-                          <m:r>
-                            <a:rPr lang="en-US" sz="1800" b="0" i="1" dirty="0" smtClean="0">
-                              <a:latin typeface="Cambria Math" panose="02040503050406030204" pitchFamily="18" charset="0"/>
-                            </a:rPr>
-                            <m:t>69</m:t>
-                          </m:r>
-                          <m:r>
-                            <a:rPr lang="en-US" sz="1800" b="0" i="1" dirty="0" smtClean="0">
-                              <a:latin typeface="Cambria Math" panose="02040503050406030204" pitchFamily="18" charset="0"/>
-                            </a:rPr>
-                            <m:t>+1</m:t>
-                          </m:r>
-                          <m:r>
-                            <a:rPr lang="en-US" sz="1800" b="0" i="1" dirty="0" smtClean="0">
-                              <a:latin typeface="Cambria Math" panose="02040503050406030204" pitchFamily="18" charset="0"/>
-                            </a:rPr>
-                            <m:t>1+6+3+81</m:t>
+                            <m:t>27+69+11+6+3+81</m:t>
                           </m:r>
                         </m:den>
                       </m:f>
@@ -13692,31 +14233,7 @@
                         <a:rPr lang="en-US" sz="1800" b="0" i="1" dirty="0" smtClean="0">
                           <a:latin typeface="Cambria Math" panose="02040503050406030204" pitchFamily="18" charset="0"/>
                         </a:rPr>
-                        <m:t>=</m:t>
-                      </m:r>
-                      <m:r>
-                        <a:rPr lang="en-US" sz="1800" b="0" i="1" dirty="0" smtClean="0">
-                          <a:latin typeface="Cambria Math" panose="02040503050406030204" pitchFamily="18" charset="0"/>
-                        </a:rPr>
-                        <m:t>16</m:t>
-                      </m:r>
-                      <m:r>
-                        <a:rPr lang="en-US" sz="1800" b="0" i="1" dirty="0" smtClean="0">
-                          <a:latin typeface="Cambria Math" panose="02040503050406030204" pitchFamily="18" charset="0"/>
-                        </a:rPr>
-                        <m:t>.</m:t>
-                      </m:r>
-                      <m:r>
-                        <a:rPr lang="en-US" sz="1800" b="0" i="1" dirty="0" smtClean="0">
-                          <a:latin typeface="Cambria Math" panose="02040503050406030204" pitchFamily="18" charset="0"/>
-                        </a:rPr>
-                        <m:t>75</m:t>
-                      </m:r>
-                      <m:r>
-                        <a:rPr lang="en-US" sz="1800" b="0" i="1" dirty="0" smtClean="0">
-                          <a:latin typeface="Cambria Math" panose="02040503050406030204" pitchFamily="18" charset="0"/>
-                        </a:rPr>
-                        <m:t>%</m:t>
+                        <m:t>=16.75%</m:t>
                       </m:r>
                     </m:oMath>
                   </m:oMathPara>
@@ -13918,31 +14435,7 @@
                         <a:rPr lang="en-US" sz="1800" b="0" i="1" smtClean="0">
                           <a:latin typeface="Cambria Math" panose="02040503050406030204" pitchFamily="18" charset="0"/>
                         </a:rPr>
-                        <m:t>=</m:t>
-                      </m:r>
-                      <m:r>
-                        <a:rPr lang="en-US" sz="1800" b="0" i="1" smtClean="0">
-                          <a:latin typeface="Cambria Math" panose="02040503050406030204" pitchFamily="18" charset="0"/>
-                        </a:rPr>
-                        <m:t>11</m:t>
-                      </m:r>
-                      <m:r>
-                        <a:rPr lang="en-US" sz="1800" b="0" i="1" smtClean="0">
-                          <a:latin typeface="Cambria Math" panose="02040503050406030204" pitchFamily="18" charset="0"/>
-                        </a:rPr>
-                        <m:t>.</m:t>
-                      </m:r>
-                      <m:r>
-                        <a:rPr lang="en-US" sz="1800" b="0" i="1" smtClean="0">
-                          <a:latin typeface="Cambria Math" panose="02040503050406030204" pitchFamily="18" charset="0"/>
-                        </a:rPr>
-                        <m:t>21</m:t>
-                      </m:r>
-                      <m:r>
-                        <a:rPr lang="en-US" sz="1800" b="0" i="1" smtClean="0">
-                          <a:latin typeface="Cambria Math" panose="02040503050406030204" pitchFamily="18" charset="0"/>
-                        </a:rPr>
-                        <m:t>%</m:t>
+                        <m:t>=11.21%</m:t>
                       </m:r>
                     </m:oMath>
                   </m:oMathPara>
@@ -13952,7 +14445,7 @@
             </p:txBody>
           </p:sp>
         </mc:Choice>
-        <mc:Fallback>
+        <mc:Fallback xmlns="">
           <p:sp>
             <p:nvSpPr>
               <p:cNvPr id="9" name="Content Placeholder 2">
@@ -14058,8 +14551,8 @@
           </a:p>
         </p:txBody>
       </p:sp>
-      <mc:AlternateContent xmlns:mc="http://schemas.openxmlformats.org/markup-compatibility/2006">
-        <mc:Choice xmlns:a14="http://schemas.microsoft.com/office/drawing/2010/main" Requires="a14">
+      <mc:AlternateContent xmlns:mc="http://schemas.openxmlformats.org/markup-compatibility/2006" xmlns:a14="http://schemas.microsoft.com/office/drawing/2010/main">
+        <mc:Choice Requires="a14">
           <p:sp>
             <p:nvSpPr>
               <p:cNvPr id="7" name="TextBox 6">
@@ -14365,7 +14858,7 @@
             </p:txBody>
           </p:sp>
         </mc:Choice>
-        <mc:Fallback>
+        <mc:Fallback xmlns="">
           <p:sp>
             <p:nvSpPr>
               <p:cNvPr id="7" name="TextBox 6">
@@ -14448,8 +14941,8 @@
           </a:p>
         </p:txBody>
       </p:sp>
-      <mc:AlternateContent xmlns:mc="http://schemas.openxmlformats.org/markup-compatibility/2006">
-        <mc:Choice xmlns:a14="http://schemas.microsoft.com/office/drawing/2010/main" Requires="a14">
+      <mc:AlternateContent xmlns:mc="http://schemas.openxmlformats.org/markup-compatibility/2006" xmlns:a14="http://schemas.microsoft.com/office/drawing/2010/main">
+        <mc:Choice Requires="a14">
           <p:sp>
             <p:nvSpPr>
               <p:cNvPr id="9" name="Content Placeholder 2">
@@ -14722,19 +15215,7 @@
                             <a:rPr lang="en-US" sz="1800" b="0" i="1" dirty="0" smtClean="0">
                               <a:latin typeface="Cambria Math" panose="02040503050406030204" pitchFamily="18" charset="0"/>
                             </a:rPr>
-                            <m:t>27+</m:t>
-                          </m:r>
-                          <m:r>
-                            <a:rPr lang="en-US" sz="1800" b="0" i="1" dirty="0" smtClean="0">
-                              <a:latin typeface="Cambria Math" panose="02040503050406030204" pitchFamily="18" charset="0"/>
-                            </a:rPr>
-                            <m:t>1</m:t>
-                          </m:r>
-                          <m:r>
-                            <a:rPr lang="en-US" sz="1800" b="0" i="1" dirty="0" smtClean="0">
-                              <a:latin typeface="Cambria Math" panose="02040503050406030204" pitchFamily="18" charset="0"/>
-                            </a:rPr>
-                            <m:t>6</m:t>
+                            <m:t>27+16</m:t>
                           </m:r>
                         </m:num>
                         <m:den>
@@ -14742,37 +15223,7 @@
                             <a:rPr lang="en-US" sz="1800" b="0" i="1" dirty="0" smtClean="0">
                               <a:latin typeface="Cambria Math" panose="02040503050406030204" pitchFamily="18" charset="0"/>
                             </a:rPr>
-                            <m:t>27+</m:t>
-                          </m:r>
-                          <m:r>
-                            <a:rPr lang="en-US" sz="1800" b="0" i="1" dirty="0" smtClean="0">
-                              <a:latin typeface="Cambria Math" panose="02040503050406030204" pitchFamily="18" charset="0"/>
-                            </a:rPr>
-                            <m:t>180</m:t>
-                          </m:r>
-                          <m:r>
-                            <a:rPr lang="en-US" sz="1800" b="0" i="1" dirty="0" smtClean="0">
-                              <a:latin typeface="Cambria Math" panose="02040503050406030204" pitchFamily="18" charset="0"/>
-                            </a:rPr>
-                            <m:t>+11+</m:t>
-                          </m:r>
-                          <m:r>
-                            <a:rPr lang="en-US" sz="1800" b="0" i="1" dirty="0" smtClean="0">
-                              <a:latin typeface="Cambria Math" panose="02040503050406030204" pitchFamily="18" charset="0"/>
-                            </a:rPr>
-                            <m:t>1</m:t>
-                          </m:r>
-                          <m:r>
-                            <a:rPr lang="en-US" sz="1800" b="0" i="1" dirty="0" smtClean="0">
-                              <a:latin typeface="Cambria Math" panose="02040503050406030204" pitchFamily="18" charset="0"/>
-                            </a:rPr>
-                            <m:t>6+3+</m:t>
-                          </m:r>
-                          <m:r>
-                            <a:rPr lang="en-US" sz="1800" b="0" i="1" dirty="0" smtClean="0">
-                              <a:latin typeface="Cambria Math" panose="02040503050406030204" pitchFamily="18" charset="0"/>
-                            </a:rPr>
-                            <m:t>27</m:t>
+                            <m:t>27+180+11+16+3+27</m:t>
                           </m:r>
                         </m:den>
                       </m:f>
@@ -14780,19 +15231,7 @@
                         <a:rPr lang="en-US" sz="1800" b="0" i="1" dirty="0" smtClean="0">
                           <a:latin typeface="Cambria Math" panose="02040503050406030204" pitchFamily="18" charset="0"/>
                         </a:rPr>
-                        <m:t>=16.</m:t>
-                      </m:r>
-                      <m:r>
-                        <a:rPr lang="en-US" sz="1800" b="0" i="1" dirty="0" smtClean="0">
-                          <a:latin typeface="Cambria Math" panose="02040503050406030204" pitchFamily="18" charset="0"/>
-                        </a:rPr>
-                        <m:t>41</m:t>
-                      </m:r>
-                      <m:r>
-                        <a:rPr lang="en-US" sz="1800" b="0" i="1" dirty="0" smtClean="0">
-                          <a:latin typeface="Cambria Math" panose="02040503050406030204" pitchFamily="18" charset="0"/>
-                        </a:rPr>
-                        <m:t>%</m:t>
+                        <m:t>=16.41%</m:t>
                       </m:r>
                     </m:oMath>
                   </m:oMathPara>
@@ -14856,13 +15295,7 @@
                             <a:rPr lang="en-US" sz="1800" b="0" i="1" smtClean="0">
                               <a:latin typeface="Cambria Math" panose="02040503050406030204" pitchFamily="18" charset="0"/>
                             </a:rPr>
-                            <m:t>2</m:t>
-                          </m:r>
-                          <m:r>
-                            <a:rPr lang="en-US" sz="1800" b="0" i="1" smtClean="0">
-                              <a:latin typeface="Cambria Math" panose="02040503050406030204" pitchFamily="18" charset="0"/>
-                            </a:rPr>
-                            <m:t>0+3</m:t>
+                            <m:t>20+3</m:t>
                           </m:r>
                         </m:num>
                         <m:den>
@@ -14876,37 +15309,7 @@
                             <a:rPr lang="en-US" sz="1800" b="0" i="1" smtClean="0">
                               <a:latin typeface="Cambria Math" panose="02040503050406030204" pitchFamily="18" charset="0"/>
                             </a:rPr>
-                            <m:t>6+</m:t>
-                          </m:r>
-                          <m:r>
-                            <a:rPr lang="en-US" sz="1800" b="0" i="1" smtClean="0">
-                              <a:latin typeface="Cambria Math" panose="02040503050406030204" pitchFamily="18" charset="0"/>
-                            </a:rPr>
-                            <m:t>2</m:t>
-                          </m:r>
-                          <m:r>
-                            <a:rPr lang="en-US" sz="1800" b="0" i="1" smtClean="0">
-                              <a:latin typeface="Cambria Math" panose="02040503050406030204" pitchFamily="18" charset="0"/>
-                            </a:rPr>
-                            <m:t>0+12+</m:t>
-                          </m:r>
-                          <m:r>
-                            <a:rPr lang="en-US" sz="1800" b="0" i="1" smtClean="0">
-                              <a:latin typeface="Cambria Math" panose="02040503050406030204" pitchFamily="18" charset="0"/>
-                            </a:rPr>
-                            <m:t>1</m:t>
-                          </m:r>
-                          <m:r>
-                            <a:rPr lang="en-US" sz="1800" b="0" i="1" smtClean="0">
-                              <a:latin typeface="Cambria Math" panose="02040503050406030204" pitchFamily="18" charset="0"/>
-                            </a:rPr>
-                            <m:t>6+3+</m:t>
-                          </m:r>
-                          <m:r>
-                            <a:rPr lang="en-US" sz="1800" b="0" i="1" smtClean="0">
-                              <a:latin typeface="Cambria Math" panose="02040503050406030204" pitchFamily="18" charset="0"/>
-                            </a:rPr>
-                            <m:t>25</m:t>
+                            <m:t>6+20+12+16+3+25</m:t>
                           </m:r>
                         </m:den>
                       </m:f>
@@ -15034,19 +15437,7 @@
                             <a:rPr lang="en-US" sz="1800" b="0" i="1" smtClean="0">
                               <a:latin typeface="Cambria Math" panose="02040503050406030204" pitchFamily="18" charset="0"/>
                             </a:rPr>
-                            <m:t>+27+</m:t>
-                          </m:r>
-                          <m:r>
-                            <a:rPr lang="en-US" sz="1800" b="0" i="1" smtClean="0">
-                              <a:latin typeface="Cambria Math" panose="02040503050406030204" pitchFamily="18" charset="0"/>
-                            </a:rPr>
-                            <m:t>180</m:t>
-                          </m:r>
-                          <m:r>
-                            <a:rPr lang="en-US" sz="1800" b="0" i="1" smtClean="0">
-                              <a:latin typeface="Cambria Math" panose="02040503050406030204" pitchFamily="18" charset="0"/>
-                            </a:rPr>
-                            <m:t>+11</m:t>
+                            <m:t>+27+180+11</m:t>
                           </m:r>
                         </m:den>
                       </m:f>
@@ -15054,31 +15445,7 @@
                         <a:rPr lang="en-US" sz="1800" b="0" i="1" smtClean="0">
                           <a:latin typeface="Cambria Math" panose="02040503050406030204" pitchFamily="18" charset="0"/>
                         </a:rPr>
-                        <m:t>=</m:t>
-                      </m:r>
-                      <m:r>
-                        <a:rPr lang="en-US" sz="1800" b="0" i="1" smtClean="0">
-                          <a:latin typeface="Cambria Math" panose="02040503050406030204" pitchFamily="18" charset="0"/>
-                        </a:rPr>
-                        <m:t>7</m:t>
-                      </m:r>
-                      <m:r>
-                        <a:rPr lang="en-US" sz="1800" b="0" i="1" smtClean="0">
-                          <a:latin typeface="Cambria Math" panose="02040503050406030204" pitchFamily="18" charset="0"/>
-                        </a:rPr>
-                        <m:t>.</m:t>
-                      </m:r>
-                      <m:r>
-                        <a:rPr lang="en-US" sz="1800" b="0" i="1" smtClean="0">
-                          <a:latin typeface="Cambria Math" panose="02040503050406030204" pitchFamily="18" charset="0"/>
-                        </a:rPr>
-                        <m:t>05</m:t>
-                      </m:r>
-                      <m:r>
-                        <a:rPr lang="en-US" sz="1800" b="0" i="1" smtClean="0">
-                          <a:latin typeface="Cambria Math" panose="02040503050406030204" pitchFamily="18" charset="0"/>
-                        </a:rPr>
-                        <m:t>%</m:t>
+                        <m:t>=7.05%</m:t>
                       </m:r>
                     </m:oMath>
                   </m:oMathPara>
@@ -15088,7 +15455,7 @@
             </p:txBody>
           </p:sp>
         </mc:Choice>
-        <mc:Fallback>
+        <mc:Fallback xmlns="">
           <p:sp>
             <p:nvSpPr>
               <p:cNvPr id="9" name="Content Placeholder 2">
@@ -16056,10 +16423,10 @@
       </mc:AlternateContent>
       <p:sp>
         <p:nvSpPr>
-          <p:cNvPr id="4" name="Content Placeholder 2">
+          <p:cNvPr id="3" name="Content Placeholder 2">
             <a:extLst>
               <a:ext uri="{FF2B5EF4-FFF2-40B4-BE49-F238E27FC236}">
-                <a16:creationId xmlns:a16="http://schemas.microsoft.com/office/drawing/2014/main" id="{481A5329-54CD-C0DB-4845-5149572E47C3}"/>
+                <a16:creationId xmlns:a16="http://schemas.microsoft.com/office/drawing/2014/main" id="{B446FAAB-3915-7B5C-4BFB-022FB35DAE33}"/>
               </a:ext>
             </a:extLst>
           </p:cNvPr>
@@ -16070,12 +16437,16 @@
         </p:nvSpPr>
         <p:spPr>
           <a:xfrm>
-            <a:off x="838200" y="4225253"/>
-            <a:ext cx="4019026" cy="1959146"/>
+            <a:off x="838199" y="6096967"/>
+            <a:ext cx="2691003" cy="431177"/>
           </a:xfrm>
           <a:prstGeom prst="rect">
             <a:avLst/>
           </a:prstGeom>
+          <a:noFill/>
+          <a:ln>
+            <a:noFill/>
+          </a:ln>
         </p:spPr>
         <p:style>
           <a:lnRef idx="2">
@@ -16093,7 +16464,7 @@
         </p:style>
         <p:txBody>
           <a:bodyPr vert="horz" lIns="91440" tIns="45720" rIns="91440" bIns="45720" rtlCol="0">
-            <a:normAutofit/>
+            <a:normAutofit fontScale="55000" lnSpcReduction="20000"/>
           </a:bodyPr>
           <a:lstStyle>
             <a:lvl1pPr marL="228600" indent="-228600" algn="l" defTabSz="914400" rtl="0" eaLnBrk="1" latinLnBrk="0" hangingPunct="1">
@@ -16260,226 +16631,944 @@
             </a:lvl9pPr>
           </a:lstStyle>
           <a:p>
+            <a:pPr marL="0" indent="0">
+              <a:buNone/>
+            </a:pPr>
             <a:r>
               <a:rPr lang="en-US" dirty="0"/>
-              <a:t>Ex: Balanced Data</a:t>
+              <a:t>Balanced Data: Nearly equal quantity of dogs, cats, and birds</a:t>
             </a:r>
           </a:p>
         </p:txBody>
       </p:sp>
-      <p:sp>
-        <p:nvSpPr>
-          <p:cNvPr id="6" name="Content Placeholder 2">
+      <p:graphicFrame>
+        <p:nvGraphicFramePr>
+          <p:cNvPr id="5" name="Table 10">
             <a:extLst>
               <a:ext uri="{FF2B5EF4-FFF2-40B4-BE49-F238E27FC236}">
-                <a16:creationId xmlns:a16="http://schemas.microsoft.com/office/drawing/2014/main" id="{DFB373DA-FF69-1F71-C69D-0A42C80B80CE}"/>
+                <a16:creationId xmlns:a16="http://schemas.microsoft.com/office/drawing/2014/main" id="{85D84FA7-B1B6-9C41-4304-5134E6266AA6}"/>
               </a:ext>
             </a:extLst>
           </p:cNvPr>
-          <p:cNvSpPr txBox="1">
-            <a:spLocks/>
-          </p:cNvSpPr>
-          <p:nvPr/>
-        </p:nvSpPr>
-        <p:spPr>
-          <a:xfrm>
-            <a:off x="7334776" y="4225253"/>
-            <a:ext cx="4019026" cy="1959146"/>
-          </a:xfrm>
-          <a:prstGeom prst="rect">
-            <a:avLst/>
-          </a:prstGeom>
-        </p:spPr>
-        <p:style>
-          <a:lnRef idx="2">
-            <a:schemeClr val="accent5"/>
-          </a:lnRef>
-          <a:fillRef idx="1">
-            <a:schemeClr val="lt1"/>
-          </a:fillRef>
-          <a:effectRef idx="0">
-            <a:schemeClr val="accent5"/>
-          </a:effectRef>
-          <a:fontRef idx="minor">
-            <a:schemeClr val="dk1"/>
-          </a:fontRef>
-        </p:style>
-        <p:txBody>
-          <a:bodyPr vert="horz" lIns="91440" tIns="45720" rIns="91440" bIns="45720" rtlCol="0">
-            <a:normAutofit/>
-          </a:bodyPr>
-          <a:lstStyle>
-            <a:lvl1pPr marL="228600" indent="-228600" algn="l" defTabSz="914400" rtl="0" eaLnBrk="1" latinLnBrk="0" hangingPunct="1">
-              <a:lnSpc>
-                <a:spcPct val="90000"/>
-              </a:lnSpc>
-              <a:spcBef>
-                <a:spcPts val="1000"/>
-              </a:spcBef>
-              <a:buFont typeface="Arial" panose="020B0604020202020204" pitchFamily="34" charset="0"/>
-              <a:buChar char="•"/>
-              <a:defRPr sz="2800" kern="1200">
-                <a:solidFill>
-                  <a:schemeClr val="tx1"/>
-                </a:solidFill>
-                <a:latin typeface="+mn-lt"/>
-                <a:ea typeface="+mn-ea"/>
-                <a:cs typeface="+mn-cs"/>
-              </a:defRPr>
-            </a:lvl1pPr>
-            <a:lvl2pPr marL="685800" indent="-228600" algn="l" defTabSz="914400" rtl="0" eaLnBrk="1" latinLnBrk="0" hangingPunct="1">
-              <a:lnSpc>
-                <a:spcPct val="90000"/>
-              </a:lnSpc>
-              <a:spcBef>
-                <a:spcPts val="500"/>
-              </a:spcBef>
-              <a:buFont typeface="Arial" panose="020B0604020202020204" pitchFamily="34" charset="0"/>
-              <a:buChar char="•"/>
-              <a:defRPr sz="2400" kern="1200">
-                <a:solidFill>
-                  <a:schemeClr val="tx1"/>
-                </a:solidFill>
-                <a:latin typeface="+mn-lt"/>
-                <a:ea typeface="+mn-ea"/>
-                <a:cs typeface="+mn-cs"/>
-              </a:defRPr>
-            </a:lvl2pPr>
-            <a:lvl3pPr marL="1143000" indent="-228600" algn="l" defTabSz="914400" rtl="0" eaLnBrk="1" latinLnBrk="0" hangingPunct="1">
-              <a:lnSpc>
-                <a:spcPct val="90000"/>
-              </a:lnSpc>
-              <a:spcBef>
-                <a:spcPts val="500"/>
-              </a:spcBef>
-              <a:buFont typeface="Arial" panose="020B0604020202020204" pitchFamily="34" charset="0"/>
-              <a:buChar char="•"/>
-              <a:defRPr sz="2000" kern="1200">
-                <a:solidFill>
-                  <a:schemeClr val="tx1"/>
-                </a:solidFill>
-                <a:latin typeface="+mn-lt"/>
-                <a:ea typeface="+mn-ea"/>
-                <a:cs typeface="+mn-cs"/>
-              </a:defRPr>
-            </a:lvl3pPr>
-            <a:lvl4pPr marL="1600200" indent="-228600" algn="l" defTabSz="914400" rtl="0" eaLnBrk="1" latinLnBrk="0" hangingPunct="1">
-              <a:lnSpc>
-                <a:spcPct val="90000"/>
-              </a:lnSpc>
-              <a:spcBef>
-                <a:spcPts val="500"/>
-              </a:spcBef>
-              <a:buFont typeface="Arial" panose="020B0604020202020204" pitchFamily="34" charset="0"/>
-              <a:buChar char="•"/>
-              <a:defRPr sz="1800" kern="1200">
-                <a:solidFill>
-                  <a:schemeClr val="tx1"/>
-                </a:solidFill>
-                <a:latin typeface="+mn-lt"/>
-                <a:ea typeface="+mn-ea"/>
-                <a:cs typeface="+mn-cs"/>
-              </a:defRPr>
-            </a:lvl4pPr>
-            <a:lvl5pPr marL="2057400" indent="-228600" algn="l" defTabSz="914400" rtl="0" eaLnBrk="1" latinLnBrk="0" hangingPunct="1">
-              <a:lnSpc>
-                <a:spcPct val="90000"/>
-              </a:lnSpc>
-              <a:spcBef>
-                <a:spcPts val="500"/>
-              </a:spcBef>
-              <a:buFont typeface="Arial" panose="020B0604020202020204" pitchFamily="34" charset="0"/>
-              <a:buChar char="•"/>
-              <a:defRPr sz="1800" kern="1200">
-                <a:solidFill>
-                  <a:schemeClr val="tx1"/>
-                </a:solidFill>
-                <a:latin typeface="+mn-lt"/>
-                <a:ea typeface="+mn-ea"/>
-                <a:cs typeface="+mn-cs"/>
-              </a:defRPr>
-            </a:lvl5pPr>
-            <a:lvl6pPr marL="2514600" indent="-228600" algn="l" defTabSz="914400" rtl="0" eaLnBrk="1" latinLnBrk="0" hangingPunct="1">
-              <a:lnSpc>
-                <a:spcPct val="90000"/>
-              </a:lnSpc>
-              <a:spcBef>
-                <a:spcPts val="500"/>
-              </a:spcBef>
-              <a:buFont typeface="Arial" panose="020B0604020202020204" pitchFamily="34" charset="0"/>
-              <a:buChar char="•"/>
-              <a:defRPr sz="1800" kern="1200">
-                <a:solidFill>
-                  <a:schemeClr val="tx1"/>
-                </a:solidFill>
-                <a:latin typeface="+mn-lt"/>
-                <a:ea typeface="+mn-ea"/>
-                <a:cs typeface="+mn-cs"/>
-              </a:defRPr>
-            </a:lvl6pPr>
-            <a:lvl7pPr marL="2971800" indent="-228600" algn="l" defTabSz="914400" rtl="0" eaLnBrk="1" latinLnBrk="0" hangingPunct="1">
-              <a:lnSpc>
-                <a:spcPct val="90000"/>
-              </a:lnSpc>
-              <a:spcBef>
-                <a:spcPts val="500"/>
-              </a:spcBef>
-              <a:buFont typeface="Arial" panose="020B0604020202020204" pitchFamily="34" charset="0"/>
-              <a:buChar char="•"/>
-              <a:defRPr sz="1800" kern="1200">
-                <a:solidFill>
-                  <a:schemeClr val="tx1"/>
-                </a:solidFill>
-                <a:latin typeface="+mn-lt"/>
-                <a:ea typeface="+mn-ea"/>
-                <a:cs typeface="+mn-cs"/>
-              </a:defRPr>
-            </a:lvl7pPr>
-            <a:lvl8pPr marL="3429000" indent="-228600" algn="l" defTabSz="914400" rtl="0" eaLnBrk="1" latinLnBrk="0" hangingPunct="1">
-              <a:lnSpc>
-                <a:spcPct val="90000"/>
-              </a:lnSpc>
-              <a:spcBef>
-                <a:spcPts val="500"/>
-              </a:spcBef>
-              <a:buFont typeface="Arial" panose="020B0604020202020204" pitchFamily="34" charset="0"/>
-              <a:buChar char="•"/>
-              <a:defRPr sz="1800" kern="1200">
-                <a:solidFill>
-                  <a:schemeClr val="tx1"/>
-                </a:solidFill>
-                <a:latin typeface="+mn-lt"/>
-                <a:ea typeface="+mn-ea"/>
-                <a:cs typeface="+mn-cs"/>
-              </a:defRPr>
-            </a:lvl8pPr>
-            <a:lvl9pPr marL="3886200" indent="-228600" algn="l" defTabSz="914400" rtl="0" eaLnBrk="1" latinLnBrk="0" hangingPunct="1">
-              <a:lnSpc>
-                <a:spcPct val="90000"/>
-              </a:lnSpc>
-              <a:spcBef>
-                <a:spcPts val="500"/>
-              </a:spcBef>
-              <a:buFont typeface="Arial" panose="020B0604020202020204" pitchFamily="34" charset="0"/>
-              <a:buChar char="•"/>
-              <a:defRPr sz="1800" kern="1200">
-                <a:solidFill>
-                  <a:schemeClr val="tx1"/>
-                </a:solidFill>
-                <a:latin typeface="+mn-lt"/>
-                <a:ea typeface="+mn-ea"/>
-                <a:cs typeface="+mn-cs"/>
-              </a:defRPr>
-            </a:lvl9pPr>
-          </a:lstStyle>
-          <a:p>
-            <a:r>
-              <a:rPr lang="en-US" dirty="0"/>
-              <a:t>Ex: Imbalanced Data</a:t>
-            </a:r>
-          </a:p>
-        </p:txBody>
-      </p:sp>
+          <p:cNvGraphicFramePr>
+            <a:graphicFrameLocks noGrp="1"/>
+          </p:cNvGraphicFramePr>
+          <p:nvPr>
+            <p:extLst>
+              <p:ext uri="{D42A27DB-BD31-4B8C-83A1-F6EECF244321}">
+                <p14:modId xmlns:p14="http://schemas.microsoft.com/office/powerpoint/2010/main" val="3802771662"/>
+              </p:ext>
+            </p:extLst>
+          </p:nvPr>
+        </p:nvGraphicFramePr>
+        <p:xfrm>
+          <a:off x="838198" y="3921583"/>
+          <a:ext cx="2691004" cy="2124504"/>
+        </p:xfrm>
+        <a:graphic>
+          <a:graphicData uri="http://schemas.openxmlformats.org/drawingml/2006/table">
+            <a:tbl>
+              <a:tblPr firstRow="1" bandRow="1">
+                <a:tableStyleId>{5C22544A-7EE6-4342-B048-85BDC9FD1C3A}</a:tableStyleId>
+              </a:tblPr>
+              <a:tblGrid>
+                <a:gridCol w="672751">
+                  <a:extLst>
+                    <a:ext uri="{9D8B030D-6E8A-4147-A177-3AD203B41FA5}">
+                      <a16:colId xmlns:a16="http://schemas.microsoft.com/office/drawing/2014/main" val="3779047369"/>
+                    </a:ext>
+                  </a:extLst>
+                </a:gridCol>
+                <a:gridCol w="672751">
+                  <a:extLst>
+                    <a:ext uri="{9D8B030D-6E8A-4147-A177-3AD203B41FA5}">
+                      <a16:colId xmlns:a16="http://schemas.microsoft.com/office/drawing/2014/main" val="2587912599"/>
+                    </a:ext>
+                  </a:extLst>
+                </a:gridCol>
+                <a:gridCol w="672751">
+                  <a:extLst>
+                    <a:ext uri="{9D8B030D-6E8A-4147-A177-3AD203B41FA5}">
+                      <a16:colId xmlns:a16="http://schemas.microsoft.com/office/drawing/2014/main" val="617498338"/>
+                    </a:ext>
+                  </a:extLst>
+                </a:gridCol>
+                <a:gridCol w="672751">
+                  <a:extLst>
+                    <a:ext uri="{9D8B030D-6E8A-4147-A177-3AD203B41FA5}">
+                      <a16:colId xmlns:a16="http://schemas.microsoft.com/office/drawing/2014/main" val="1361611942"/>
+                    </a:ext>
+                  </a:extLst>
+                </a:gridCol>
+              </a:tblGrid>
+              <a:tr h="517477">
+                <a:tc>
+                  <a:txBody>
+                    <a:bodyPr/>
+                    <a:lstStyle/>
+                    <a:p>
+                      <a:pPr algn="ctr"/>
+                      <a:endParaRPr lang="en-US" sz="1500" b="1" dirty="0">
+                        <a:solidFill>
+                          <a:schemeClr val="bg1"/>
+                        </a:solidFill>
+                      </a:endParaRPr>
+                    </a:p>
+                  </a:txBody>
+                  <a:tcPr marL="73925" marR="73925" marT="36963" marB="36963">
+                    <a:solidFill>
+                      <a:srgbClr val="4472C4"/>
+                    </a:solidFill>
+                  </a:tcPr>
+                </a:tc>
+                <a:tc>
+                  <a:txBody>
+                    <a:bodyPr/>
+                    <a:lstStyle/>
+                    <a:p>
+                      <a:pPr algn="ctr"/>
+                      <a:r>
+                        <a:rPr lang="en-US" sz="1500" dirty="0"/>
+                        <a:t>Model Cat</a:t>
+                      </a:r>
+                    </a:p>
+                  </a:txBody>
+                  <a:tcPr marL="73925" marR="73925" marT="36963" marB="36963"/>
+                </a:tc>
+                <a:tc>
+                  <a:txBody>
+                    <a:bodyPr/>
+                    <a:lstStyle/>
+                    <a:p>
+                      <a:pPr algn="ctr"/>
+                      <a:r>
+                        <a:rPr lang="en-US" sz="1500" dirty="0"/>
+                        <a:t>Model Dog</a:t>
+                      </a:r>
+                    </a:p>
+                  </a:txBody>
+                  <a:tcPr marL="73925" marR="73925" marT="36963" marB="36963"/>
+                </a:tc>
+                <a:tc>
+                  <a:txBody>
+                    <a:bodyPr/>
+                    <a:lstStyle/>
+                    <a:p>
+                      <a:pPr algn="ctr"/>
+                      <a:r>
+                        <a:rPr lang="en-US" sz="1500" dirty="0"/>
+                        <a:t>Model Bird</a:t>
+                      </a:r>
+                    </a:p>
+                  </a:txBody>
+                  <a:tcPr marL="73925" marR="73925" marT="36963" marB="36963"/>
+                </a:tc>
+                <a:extLst>
+                  <a:ext uri="{0D108BD9-81ED-4DB2-BD59-A6C34878D82A}">
+                    <a16:rowId xmlns:a16="http://schemas.microsoft.com/office/drawing/2014/main" val="2688480762"/>
+                  </a:ext>
+                </a:extLst>
+              </a:tr>
+              <a:tr h="517477">
+                <a:tc>
+                  <a:txBody>
+                    <a:bodyPr/>
+                    <a:lstStyle/>
+                    <a:p>
+                      <a:pPr algn="ctr"/>
+                      <a:r>
+                        <a:rPr lang="en-US" sz="1500" b="1" dirty="0">
+                          <a:solidFill>
+                            <a:schemeClr val="bg1"/>
+                          </a:solidFill>
+                        </a:rPr>
+                        <a:t>Data Cat</a:t>
+                      </a:r>
+                    </a:p>
+                  </a:txBody>
+                  <a:tcPr marL="73925" marR="73925" marT="36963" marB="36963">
+                    <a:solidFill>
+                      <a:srgbClr val="4472C4"/>
+                    </a:solidFill>
+                  </a:tcPr>
+                </a:tc>
+                <a:tc>
+                  <a:txBody>
+                    <a:bodyPr/>
+                    <a:lstStyle/>
+                    <a:p>
+                      <a:r>
+                        <a:rPr lang="en-US" sz="1500" dirty="0"/>
+                        <a:t>76</a:t>
+                      </a:r>
+                    </a:p>
+                  </a:txBody>
+                  <a:tcPr marL="73925" marR="73925" marT="36963" marB="36963"/>
+                </a:tc>
+                <a:tc>
+                  <a:txBody>
+                    <a:bodyPr/>
+                    <a:lstStyle/>
+                    <a:p>
+                      <a:r>
+                        <a:rPr lang="en-US" sz="1500" dirty="0"/>
+                        <a:t>10</a:t>
+                      </a:r>
+                    </a:p>
+                  </a:txBody>
+                  <a:tcPr marL="73925" marR="73925" marT="36963" marB="36963"/>
+                </a:tc>
+                <a:tc>
+                  <a:txBody>
+                    <a:bodyPr/>
+                    <a:lstStyle/>
+                    <a:p>
+                      <a:r>
+                        <a:rPr lang="en-US" sz="1500" dirty="0"/>
+                        <a:t>12</a:t>
+                      </a:r>
+                    </a:p>
+                  </a:txBody>
+                  <a:tcPr marL="73925" marR="73925" marT="36963" marB="36963"/>
+                </a:tc>
+                <a:extLst>
+                  <a:ext uri="{0D108BD9-81ED-4DB2-BD59-A6C34878D82A}">
+                    <a16:rowId xmlns:a16="http://schemas.microsoft.com/office/drawing/2014/main" val="1617891110"/>
+                  </a:ext>
+                </a:extLst>
+              </a:tr>
+              <a:tr h="517477">
+                <a:tc>
+                  <a:txBody>
+                    <a:bodyPr/>
+                    <a:lstStyle/>
+                    <a:p>
+                      <a:pPr algn="ctr"/>
+                      <a:r>
+                        <a:rPr lang="en-US" sz="1500" b="1" dirty="0">
+                          <a:solidFill>
+                            <a:schemeClr val="bg1"/>
+                          </a:solidFill>
+                        </a:rPr>
+                        <a:t>Data Dog</a:t>
+                      </a:r>
+                    </a:p>
+                  </a:txBody>
+                  <a:tcPr marL="73925" marR="73925" marT="36963" marB="36963">
+                    <a:solidFill>
+                      <a:srgbClr val="4472C4"/>
+                    </a:solidFill>
+                  </a:tcPr>
+                </a:tc>
+                <a:tc>
+                  <a:txBody>
+                    <a:bodyPr/>
+                    <a:lstStyle/>
+                    <a:p>
+                      <a:r>
+                        <a:rPr lang="en-US" sz="1500" dirty="0"/>
+                        <a:t>27</a:t>
+                      </a:r>
+                    </a:p>
+                  </a:txBody>
+                  <a:tcPr marL="73925" marR="73925" marT="36963" marB="36963"/>
+                </a:tc>
+                <a:tc>
+                  <a:txBody>
+                    <a:bodyPr/>
+                    <a:lstStyle/>
+                    <a:p>
+                      <a:r>
+                        <a:rPr lang="en-US" sz="1500" dirty="0"/>
+                        <a:t>69</a:t>
+                      </a:r>
+                    </a:p>
+                  </a:txBody>
+                  <a:tcPr marL="73925" marR="73925" marT="36963" marB="36963"/>
+                </a:tc>
+                <a:tc>
+                  <a:txBody>
+                    <a:bodyPr/>
+                    <a:lstStyle/>
+                    <a:p>
+                      <a:r>
+                        <a:rPr lang="en-US" sz="1500" dirty="0"/>
+                        <a:t>11</a:t>
+                      </a:r>
+                    </a:p>
+                  </a:txBody>
+                  <a:tcPr marL="73925" marR="73925" marT="36963" marB="36963"/>
+                </a:tc>
+                <a:extLst>
+                  <a:ext uri="{0D108BD9-81ED-4DB2-BD59-A6C34878D82A}">
+                    <a16:rowId xmlns:a16="http://schemas.microsoft.com/office/drawing/2014/main" val="842711822"/>
+                  </a:ext>
+                </a:extLst>
+              </a:tr>
+              <a:tr h="517477">
+                <a:tc>
+                  <a:txBody>
+                    <a:bodyPr/>
+                    <a:lstStyle/>
+                    <a:p>
+                      <a:pPr algn="ctr"/>
+                      <a:r>
+                        <a:rPr lang="en-US" sz="1500" b="1" dirty="0">
+                          <a:solidFill>
+                            <a:schemeClr val="bg1"/>
+                          </a:solidFill>
+                        </a:rPr>
+                        <a:t>Data Bird</a:t>
+                      </a:r>
+                    </a:p>
+                  </a:txBody>
+                  <a:tcPr marL="73925" marR="73925" marT="36963" marB="36963">
+                    <a:solidFill>
+                      <a:srgbClr val="4472C4"/>
+                    </a:solidFill>
+                  </a:tcPr>
+                </a:tc>
+                <a:tc>
+                  <a:txBody>
+                    <a:bodyPr/>
+                    <a:lstStyle/>
+                    <a:p>
+                      <a:r>
+                        <a:rPr lang="en-US" sz="1500" dirty="0"/>
+                        <a:t>6</a:t>
+                      </a:r>
+                    </a:p>
+                  </a:txBody>
+                  <a:tcPr marL="73925" marR="73925" marT="36963" marB="36963"/>
+                </a:tc>
+                <a:tc>
+                  <a:txBody>
+                    <a:bodyPr/>
+                    <a:lstStyle/>
+                    <a:p>
+                      <a:r>
+                        <a:rPr lang="en-US" sz="1500" dirty="0"/>
+                        <a:t>3</a:t>
+                      </a:r>
+                    </a:p>
+                  </a:txBody>
+                  <a:tcPr marL="73925" marR="73925" marT="36963" marB="36963"/>
+                </a:tc>
+                <a:tc>
+                  <a:txBody>
+                    <a:bodyPr/>
+                    <a:lstStyle/>
+                    <a:p>
+                      <a:r>
+                        <a:rPr lang="en-US" sz="1500" dirty="0"/>
+                        <a:t>81</a:t>
+                      </a:r>
+                    </a:p>
+                  </a:txBody>
+                  <a:tcPr marL="73925" marR="73925" marT="36963" marB="36963"/>
+                </a:tc>
+                <a:extLst>
+                  <a:ext uri="{0D108BD9-81ED-4DB2-BD59-A6C34878D82A}">
+                    <a16:rowId xmlns:a16="http://schemas.microsoft.com/office/drawing/2014/main" val="1343416302"/>
+                  </a:ext>
+                </a:extLst>
+              </a:tr>
+            </a:tbl>
+          </a:graphicData>
+        </a:graphic>
+      </p:graphicFrame>
+      <mc:AlternateContent xmlns:mc="http://schemas.openxmlformats.org/markup-compatibility/2006">
+        <mc:Choice xmlns:a14="http://schemas.microsoft.com/office/drawing/2010/main" Requires="a14">
+          <p:sp>
+            <p:nvSpPr>
+              <p:cNvPr id="7" name="Content Placeholder 2">
+                <a:extLst>
+                  <a:ext uri="{FF2B5EF4-FFF2-40B4-BE49-F238E27FC236}">
+                    <a16:creationId xmlns:a16="http://schemas.microsoft.com/office/drawing/2014/main" id="{361941BC-03DD-752F-2C25-192F11BC7C51}"/>
+                  </a:ext>
+                </a:extLst>
+              </p:cNvPr>
+              <p:cNvSpPr txBox="1">
+                <a:spLocks/>
+              </p:cNvSpPr>
+              <p:nvPr/>
+            </p:nvSpPr>
+            <p:spPr>
+              <a:xfrm>
+                <a:off x="3905540" y="3356746"/>
+                <a:ext cx="6790423" cy="2661379"/>
+              </a:xfrm>
+              <a:prstGeom prst="rect">
+                <a:avLst/>
+              </a:prstGeom>
+              <a:noFill/>
+              <a:ln>
+                <a:noFill/>
+              </a:ln>
+            </p:spPr>
+            <p:style>
+              <a:lnRef idx="2">
+                <a:schemeClr val="accent5"/>
+              </a:lnRef>
+              <a:fillRef idx="1">
+                <a:schemeClr val="lt1"/>
+              </a:fillRef>
+              <a:effectRef idx="0">
+                <a:schemeClr val="accent5"/>
+              </a:effectRef>
+              <a:fontRef idx="minor">
+                <a:schemeClr val="dk1"/>
+              </a:fontRef>
+            </p:style>
+            <p:txBody>
+              <a:bodyPr vert="horz" lIns="91440" tIns="45720" rIns="91440" bIns="45720" rtlCol="0">
+                <a:noAutofit/>
+              </a:bodyPr>
+              <a:lstStyle>
+                <a:lvl1pPr marL="228600" indent="-228600" algn="l" defTabSz="914400" rtl="0" eaLnBrk="1" latinLnBrk="0" hangingPunct="1">
+                  <a:lnSpc>
+                    <a:spcPct val="90000"/>
+                  </a:lnSpc>
+                  <a:spcBef>
+                    <a:spcPts val="1000"/>
+                  </a:spcBef>
+                  <a:buFont typeface="Arial" panose="020B0604020202020204" pitchFamily="34" charset="0"/>
+                  <a:buChar char="•"/>
+                  <a:defRPr sz="2800" kern="1200">
+                    <a:solidFill>
+                      <a:schemeClr val="tx1"/>
+                    </a:solidFill>
+                    <a:latin typeface="+mn-lt"/>
+                    <a:ea typeface="+mn-ea"/>
+                    <a:cs typeface="+mn-cs"/>
+                  </a:defRPr>
+                </a:lvl1pPr>
+                <a:lvl2pPr marL="685800" indent="-228600" algn="l" defTabSz="914400" rtl="0" eaLnBrk="1" latinLnBrk="0" hangingPunct="1">
+                  <a:lnSpc>
+                    <a:spcPct val="90000"/>
+                  </a:lnSpc>
+                  <a:spcBef>
+                    <a:spcPts val="500"/>
+                  </a:spcBef>
+                  <a:buFont typeface="Arial" panose="020B0604020202020204" pitchFamily="34" charset="0"/>
+                  <a:buChar char="•"/>
+                  <a:defRPr sz="2400" kern="1200">
+                    <a:solidFill>
+                      <a:schemeClr val="tx1"/>
+                    </a:solidFill>
+                    <a:latin typeface="+mn-lt"/>
+                    <a:ea typeface="+mn-ea"/>
+                    <a:cs typeface="+mn-cs"/>
+                  </a:defRPr>
+                </a:lvl2pPr>
+                <a:lvl3pPr marL="1143000" indent="-228600" algn="l" defTabSz="914400" rtl="0" eaLnBrk="1" latinLnBrk="0" hangingPunct="1">
+                  <a:lnSpc>
+                    <a:spcPct val="90000"/>
+                  </a:lnSpc>
+                  <a:spcBef>
+                    <a:spcPts val="500"/>
+                  </a:spcBef>
+                  <a:buFont typeface="Arial" panose="020B0604020202020204" pitchFamily="34" charset="0"/>
+                  <a:buChar char="•"/>
+                  <a:defRPr sz="2000" kern="1200">
+                    <a:solidFill>
+                      <a:schemeClr val="tx1"/>
+                    </a:solidFill>
+                    <a:latin typeface="+mn-lt"/>
+                    <a:ea typeface="+mn-ea"/>
+                    <a:cs typeface="+mn-cs"/>
+                  </a:defRPr>
+                </a:lvl3pPr>
+                <a:lvl4pPr marL="1600200" indent="-228600" algn="l" defTabSz="914400" rtl="0" eaLnBrk="1" latinLnBrk="0" hangingPunct="1">
+                  <a:lnSpc>
+                    <a:spcPct val="90000"/>
+                  </a:lnSpc>
+                  <a:spcBef>
+                    <a:spcPts val="500"/>
+                  </a:spcBef>
+                  <a:buFont typeface="Arial" panose="020B0604020202020204" pitchFamily="34" charset="0"/>
+                  <a:buChar char="•"/>
+                  <a:defRPr sz="1800" kern="1200">
+                    <a:solidFill>
+                      <a:schemeClr val="tx1"/>
+                    </a:solidFill>
+                    <a:latin typeface="+mn-lt"/>
+                    <a:ea typeface="+mn-ea"/>
+                    <a:cs typeface="+mn-cs"/>
+                  </a:defRPr>
+                </a:lvl4pPr>
+                <a:lvl5pPr marL="2057400" indent="-228600" algn="l" defTabSz="914400" rtl="0" eaLnBrk="1" latinLnBrk="0" hangingPunct="1">
+                  <a:lnSpc>
+                    <a:spcPct val="90000"/>
+                  </a:lnSpc>
+                  <a:spcBef>
+                    <a:spcPts val="500"/>
+                  </a:spcBef>
+                  <a:buFont typeface="Arial" panose="020B0604020202020204" pitchFamily="34" charset="0"/>
+                  <a:buChar char="•"/>
+                  <a:defRPr sz="1800" kern="1200">
+                    <a:solidFill>
+                      <a:schemeClr val="tx1"/>
+                    </a:solidFill>
+                    <a:latin typeface="+mn-lt"/>
+                    <a:ea typeface="+mn-ea"/>
+                    <a:cs typeface="+mn-cs"/>
+                  </a:defRPr>
+                </a:lvl5pPr>
+                <a:lvl6pPr marL="2514600" indent="-228600" algn="l" defTabSz="914400" rtl="0" eaLnBrk="1" latinLnBrk="0" hangingPunct="1">
+                  <a:lnSpc>
+                    <a:spcPct val="90000"/>
+                  </a:lnSpc>
+                  <a:spcBef>
+                    <a:spcPts val="500"/>
+                  </a:spcBef>
+                  <a:buFont typeface="Arial" panose="020B0604020202020204" pitchFamily="34" charset="0"/>
+                  <a:buChar char="•"/>
+                  <a:defRPr sz="1800" kern="1200">
+                    <a:solidFill>
+                      <a:schemeClr val="tx1"/>
+                    </a:solidFill>
+                    <a:latin typeface="+mn-lt"/>
+                    <a:ea typeface="+mn-ea"/>
+                    <a:cs typeface="+mn-cs"/>
+                  </a:defRPr>
+                </a:lvl6pPr>
+                <a:lvl7pPr marL="2971800" indent="-228600" algn="l" defTabSz="914400" rtl="0" eaLnBrk="1" latinLnBrk="0" hangingPunct="1">
+                  <a:lnSpc>
+                    <a:spcPct val="90000"/>
+                  </a:lnSpc>
+                  <a:spcBef>
+                    <a:spcPts val="500"/>
+                  </a:spcBef>
+                  <a:buFont typeface="Arial" panose="020B0604020202020204" pitchFamily="34" charset="0"/>
+                  <a:buChar char="•"/>
+                  <a:defRPr sz="1800" kern="1200">
+                    <a:solidFill>
+                      <a:schemeClr val="tx1"/>
+                    </a:solidFill>
+                    <a:latin typeface="+mn-lt"/>
+                    <a:ea typeface="+mn-ea"/>
+                    <a:cs typeface="+mn-cs"/>
+                  </a:defRPr>
+                </a:lvl7pPr>
+                <a:lvl8pPr marL="3429000" indent="-228600" algn="l" defTabSz="914400" rtl="0" eaLnBrk="1" latinLnBrk="0" hangingPunct="1">
+                  <a:lnSpc>
+                    <a:spcPct val="90000"/>
+                  </a:lnSpc>
+                  <a:spcBef>
+                    <a:spcPts val="500"/>
+                  </a:spcBef>
+                  <a:buFont typeface="Arial" panose="020B0604020202020204" pitchFamily="34" charset="0"/>
+                  <a:buChar char="•"/>
+                  <a:defRPr sz="1800" kern="1200">
+                    <a:solidFill>
+                      <a:schemeClr val="tx1"/>
+                    </a:solidFill>
+                    <a:latin typeface="+mn-lt"/>
+                    <a:ea typeface="+mn-ea"/>
+                    <a:cs typeface="+mn-cs"/>
+                  </a:defRPr>
+                </a:lvl8pPr>
+                <a:lvl9pPr marL="3886200" indent="-228600" algn="l" defTabSz="914400" rtl="0" eaLnBrk="1" latinLnBrk="0" hangingPunct="1">
+                  <a:lnSpc>
+                    <a:spcPct val="90000"/>
+                  </a:lnSpc>
+                  <a:spcBef>
+                    <a:spcPts val="500"/>
+                  </a:spcBef>
+                  <a:buFont typeface="Arial" panose="020B0604020202020204" pitchFamily="34" charset="0"/>
+                  <a:buChar char="•"/>
+                  <a:defRPr sz="1800" kern="1200">
+                    <a:solidFill>
+                      <a:schemeClr val="tx1"/>
+                    </a:solidFill>
+                    <a:latin typeface="+mn-lt"/>
+                    <a:ea typeface="+mn-ea"/>
+                    <a:cs typeface="+mn-cs"/>
+                  </a:defRPr>
+                </a:lvl9pPr>
+              </a:lstStyle>
+              <a:p>
+                <a:pPr marL="0" indent="0" algn="ctr">
+                  <a:lnSpc>
+                    <a:spcPct val="150000"/>
+                  </a:lnSpc>
+                  <a:buNone/>
+                </a:pPr>
+                <a14:m>
+                  <m:oMathPara xmlns:m="http://schemas.openxmlformats.org/officeDocument/2006/math">
+                    <m:oMathParaPr>
+                      <m:jc m:val="centerGroup"/>
+                    </m:oMathParaPr>
+                    <m:oMath xmlns:m="http://schemas.openxmlformats.org/officeDocument/2006/math">
+                      <m:r>
+                        <a:rPr lang="en-AU" sz="1800" b="0" i="1" dirty="0" smtClean="0">
+                          <a:latin typeface="Cambria Math" panose="02040503050406030204" pitchFamily="18" charset="0"/>
+                        </a:rPr>
+                        <m:t>𝑃𝑟𝑒𝑐𝑖𝑠𝑖𝑜</m:t>
+                      </m:r>
+                      <m:sSub>
+                        <m:sSubPr>
+                          <m:ctrlPr>
+                            <a:rPr lang="en-AU" sz="1800" b="0" i="1" dirty="0" smtClean="0">
+                              <a:latin typeface="Cambria Math" panose="02040503050406030204" pitchFamily="18" charset="0"/>
+                            </a:rPr>
+                          </m:ctrlPr>
+                        </m:sSubPr>
+                        <m:e>
+                          <m:r>
+                            <a:rPr lang="en-AU" sz="1800" b="0" i="1" dirty="0" smtClean="0">
+                              <a:latin typeface="Cambria Math" panose="02040503050406030204" pitchFamily="18" charset="0"/>
+                            </a:rPr>
+                            <m:t>𝑛</m:t>
+                          </m:r>
+                        </m:e>
+                        <m:sub>
+                          <m:r>
+                            <a:rPr lang="en-AU" sz="1800" b="0" i="1" dirty="0" smtClean="0">
+                              <a:latin typeface="Cambria Math" panose="02040503050406030204" pitchFamily="18" charset="0"/>
+                            </a:rPr>
+                            <m:t>𝐶𝑎𝑡</m:t>
+                          </m:r>
+                        </m:sub>
+                      </m:sSub>
+                      <m:r>
+                        <a:rPr lang="en-US" sz="1800" i="1" dirty="0" smtClean="0">
+                          <a:latin typeface="Cambria Math" panose="02040503050406030204" pitchFamily="18" charset="0"/>
+                        </a:rPr>
+                        <m:t> =</m:t>
+                      </m:r>
+                      <m:f>
+                        <m:fPr>
+                          <m:ctrlPr>
+                            <a:rPr lang="en-US" sz="1800" b="0" i="1" dirty="0" smtClean="0">
+                              <a:latin typeface="Cambria Math" panose="02040503050406030204" pitchFamily="18" charset="0"/>
+                            </a:rPr>
+                          </m:ctrlPr>
+                        </m:fPr>
+                        <m:num>
+                          <m:r>
+                            <a:rPr lang="en-AU" sz="1800" b="0" i="1" dirty="0" smtClean="0">
+                              <a:latin typeface="Cambria Math" panose="02040503050406030204" pitchFamily="18" charset="0"/>
+                            </a:rPr>
+                            <m:t>76</m:t>
+                          </m:r>
+                        </m:num>
+                        <m:den>
+                          <m:r>
+                            <a:rPr lang="en-AU" sz="1800" b="0" i="1" dirty="0" smtClean="0">
+                              <a:latin typeface="Cambria Math" panose="02040503050406030204" pitchFamily="18" charset="0"/>
+                            </a:rPr>
+                            <m:t>76+27+6</m:t>
+                          </m:r>
+                        </m:den>
+                      </m:f>
+                      <m:r>
+                        <a:rPr lang="en-US" sz="1800" b="0" i="1" dirty="0" smtClean="0">
+                          <a:latin typeface="Cambria Math" panose="02040503050406030204" pitchFamily="18" charset="0"/>
+                        </a:rPr>
+                        <m:t>=</m:t>
+                      </m:r>
+                      <m:r>
+                        <a:rPr lang="en-AU" sz="1800" b="0" i="1" dirty="0" smtClean="0">
+                          <a:latin typeface="Cambria Math" panose="02040503050406030204" pitchFamily="18" charset="0"/>
+                        </a:rPr>
+                        <m:t>69.</m:t>
+                      </m:r>
+                      <m:r>
+                        <a:rPr lang="en-US" sz="1800" b="0" i="1" dirty="0" smtClean="0">
+                          <a:latin typeface="Cambria Math" panose="02040503050406030204" pitchFamily="18" charset="0"/>
+                        </a:rPr>
+                        <m:t>7</m:t>
+                      </m:r>
+                      <m:r>
+                        <a:rPr lang="en-AU" sz="1800" b="0" i="1" dirty="0" smtClean="0">
+                          <a:latin typeface="Cambria Math" panose="02040503050406030204" pitchFamily="18" charset="0"/>
+                        </a:rPr>
+                        <m:t>2</m:t>
+                      </m:r>
+                      <m:r>
+                        <a:rPr lang="en-US" sz="1800" b="0" i="1" dirty="0" smtClean="0">
+                          <a:latin typeface="Cambria Math" panose="02040503050406030204" pitchFamily="18" charset="0"/>
+                        </a:rPr>
+                        <m:t>%</m:t>
+                      </m:r>
+                    </m:oMath>
+                  </m:oMathPara>
+                </a14:m>
+                <a:endParaRPr lang="en-US" sz="1800" b="0" dirty="0"/>
+              </a:p>
+              <a:p>
+                <a:pPr marL="0" indent="0" algn="ctr">
+                  <a:lnSpc>
+                    <a:spcPct val="150000"/>
+                  </a:lnSpc>
+                  <a:buNone/>
+                </a:pPr>
+                <a14:m>
+                  <m:oMathPara xmlns:m="http://schemas.openxmlformats.org/officeDocument/2006/math">
+                    <m:oMathParaPr>
+                      <m:jc m:val="centerGroup"/>
+                    </m:oMathParaPr>
+                    <m:oMath xmlns:m="http://schemas.openxmlformats.org/officeDocument/2006/math">
+                      <m:sSub>
+                        <m:sSubPr>
+                          <m:ctrlPr>
+                            <a:rPr lang="en-US" sz="1800" i="1">
+                              <a:latin typeface="Cambria Math" panose="02040503050406030204" pitchFamily="18" charset="0"/>
+                            </a:rPr>
+                          </m:ctrlPr>
+                        </m:sSubPr>
+                        <m:e>
+                          <m:r>
+                            <a:rPr lang="en-AU" sz="1800" b="0" i="1" smtClean="0">
+                              <a:latin typeface="Cambria Math" panose="02040503050406030204" pitchFamily="18" charset="0"/>
+                            </a:rPr>
+                            <m:t>𝑃𝑟𝑒𝑐𝑖𝑠𝑖𝑜𝑛</m:t>
+                          </m:r>
+                        </m:e>
+                        <m:sub>
+                          <m:r>
+                            <a:rPr lang="en-US" sz="1800" i="1">
+                              <a:latin typeface="Cambria Math" panose="02040503050406030204" pitchFamily="18" charset="0"/>
+                            </a:rPr>
+                            <m:t>𝐷𝑜𝑔</m:t>
+                          </m:r>
+                        </m:sub>
+                      </m:sSub>
+                      <m:r>
+                        <a:rPr lang="en-US" sz="1800" i="1">
+                          <a:latin typeface="Cambria Math" panose="02040503050406030204" pitchFamily="18" charset="0"/>
+                        </a:rPr>
+                        <m:t>=</m:t>
+                      </m:r>
+                      <m:f>
+                        <m:fPr>
+                          <m:ctrlPr>
+                            <a:rPr lang="en-US" sz="1800" i="1">
+                              <a:latin typeface="Cambria Math" panose="02040503050406030204" pitchFamily="18" charset="0"/>
+                            </a:rPr>
+                          </m:ctrlPr>
+                        </m:fPr>
+                        <m:num>
+                          <m:r>
+                            <a:rPr lang="en-AU" sz="1800" b="0" i="1" smtClean="0">
+                              <a:latin typeface="Cambria Math" panose="02040503050406030204" pitchFamily="18" charset="0"/>
+                            </a:rPr>
+                            <m:t>69</m:t>
+                          </m:r>
+                        </m:num>
+                        <m:den>
+                          <m:r>
+                            <a:rPr lang="en-AU" sz="1800" b="0" i="1" smtClean="0">
+                              <a:latin typeface="Cambria Math" panose="02040503050406030204" pitchFamily="18" charset="0"/>
+                            </a:rPr>
+                            <m:t>10+69+3</m:t>
+                          </m:r>
+                        </m:den>
+                      </m:f>
+                      <m:r>
+                        <a:rPr lang="en-US" sz="1800" i="1">
+                          <a:latin typeface="Cambria Math" panose="02040503050406030204" pitchFamily="18" charset="0"/>
+                        </a:rPr>
+                        <m:t>=</m:t>
+                      </m:r>
+                      <m:r>
+                        <a:rPr lang="en-AU" sz="1800" b="0" i="1" smtClean="0">
+                          <a:latin typeface="Cambria Math" panose="02040503050406030204" pitchFamily="18" charset="0"/>
+                        </a:rPr>
+                        <m:t>84</m:t>
+                      </m:r>
+                      <m:r>
+                        <a:rPr lang="en-US" sz="1800" i="1">
+                          <a:latin typeface="Cambria Math" panose="02040503050406030204" pitchFamily="18" charset="0"/>
+                        </a:rPr>
+                        <m:t>.</m:t>
+                      </m:r>
+                      <m:r>
+                        <a:rPr lang="en-US" sz="1800" b="0" i="1" smtClean="0">
+                          <a:latin typeface="Cambria Math" panose="02040503050406030204" pitchFamily="18" charset="0"/>
+                        </a:rPr>
+                        <m:t>1</m:t>
+                      </m:r>
+                      <m:r>
+                        <a:rPr lang="en-AU" sz="1800" b="0" i="1" smtClean="0">
+                          <a:latin typeface="Cambria Math" panose="02040503050406030204" pitchFamily="18" charset="0"/>
+                        </a:rPr>
+                        <m:t>4</m:t>
+                      </m:r>
+                      <m:r>
+                        <a:rPr lang="en-US" sz="1800" i="1">
+                          <a:latin typeface="Cambria Math" panose="02040503050406030204" pitchFamily="18" charset="0"/>
+                        </a:rPr>
+                        <m:t>%</m:t>
+                      </m:r>
+                    </m:oMath>
+                  </m:oMathPara>
+                </a14:m>
+                <a:endParaRPr lang="en-US" sz="1800" b="0" dirty="0"/>
+              </a:p>
+              <a:p>
+                <a:pPr marL="0" indent="0" algn="ctr">
+                  <a:lnSpc>
+                    <a:spcPct val="150000"/>
+                  </a:lnSpc>
+                  <a:buNone/>
+                </a:pPr>
+                <a14:m>
+                  <m:oMathPara xmlns:m="http://schemas.openxmlformats.org/officeDocument/2006/math">
+                    <m:oMathParaPr>
+                      <m:jc m:val="centerGroup"/>
+                    </m:oMathParaPr>
+                    <m:oMath xmlns:m="http://schemas.openxmlformats.org/officeDocument/2006/math">
+                      <m:r>
+                        <a:rPr lang="en-AU" sz="1800" b="0" i="1" smtClean="0">
+                          <a:latin typeface="Cambria Math" panose="02040503050406030204" pitchFamily="18" charset="0"/>
+                        </a:rPr>
+                        <m:t>𝑃𝑟𝑒𝑐𝑖𝑠𝑖𝑜</m:t>
+                      </m:r>
+                      <m:sSub>
+                        <m:sSubPr>
+                          <m:ctrlPr>
+                            <a:rPr lang="en-AU" sz="1800" b="0" i="1" smtClean="0">
+                              <a:latin typeface="Cambria Math" panose="02040503050406030204" pitchFamily="18" charset="0"/>
+                            </a:rPr>
+                          </m:ctrlPr>
+                        </m:sSubPr>
+                        <m:e>
+                          <m:r>
+                            <a:rPr lang="en-AU" sz="1800" b="0" i="1" smtClean="0">
+                              <a:latin typeface="Cambria Math" panose="02040503050406030204" pitchFamily="18" charset="0"/>
+                            </a:rPr>
+                            <m:t>𝑛</m:t>
+                          </m:r>
+                        </m:e>
+                        <m:sub>
+                          <m:r>
+                            <a:rPr lang="en-AU" sz="1800" b="0" i="1" smtClean="0">
+                              <a:latin typeface="Cambria Math" panose="02040503050406030204" pitchFamily="18" charset="0"/>
+                            </a:rPr>
+                            <m:t>𝐵𝑖𝑟𝑑</m:t>
+                          </m:r>
+                        </m:sub>
+                      </m:sSub>
+                      <m:r>
+                        <a:rPr lang="en-US" sz="1800" b="0" i="1" smtClean="0">
+                          <a:latin typeface="Cambria Math" panose="02040503050406030204" pitchFamily="18" charset="0"/>
+                        </a:rPr>
+                        <m:t>=</m:t>
+                      </m:r>
+                      <m:f>
+                        <m:fPr>
+                          <m:ctrlPr>
+                            <a:rPr lang="en-US" sz="1800" b="0" i="1" smtClean="0">
+                              <a:latin typeface="Cambria Math" panose="02040503050406030204" pitchFamily="18" charset="0"/>
+                            </a:rPr>
+                          </m:ctrlPr>
+                        </m:fPr>
+                        <m:num>
+                          <m:r>
+                            <a:rPr lang="en-AU" sz="1800" b="0" i="1" smtClean="0">
+                              <a:latin typeface="Cambria Math" panose="02040503050406030204" pitchFamily="18" charset="0"/>
+                            </a:rPr>
+                            <m:t>81</m:t>
+                          </m:r>
+                        </m:num>
+                        <m:den>
+                          <m:r>
+                            <a:rPr lang="en-AU" sz="1800" b="0" i="1" smtClean="0">
+                              <a:latin typeface="Cambria Math" panose="02040503050406030204" pitchFamily="18" charset="0"/>
+                            </a:rPr>
+                            <m:t>12+11+81</m:t>
+                          </m:r>
+                        </m:den>
+                      </m:f>
+                      <m:r>
+                        <a:rPr lang="en-US" sz="1800" b="0" i="1" smtClean="0">
+                          <a:latin typeface="Cambria Math" panose="02040503050406030204" pitchFamily="18" charset="0"/>
+                        </a:rPr>
+                        <m:t>=</m:t>
+                      </m:r>
+                      <m:r>
+                        <a:rPr lang="en-AU" sz="1800" b="0" i="1" smtClean="0">
+                          <a:latin typeface="Cambria Math" panose="02040503050406030204" pitchFamily="18" charset="0"/>
+                        </a:rPr>
+                        <m:t>77</m:t>
+                      </m:r>
+                      <m:r>
+                        <a:rPr lang="en-US" sz="1800" b="0" i="1" smtClean="0">
+                          <a:latin typeface="Cambria Math" panose="02040503050406030204" pitchFamily="18" charset="0"/>
+                        </a:rPr>
+                        <m:t>.</m:t>
+                      </m:r>
+                      <m:r>
+                        <a:rPr lang="en-AU" sz="1800" b="0" i="1" smtClean="0">
+                          <a:latin typeface="Cambria Math" panose="02040503050406030204" pitchFamily="18" charset="0"/>
+                        </a:rPr>
+                        <m:t>88</m:t>
+                      </m:r>
+                      <m:r>
+                        <a:rPr lang="en-US" sz="1800" b="0" i="1" smtClean="0">
+                          <a:latin typeface="Cambria Math" panose="02040503050406030204" pitchFamily="18" charset="0"/>
+                        </a:rPr>
+                        <m:t>%</m:t>
+                      </m:r>
+                    </m:oMath>
+                  </m:oMathPara>
+                </a14:m>
+                <a:endParaRPr lang="en-US" sz="1800" b="0" dirty="0"/>
+              </a:p>
+            </p:txBody>
+          </p:sp>
+        </mc:Choice>
+        <mc:Fallback>
+          <p:sp>
+            <p:nvSpPr>
+              <p:cNvPr id="7" name="Content Placeholder 2">
+                <a:extLst>
+                  <a:ext uri="{FF2B5EF4-FFF2-40B4-BE49-F238E27FC236}">
+                    <a16:creationId xmlns:a16="http://schemas.microsoft.com/office/drawing/2014/main" id="{361941BC-03DD-752F-2C25-192F11BC7C51}"/>
+                  </a:ext>
+                </a:extLst>
+              </p:cNvPr>
+              <p:cNvSpPr txBox="1">
+                <a:spLocks noRot="1" noChangeAspect="1" noMove="1" noResize="1" noEditPoints="1" noAdjustHandles="1" noChangeArrowheads="1" noChangeShapeType="1" noTextEdit="1"/>
+              </p:cNvSpPr>
+              <p:nvPr/>
+            </p:nvSpPr>
+            <p:spPr>
+              <a:xfrm>
+                <a:off x="3905540" y="3356746"/>
+                <a:ext cx="6790423" cy="2661379"/>
+              </a:xfrm>
+              <a:prstGeom prst="rect">
+                <a:avLst/>
+              </a:prstGeom>
+              <a:blipFill>
+                <a:blip r:embed="rId3"/>
+                <a:stretch>
+                  <a:fillRect/>
+                </a:stretch>
+              </a:blipFill>
+              <a:ln>
+                <a:noFill/>
+              </a:ln>
+            </p:spPr>
+            <p:txBody>
+              <a:bodyPr/>
+              <a:lstStyle/>
+              <a:p>
+                <a:r>
+                  <a:rPr lang="en-AU">
+                    <a:noFill/>
+                  </a:rPr>
+                  <a:t> </a:t>
+                </a:r>
+              </a:p>
+            </p:txBody>
+          </p:sp>
+        </mc:Fallback>
+      </mc:AlternateContent>
     </p:spTree>
     <p:extLst>
       <p:ext uri="{BB962C8B-B14F-4D97-AF65-F5344CB8AC3E}">

</xml_diff>

<commit_message>
Add two types of supervised learning
</commit_message>
<xml_diff>
--- a/DecisionTrees/DecisionTrees.pptx
+++ b/DecisionTrees/DecisionTrees.pptx
@@ -4568,7 +4568,7 @@
           <a:p>
             <a:fld id="{7E292AB8-5F8F-4402-9592-F9413DCC0C16}" type="datetimeFigureOut">
               <a:rPr lang="en-US" smtClean="0"/>
-              <a:t>7/6/2023</a:t>
+              <a:t>7/7/2023</a:t>
             </a:fld>
             <a:endParaRPr lang="en-US"/>
           </a:p>
@@ -4766,7 +4766,7 @@
           <a:p>
             <a:fld id="{7E292AB8-5F8F-4402-9592-F9413DCC0C16}" type="datetimeFigureOut">
               <a:rPr lang="en-US" smtClean="0"/>
-              <a:t>7/6/2023</a:t>
+              <a:t>7/7/2023</a:t>
             </a:fld>
             <a:endParaRPr lang="en-US"/>
           </a:p>
@@ -4974,7 +4974,7 @@
           <a:p>
             <a:fld id="{7E292AB8-5F8F-4402-9592-F9413DCC0C16}" type="datetimeFigureOut">
               <a:rPr lang="en-US" smtClean="0"/>
-              <a:t>7/6/2023</a:t>
+              <a:t>7/7/2023</a:t>
             </a:fld>
             <a:endParaRPr lang="en-US"/>
           </a:p>
@@ -5172,7 +5172,7 @@
           <a:p>
             <a:fld id="{7E292AB8-5F8F-4402-9592-F9413DCC0C16}" type="datetimeFigureOut">
               <a:rPr lang="en-US" smtClean="0"/>
-              <a:t>7/6/2023</a:t>
+              <a:t>7/7/2023</a:t>
             </a:fld>
             <a:endParaRPr lang="en-US"/>
           </a:p>
@@ -5447,7 +5447,7 @@
           <a:p>
             <a:fld id="{7E292AB8-5F8F-4402-9592-F9413DCC0C16}" type="datetimeFigureOut">
               <a:rPr lang="en-US" smtClean="0"/>
-              <a:t>7/6/2023</a:t>
+              <a:t>7/7/2023</a:t>
             </a:fld>
             <a:endParaRPr lang="en-US"/>
           </a:p>
@@ -5712,7 +5712,7 @@
           <a:p>
             <a:fld id="{7E292AB8-5F8F-4402-9592-F9413DCC0C16}" type="datetimeFigureOut">
               <a:rPr lang="en-US" smtClean="0"/>
-              <a:t>7/6/2023</a:t>
+              <a:t>7/7/2023</a:t>
             </a:fld>
             <a:endParaRPr lang="en-US"/>
           </a:p>
@@ -6124,7 +6124,7 @@
           <a:p>
             <a:fld id="{7E292AB8-5F8F-4402-9592-F9413DCC0C16}" type="datetimeFigureOut">
               <a:rPr lang="en-US" smtClean="0"/>
-              <a:t>7/6/2023</a:t>
+              <a:t>7/7/2023</a:t>
             </a:fld>
             <a:endParaRPr lang="en-US"/>
           </a:p>
@@ -6265,7 +6265,7 @@
           <a:p>
             <a:fld id="{7E292AB8-5F8F-4402-9592-F9413DCC0C16}" type="datetimeFigureOut">
               <a:rPr lang="en-US" smtClean="0"/>
-              <a:t>7/6/2023</a:t>
+              <a:t>7/7/2023</a:t>
             </a:fld>
             <a:endParaRPr lang="en-US"/>
           </a:p>
@@ -6378,7 +6378,7 @@
           <a:p>
             <a:fld id="{7E292AB8-5F8F-4402-9592-F9413DCC0C16}" type="datetimeFigureOut">
               <a:rPr lang="en-US" smtClean="0"/>
-              <a:t>7/6/2023</a:t>
+              <a:t>7/7/2023</a:t>
             </a:fld>
             <a:endParaRPr lang="en-US"/>
           </a:p>
@@ -6689,7 +6689,7 @@
           <a:p>
             <a:fld id="{7E292AB8-5F8F-4402-9592-F9413DCC0C16}" type="datetimeFigureOut">
               <a:rPr lang="en-US" smtClean="0"/>
-              <a:t>7/6/2023</a:t>
+              <a:t>7/7/2023</a:t>
             </a:fld>
             <a:endParaRPr lang="en-US"/>
           </a:p>
@@ -6977,7 +6977,7 @@
           <a:p>
             <a:fld id="{7E292AB8-5F8F-4402-9592-F9413DCC0C16}" type="datetimeFigureOut">
               <a:rPr lang="en-US" smtClean="0"/>
-              <a:t>7/6/2023</a:t>
+              <a:t>7/7/2023</a:t>
             </a:fld>
             <a:endParaRPr lang="en-US"/>
           </a:p>
@@ -7218,7 +7218,7 @@
           <a:p>
             <a:fld id="{7E292AB8-5F8F-4402-9592-F9413DCC0C16}" type="datetimeFigureOut">
               <a:rPr lang="en-US" smtClean="0"/>
-              <a:t>7/6/2023</a:t>
+              <a:t>7/7/2023</a:t>
             </a:fld>
             <a:endParaRPr lang="en-US"/>
           </a:p>
@@ -21034,13 +21034,52 @@
         </p:nvSpPr>
         <p:spPr/>
         <p:txBody>
-          <a:bodyPr/>
+          <a:bodyPr>
+            <a:normAutofit fontScale="92500" lnSpcReduction="10000"/>
+          </a:bodyPr>
           <a:lstStyle/>
           <a:p>
             <a:r>
               <a:rPr lang="en-US" dirty="0"/>
-              <a:t>Classification</a:t>
+              <a:t>Classification:</a:t>
             </a:r>
+          </a:p>
+          <a:p>
+            <a:pPr lvl="1"/>
+            <a:r>
+              <a:rPr lang="en-AU" dirty="0"/>
+              <a:t>The goal is to predict a categorical or discrete output variable based on input features. </a:t>
+            </a:r>
+          </a:p>
+          <a:p>
+            <a:pPr lvl="1"/>
+            <a:r>
+              <a:rPr lang="en-AU" dirty="0"/>
+              <a:t>The algorithm learns from a </a:t>
+            </a:r>
+            <a:r>
+              <a:rPr lang="en-AU" dirty="0" err="1"/>
+              <a:t>labeled</a:t>
+            </a:r>
+            <a:r>
+              <a:rPr lang="en-AU" dirty="0"/>
+              <a:t> dataset where each example is assigned a predefined class or category.</a:t>
+            </a:r>
+          </a:p>
+          <a:p>
+            <a:pPr lvl="1"/>
+            <a:r>
+              <a:rPr lang="en-AU" dirty="0"/>
+              <a:t>The model then uses this training data to classify new, unseen instances into one of the known classes.</a:t>
+            </a:r>
+          </a:p>
+          <a:p>
+            <a:pPr lvl="1"/>
+            <a:r>
+              <a:rPr lang="en-AU" dirty="0"/>
+              <a:t>Example: Email spam detection</a:t>
+            </a:r>
+            <a:endParaRPr lang="en-US" dirty="0"/>
           </a:p>
         </p:txBody>
       </p:sp>
@@ -21062,13 +21101,52 @@
         </p:nvSpPr>
         <p:spPr/>
         <p:txBody>
-          <a:bodyPr/>
+          <a:bodyPr>
+            <a:normAutofit fontScale="92500" lnSpcReduction="10000"/>
+          </a:bodyPr>
           <a:lstStyle/>
           <a:p>
             <a:r>
               <a:rPr lang="en-US" dirty="0"/>
-              <a:t>Regression</a:t>
+              <a:t>Regression:</a:t>
             </a:r>
+          </a:p>
+          <a:p>
+            <a:pPr lvl="1"/>
+            <a:r>
+              <a:rPr lang="en-AU" dirty="0"/>
+              <a:t>It involves predicting a continuous output variable based on input features.</a:t>
+            </a:r>
+          </a:p>
+          <a:p>
+            <a:pPr lvl="1"/>
+            <a:r>
+              <a:rPr lang="en-AU" dirty="0"/>
+              <a:t>The algorithm learns from </a:t>
+            </a:r>
+            <a:r>
+              <a:rPr lang="en-AU" dirty="0" err="1"/>
+              <a:t>labeled</a:t>
+            </a:r>
+            <a:r>
+              <a:rPr lang="en-AU" dirty="0"/>
+              <a:t> data, where each example has a corresponding continuous target value.</a:t>
+            </a:r>
+          </a:p>
+          <a:p>
+            <a:pPr lvl="1"/>
+            <a:r>
+              <a:rPr lang="en-AU" dirty="0"/>
+              <a:t>The model then uses this training data to estimate or predict numeric values for new inputs.</a:t>
+            </a:r>
+          </a:p>
+          <a:p>
+            <a:pPr lvl="1"/>
+            <a:r>
+              <a:rPr lang="en-AU" dirty="0"/>
+              <a:t>Example: Predicting house prices based on some factors (area, no. of. bedrooms, location…) </a:t>
+            </a:r>
+            <a:endParaRPr lang="en-US" dirty="0"/>
           </a:p>
         </p:txBody>
       </p:sp>

</xml_diff>

<commit_message>
Add Entropy and Cross Entropy
</commit_message>
<xml_diff>
--- a/DecisionTrees/DecisionTrees.pptx
+++ b/DecisionTrees/DecisionTrees.pptx
@@ -27,9 +27,10 @@
     <p:sldId id="261" r:id="rId21"/>
     <p:sldId id="282" r:id="rId22"/>
     <p:sldId id="283" r:id="rId23"/>
-    <p:sldId id="262" r:id="rId24"/>
-    <p:sldId id="278" r:id="rId25"/>
-    <p:sldId id="279" r:id="rId26"/>
+    <p:sldId id="284" r:id="rId24"/>
+    <p:sldId id="262" r:id="rId25"/>
+    <p:sldId id="278" r:id="rId26"/>
+    <p:sldId id="279" r:id="rId27"/>
   </p:sldIdLst>
   <p:sldSz cx="12192000" cy="6858000"/>
   <p:notesSz cx="6858000" cy="9144000"/>
@@ -8555,7 +8556,7 @@
           <a:p>
             <a:fld id="{7E292AB8-5F8F-4402-9592-F9413DCC0C16}" type="datetimeFigureOut">
               <a:rPr lang="en-US" smtClean="0"/>
-              <a:t>7/8/2023</a:t>
+              <a:t>7/10/2023</a:t>
             </a:fld>
             <a:endParaRPr lang="en-US"/>
           </a:p>
@@ -8753,7 +8754,7 @@
           <a:p>
             <a:fld id="{7E292AB8-5F8F-4402-9592-F9413DCC0C16}" type="datetimeFigureOut">
               <a:rPr lang="en-US" smtClean="0"/>
-              <a:t>7/8/2023</a:t>
+              <a:t>7/10/2023</a:t>
             </a:fld>
             <a:endParaRPr lang="en-US"/>
           </a:p>
@@ -8961,7 +8962,7 @@
           <a:p>
             <a:fld id="{7E292AB8-5F8F-4402-9592-F9413DCC0C16}" type="datetimeFigureOut">
               <a:rPr lang="en-US" smtClean="0"/>
-              <a:t>7/8/2023</a:t>
+              <a:t>7/10/2023</a:t>
             </a:fld>
             <a:endParaRPr lang="en-US"/>
           </a:p>
@@ -9159,7 +9160,7 @@
           <a:p>
             <a:fld id="{7E292AB8-5F8F-4402-9592-F9413DCC0C16}" type="datetimeFigureOut">
               <a:rPr lang="en-US" smtClean="0"/>
-              <a:t>7/8/2023</a:t>
+              <a:t>7/10/2023</a:t>
             </a:fld>
             <a:endParaRPr lang="en-US"/>
           </a:p>
@@ -9434,7 +9435,7 @@
           <a:p>
             <a:fld id="{7E292AB8-5F8F-4402-9592-F9413DCC0C16}" type="datetimeFigureOut">
               <a:rPr lang="en-US" smtClean="0"/>
-              <a:t>7/8/2023</a:t>
+              <a:t>7/10/2023</a:t>
             </a:fld>
             <a:endParaRPr lang="en-US"/>
           </a:p>
@@ -9699,7 +9700,7 @@
           <a:p>
             <a:fld id="{7E292AB8-5F8F-4402-9592-F9413DCC0C16}" type="datetimeFigureOut">
               <a:rPr lang="en-US" smtClean="0"/>
-              <a:t>7/8/2023</a:t>
+              <a:t>7/10/2023</a:t>
             </a:fld>
             <a:endParaRPr lang="en-US"/>
           </a:p>
@@ -10111,7 +10112,7 @@
           <a:p>
             <a:fld id="{7E292AB8-5F8F-4402-9592-F9413DCC0C16}" type="datetimeFigureOut">
               <a:rPr lang="en-US" smtClean="0"/>
-              <a:t>7/8/2023</a:t>
+              <a:t>7/10/2023</a:t>
             </a:fld>
             <a:endParaRPr lang="en-US"/>
           </a:p>
@@ -10252,7 +10253,7 @@
           <a:p>
             <a:fld id="{7E292AB8-5F8F-4402-9592-F9413DCC0C16}" type="datetimeFigureOut">
               <a:rPr lang="en-US" smtClean="0"/>
-              <a:t>7/8/2023</a:t>
+              <a:t>7/10/2023</a:t>
             </a:fld>
             <a:endParaRPr lang="en-US"/>
           </a:p>
@@ -10365,7 +10366,7 @@
           <a:p>
             <a:fld id="{7E292AB8-5F8F-4402-9592-F9413DCC0C16}" type="datetimeFigureOut">
               <a:rPr lang="en-US" smtClean="0"/>
-              <a:t>7/8/2023</a:t>
+              <a:t>7/10/2023</a:t>
             </a:fld>
             <a:endParaRPr lang="en-US"/>
           </a:p>
@@ -10676,7 +10677,7 @@
           <a:p>
             <a:fld id="{7E292AB8-5F8F-4402-9592-F9413DCC0C16}" type="datetimeFigureOut">
               <a:rPr lang="en-US" smtClean="0"/>
-              <a:t>7/8/2023</a:t>
+              <a:t>7/10/2023</a:t>
             </a:fld>
             <a:endParaRPr lang="en-US"/>
           </a:p>
@@ -10964,7 +10965,7 @@
           <a:p>
             <a:fld id="{7E292AB8-5F8F-4402-9592-F9413DCC0C16}" type="datetimeFigureOut">
               <a:rPr lang="en-US" smtClean="0"/>
-              <a:t>7/8/2023</a:t>
+              <a:t>7/10/2023</a:t>
             </a:fld>
             <a:endParaRPr lang="en-US"/>
           </a:p>
@@ -11205,7 +11206,7 @@
           <a:p>
             <a:fld id="{7E292AB8-5F8F-4402-9592-F9413DCC0C16}" type="datetimeFigureOut">
               <a:rPr lang="en-US" smtClean="0"/>
-              <a:t>7/8/2023</a:t>
+              <a:t>7/10/2023</a:t>
             </a:fld>
             <a:endParaRPr lang="en-US"/>
           </a:p>
@@ -24475,8 +24476,8 @@
           </a:p>
         </p:txBody>
       </p:sp>
-      <mc:AlternateContent xmlns:mc="http://schemas.openxmlformats.org/markup-compatibility/2006">
-        <mc:Choice xmlns:a14="http://schemas.microsoft.com/office/drawing/2010/main" Requires="a14">
+      <mc:AlternateContent xmlns:mc="http://schemas.openxmlformats.org/markup-compatibility/2006" xmlns:a14="http://schemas.microsoft.com/office/drawing/2010/main">
+        <mc:Choice Requires="a14">
           <p:sp>
             <p:nvSpPr>
               <p:cNvPr id="3" name="Content Placeholder 2">
@@ -25132,7 +25133,7 @@
             </p:txBody>
           </p:sp>
         </mc:Choice>
-        <mc:Fallback>
+        <mc:Fallback xmlns="">
           <p:sp>
             <p:nvSpPr>
               <p:cNvPr id="3" name="Content Placeholder 2">
@@ -25241,8 +25242,8 @@
           </a:p>
         </p:txBody>
       </p:sp>
-      <mc:AlternateContent xmlns:mc="http://schemas.openxmlformats.org/markup-compatibility/2006">
-        <mc:Choice xmlns:a14="http://schemas.microsoft.com/office/drawing/2010/main" Requires="a14">
+      <mc:AlternateContent xmlns:mc="http://schemas.openxmlformats.org/markup-compatibility/2006" xmlns:a14="http://schemas.microsoft.com/office/drawing/2010/main">
+        <mc:Choice Requires="a14">
           <p:sp>
             <p:nvSpPr>
               <p:cNvPr id="3" name="Content Placeholder 2">
@@ -25458,7 +25459,7 @@
             </p:txBody>
           </p:sp>
         </mc:Choice>
-        <mc:Fallback>
+        <mc:Fallback xmlns="">
           <p:sp>
             <p:nvSpPr>
               <p:cNvPr id="3" name="Content Placeholder 2">
@@ -26092,8 +26093,8 @@
           </a:p>
         </p:txBody>
       </p:sp>
-      <mc:AlternateContent xmlns:mc="http://schemas.openxmlformats.org/markup-compatibility/2006">
-        <mc:Choice xmlns:a14="http://schemas.microsoft.com/office/drawing/2010/main" Requires="a14">
+      <mc:AlternateContent xmlns:mc="http://schemas.openxmlformats.org/markup-compatibility/2006" xmlns:a14="http://schemas.microsoft.com/office/drawing/2010/main">
+        <mc:Choice Requires="a14">
           <p:sp>
             <p:nvSpPr>
               <p:cNvPr id="26" name="TextBox 25">
@@ -26160,7 +26161,7 @@
             </p:txBody>
           </p:sp>
         </mc:Choice>
-        <mc:Fallback>
+        <mc:Fallback xmlns="">
           <p:sp>
             <p:nvSpPr>
               <p:cNvPr id="26" name="TextBox 25">
@@ -26205,8 +26206,8 @@
           </p:sp>
         </mc:Fallback>
       </mc:AlternateContent>
-      <mc:AlternateContent xmlns:mc="http://schemas.openxmlformats.org/markup-compatibility/2006">
-        <mc:Choice xmlns:a14="http://schemas.microsoft.com/office/drawing/2010/main" Requires="a14">
+      <mc:AlternateContent xmlns:mc="http://schemas.openxmlformats.org/markup-compatibility/2006" xmlns:a14="http://schemas.microsoft.com/office/drawing/2010/main">
+        <mc:Choice Requires="a14">
           <p:sp>
             <p:nvSpPr>
               <p:cNvPr id="27" name="TextBox 26">
@@ -26273,7 +26274,7 @@
             </p:txBody>
           </p:sp>
         </mc:Choice>
-        <mc:Fallback>
+        <mc:Fallback xmlns="">
           <p:sp>
             <p:nvSpPr>
               <p:cNvPr id="27" name="TextBox 26">
@@ -26318,8 +26319,8 @@
           </p:sp>
         </mc:Fallback>
       </mc:AlternateContent>
-      <mc:AlternateContent xmlns:mc="http://schemas.openxmlformats.org/markup-compatibility/2006">
-        <mc:Choice xmlns:a14="http://schemas.microsoft.com/office/drawing/2010/main" Requires="a14">
+      <mc:AlternateContent xmlns:mc="http://schemas.openxmlformats.org/markup-compatibility/2006" xmlns:a14="http://schemas.microsoft.com/office/drawing/2010/main">
+        <mc:Choice Requires="a14">
           <p:sp>
             <p:nvSpPr>
               <p:cNvPr id="28" name="TextBox 27">
@@ -26386,7 +26387,7 @@
             </p:txBody>
           </p:sp>
         </mc:Choice>
-        <mc:Fallback>
+        <mc:Fallback xmlns="">
           <p:sp>
             <p:nvSpPr>
               <p:cNvPr id="28" name="TextBox 27">
@@ -26987,8 +26988,8 @@
           </a:p>
         </p:txBody>
       </p:sp>
-      <mc:AlternateContent xmlns:mc="http://schemas.openxmlformats.org/markup-compatibility/2006">
-        <mc:Choice xmlns:a14="http://schemas.microsoft.com/office/drawing/2010/main" Requires="a14">
+      <mc:AlternateContent xmlns:mc="http://schemas.openxmlformats.org/markup-compatibility/2006" xmlns:a14="http://schemas.microsoft.com/office/drawing/2010/main">
+        <mc:Choice Requires="a14">
           <p:sp>
             <p:nvSpPr>
               <p:cNvPr id="43" name="TextBox 42">
@@ -27055,7 +27056,7 @@
             </p:txBody>
           </p:sp>
         </mc:Choice>
-        <mc:Fallback>
+        <mc:Fallback xmlns="">
           <p:sp>
             <p:nvSpPr>
               <p:cNvPr id="43" name="TextBox 42">
@@ -27100,8 +27101,8 @@
           </p:sp>
         </mc:Fallback>
       </mc:AlternateContent>
-      <mc:AlternateContent xmlns:mc="http://schemas.openxmlformats.org/markup-compatibility/2006">
-        <mc:Choice xmlns:a14="http://schemas.microsoft.com/office/drawing/2010/main" Requires="a14">
+      <mc:AlternateContent xmlns:mc="http://schemas.openxmlformats.org/markup-compatibility/2006" xmlns:a14="http://schemas.microsoft.com/office/drawing/2010/main">
+        <mc:Choice Requires="a14">
           <p:sp>
             <p:nvSpPr>
               <p:cNvPr id="44" name="TextBox 43">
@@ -27149,13 +27150,7 @@
                           <a:rPr lang="en-US" b="0" i="1" smtClean="0">
                             <a:latin typeface="Cambria Math" panose="02040503050406030204" pitchFamily="18" charset="0"/>
                           </a:rPr>
-                          <m:t>2</m:t>
-                        </m:r>
-                        <m:r>
-                          <a:rPr lang="en-US" b="0" i="1" smtClean="0">
-                            <a:latin typeface="Cambria Math" panose="02040503050406030204" pitchFamily="18" charset="0"/>
-                          </a:rPr>
-                          <m:t>5</m:t>
+                          <m:t>25</m:t>
                         </m:r>
                       </m:num>
                       <m:den>
@@ -27174,7 +27169,7 @@
             </p:txBody>
           </p:sp>
         </mc:Choice>
-        <mc:Fallback>
+        <mc:Fallback xmlns="">
           <p:sp>
             <p:nvSpPr>
               <p:cNvPr id="44" name="TextBox 43">
@@ -27219,8 +27214,8 @@
           </p:sp>
         </mc:Fallback>
       </mc:AlternateContent>
-      <mc:AlternateContent xmlns:mc="http://schemas.openxmlformats.org/markup-compatibility/2006">
-        <mc:Choice xmlns:a14="http://schemas.microsoft.com/office/drawing/2010/main" Requires="a14">
+      <mc:AlternateContent xmlns:mc="http://schemas.openxmlformats.org/markup-compatibility/2006" xmlns:a14="http://schemas.microsoft.com/office/drawing/2010/main">
+        <mc:Choice Requires="a14">
           <p:sp>
             <p:nvSpPr>
               <p:cNvPr id="45" name="TextBox 44">
@@ -27287,7 +27282,7 @@
             </p:txBody>
           </p:sp>
         </mc:Choice>
-        <mc:Fallback>
+        <mc:Fallback xmlns="">
           <p:sp>
             <p:nvSpPr>
               <p:cNvPr id="45" name="TextBox 44">
@@ -27577,8 +27572,8 @@
           </a:p>
         </p:txBody>
       </p:sp>
-      <mc:AlternateContent xmlns:mc="http://schemas.openxmlformats.org/markup-compatibility/2006">
-        <mc:Choice xmlns:a14="http://schemas.microsoft.com/office/drawing/2010/main" Requires="a14">
+      <mc:AlternateContent xmlns:mc="http://schemas.openxmlformats.org/markup-compatibility/2006" xmlns:a14="http://schemas.microsoft.com/office/drawing/2010/main">
+        <mc:Choice Requires="a14">
           <p:sp>
             <p:nvSpPr>
               <p:cNvPr id="3" name="Content Placeholder 2">
@@ -27794,7 +27789,7 @@
             </p:txBody>
           </p:sp>
         </mc:Choice>
-        <mc:Fallback>
+        <mc:Fallback xmlns="">
           <p:sp>
             <p:nvSpPr>
               <p:cNvPr id="3" name="Content Placeholder 2">
@@ -28428,8 +28423,8 @@
           </a:p>
         </p:txBody>
       </p:sp>
-      <mc:AlternateContent xmlns:mc="http://schemas.openxmlformats.org/markup-compatibility/2006">
-        <mc:Choice xmlns:a14="http://schemas.microsoft.com/office/drawing/2010/main" Requires="a14">
+      <mc:AlternateContent xmlns:mc="http://schemas.openxmlformats.org/markup-compatibility/2006" xmlns:a14="http://schemas.microsoft.com/office/drawing/2010/main">
+        <mc:Choice Requires="a14">
           <p:sp>
             <p:nvSpPr>
               <p:cNvPr id="26" name="TextBox 25">
@@ -28496,7 +28491,7 @@
             </p:txBody>
           </p:sp>
         </mc:Choice>
-        <mc:Fallback>
+        <mc:Fallback xmlns="">
           <p:sp>
             <p:nvSpPr>
               <p:cNvPr id="26" name="TextBox 25">
@@ -28541,8 +28536,8 @@
           </p:sp>
         </mc:Fallback>
       </mc:AlternateContent>
-      <mc:AlternateContent xmlns:mc="http://schemas.openxmlformats.org/markup-compatibility/2006">
-        <mc:Choice xmlns:a14="http://schemas.microsoft.com/office/drawing/2010/main" Requires="a14">
+      <mc:AlternateContent xmlns:mc="http://schemas.openxmlformats.org/markup-compatibility/2006" xmlns:a14="http://schemas.microsoft.com/office/drawing/2010/main">
+        <mc:Choice Requires="a14">
           <p:sp>
             <p:nvSpPr>
               <p:cNvPr id="27" name="TextBox 26">
@@ -28609,7 +28604,7 @@
             </p:txBody>
           </p:sp>
         </mc:Choice>
-        <mc:Fallback>
+        <mc:Fallback xmlns="">
           <p:sp>
             <p:nvSpPr>
               <p:cNvPr id="27" name="TextBox 26">
@@ -28654,8 +28649,8 @@
           </p:sp>
         </mc:Fallback>
       </mc:AlternateContent>
-      <mc:AlternateContent xmlns:mc="http://schemas.openxmlformats.org/markup-compatibility/2006">
-        <mc:Choice xmlns:a14="http://schemas.microsoft.com/office/drawing/2010/main" Requires="a14">
+      <mc:AlternateContent xmlns:mc="http://schemas.openxmlformats.org/markup-compatibility/2006" xmlns:a14="http://schemas.microsoft.com/office/drawing/2010/main">
+        <mc:Choice Requires="a14">
           <p:sp>
             <p:nvSpPr>
               <p:cNvPr id="28" name="TextBox 27">
@@ -28722,7 +28717,7 @@
             </p:txBody>
           </p:sp>
         </mc:Choice>
-        <mc:Fallback>
+        <mc:Fallback xmlns="">
           <p:sp>
             <p:nvSpPr>
               <p:cNvPr id="28" name="TextBox 27">
@@ -29323,8 +29318,8 @@
           </a:p>
         </p:txBody>
       </p:sp>
-      <mc:AlternateContent xmlns:mc="http://schemas.openxmlformats.org/markup-compatibility/2006">
-        <mc:Choice xmlns:a14="http://schemas.microsoft.com/office/drawing/2010/main" Requires="a14">
+      <mc:AlternateContent xmlns:mc="http://schemas.openxmlformats.org/markup-compatibility/2006" xmlns:a14="http://schemas.microsoft.com/office/drawing/2010/main">
+        <mc:Choice Requires="a14">
           <p:sp>
             <p:nvSpPr>
               <p:cNvPr id="43" name="TextBox 42">
@@ -29391,7 +29386,7 @@
             </p:txBody>
           </p:sp>
         </mc:Choice>
-        <mc:Fallback>
+        <mc:Fallback xmlns="">
           <p:sp>
             <p:nvSpPr>
               <p:cNvPr id="43" name="TextBox 42">
@@ -29436,8 +29431,8 @@
           </p:sp>
         </mc:Fallback>
       </mc:AlternateContent>
-      <mc:AlternateContent xmlns:mc="http://schemas.openxmlformats.org/markup-compatibility/2006">
-        <mc:Choice xmlns:a14="http://schemas.microsoft.com/office/drawing/2010/main" Requires="a14">
+      <mc:AlternateContent xmlns:mc="http://schemas.openxmlformats.org/markup-compatibility/2006" xmlns:a14="http://schemas.microsoft.com/office/drawing/2010/main">
+        <mc:Choice Requires="a14">
           <p:sp>
             <p:nvSpPr>
               <p:cNvPr id="44" name="TextBox 43">
@@ -29504,7 +29499,7 @@
             </p:txBody>
           </p:sp>
         </mc:Choice>
-        <mc:Fallback>
+        <mc:Fallback xmlns="">
           <p:sp>
             <p:nvSpPr>
               <p:cNvPr id="44" name="TextBox 43">
@@ -29549,8 +29544,8 @@
           </p:sp>
         </mc:Fallback>
       </mc:AlternateContent>
-      <mc:AlternateContent xmlns:mc="http://schemas.openxmlformats.org/markup-compatibility/2006">
-        <mc:Choice xmlns:a14="http://schemas.microsoft.com/office/drawing/2010/main" Requires="a14">
+      <mc:AlternateContent xmlns:mc="http://schemas.openxmlformats.org/markup-compatibility/2006" xmlns:a14="http://schemas.microsoft.com/office/drawing/2010/main">
+        <mc:Choice Requires="a14">
           <p:sp>
             <p:nvSpPr>
               <p:cNvPr id="45" name="TextBox 44">
@@ -29617,7 +29612,7 @@
             </p:txBody>
           </p:sp>
         </mc:Choice>
-        <mc:Fallback>
+        <mc:Fallback xmlns="">
           <p:sp>
             <p:nvSpPr>
               <p:cNvPr id="45" name="TextBox 44">
@@ -29877,6 +29872,652 @@
           <p:cNvPr id="2" name="Title 1">
             <a:extLst>
               <a:ext uri="{FF2B5EF4-FFF2-40B4-BE49-F238E27FC236}">
+                <a16:creationId xmlns:a16="http://schemas.microsoft.com/office/drawing/2014/main" id="{D7D84157-C6D0-2EA9-8E09-09A662918383}"/>
+              </a:ext>
+            </a:extLst>
+          </p:cNvPr>
+          <p:cNvSpPr>
+            <a:spLocks noGrp="1"/>
+          </p:cNvSpPr>
+          <p:nvPr>
+            <p:ph type="title"/>
+          </p:nvPr>
+        </p:nvSpPr>
+        <p:spPr/>
+        <p:txBody>
+          <a:bodyPr/>
+          <a:lstStyle/>
+          <a:p>
+            <a:r>
+              <a:rPr lang="en-AU" dirty="0"/>
+              <a:t>Entropy</a:t>
+            </a:r>
+          </a:p>
+        </p:txBody>
+      </p:sp>
+      <mc:AlternateContent xmlns:mc="http://schemas.openxmlformats.org/markup-compatibility/2006">
+        <mc:Choice xmlns:a14="http://schemas.microsoft.com/office/drawing/2010/main" Requires="a14">
+          <p:sp>
+            <p:nvSpPr>
+              <p:cNvPr id="3" name="Content Placeholder 2">
+                <a:extLst>
+                  <a:ext uri="{FF2B5EF4-FFF2-40B4-BE49-F238E27FC236}">
+                    <a16:creationId xmlns:a16="http://schemas.microsoft.com/office/drawing/2014/main" id="{53228F2A-4E22-DA45-3CDC-80B816A318D6}"/>
+                  </a:ext>
+                </a:extLst>
+              </p:cNvPr>
+              <p:cNvSpPr>
+                <a:spLocks noGrp="1"/>
+              </p:cNvSpPr>
+              <p:nvPr>
+                <p:ph idx="1"/>
+              </p:nvPr>
+            </p:nvSpPr>
+            <p:spPr/>
+            <p:txBody>
+              <a:bodyPr>
+                <a:normAutofit/>
+              </a:bodyPr>
+              <a:lstStyle/>
+              <a:p>
+                <a:r>
+                  <a:rPr lang="en-AU" sz="2400" dirty="0"/>
+                  <a:t>Entropy of a random variable X is the level of uncertainty inherent in the variables possible outcome.</a:t>
+                </a:r>
+              </a:p>
+              <a:p>
+                <a:r>
+                  <a:rPr lang="en-AU" sz="2400" dirty="0"/>
+                  <a:t>P(x) – Probability distribution and X is a random variable.</a:t>
+                </a:r>
+              </a:p>
+              <a:p>
+                <a:pPr marL="0" indent="0">
+                  <a:buNone/>
+                </a:pPr>
+                <a14:m>
+                  <m:oMathPara xmlns:m="http://schemas.openxmlformats.org/officeDocument/2006/math">
+                    <m:oMathParaPr>
+                      <m:jc m:val="centerGroup"/>
+                    </m:oMathParaPr>
+                    <m:oMath xmlns:m="http://schemas.openxmlformats.org/officeDocument/2006/math">
+                      <m:r>
+                        <a:rPr lang="en-AU" sz="2400" b="0" i="1" smtClean="0">
+                          <a:latin typeface="Cambria Math" panose="02040503050406030204" pitchFamily="18" charset="0"/>
+                        </a:rPr>
+                        <m:t>𝐸𝑛𝑡𝑟𝑜𝑝𝑦</m:t>
+                      </m:r>
+                      <m:r>
+                        <a:rPr lang="en-AU" sz="2400" b="0" i="1" smtClean="0">
+                          <a:latin typeface="Cambria Math" panose="02040503050406030204" pitchFamily="18" charset="0"/>
+                        </a:rPr>
+                        <m:t>=</m:t>
+                      </m:r>
+                      <m:r>
+                        <a:rPr lang="en-AU" sz="2400" b="0" i="1" smtClean="0">
+                          <a:latin typeface="Cambria Math" panose="02040503050406030204" pitchFamily="18" charset="0"/>
+                        </a:rPr>
+                        <m:t>𝐻</m:t>
+                      </m:r>
+                      <m:d>
+                        <m:dPr>
+                          <m:ctrlPr>
+                            <a:rPr lang="en-AU" sz="2400" b="0" i="1" smtClean="0">
+                              <a:latin typeface="Cambria Math" panose="02040503050406030204" pitchFamily="18" charset="0"/>
+                            </a:rPr>
+                          </m:ctrlPr>
+                        </m:dPr>
+                        <m:e>
+                          <m:r>
+                            <a:rPr lang="en-AU" sz="2400" b="0" i="1" smtClean="0">
+                              <a:latin typeface="Cambria Math" panose="02040503050406030204" pitchFamily="18" charset="0"/>
+                            </a:rPr>
+                            <m:t>𝑥</m:t>
+                          </m:r>
+                        </m:e>
+                      </m:d>
+                      <m:r>
+                        <a:rPr lang="en-AU" sz="2400" b="0" i="1" smtClean="0">
+                          <a:latin typeface="Cambria Math" panose="02040503050406030204" pitchFamily="18" charset="0"/>
+                        </a:rPr>
+                        <m:t>= </m:t>
+                      </m:r>
+                      <m:d>
+                        <m:dPr>
+                          <m:begChr m:val="{"/>
+                          <m:endChr m:val=""/>
+                          <m:ctrlPr>
+                            <a:rPr lang="en-AU" sz="2400" b="0" i="1" smtClean="0">
+                              <a:latin typeface="Cambria Math" panose="02040503050406030204" pitchFamily="18" charset="0"/>
+                            </a:rPr>
+                          </m:ctrlPr>
+                        </m:dPr>
+                        <m:e>
+                          <m:eqArr>
+                            <m:eqArrPr>
+                              <m:ctrlPr>
+                                <a:rPr lang="en-AU" sz="2400" b="0" i="1" smtClean="0">
+                                  <a:latin typeface="Cambria Math" panose="02040503050406030204" pitchFamily="18" charset="0"/>
+                                </a:rPr>
+                              </m:ctrlPr>
+                            </m:eqArrPr>
+                            <m:e>
+                              <m:r>
+                                <a:rPr lang="en-AU" sz="2400" b="0" i="1" smtClean="0">
+                                  <a:latin typeface="Cambria Math" panose="02040503050406030204" pitchFamily="18" charset="0"/>
+                                </a:rPr>
+                                <m:t>−</m:t>
+                              </m:r>
+                              <m:nary>
+                                <m:naryPr>
+                                  <m:limLoc m:val="undOvr"/>
+                                  <m:subHide m:val="on"/>
+                                  <m:supHide m:val="on"/>
+                                  <m:ctrlPr>
+                                    <a:rPr lang="en-AU" sz="2400" b="0" i="1" smtClean="0">
+                                      <a:latin typeface="Cambria Math" panose="02040503050406030204" pitchFamily="18" charset="0"/>
+                                    </a:rPr>
+                                  </m:ctrlPr>
+                                </m:naryPr>
+                                <m:sub/>
+                                <m:sup/>
+                                <m:e>
+                                  <m:r>
+                                    <a:rPr lang="en-AU" sz="2400" b="0" i="1" smtClean="0">
+                                      <a:latin typeface="Cambria Math" panose="02040503050406030204" pitchFamily="18" charset="0"/>
+                                    </a:rPr>
+                                    <m:t>𝑝</m:t>
+                                  </m:r>
+                                  <m:d>
+                                    <m:dPr>
+                                      <m:ctrlPr>
+                                        <a:rPr lang="en-AU" sz="2400" b="0" i="1" smtClean="0">
+                                          <a:latin typeface="Cambria Math" panose="02040503050406030204" pitchFamily="18" charset="0"/>
+                                        </a:rPr>
+                                      </m:ctrlPr>
+                                    </m:dPr>
+                                    <m:e>
+                                      <m:r>
+                                        <a:rPr lang="en-AU" sz="2400" b="0" i="1" smtClean="0">
+                                          <a:latin typeface="Cambria Math" panose="02040503050406030204" pitchFamily="18" charset="0"/>
+                                        </a:rPr>
+                                        <m:t>𝑥</m:t>
+                                      </m:r>
+                                    </m:e>
+                                  </m:d>
+                                  <m:r>
+                                    <a:rPr lang="en-AU" sz="2400" b="0" i="1" smtClean="0">
+                                      <a:latin typeface="Cambria Math" panose="02040503050406030204" pitchFamily="18" charset="0"/>
+                                    </a:rPr>
+                                    <m:t>.</m:t>
+                                  </m:r>
+                                  <m:func>
+                                    <m:funcPr>
+                                      <m:ctrlPr>
+                                        <a:rPr lang="en-AU" sz="2400" b="0" i="1" smtClean="0">
+                                          <a:latin typeface="Cambria Math" panose="02040503050406030204" pitchFamily="18" charset="0"/>
+                                        </a:rPr>
+                                      </m:ctrlPr>
+                                    </m:funcPr>
+                                    <m:fName>
+                                      <m:r>
+                                        <m:rPr>
+                                          <m:sty m:val="p"/>
+                                        </m:rPr>
+                                        <a:rPr lang="en-AU" sz="2400" b="0" i="0" smtClean="0">
+                                          <a:latin typeface="Cambria Math" panose="02040503050406030204" pitchFamily="18" charset="0"/>
+                                        </a:rPr>
+                                        <m:t>log</m:t>
+                                      </m:r>
+                                    </m:fName>
+                                    <m:e>
+                                      <m:d>
+                                        <m:dPr>
+                                          <m:ctrlPr>
+                                            <a:rPr lang="en-AU" sz="2400" b="0" i="1" smtClean="0">
+                                              <a:latin typeface="Cambria Math" panose="02040503050406030204" pitchFamily="18" charset="0"/>
+                                            </a:rPr>
+                                          </m:ctrlPr>
+                                        </m:dPr>
+                                        <m:e>
+                                          <m:r>
+                                            <a:rPr lang="en-AU" sz="2400" b="0" i="1" smtClean="0">
+                                              <a:latin typeface="Cambria Math" panose="02040503050406030204" pitchFamily="18" charset="0"/>
+                                            </a:rPr>
+                                            <m:t>𝑝</m:t>
+                                          </m:r>
+                                          <m:d>
+                                            <m:dPr>
+                                              <m:ctrlPr>
+                                                <a:rPr lang="en-AU" sz="2400" b="0" i="1" smtClean="0">
+                                                  <a:latin typeface="Cambria Math" panose="02040503050406030204" pitchFamily="18" charset="0"/>
+                                                </a:rPr>
+                                              </m:ctrlPr>
+                                            </m:dPr>
+                                            <m:e>
+                                              <m:r>
+                                                <a:rPr lang="en-AU" sz="2400" b="0" i="1" smtClean="0">
+                                                  <a:latin typeface="Cambria Math" panose="02040503050406030204" pitchFamily="18" charset="0"/>
+                                                </a:rPr>
+                                                <m:t>𝑥</m:t>
+                                              </m:r>
+                                            </m:e>
+                                          </m:d>
+                                        </m:e>
+                                      </m:d>
+                                    </m:e>
+                                  </m:func>
+                                  <m:r>
+                                    <a:rPr lang="en-AU" sz="2400" b="0" i="1" smtClean="0">
+                                      <a:latin typeface="Cambria Math" panose="02040503050406030204" pitchFamily="18" charset="0"/>
+                                    </a:rPr>
+                                    <m:t> , </m:t>
+                                  </m:r>
+                                  <m:r>
+                                    <a:rPr lang="en-AU" sz="2400" b="0" i="1" smtClean="0">
+                                      <a:latin typeface="Cambria Math" panose="02040503050406030204" pitchFamily="18" charset="0"/>
+                                    </a:rPr>
+                                    <m:t>𝑖𝑓</m:t>
+                                  </m:r>
+                                  <m:r>
+                                    <a:rPr lang="en-AU" sz="2400" b="0" i="1" smtClean="0">
+                                      <a:latin typeface="Cambria Math" panose="02040503050406030204" pitchFamily="18" charset="0"/>
+                                    </a:rPr>
+                                    <m:t> </m:t>
+                                  </m:r>
+                                  <m:r>
+                                    <a:rPr lang="en-AU" sz="2400" b="0" i="1" smtClean="0">
+                                      <a:latin typeface="Cambria Math" panose="02040503050406030204" pitchFamily="18" charset="0"/>
+                                    </a:rPr>
+                                    <m:t>𝑋</m:t>
+                                  </m:r>
+                                  <m:r>
+                                    <a:rPr lang="en-AU" sz="2400" b="0" i="1" smtClean="0">
+                                      <a:latin typeface="Cambria Math" panose="02040503050406030204" pitchFamily="18" charset="0"/>
+                                    </a:rPr>
+                                    <m:t> </m:t>
+                                  </m:r>
+                                  <m:r>
+                                    <a:rPr lang="en-AU" sz="2400" b="0" i="1" smtClean="0">
+                                      <a:latin typeface="Cambria Math" panose="02040503050406030204" pitchFamily="18" charset="0"/>
+                                    </a:rPr>
+                                    <m:t>𝑖𝑠</m:t>
+                                  </m:r>
+                                  <m:r>
+                                    <a:rPr lang="en-AU" sz="2400" b="0" i="1" smtClean="0">
+                                      <a:latin typeface="Cambria Math" panose="02040503050406030204" pitchFamily="18" charset="0"/>
+                                    </a:rPr>
+                                    <m:t> </m:t>
+                                  </m:r>
+                                  <m:r>
+                                    <a:rPr lang="en-AU" sz="2400" b="0" i="1" smtClean="0">
+                                      <a:latin typeface="Cambria Math" panose="02040503050406030204" pitchFamily="18" charset="0"/>
+                                    </a:rPr>
+                                    <m:t>𝑐𝑜𝑛𝑡𝑖𝑛𝑜𝑢𝑠</m:t>
+                                  </m:r>
+                                </m:e>
+                              </m:nary>
+                            </m:e>
+                            <m:e>
+                              <m:r>
+                                <a:rPr lang="en-AU" sz="2400" b="0" i="1" smtClean="0">
+                                  <a:latin typeface="Cambria Math" panose="02040503050406030204" pitchFamily="18" charset="0"/>
+                                </a:rPr>
+                                <m:t>−</m:t>
+                              </m:r>
+                              <m:nary>
+                                <m:naryPr>
+                                  <m:chr m:val="∑"/>
+                                  <m:supHide m:val="on"/>
+                                  <m:ctrlPr>
+                                    <a:rPr lang="en-AU" sz="2400" b="0" i="1" smtClean="0">
+                                      <a:latin typeface="Cambria Math" panose="02040503050406030204" pitchFamily="18" charset="0"/>
+                                    </a:rPr>
+                                  </m:ctrlPr>
+                                </m:naryPr>
+                                <m:sub>
+                                  <m:r>
+                                    <m:rPr>
+                                      <m:brk m:alnAt="7"/>
+                                    </m:rPr>
+                                    <a:rPr lang="en-AU" sz="2400" b="0" i="1" smtClean="0">
+                                      <a:latin typeface="Cambria Math" panose="02040503050406030204" pitchFamily="18" charset="0"/>
+                                    </a:rPr>
+                                    <m:t>𝑥</m:t>
+                                  </m:r>
+                                </m:sub>
+                                <m:sup/>
+                                <m:e>
+                                  <m:r>
+                                    <a:rPr lang="en-AU" sz="2400" b="0" i="1" smtClean="0">
+                                      <a:latin typeface="Cambria Math" panose="02040503050406030204" pitchFamily="18" charset="0"/>
+                                    </a:rPr>
+                                    <m:t>𝑝</m:t>
+                                  </m:r>
+                                  <m:d>
+                                    <m:dPr>
+                                      <m:ctrlPr>
+                                        <a:rPr lang="en-AU" sz="2400" b="0" i="1" smtClean="0">
+                                          <a:latin typeface="Cambria Math" panose="02040503050406030204" pitchFamily="18" charset="0"/>
+                                        </a:rPr>
+                                      </m:ctrlPr>
+                                    </m:dPr>
+                                    <m:e>
+                                      <m:r>
+                                        <a:rPr lang="en-AU" sz="2400" b="0" i="1" smtClean="0">
+                                          <a:latin typeface="Cambria Math" panose="02040503050406030204" pitchFamily="18" charset="0"/>
+                                        </a:rPr>
+                                        <m:t>𝑥</m:t>
+                                      </m:r>
+                                    </m:e>
+                                  </m:d>
+                                  <m:r>
+                                    <a:rPr lang="en-AU" sz="2400" b="0" i="1" smtClean="0">
+                                      <a:latin typeface="Cambria Math" panose="02040503050406030204" pitchFamily="18" charset="0"/>
+                                    </a:rPr>
+                                    <m:t>.</m:t>
+                                  </m:r>
+                                  <m:func>
+                                    <m:funcPr>
+                                      <m:ctrlPr>
+                                        <a:rPr lang="en-AU" sz="2400" b="0" i="1" smtClean="0">
+                                          <a:latin typeface="Cambria Math" panose="02040503050406030204" pitchFamily="18" charset="0"/>
+                                        </a:rPr>
+                                      </m:ctrlPr>
+                                    </m:funcPr>
+                                    <m:fName>
+                                      <m:r>
+                                        <m:rPr>
+                                          <m:sty m:val="p"/>
+                                        </m:rPr>
+                                        <a:rPr lang="en-AU" sz="2400" b="0" i="0" smtClean="0">
+                                          <a:latin typeface="Cambria Math" panose="02040503050406030204" pitchFamily="18" charset="0"/>
+                                        </a:rPr>
+                                        <m:t>log</m:t>
+                                      </m:r>
+                                    </m:fName>
+                                    <m:e>
+                                      <m:d>
+                                        <m:dPr>
+                                          <m:ctrlPr>
+                                            <a:rPr lang="en-AU" sz="2400" b="0" i="1" smtClean="0">
+                                              <a:latin typeface="Cambria Math" panose="02040503050406030204" pitchFamily="18" charset="0"/>
+                                            </a:rPr>
+                                          </m:ctrlPr>
+                                        </m:dPr>
+                                        <m:e>
+                                          <m:r>
+                                            <a:rPr lang="en-AU" sz="2400" b="0" i="1" smtClean="0">
+                                              <a:latin typeface="Cambria Math" panose="02040503050406030204" pitchFamily="18" charset="0"/>
+                                            </a:rPr>
+                                            <m:t>𝑝</m:t>
+                                          </m:r>
+                                          <m:d>
+                                            <m:dPr>
+                                              <m:ctrlPr>
+                                                <a:rPr lang="en-AU" sz="2400" b="0" i="1" smtClean="0">
+                                                  <a:latin typeface="Cambria Math" panose="02040503050406030204" pitchFamily="18" charset="0"/>
+                                                </a:rPr>
+                                              </m:ctrlPr>
+                                            </m:dPr>
+                                            <m:e>
+                                              <m:r>
+                                                <a:rPr lang="en-AU" sz="2400" b="0" i="1" smtClean="0">
+                                                  <a:latin typeface="Cambria Math" panose="02040503050406030204" pitchFamily="18" charset="0"/>
+                                                </a:rPr>
+                                                <m:t>𝑥</m:t>
+                                              </m:r>
+                                            </m:e>
+                                          </m:d>
+                                        </m:e>
+                                      </m:d>
+                                    </m:e>
+                                  </m:func>
+                                  <m:r>
+                                    <a:rPr lang="en-AU" sz="2400" b="0" i="1" smtClean="0">
+                                      <a:latin typeface="Cambria Math" panose="02040503050406030204" pitchFamily="18" charset="0"/>
+                                    </a:rPr>
+                                    <m:t>, </m:t>
+                                  </m:r>
+                                  <m:r>
+                                    <a:rPr lang="en-AU" sz="2400" b="0" i="1" smtClean="0">
+                                      <a:latin typeface="Cambria Math" panose="02040503050406030204" pitchFamily="18" charset="0"/>
+                                    </a:rPr>
+                                    <m:t>𝑖𝑓</m:t>
+                                  </m:r>
+                                  <m:r>
+                                    <a:rPr lang="en-AU" sz="2400" b="0" i="1" smtClean="0">
+                                      <a:latin typeface="Cambria Math" panose="02040503050406030204" pitchFamily="18" charset="0"/>
+                                    </a:rPr>
+                                    <m:t> </m:t>
+                                  </m:r>
+                                  <m:r>
+                                    <a:rPr lang="en-AU" sz="2400" b="0" i="1" smtClean="0">
+                                      <a:latin typeface="Cambria Math" panose="02040503050406030204" pitchFamily="18" charset="0"/>
+                                    </a:rPr>
+                                    <m:t>𝑋</m:t>
+                                  </m:r>
+                                  <m:r>
+                                    <a:rPr lang="en-AU" sz="2400" b="0" i="1" smtClean="0">
+                                      <a:latin typeface="Cambria Math" panose="02040503050406030204" pitchFamily="18" charset="0"/>
+                                    </a:rPr>
+                                    <m:t> </m:t>
+                                  </m:r>
+                                  <m:r>
+                                    <a:rPr lang="en-AU" sz="2400" b="0" i="1" smtClean="0">
+                                      <a:latin typeface="Cambria Math" panose="02040503050406030204" pitchFamily="18" charset="0"/>
+                                    </a:rPr>
+                                    <m:t>𝑖𝑠</m:t>
+                                  </m:r>
+                                  <m:r>
+                                    <a:rPr lang="en-AU" sz="2400" b="0" i="1" smtClean="0">
+                                      <a:latin typeface="Cambria Math" panose="02040503050406030204" pitchFamily="18" charset="0"/>
+                                    </a:rPr>
+                                    <m:t> </m:t>
+                                  </m:r>
+                                  <m:r>
+                                    <a:rPr lang="en-AU" sz="2400" b="0" i="1" smtClean="0">
+                                      <a:latin typeface="Cambria Math" panose="02040503050406030204" pitchFamily="18" charset="0"/>
+                                    </a:rPr>
+                                    <m:t>𝑑𝑖𝑠𝑐𝑟𝑒𝑡𝑒</m:t>
+                                  </m:r>
+                                </m:e>
+                              </m:nary>
+                            </m:e>
+                          </m:eqArr>
+                        </m:e>
+                      </m:d>
+                    </m:oMath>
+                  </m:oMathPara>
+                </a14:m>
+                <a:endParaRPr lang="en-AU" sz="2400" dirty="0"/>
+              </a:p>
+              <a:p>
+                <a:r>
+                  <a:rPr lang="en-AU" sz="2400" dirty="0"/>
+                  <a:t>Reason for –Ve sign: </a:t>
+                </a:r>
+                <a14:m>
+                  <m:oMath xmlns:m="http://schemas.openxmlformats.org/officeDocument/2006/math">
+                    <m:func>
+                      <m:funcPr>
+                        <m:ctrlPr>
+                          <a:rPr lang="en-AU" sz="2400" b="0" i="1" smtClean="0">
+                            <a:latin typeface="Cambria Math" panose="02040503050406030204" pitchFamily="18" charset="0"/>
+                          </a:rPr>
+                        </m:ctrlPr>
+                      </m:funcPr>
+                      <m:fName>
+                        <m:r>
+                          <m:rPr>
+                            <m:sty m:val="p"/>
+                          </m:rPr>
+                          <a:rPr lang="en-AU" sz="2400" b="0" i="0" smtClean="0">
+                            <a:latin typeface="Cambria Math" panose="02040503050406030204" pitchFamily="18" charset="0"/>
+                          </a:rPr>
+                          <m:t>log</m:t>
+                        </m:r>
+                      </m:fName>
+                      <m:e>
+                        <m:d>
+                          <m:dPr>
+                            <m:ctrlPr>
+                              <a:rPr lang="en-AU" sz="2400" b="0" i="1" smtClean="0">
+                                <a:latin typeface="Cambria Math" panose="02040503050406030204" pitchFamily="18" charset="0"/>
+                              </a:rPr>
+                            </m:ctrlPr>
+                          </m:dPr>
+                          <m:e>
+                            <m:r>
+                              <a:rPr lang="en-AU" sz="2400" b="0" i="1" smtClean="0">
+                                <a:latin typeface="Cambria Math" panose="02040503050406030204" pitchFamily="18" charset="0"/>
+                              </a:rPr>
+                              <m:t>𝑝</m:t>
+                            </m:r>
+                            <m:d>
+                              <m:dPr>
+                                <m:ctrlPr>
+                                  <a:rPr lang="en-AU" sz="2400" b="0" i="1" smtClean="0">
+                                    <a:latin typeface="Cambria Math" panose="02040503050406030204" pitchFamily="18" charset="0"/>
+                                  </a:rPr>
+                                </m:ctrlPr>
+                              </m:dPr>
+                              <m:e>
+                                <m:r>
+                                  <a:rPr lang="en-AU" sz="2400" b="0" i="1" smtClean="0">
+                                    <a:latin typeface="Cambria Math" panose="02040503050406030204" pitchFamily="18" charset="0"/>
+                                  </a:rPr>
+                                  <m:t>𝑥</m:t>
+                                </m:r>
+                              </m:e>
+                            </m:d>
+                          </m:e>
+                        </m:d>
+                      </m:e>
+                    </m:func>
+                    <m:r>
+                      <a:rPr lang="en-AU" sz="2400" b="0" i="1" smtClean="0">
+                        <a:latin typeface="Cambria Math" panose="02040503050406030204" pitchFamily="18" charset="0"/>
+                      </a:rPr>
+                      <m:t>&lt;0, ∀</m:t>
+                    </m:r>
+                    <m:r>
+                      <a:rPr lang="en-AU" sz="2400" b="0" i="1" smtClean="0">
+                        <a:latin typeface="Cambria Math" panose="02040503050406030204" pitchFamily="18" charset="0"/>
+                      </a:rPr>
+                      <m:t>𝑝</m:t>
+                    </m:r>
+                    <m:d>
+                      <m:dPr>
+                        <m:ctrlPr>
+                          <a:rPr lang="en-AU" sz="2400" b="0" i="1" smtClean="0">
+                            <a:latin typeface="Cambria Math" panose="02040503050406030204" pitchFamily="18" charset="0"/>
+                          </a:rPr>
+                        </m:ctrlPr>
+                      </m:dPr>
+                      <m:e>
+                        <m:r>
+                          <a:rPr lang="en-AU" sz="2400" b="0" i="1" smtClean="0">
+                            <a:latin typeface="Cambria Math" panose="02040503050406030204" pitchFamily="18" charset="0"/>
+                          </a:rPr>
+                          <m:t>𝑥</m:t>
+                        </m:r>
+                      </m:e>
+                    </m:d>
+                  </m:oMath>
+                </a14:m>
+                <a:endParaRPr lang="en-AU" sz="2400" dirty="0"/>
+              </a:p>
+              <a:p>
+                <a:r>
+                  <a:rPr lang="en-AU" sz="2400" dirty="0"/>
+                  <a:t> The greater the value of Entropy-H(x) , the greater the uncertainty for probability distribution and the smaller the value the less the uncertainty. </a:t>
+                </a:r>
+              </a:p>
+              <a:p>
+                <a:endParaRPr lang="en-AU" sz="2400" dirty="0"/>
+              </a:p>
+              <a:p>
+                <a:endParaRPr lang="en-AU" sz="2400" dirty="0"/>
+              </a:p>
+            </p:txBody>
+          </p:sp>
+        </mc:Choice>
+        <mc:Fallback>
+          <p:sp>
+            <p:nvSpPr>
+              <p:cNvPr id="3" name="Content Placeholder 2">
+                <a:extLst>
+                  <a:ext uri="{FF2B5EF4-FFF2-40B4-BE49-F238E27FC236}">
+                    <a16:creationId xmlns:a16="http://schemas.microsoft.com/office/drawing/2014/main" id="{53228F2A-4E22-DA45-3CDC-80B816A318D6}"/>
+                  </a:ext>
+                </a:extLst>
+              </p:cNvPr>
+              <p:cNvSpPr>
+                <a:spLocks noGrp="1" noRot="1" noChangeAspect="1" noMove="1" noResize="1" noEditPoints="1" noAdjustHandles="1" noChangeArrowheads="1" noChangeShapeType="1" noTextEdit="1"/>
+              </p:cNvSpPr>
+              <p:nvPr>
+                <p:ph idx="1"/>
+              </p:nvPr>
+            </p:nvSpPr>
+            <p:spPr>
+              <a:blipFill>
+                <a:blip r:embed="rId2"/>
+                <a:stretch>
+                  <a:fillRect l="-812" t="-1961" r="-1449" b="-1681"/>
+                </a:stretch>
+              </a:blipFill>
+            </p:spPr>
+            <p:txBody>
+              <a:bodyPr/>
+              <a:lstStyle/>
+              <a:p>
+                <a:r>
+                  <a:rPr lang="en-AU">
+                    <a:noFill/>
+                  </a:rPr>
+                  <a:t> </a:t>
+                </a:r>
+              </a:p>
+            </p:txBody>
+          </p:sp>
+        </mc:Fallback>
+      </mc:AlternateContent>
+    </p:spTree>
+    <p:extLst>
+      <p:ext uri="{BB962C8B-B14F-4D97-AF65-F5344CB8AC3E}">
+        <p14:creationId xmlns:p14="http://schemas.microsoft.com/office/powerpoint/2010/main" val="538365427"/>
+      </p:ext>
+    </p:extLst>
+  </p:cSld>
+  <p:clrMapOvr>
+    <a:masterClrMapping/>
+  </p:clrMapOvr>
+</p:sld>
+</file>
+
+<file path=ppt/slides/slide24.xml><?xml version="1.0" encoding="utf-8"?>
+<p:sld xmlns:a="http://schemas.openxmlformats.org/drawingml/2006/main" xmlns:r="http://schemas.openxmlformats.org/officeDocument/2006/relationships" xmlns:p="http://schemas.openxmlformats.org/presentationml/2006/main">
+  <p:cSld>
+    <p:spTree>
+      <p:nvGrpSpPr>
+        <p:cNvPr id="1" name=""/>
+        <p:cNvGrpSpPr/>
+        <p:nvPr/>
+      </p:nvGrpSpPr>
+      <p:grpSpPr>
+        <a:xfrm>
+          <a:off x="0" y="0"/>
+          <a:ext cx="0" cy="0"/>
+          <a:chOff x="0" y="0"/>
+          <a:chExt cx="0" cy="0"/>
+        </a:xfrm>
+      </p:grpSpPr>
+      <p:sp>
+        <p:nvSpPr>
+          <p:cNvPr id="2" name="Title 1">
+            <a:extLst>
+              <a:ext uri="{FF2B5EF4-FFF2-40B4-BE49-F238E27FC236}">
                 <a16:creationId xmlns:a16="http://schemas.microsoft.com/office/drawing/2014/main" id="{4F1261DB-738A-7255-D20B-EBC43962B8AC}"/>
               </a:ext>
             </a:extLst>
@@ -29895,36 +30536,725 @@
           <a:p>
             <a:r>
               <a:rPr lang="en-US" dirty="0"/>
-              <a:t>Entropy Loss</a:t>
+              <a:t>Cross Entropy Loss/Log Loss/Logistic Loss</a:t>
             </a:r>
           </a:p>
         </p:txBody>
       </p:sp>
-      <p:sp>
-        <p:nvSpPr>
-          <p:cNvPr id="3" name="Content Placeholder 2">
-            <a:extLst>
-              <a:ext uri="{FF2B5EF4-FFF2-40B4-BE49-F238E27FC236}">
-                <a16:creationId xmlns:a16="http://schemas.microsoft.com/office/drawing/2014/main" id="{1902F06A-DBBA-FAC1-6F16-EDA8BADAA57F}"/>
-              </a:ext>
-            </a:extLst>
-          </p:cNvPr>
-          <p:cNvSpPr>
-            <a:spLocks noGrp="1"/>
-          </p:cNvSpPr>
-          <p:nvPr>
-            <p:ph idx="1"/>
-          </p:nvPr>
-        </p:nvSpPr>
-        <p:spPr/>
-        <p:txBody>
-          <a:bodyPr/>
-          <a:lstStyle/>
-          <a:p>
-            <a:endParaRPr lang="en-US" dirty="0"/>
-          </a:p>
-        </p:txBody>
-      </p:sp>
+      <mc:AlternateContent xmlns:mc="http://schemas.openxmlformats.org/markup-compatibility/2006">
+        <mc:Choice xmlns:a14="http://schemas.microsoft.com/office/drawing/2010/main" Requires="a14">
+          <p:sp>
+            <p:nvSpPr>
+              <p:cNvPr id="3" name="Content Placeholder 2">
+                <a:extLst>
+                  <a:ext uri="{FF2B5EF4-FFF2-40B4-BE49-F238E27FC236}">
+                    <a16:creationId xmlns:a16="http://schemas.microsoft.com/office/drawing/2014/main" id="{1902F06A-DBBA-FAC1-6F16-EDA8BADAA57F}"/>
+                  </a:ext>
+                </a:extLst>
+              </p:cNvPr>
+              <p:cNvSpPr>
+                <a:spLocks noGrp="1"/>
+              </p:cNvSpPr>
+              <p:nvPr>
+                <p:ph idx="1"/>
+              </p:nvPr>
+            </p:nvSpPr>
+            <p:spPr/>
+            <p:txBody>
+              <a:bodyPr>
+                <a:normAutofit fontScale="92500" lnSpcReduction="20000"/>
+              </a:bodyPr>
+              <a:lstStyle/>
+              <a:p>
+                <a:r>
+                  <a:rPr lang="en-AU" dirty="0"/>
+                  <a:t>Each predicted class probability is compared to the actual class desired output 0 or 1 and a score/loss is calculated that penalizes the probability based on how far it is from the actual expected value.</a:t>
+                </a:r>
+              </a:p>
+              <a:p>
+                <a:r>
+                  <a:rPr lang="en-AU" dirty="0"/>
+                  <a:t>Cross-entropy loss is used when adjusting model weights during training. The aim is to minimize the loss, </a:t>
+                </a:r>
+                <a:r>
+                  <a:rPr lang="en-AU" dirty="0" err="1"/>
+                  <a:t>i.e</a:t>
+                </a:r>
+                <a:r>
+                  <a:rPr lang="en-AU" dirty="0"/>
+                  <a:t>, the smaller the loss the better the model. A perfect model has a cross-entropy loss of 0.</a:t>
+                </a:r>
+              </a:p>
+              <a:p>
+                <a:pPr marL="0" indent="0">
+                  <a:buNone/>
+                </a:pPr>
+                <a14:m>
+                  <m:oMathPara xmlns:m="http://schemas.openxmlformats.org/officeDocument/2006/math">
+                    <m:oMathParaPr>
+                      <m:jc m:val="centerGroup"/>
+                    </m:oMathParaPr>
+                    <m:oMath xmlns:m="http://schemas.openxmlformats.org/officeDocument/2006/math">
+                      <m:r>
+                        <a:rPr lang="en-AU" b="0" i="1" smtClean="0">
+                          <a:latin typeface="Cambria Math" panose="02040503050406030204" pitchFamily="18" charset="0"/>
+                        </a:rPr>
+                        <m:t>𝑆𝑜𝑓𝑡𝑚𝑎𝑥</m:t>
+                      </m:r>
+                      <m:r>
+                        <a:rPr lang="en-AU" b="0" i="1" smtClean="0">
+                          <a:latin typeface="Cambria Math" panose="02040503050406030204" pitchFamily="18" charset="0"/>
+                        </a:rPr>
+                        <m:t> </m:t>
+                      </m:r>
+                      <m:r>
+                        <a:rPr lang="en-AU" b="0" i="1" smtClean="0">
+                          <a:latin typeface="Cambria Math" panose="02040503050406030204" pitchFamily="18" charset="0"/>
+                        </a:rPr>
+                        <m:t>𝑝𝑟𝑜𝑏𝑎𝑏𝑖𝑙𝑖𝑡𝑦</m:t>
+                      </m:r>
+                      <m:r>
+                        <a:rPr lang="en-AU" b="0" i="1" smtClean="0">
+                          <a:latin typeface="Cambria Math" panose="02040503050406030204" pitchFamily="18" charset="0"/>
+                        </a:rPr>
+                        <m:t> </m:t>
+                      </m:r>
+                      <m:r>
+                        <a:rPr lang="en-AU" b="0" i="1" smtClean="0">
+                          <a:latin typeface="Cambria Math" panose="02040503050406030204" pitchFamily="18" charset="0"/>
+                        </a:rPr>
+                        <m:t>𝑆</m:t>
+                      </m:r>
+                      <m:d>
+                        <m:dPr>
+                          <m:ctrlPr>
+                            <a:rPr lang="en-AU" b="0" i="1" smtClean="0">
+                              <a:latin typeface="Cambria Math" panose="02040503050406030204" pitchFamily="18" charset="0"/>
+                            </a:rPr>
+                          </m:ctrlPr>
+                        </m:dPr>
+                        <m:e>
+                          <m:sSub>
+                            <m:sSubPr>
+                              <m:ctrlPr>
+                                <a:rPr lang="en-AU" b="0" i="1" smtClean="0">
+                                  <a:latin typeface="Cambria Math" panose="02040503050406030204" pitchFamily="18" charset="0"/>
+                                </a:rPr>
+                              </m:ctrlPr>
+                            </m:sSubPr>
+                            <m:e>
+                              <m:r>
+                                <a:rPr lang="en-AU" b="0" i="1" smtClean="0">
+                                  <a:latin typeface="Cambria Math" panose="02040503050406030204" pitchFamily="18" charset="0"/>
+                                </a:rPr>
+                                <m:t>𝑦</m:t>
+                              </m:r>
+                            </m:e>
+                            <m:sub>
+                              <m:r>
+                                <a:rPr lang="en-AU" b="0" i="1" smtClean="0">
+                                  <a:latin typeface="Cambria Math" panose="02040503050406030204" pitchFamily="18" charset="0"/>
+                                </a:rPr>
+                                <m:t>𝑖</m:t>
+                              </m:r>
+                            </m:sub>
+                          </m:sSub>
+                        </m:e>
+                      </m:d>
+                      <m:r>
+                        <a:rPr lang="en-AU" b="0" i="1" smtClean="0">
+                          <a:latin typeface="Cambria Math" panose="02040503050406030204" pitchFamily="18" charset="0"/>
+                        </a:rPr>
+                        <m:t>=</m:t>
+                      </m:r>
+                      <m:f>
+                        <m:fPr>
+                          <m:ctrlPr>
+                            <a:rPr lang="en-AU" b="0" i="1" smtClean="0">
+                              <a:latin typeface="Cambria Math" panose="02040503050406030204" pitchFamily="18" charset="0"/>
+                            </a:rPr>
+                          </m:ctrlPr>
+                        </m:fPr>
+                        <m:num>
+                          <m:func>
+                            <m:funcPr>
+                              <m:ctrlPr>
+                                <a:rPr lang="en-AU" b="0" i="1" smtClean="0">
+                                  <a:latin typeface="Cambria Math" panose="02040503050406030204" pitchFamily="18" charset="0"/>
+                                </a:rPr>
+                              </m:ctrlPr>
+                            </m:funcPr>
+                            <m:fName>
+                              <m:r>
+                                <m:rPr>
+                                  <m:sty m:val="p"/>
+                                </m:rPr>
+                                <a:rPr lang="en-AU" b="0" i="0" smtClean="0">
+                                  <a:latin typeface="Cambria Math" panose="02040503050406030204" pitchFamily="18" charset="0"/>
+                                </a:rPr>
+                                <m:t>exp</m:t>
+                              </m:r>
+                            </m:fName>
+                            <m:e>
+                              <m:d>
+                                <m:dPr>
+                                  <m:ctrlPr>
+                                    <a:rPr lang="en-AU" b="0" i="1" smtClean="0">
+                                      <a:latin typeface="Cambria Math" panose="02040503050406030204" pitchFamily="18" charset="0"/>
+                                    </a:rPr>
+                                  </m:ctrlPr>
+                                </m:dPr>
+                                <m:e>
+                                  <m:sSub>
+                                    <m:sSubPr>
+                                      <m:ctrlPr>
+                                        <a:rPr lang="en-AU" b="0" i="1" smtClean="0">
+                                          <a:latin typeface="Cambria Math" panose="02040503050406030204" pitchFamily="18" charset="0"/>
+                                        </a:rPr>
+                                      </m:ctrlPr>
+                                    </m:sSubPr>
+                                    <m:e>
+                                      <m:r>
+                                        <a:rPr lang="en-AU" b="0" i="1" smtClean="0">
+                                          <a:latin typeface="Cambria Math" panose="02040503050406030204" pitchFamily="18" charset="0"/>
+                                        </a:rPr>
+                                        <m:t>𝑦</m:t>
+                                      </m:r>
+                                    </m:e>
+                                    <m:sub>
+                                      <m:r>
+                                        <a:rPr lang="en-AU" b="0" i="1" smtClean="0">
+                                          <a:latin typeface="Cambria Math" panose="02040503050406030204" pitchFamily="18" charset="0"/>
+                                        </a:rPr>
+                                        <m:t>𝑖</m:t>
+                                      </m:r>
+                                    </m:sub>
+                                  </m:sSub>
+                                </m:e>
+                              </m:d>
+                            </m:e>
+                          </m:func>
+                        </m:num>
+                        <m:den>
+                          <m:nary>
+                            <m:naryPr>
+                              <m:chr m:val="∑"/>
+                              <m:ctrlPr>
+                                <a:rPr lang="en-AU" b="0" i="1" smtClean="0">
+                                  <a:latin typeface="Cambria Math" panose="02040503050406030204" pitchFamily="18" charset="0"/>
+                                </a:rPr>
+                              </m:ctrlPr>
+                            </m:naryPr>
+                            <m:sub>
+                              <m:r>
+                                <m:rPr>
+                                  <m:brk m:alnAt="23"/>
+                                </m:rPr>
+                                <a:rPr lang="en-AU" b="0" i="1" smtClean="0">
+                                  <a:latin typeface="Cambria Math" panose="02040503050406030204" pitchFamily="18" charset="0"/>
+                                </a:rPr>
+                                <m:t>𝑗</m:t>
+                              </m:r>
+                              <m:r>
+                                <a:rPr lang="en-AU" b="0" i="1" smtClean="0">
+                                  <a:latin typeface="Cambria Math" panose="02040503050406030204" pitchFamily="18" charset="0"/>
+                                </a:rPr>
+                                <m:t>=1</m:t>
+                              </m:r>
+                            </m:sub>
+                            <m:sup>
+                              <m:r>
+                                <a:rPr lang="en-AU" b="0" i="1" smtClean="0">
+                                  <a:latin typeface="Cambria Math" panose="02040503050406030204" pitchFamily="18" charset="0"/>
+                                </a:rPr>
+                                <m:t>𝑛</m:t>
+                              </m:r>
+                            </m:sup>
+                            <m:e>
+                              <m:r>
+                                <a:rPr lang="en-AU" b="0" i="1" smtClean="0">
+                                  <a:latin typeface="Cambria Math" panose="02040503050406030204" pitchFamily="18" charset="0"/>
+                                </a:rPr>
+                                <m:t> </m:t>
+                              </m:r>
+                              <m:func>
+                                <m:funcPr>
+                                  <m:ctrlPr>
+                                    <a:rPr lang="en-AU" b="0" i="1" smtClean="0">
+                                      <a:latin typeface="Cambria Math" panose="02040503050406030204" pitchFamily="18" charset="0"/>
+                                    </a:rPr>
+                                  </m:ctrlPr>
+                                </m:funcPr>
+                                <m:fName>
+                                  <m:r>
+                                    <m:rPr>
+                                      <m:sty m:val="p"/>
+                                    </m:rPr>
+                                    <a:rPr lang="en-AU" b="0" i="0" smtClean="0">
+                                      <a:latin typeface="Cambria Math" panose="02040503050406030204" pitchFamily="18" charset="0"/>
+                                    </a:rPr>
+                                    <m:t>exp</m:t>
+                                  </m:r>
+                                </m:fName>
+                                <m:e>
+                                  <m:d>
+                                    <m:dPr>
+                                      <m:ctrlPr>
+                                        <a:rPr lang="en-AU" b="0" i="1" smtClean="0">
+                                          <a:latin typeface="Cambria Math" panose="02040503050406030204" pitchFamily="18" charset="0"/>
+                                        </a:rPr>
+                                      </m:ctrlPr>
+                                    </m:dPr>
+                                    <m:e>
+                                      <m:sSub>
+                                        <m:sSubPr>
+                                          <m:ctrlPr>
+                                            <a:rPr lang="en-AU" b="0" i="1" smtClean="0">
+                                              <a:latin typeface="Cambria Math" panose="02040503050406030204" pitchFamily="18" charset="0"/>
+                                            </a:rPr>
+                                          </m:ctrlPr>
+                                        </m:sSubPr>
+                                        <m:e>
+                                          <m:r>
+                                            <a:rPr lang="en-AU" b="0" i="1" smtClean="0">
+                                              <a:latin typeface="Cambria Math" panose="02040503050406030204" pitchFamily="18" charset="0"/>
+                                            </a:rPr>
+                                            <m:t>𝑦</m:t>
+                                          </m:r>
+                                        </m:e>
+                                        <m:sub>
+                                          <m:r>
+                                            <a:rPr lang="en-AU" b="0" i="1" smtClean="0">
+                                              <a:latin typeface="Cambria Math" panose="02040503050406030204" pitchFamily="18" charset="0"/>
+                                            </a:rPr>
+                                            <m:t>𝑗</m:t>
+                                          </m:r>
+                                        </m:sub>
+                                      </m:sSub>
+                                    </m:e>
+                                  </m:d>
+                                </m:e>
+                              </m:func>
+                              <m:r>
+                                <a:rPr lang="en-AU" b="0" i="1" smtClean="0">
+                                  <a:latin typeface="Cambria Math" panose="02040503050406030204" pitchFamily="18" charset="0"/>
+                                </a:rPr>
+                                <m:t> </m:t>
+                              </m:r>
+                            </m:e>
+                          </m:nary>
+                        </m:den>
+                      </m:f>
+                    </m:oMath>
+                  </m:oMathPara>
+                </a14:m>
+                <a:endParaRPr lang="en-US" dirty="0"/>
+              </a:p>
+              <a:p>
+                <a:pPr marL="0" indent="0">
+                  <a:buNone/>
+                </a:pPr>
+                <a14:m>
+                  <m:oMathPara xmlns:m="http://schemas.openxmlformats.org/officeDocument/2006/math">
+                    <m:oMathParaPr>
+                      <m:jc m:val="centerGroup"/>
+                    </m:oMathParaPr>
+                    <m:oMath xmlns:m="http://schemas.openxmlformats.org/officeDocument/2006/math">
+                      <m:r>
+                        <a:rPr lang="en-AU" b="0" i="1" smtClean="0">
+                          <a:latin typeface="Cambria Math" panose="02040503050406030204" pitchFamily="18" charset="0"/>
+                        </a:rPr>
+                        <m:t>𝐶𝑟𝑜𝑠𝑠</m:t>
+                      </m:r>
+                      <m:r>
+                        <a:rPr lang="en-AU" b="0" i="1" smtClean="0">
+                          <a:latin typeface="Cambria Math" panose="02040503050406030204" pitchFamily="18" charset="0"/>
+                        </a:rPr>
+                        <m:t> </m:t>
+                      </m:r>
+                      <m:r>
+                        <a:rPr lang="en-AU" b="0" i="1" smtClean="0">
+                          <a:latin typeface="Cambria Math" panose="02040503050406030204" pitchFamily="18" charset="0"/>
+                        </a:rPr>
+                        <m:t>𝐸𝑛𝑡𝑟𝑜𝑝𝑦</m:t>
+                      </m:r>
+                      <m:r>
+                        <a:rPr lang="en-AU" b="0" i="1" smtClean="0">
+                          <a:latin typeface="Cambria Math" panose="02040503050406030204" pitchFamily="18" charset="0"/>
+                        </a:rPr>
+                        <m:t> </m:t>
+                      </m:r>
+                      <m:r>
+                        <a:rPr lang="en-AU" b="0" i="1" smtClean="0">
+                          <a:latin typeface="Cambria Math" panose="02040503050406030204" pitchFamily="18" charset="0"/>
+                        </a:rPr>
+                        <m:t>𝐿𝑜𝑠𝑠</m:t>
+                      </m:r>
+                      <m:d>
+                        <m:dPr>
+                          <m:ctrlPr>
+                            <a:rPr lang="en-AU" b="0" i="1" smtClean="0">
+                              <a:latin typeface="Cambria Math" panose="02040503050406030204" pitchFamily="18" charset="0"/>
+                            </a:rPr>
+                          </m:ctrlPr>
+                        </m:dPr>
+                        <m:e>
+                          <m:sSub>
+                            <m:sSubPr>
+                              <m:ctrlPr>
+                                <a:rPr lang="en-AU" b="0" i="1" smtClean="0">
+                                  <a:latin typeface="Cambria Math" panose="02040503050406030204" pitchFamily="18" charset="0"/>
+                                </a:rPr>
+                              </m:ctrlPr>
+                            </m:sSubPr>
+                            <m:e>
+                              <m:r>
+                                <a:rPr lang="en-AU" b="0" i="1" smtClean="0">
+                                  <a:latin typeface="Cambria Math" panose="02040503050406030204" pitchFamily="18" charset="0"/>
+                                </a:rPr>
+                                <m:t>𝐿</m:t>
+                              </m:r>
+                            </m:e>
+                            <m:sub>
+                              <m:r>
+                                <a:rPr lang="en-AU" b="0" i="1" smtClean="0">
+                                  <a:latin typeface="Cambria Math" panose="02040503050406030204" pitchFamily="18" charset="0"/>
+                                </a:rPr>
+                                <m:t>𝐶𝐸</m:t>
+                              </m:r>
+                            </m:sub>
+                          </m:sSub>
+                        </m:e>
+                      </m:d>
+                      <m:r>
+                        <a:rPr lang="en-AU" b="0" i="1" smtClean="0">
+                          <a:latin typeface="Cambria Math" panose="02040503050406030204" pitchFamily="18" charset="0"/>
+                        </a:rPr>
+                        <m:t>=− </m:t>
+                      </m:r>
+                      <m:nary>
+                        <m:naryPr>
+                          <m:chr m:val="∑"/>
+                          <m:ctrlPr>
+                            <a:rPr lang="en-AU" b="0" i="1" smtClean="0">
+                              <a:latin typeface="Cambria Math" panose="02040503050406030204" pitchFamily="18" charset="0"/>
+                            </a:rPr>
+                          </m:ctrlPr>
+                        </m:naryPr>
+                        <m:sub>
+                          <m:r>
+                            <m:rPr>
+                              <m:brk m:alnAt="23"/>
+                            </m:rPr>
+                            <a:rPr lang="en-AU" b="0" i="1" smtClean="0">
+                              <a:latin typeface="Cambria Math" panose="02040503050406030204" pitchFamily="18" charset="0"/>
+                            </a:rPr>
+                            <m:t>𝑖</m:t>
+                          </m:r>
+                          <m:r>
+                            <a:rPr lang="en-AU" b="0" i="1" smtClean="0">
+                              <a:latin typeface="Cambria Math" panose="02040503050406030204" pitchFamily="18" charset="0"/>
+                            </a:rPr>
+                            <m:t>=1</m:t>
+                          </m:r>
+                        </m:sub>
+                        <m:sup>
+                          <m:r>
+                            <a:rPr lang="en-AU" b="0" i="1" smtClean="0">
+                              <a:latin typeface="Cambria Math" panose="02040503050406030204" pitchFamily="18" charset="0"/>
+                            </a:rPr>
+                            <m:t>𝑛</m:t>
+                          </m:r>
+                        </m:sup>
+                        <m:e>
+                          <m:sSub>
+                            <m:sSubPr>
+                              <m:ctrlPr>
+                                <a:rPr lang="en-AU" b="0" i="1" smtClean="0">
+                                  <a:latin typeface="Cambria Math" panose="02040503050406030204" pitchFamily="18" charset="0"/>
+                                </a:rPr>
+                              </m:ctrlPr>
+                            </m:sSubPr>
+                            <m:e>
+                              <m:r>
+                                <a:rPr lang="en-AU" b="0" i="1" smtClean="0">
+                                  <a:latin typeface="Cambria Math" panose="02040503050406030204" pitchFamily="18" charset="0"/>
+                                </a:rPr>
+                                <m:t>𝑡</m:t>
+                              </m:r>
+                            </m:e>
+                            <m:sub>
+                              <m:r>
+                                <a:rPr lang="en-AU" b="0" i="1" smtClean="0">
+                                  <a:latin typeface="Cambria Math" panose="02040503050406030204" pitchFamily="18" charset="0"/>
+                                </a:rPr>
+                                <m:t>𝑖</m:t>
+                              </m:r>
+                            </m:sub>
+                          </m:sSub>
+                          <m:func>
+                            <m:funcPr>
+                              <m:ctrlPr>
+                                <a:rPr lang="en-AU" b="0" i="1" smtClean="0">
+                                  <a:latin typeface="Cambria Math" panose="02040503050406030204" pitchFamily="18" charset="0"/>
+                                </a:rPr>
+                              </m:ctrlPr>
+                            </m:funcPr>
+                            <m:fName>
+                              <m:r>
+                                <m:rPr>
+                                  <m:sty m:val="p"/>
+                                </m:rPr>
+                                <a:rPr lang="en-AU" b="0" i="0" smtClean="0">
+                                  <a:latin typeface="Cambria Math" panose="02040503050406030204" pitchFamily="18" charset="0"/>
+                                </a:rPr>
+                                <m:t>log</m:t>
+                              </m:r>
+                            </m:fName>
+                            <m:e>
+                              <m:d>
+                                <m:dPr>
+                                  <m:ctrlPr>
+                                    <a:rPr lang="en-AU" b="0" i="1" smtClean="0">
+                                      <a:latin typeface="Cambria Math" panose="02040503050406030204" pitchFamily="18" charset="0"/>
+                                    </a:rPr>
+                                  </m:ctrlPr>
+                                </m:dPr>
+                                <m:e>
+                                  <m:sSub>
+                                    <m:sSubPr>
+                                      <m:ctrlPr>
+                                        <a:rPr lang="en-AU" b="0" i="1" smtClean="0">
+                                          <a:latin typeface="Cambria Math" panose="02040503050406030204" pitchFamily="18" charset="0"/>
+                                        </a:rPr>
+                                      </m:ctrlPr>
+                                    </m:sSubPr>
+                                    <m:e>
+                                      <m:r>
+                                        <a:rPr lang="en-AU" b="0" i="1" smtClean="0">
+                                          <a:latin typeface="Cambria Math" panose="02040503050406030204" pitchFamily="18" charset="0"/>
+                                        </a:rPr>
+                                        <m:t>𝑝</m:t>
+                                      </m:r>
+                                    </m:e>
+                                    <m:sub>
+                                      <m:r>
+                                        <a:rPr lang="en-AU" b="0" i="1" smtClean="0">
+                                          <a:latin typeface="Cambria Math" panose="02040503050406030204" pitchFamily="18" charset="0"/>
+                                        </a:rPr>
+                                        <m:t>𝑖</m:t>
+                                      </m:r>
+                                    </m:sub>
+                                  </m:sSub>
+                                </m:e>
+                              </m:d>
+                            </m:e>
+                          </m:func>
+                          <m:r>
+                            <a:rPr lang="en-AU" b="0" i="1" smtClean="0">
+                              <a:latin typeface="Cambria Math" panose="02040503050406030204" pitchFamily="18" charset="0"/>
+                            </a:rPr>
+                            <m:t>, </m:t>
+                          </m:r>
+                          <m:r>
+                            <a:rPr lang="en-AU" b="0" i="1" smtClean="0">
+                              <a:latin typeface="Cambria Math" panose="02040503050406030204" pitchFamily="18" charset="0"/>
+                            </a:rPr>
+                            <m:t>𝑓𝑜𝑟</m:t>
+                          </m:r>
+                          <m:r>
+                            <a:rPr lang="en-AU" b="0" i="1" smtClean="0">
+                              <a:latin typeface="Cambria Math" panose="02040503050406030204" pitchFamily="18" charset="0"/>
+                            </a:rPr>
+                            <m:t> </m:t>
+                          </m:r>
+                          <m:r>
+                            <a:rPr lang="en-AU" b="0" i="1" smtClean="0">
+                              <a:latin typeface="Cambria Math" panose="02040503050406030204" pitchFamily="18" charset="0"/>
+                            </a:rPr>
+                            <m:t>𝑛</m:t>
+                          </m:r>
+                          <m:r>
+                            <a:rPr lang="en-AU" b="0" i="1" smtClean="0">
+                              <a:latin typeface="Cambria Math" panose="02040503050406030204" pitchFamily="18" charset="0"/>
+                            </a:rPr>
+                            <m:t> </m:t>
+                          </m:r>
+                          <m:r>
+                            <a:rPr lang="en-AU" b="0" i="1" smtClean="0">
+                              <a:latin typeface="Cambria Math" panose="02040503050406030204" pitchFamily="18" charset="0"/>
+                            </a:rPr>
+                            <m:t>𝑐𝑙𝑎𝑠𝑠𝑒𝑠</m:t>
+                          </m:r>
+                        </m:e>
+                      </m:nary>
+                      <m:r>
+                        <a:rPr lang="en-AU" b="0" i="1" smtClean="0">
+                          <a:latin typeface="Cambria Math" panose="02040503050406030204" pitchFamily="18" charset="0"/>
+                        </a:rPr>
+                        <m:t> </m:t>
+                      </m:r>
+                    </m:oMath>
+                  </m:oMathPara>
+                </a14:m>
+                <a:endParaRPr lang="en-US" dirty="0"/>
+              </a:p>
+              <a:p>
+                <a:r>
+                  <a:rPr lang="en-US" dirty="0"/>
+                  <a:t>Where </a:t>
+                </a:r>
+                <a14:m>
+                  <m:oMath xmlns:m="http://schemas.openxmlformats.org/officeDocument/2006/math">
+                    <m:sSub>
+                      <m:sSubPr>
+                        <m:ctrlPr>
+                          <a:rPr lang="en-AU" b="0" i="1" smtClean="0">
+                            <a:latin typeface="Cambria Math" panose="02040503050406030204" pitchFamily="18" charset="0"/>
+                          </a:rPr>
+                        </m:ctrlPr>
+                      </m:sSubPr>
+                      <m:e>
+                        <m:r>
+                          <a:rPr lang="en-AU" b="0" i="1" smtClean="0">
+                            <a:latin typeface="Cambria Math" panose="02040503050406030204" pitchFamily="18" charset="0"/>
+                          </a:rPr>
+                          <m:t>𝑡</m:t>
+                        </m:r>
+                      </m:e>
+                      <m:sub>
+                        <m:r>
+                          <a:rPr lang="en-AU" b="0" i="1" smtClean="0">
+                            <a:latin typeface="Cambria Math" panose="02040503050406030204" pitchFamily="18" charset="0"/>
+                          </a:rPr>
+                          <m:t>𝑖</m:t>
+                        </m:r>
+                      </m:sub>
+                    </m:sSub>
+                  </m:oMath>
+                </a14:m>
+                <a:r>
+                  <a:rPr lang="en-US" dirty="0"/>
+                  <a:t> - truth label, </a:t>
+                </a:r>
+                <a14:m>
+                  <m:oMath xmlns:m="http://schemas.openxmlformats.org/officeDocument/2006/math">
+                    <m:sSub>
+                      <m:sSubPr>
+                        <m:ctrlPr>
+                          <a:rPr lang="en-AU" b="0" i="1" smtClean="0">
+                            <a:latin typeface="Cambria Math" panose="02040503050406030204" pitchFamily="18" charset="0"/>
+                          </a:rPr>
+                        </m:ctrlPr>
+                      </m:sSubPr>
+                      <m:e>
+                        <m:r>
+                          <a:rPr lang="en-AU" b="0" i="1" smtClean="0">
+                            <a:latin typeface="Cambria Math" panose="02040503050406030204" pitchFamily="18" charset="0"/>
+                          </a:rPr>
+                          <m:t>𝑝</m:t>
+                        </m:r>
+                      </m:e>
+                      <m:sub>
+                        <m:r>
+                          <a:rPr lang="en-AU" b="0" i="1" smtClean="0">
+                            <a:latin typeface="Cambria Math" panose="02040503050406030204" pitchFamily="18" charset="0"/>
+                          </a:rPr>
+                          <m:t>𝑖</m:t>
+                        </m:r>
+                      </m:sub>
+                    </m:sSub>
+                  </m:oMath>
+                </a14:m>
+                <a:r>
+                  <a:rPr lang="en-US" dirty="0"/>
+                  <a:t> - </a:t>
+                </a:r>
+                <a:r>
+                  <a:rPr lang="en-US" dirty="0" err="1"/>
+                  <a:t>Softmax</a:t>
+                </a:r>
+                <a:r>
+                  <a:rPr lang="en-US" dirty="0"/>
+                  <a:t> probability for </a:t>
+                </a:r>
+                <a14:m>
+                  <m:oMath xmlns:m="http://schemas.openxmlformats.org/officeDocument/2006/math">
+                    <m:sSup>
+                      <m:sSupPr>
+                        <m:ctrlPr>
+                          <a:rPr lang="en-AU" b="0" i="1" smtClean="0">
+                            <a:latin typeface="Cambria Math" panose="02040503050406030204" pitchFamily="18" charset="0"/>
+                          </a:rPr>
+                        </m:ctrlPr>
+                      </m:sSupPr>
+                      <m:e>
+                        <m:r>
+                          <a:rPr lang="en-AU" b="0" i="1" smtClean="0">
+                            <a:latin typeface="Cambria Math" panose="02040503050406030204" pitchFamily="18" charset="0"/>
+                          </a:rPr>
+                          <m:t>𝑖</m:t>
+                        </m:r>
+                      </m:e>
+                      <m:sup>
+                        <m:r>
+                          <a:rPr lang="en-AU" b="0" i="1" smtClean="0">
+                            <a:latin typeface="Cambria Math" panose="02040503050406030204" pitchFamily="18" charset="0"/>
+                          </a:rPr>
+                          <m:t>𝑡h</m:t>
+                        </m:r>
+                      </m:sup>
+                    </m:sSup>
+                  </m:oMath>
+                </a14:m>
+                <a:r>
+                  <a:rPr lang="en-US" dirty="0"/>
+                  <a:t> class</a:t>
+                </a:r>
+              </a:p>
+            </p:txBody>
+          </p:sp>
+        </mc:Choice>
+        <mc:Fallback>
+          <p:sp>
+            <p:nvSpPr>
+              <p:cNvPr id="3" name="Content Placeholder 2">
+                <a:extLst>
+                  <a:ext uri="{FF2B5EF4-FFF2-40B4-BE49-F238E27FC236}">
+                    <a16:creationId xmlns:a16="http://schemas.microsoft.com/office/drawing/2014/main" id="{1902F06A-DBBA-FAC1-6F16-EDA8BADAA57F}"/>
+                  </a:ext>
+                </a:extLst>
+              </p:cNvPr>
+              <p:cNvSpPr>
+                <a:spLocks noGrp="1" noRot="1" noChangeAspect="1" noMove="1" noResize="1" noEditPoints="1" noAdjustHandles="1" noChangeArrowheads="1" noChangeShapeType="1" noTextEdit="1"/>
+              </p:cNvSpPr>
+              <p:nvPr>
+                <p:ph idx="1"/>
+              </p:nvPr>
+            </p:nvSpPr>
+            <p:spPr>
+              <a:blipFill>
+                <a:blip r:embed="rId2"/>
+                <a:stretch>
+                  <a:fillRect l="-928" t="-3501"/>
+                </a:stretch>
+              </a:blipFill>
+            </p:spPr>
+            <p:txBody>
+              <a:bodyPr/>
+              <a:lstStyle/>
+              <a:p>
+                <a:r>
+                  <a:rPr lang="en-AU">
+                    <a:noFill/>
+                  </a:rPr>
+                  <a:t> </a:t>
+                </a:r>
+              </a:p>
+            </p:txBody>
+          </p:sp>
+        </mc:Fallback>
+      </mc:AlternateContent>
     </p:spTree>
     <p:extLst>
       <p:ext uri="{BB962C8B-B14F-4D97-AF65-F5344CB8AC3E}">
@@ -29938,7 +31268,7 @@
 </p:sld>
 </file>
 
-<file path=ppt/slides/slide24.xml><?xml version="1.0" encoding="utf-8"?>
+<file path=ppt/slides/slide25.xml><?xml version="1.0" encoding="utf-8"?>
 <p:sld xmlns:a="http://schemas.openxmlformats.org/drawingml/2006/main" xmlns:r="http://schemas.openxmlformats.org/officeDocument/2006/relationships" xmlns:p="http://schemas.openxmlformats.org/presentationml/2006/main">
   <p:cSld>
     <p:spTree>
@@ -30021,7 +31351,7 @@
 </p:sld>
 </file>
 
-<file path=ppt/slides/slide25.xml><?xml version="1.0" encoding="utf-8"?>
+<file path=ppt/slides/slide26.xml><?xml version="1.0" encoding="utf-8"?>
 <p:sld xmlns:a="http://schemas.openxmlformats.org/drawingml/2006/main" xmlns:r="http://schemas.openxmlformats.org/officeDocument/2006/relationships" xmlns:p="http://schemas.openxmlformats.org/presentationml/2006/main">
   <p:cSld>
     <p:spTree>
@@ -30615,8 +31945,8 @@
           </a:p>
         </p:txBody>
       </p:sp>
-      <mc:AlternateContent xmlns:mc="http://schemas.openxmlformats.org/markup-compatibility/2006">
-        <mc:Choice xmlns:a14="http://schemas.microsoft.com/office/drawing/2010/main" Requires="a14">
+      <mc:AlternateContent xmlns:mc="http://schemas.openxmlformats.org/markup-compatibility/2006" xmlns:a14="http://schemas.microsoft.com/office/drawing/2010/main">
+        <mc:Choice Requires="a14">
           <p:sp>
             <p:nvSpPr>
               <p:cNvPr id="3" name="Content Placeholder 2">
@@ -30825,14 +32155,7 @@
                         <a:latin typeface="Cambria Math" panose="02040503050406030204" pitchFamily="18" charset="0"/>
                         <a:ea typeface="Cambria Math" panose="02040503050406030204" pitchFamily="18" charset="0"/>
                       </a:rPr>
-                      <m:t> ∀</m:t>
-                    </m:r>
-                    <m:r>
-                      <a:rPr lang="en-US" b="0" i="1" dirty="0" smtClean="0">
-                        <a:latin typeface="Cambria Math" panose="02040503050406030204" pitchFamily="18" charset="0"/>
-                        <a:ea typeface="Cambria Math" panose="02040503050406030204" pitchFamily="18" charset="0"/>
-                      </a:rPr>
-                      <m:t> </m:t>
+                      <m:t> ∀ </m:t>
                     </m:r>
                     <m:r>
                       <a:rPr lang="en-US" b="0" i="1" dirty="0" smtClean="0">
@@ -30980,7 +32303,7 @@
             </p:txBody>
           </p:sp>
         </mc:Choice>
-        <mc:Fallback>
+        <mc:Fallback xmlns="">
           <p:sp>
             <p:nvSpPr>
               <p:cNvPr id="3" name="Content Placeholder 2">

</xml_diff>

<commit_message>
Trial of Missclassification Error
</commit_message>
<xml_diff>
--- a/DecisionTrees/DecisionTrees.pptx
+++ b/DecisionTrees/DecisionTrees.pptx
@@ -26,11 +26,12 @@
     <p:sldId id="260" r:id="rId20"/>
     <p:sldId id="261" r:id="rId21"/>
     <p:sldId id="282" r:id="rId22"/>
-    <p:sldId id="283" r:id="rId23"/>
-    <p:sldId id="284" r:id="rId24"/>
-    <p:sldId id="262" r:id="rId25"/>
-    <p:sldId id="278" r:id="rId26"/>
-    <p:sldId id="279" r:id="rId27"/>
+    <p:sldId id="285" r:id="rId23"/>
+    <p:sldId id="283" r:id="rId24"/>
+    <p:sldId id="284" r:id="rId25"/>
+    <p:sldId id="262" r:id="rId26"/>
+    <p:sldId id="278" r:id="rId27"/>
+    <p:sldId id="279" r:id="rId28"/>
   </p:sldIdLst>
   <p:sldSz cx="12192000" cy="6858000"/>
   <p:notesSz cx="6858000" cy="9144000"/>
@@ -8556,7 +8557,7 @@
           <a:p>
             <a:fld id="{7E292AB8-5F8F-4402-9592-F9413DCC0C16}" type="datetimeFigureOut">
               <a:rPr lang="en-US" smtClean="0"/>
-              <a:t>7/10/2023</a:t>
+              <a:t>7/12/2023</a:t>
             </a:fld>
             <a:endParaRPr lang="en-US"/>
           </a:p>
@@ -8754,7 +8755,7 @@
           <a:p>
             <a:fld id="{7E292AB8-5F8F-4402-9592-F9413DCC0C16}" type="datetimeFigureOut">
               <a:rPr lang="en-US" smtClean="0"/>
-              <a:t>7/10/2023</a:t>
+              <a:t>7/12/2023</a:t>
             </a:fld>
             <a:endParaRPr lang="en-US"/>
           </a:p>
@@ -8962,7 +8963,7 @@
           <a:p>
             <a:fld id="{7E292AB8-5F8F-4402-9592-F9413DCC0C16}" type="datetimeFigureOut">
               <a:rPr lang="en-US" smtClean="0"/>
-              <a:t>7/10/2023</a:t>
+              <a:t>7/12/2023</a:t>
             </a:fld>
             <a:endParaRPr lang="en-US"/>
           </a:p>
@@ -9160,7 +9161,7 @@
           <a:p>
             <a:fld id="{7E292AB8-5F8F-4402-9592-F9413DCC0C16}" type="datetimeFigureOut">
               <a:rPr lang="en-US" smtClean="0"/>
-              <a:t>7/10/2023</a:t>
+              <a:t>7/12/2023</a:t>
             </a:fld>
             <a:endParaRPr lang="en-US"/>
           </a:p>
@@ -9435,7 +9436,7 @@
           <a:p>
             <a:fld id="{7E292AB8-5F8F-4402-9592-F9413DCC0C16}" type="datetimeFigureOut">
               <a:rPr lang="en-US" smtClean="0"/>
-              <a:t>7/10/2023</a:t>
+              <a:t>7/12/2023</a:t>
             </a:fld>
             <a:endParaRPr lang="en-US"/>
           </a:p>
@@ -9700,7 +9701,7 @@
           <a:p>
             <a:fld id="{7E292AB8-5F8F-4402-9592-F9413DCC0C16}" type="datetimeFigureOut">
               <a:rPr lang="en-US" smtClean="0"/>
-              <a:t>7/10/2023</a:t>
+              <a:t>7/12/2023</a:t>
             </a:fld>
             <a:endParaRPr lang="en-US"/>
           </a:p>
@@ -10112,7 +10113,7 @@
           <a:p>
             <a:fld id="{7E292AB8-5F8F-4402-9592-F9413DCC0C16}" type="datetimeFigureOut">
               <a:rPr lang="en-US" smtClean="0"/>
-              <a:t>7/10/2023</a:t>
+              <a:t>7/12/2023</a:t>
             </a:fld>
             <a:endParaRPr lang="en-US"/>
           </a:p>
@@ -10253,7 +10254,7 @@
           <a:p>
             <a:fld id="{7E292AB8-5F8F-4402-9592-F9413DCC0C16}" type="datetimeFigureOut">
               <a:rPr lang="en-US" smtClean="0"/>
-              <a:t>7/10/2023</a:t>
+              <a:t>7/12/2023</a:t>
             </a:fld>
             <a:endParaRPr lang="en-US"/>
           </a:p>
@@ -10366,7 +10367,7 @@
           <a:p>
             <a:fld id="{7E292AB8-5F8F-4402-9592-F9413DCC0C16}" type="datetimeFigureOut">
               <a:rPr lang="en-US" smtClean="0"/>
-              <a:t>7/10/2023</a:t>
+              <a:t>7/12/2023</a:t>
             </a:fld>
             <a:endParaRPr lang="en-US"/>
           </a:p>
@@ -10677,7 +10678,7 @@
           <a:p>
             <a:fld id="{7E292AB8-5F8F-4402-9592-F9413DCC0C16}" type="datetimeFigureOut">
               <a:rPr lang="en-US" smtClean="0"/>
-              <a:t>7/10/2023</a:t>
+              <a:t>7/12/2023</a:t>
             </a:fld>
             <a:endParaRPr lang="en-US"/>
           </a:p>
@@ -10965,7 +10966,7 @@
           <a:p>
             <a:fld id="{7E292AB8-5F8F-4402-9592-F9413DCC0C16}" type="datetimeFigureOut">
               <a:rPr lang="en-US" smtClean="0"/>
-              <a:t>7/10/2023</a:t>
+              <a:t>7/12/2023</a:t>
             </a:fld>
             <a:endParaRPr lang="en-US"/>
           </a:p>
@@ -11206,7 +11207,7 @@
           <a:p>
             <a:fld id="{7E292AB8-5F8F-4402-9592-F9413DCC0C16}" type="datetimeFigureOut">
               <a:rPr lang="en-US" smtClean="0"/>
-              <a:t>7/10/2023</a:t>
+              <a:t>7/12/2023</a:t>
             </a:fld>
             <a:endParaRPr lang="en-US"/>
           </a:p>
@@ -27542,6 +27543,2228 @@
           <p:cNvPr id="2" name="Title 1">
             <a:extLst>
               <a:ext uri="{FF2B5EF4-FFF2-40B4-BE49-F238E27FC236}">
+                <a16:creationId xmlns:a16="http://schemas.microsoft.com/office/drawing/2014/main" id="{38EE15E2-EFCE-286C-7DAA-D21755E3D404}"/>
+              </a:ext>
+            </a:extLst>
+          </p:cNvPr>
+          <p:cNvSpPr>
+            <a:spLocks noGrp="1"/>
+          </p:cNvSpPr>
+          <p:nvPr>
+            <p:ph type="title"/>
+          </p:nvPr>
+        </p:nvSpPr>
+        <p:spPr/>
+        <p:txBody>
+          <a:bodyPr/>
+          <a:lstStyle/>
+          <a:p>
+            <a:endParaRPr lang="en-US"/>
+          </a:p>
+        </p:txBody>
+      </p:sp>
+      <p:sp>
+        <p:nvSpPr>
+          <p:cNvPr id="4" name="Oval 3">
+            <a:extLst>
+              <a:ext uri="{FF2B5EF4-FFF2-40B4-BE49-F238E27FC236}">
+                <a16:creationId xmlns:a16="http://schemas.microsoft.com/office/drawing/2014/main" id="{AA92FE50-245A-5820-5CF0-0B57306ED493}"/>
+              </a:ext>
+            </a:extLst>
+          </p:cNvPr>
+          <p:cNvSpPr/>
+          <p:nvPr/>
+        </p:nvSpPr>
+        <p:spPr>
+          <a:xfrm>
+            <a:off x="3867325" y="2801923"/>
+            <a:ext cx="3674378" cy="1610686"/>
+          </a:xfrm>
+          <a:prstGeom prst="ellipse">
+            <a:avLst/>
+          </a:prstGeom>
+        </p:spPr>
+        <p:style>
+          <a:lnRef idx="2">
+            <a:schemeClr val="accent1">
+              <a:shade val="50000"/>
+            </a:schemeClr>
+          </a:lnRef>
+          <a:fillRef idx="1">
+            <a:schemeClr val="accent1"/>
+          </a:fillRef>
+          <a:effectRef idx="0">
+            <a:schemeClr val="accent1"/>
+          </a:effectRef>
+          <a:fontRef idx="minor">
+            <a:schemeClr val="lt1"/>
+          </a:fontRef>
+        </p:style>
+        <p:txBody>
+          <a:bodyPr rtlCol="0" anchor="ctr"/>
+          <a:lstStyle/>
+          <a:p>
+            <a:pPr algn="ctr"/>
+            <a:endParaRPr lang="en-US" dirty="0"/>
+          </a:p>
+        </p:txBody>
+      </p:sp>
+      <p:cxnSp>
+        <p:nvCxnSpPr>
+          <p:cNvPr id="6" name="Straight Connector 5">
+            <a:extLst>
+              <a:ext uri="{FF2B5EF4-FFF2-40B4-BE49-F238E27FC236}">
+                <a16:creationId xmlns:a16="http://schemas.microsoft.com/office/drawing/2014/main" id="{F2DB9599-7A0A-DC70-4D35-20F8DF8A21A4}"/>
+              </a:ext>
+            </a:extLst>
+          </p:cNvPr>
+          <p:cNvCxnSpPr>
+            <a:cxnSpLocks/>
+            <a:endCxn id="4" idx="3"/>
+          </p:cNvCxnSpPr>
+          <p:nvPr/>
+        </p:nvCxnSpPr>
+        <p:spPr>
+          <a:xfrm flipH="1">
+            <a:off x="4405425" y="2801923"/>
+            <a:ext cx="1299089" cy="1374806"/>
+          </a:xfrm>
+          <a:prstGeom prst="line">
+            <a:avLst/>
+          </a:prstGeom>
+        </p:spPr>
+        <p:style>
+          <a:lnRef idx="1">
+            <a:schemeClr val="accent2"/>
+          </a:lnRef>
+          <a:fillRef idx="0">
+            <a:schemeClr val="accent2"/>
+          </a:fillRef>
+          <a:effectRef idx="0">
+            <a:schemeClr val="accent2"/>
+          </a:effectRef>
+          <a:fontRef idx="minor">
+            <a:schemeClr val="tx1"/>
+          </a:fontRef>
+        </p:style>
+      </p:cxnSp>
+      <p:sp>
+        <p:nvSpPr>
+          <p:cNvPr id="7" name="TextBox 6">
+            <a:extLst>
+              <a:ext uri="{FF2B5EF4-FFF2-40B4-BE49-F238E27FC236}">
+                <a16:creationId xmlns:a16="http://schemas.microsoft.com/office/drawing/2014/main" id="{A7482257-C89D-3B85-5563-EFCBEDD4D77C}"/>
+              </a:ext>
+            </a:extLst>
+          </p:cNvPr>
+          <p:cNvSpPr txBox="1"/>
+          <p:nvPr/>
+        </p:nvSpPr>
+        <p:spPr>
+          <a:xfrm>
+            <a:off x="3719994" y="2973987"/>
+            <a:ext cx="1571456" cy="369332"/>
+          </a:xfrm>
+          <a:prstGeom prst="rect">
+            <a:avLst/>
+          </a:prstGeom>
+          <a:noFill/>
+        </p:spPr>
+        <p:txBody>
+          <a:bodyPr wrap="none" rtlCol="0">
+            <a:spAutoFit/>
+          </a:bodyPr>
+          <a:lstStyle/>
+          <a:p>
+            <a:r>
+              <a:rPr lang="en-US" dirty="0"/>
+              <a:t>20% Ice Cream</a:t>
+            </a:r>
+          </a:p>
+        </p:txBody>
+      </p:sp>
+      <p:sp>
+        <p:nvSpPr>
+          <p:cNvPr id="8" name="TextBox 7">
+            <a:extLst>
+              <a:ext uri="{FF2B5EF4-FFF2-40B4-BE49-F238E27FC236}">
+                <a16:creationId xmlns:a16="http://schemas.microsoft.com/office/drawing/2014/main" id="{9A50357D-195B-E3AA-67BA-D61D215D88A5}"/>
+              </a:ext>
+            </a:extLst>
+          </p:cNvPr>
+          <p:cNvSpPr txBox="1"/>
+          <p:nvPr/>
+        </p:nvSpPr>
+        <p:spPr>
+          <a:xfrm>
+            <a:off x="6096000" y="3598877"/>
+            <a:ext cx="1034257" cy="369332"/>
+          </a:xfrm>
+          <a:prstGeom prst="rect">
+            <a:avLst/>
+          </a:prstGeom>
+          <a:noFill/>
+        </p:spPr>
+        <p:txBody>
+          <a:bodyPr wrap="none" rtlCol="0">
+            <a:spAutoFit/>
+          </a:bodyPr>
+          <a:lstStyle/>
+          <a:p>
+            <a:r>
+              <a:rPr lang="en-US" dirty="0"/>
+              <a:t>75% </a:t>
+            </a:r>
+            <a:r>
+              <a:rPr lang="en-US" dirty="0" err="1"/>
+              <a:t>Bajji</a:t>
+            </a:r>
+            <a:endParaRPr lang="en-US" dirty="0"/>
+          </a:p>
+        </p:txBody>
+      </p:sp>
+      <p:sp>
+        <p:nvSpPr>
+          <p:cNvPr id="11" name="Freeform: Shape 10">
+            <a:extLst>
+              <a:ext uri="{FF2B5EF4-FFF2-40B4-BE49-F238E27FC236}">
+                <a16:creationId xmlns:a16="http://schemas.microsoft.com/office/drawing/2014/main" id="{377DF1B8-A5C6-BF2D-17F0-FD88DC3DC249}"/>
+              </a:ext>
+            </a:extLst>
+          </p:cNvPr>
+          <p:cNvSpPr/>
+          <p:nvPr/>
+        </p:nvSpPr>
+        <p:spPr>
+          <a:xfrm>
+            <a:off x="5144118" y="2801923"/>
+            <a:ext cx="736025" cy="1588658"/>
+          </a:xfrm>
+          <a:custGeom>
+            <a:avLst/>
+            <a:gdLst>
+              <a:gd name="connsiteX0" fmla="*/ 677842 w 736025"/>
+              <a:gd name="connsiteY0" fmla="*/ 0 h 1588658"/>
+              <a:gd name="connsiteX1" fmla="*/ 669453 w 736025"/>
+              <a:gd name="connsiteY1" fmla="*/ 813732 h 1588658"/>
+              <a:gd name="connsiteX2" fmla="*/ 6722 w 736025"/>
+              <a:gd name="connsiteY2" fmla="*/ 1551963 h 1588658"/>
+            </a:gdLst>
+            <a:ahLst/>
+            <a:cxnLst>
+              <a:cxn ang="0">
+                <a:pos x="connsiteX0" y="connsiteY0"/>
+              </a:cxn>
+              <a:cxn ang="0">
+                <a:pos x="connsiteX1" y="connsiteY1"/>
+              </a:cxn>
+              <a:cxn ang="0">
+                <a:pos x="connsiteX2" y="connsiteY2"/>
+              </a:cxn>
+            </a:cxnLst>
+            <a:rect l="l" t="t" r="r" b="b"/>
+            <a:pathLst>
+              <a:path w="736025" h="1588658">
+                <a:moveTo>
+                  <a:pt x="677842" y="0"/>
+                </a:moveTo>
+                <a:cubicBezTo>
+                  <a:pt x="729574" y="277536"/>
+                  <a:pt x="781306" y="555072"/>
+                  <a:pt x="669453" y="813732"/>
+                </a:cubicBezTo>
+                <a:cubicBezTo>
+                  <a:pt x="557600" y="1072392"/>
+                  <a:pt x="-71575" y="1753299"/>
+                  <a:pt x="6722" y="1551963"/>
+                </a:cubicBezTo>
+              </a:path>
+            </a:pathLst>
+          </a:custGeom>
+          <a:noFill/>
+        </p:spPr>
+        <p:style>
+          <a:lnRef idx="2">
+            <a:schemeClr val="accent1">
+              <a:shade val="50000"/>
+            </a:schemeClr>
+          </a:lnRef>
+          <a:fillRef idx="1">
+            <a:schemeClr val="accent1"/>
+          </a:fillRef>
+          <a:effectRef idx="0">
+            <a:schemeClr val="accent1"/>
+          </a:effectRef>
+          <a:fontRef idx="minor">
+            <a:schemeClr val="lt1"/>
+          </a:fontRef>
+        </p:style>
+        <p:txBody>
+          <a:bodyPr rtlCol="0" anchor="ctr"/>
+          <a:lstStyle/>
+          <a:p>
+            <a:pPr algn="ctr"/>
+            <a:endParaRPr lang="en-US"/>
+          </a:p>
+        </p:txBody>
+      </p:sp>
+      <p:sp>
+        <p:nvSpPr>
+          <p:cNvPr id="12" name="TextBox 11">
+            <a:extLst>
+              <a:ext uri="{FF2B5EF4-FFF2-40B4-BE49-F238E27FC236}">
+                <a16:creationId xmlns:a16="http://schemas.microsoft.com/office/drawing/2014/main" id="{292A4A18-74F0-D0FB-86CF-B5DBB5A242A4}"/>
+              </a:ext>
+            </a:extLst>
+          </p:cNvPr>
+          <p:cNvSpPr txBox="1"/>
+          <p:nvPr/>
+        </p:nvSpPr>
+        <p:spPr>
+          <a:xfrm rot="18953054">
+            <a:off x="4806947" y="3575358"/>
+            <a:ext cx="917239" cy="369332"/>
+          </a:xfrm>
+          <a:prstGeom prst="rect">
+            <a:avLst/>
+          </a:prstGeom>
+          <a:noFill/>
+        </p:spPr>
+        <p:txBody>
+          <a:bodyPr wrap="none" rtlCol="0">
+            <a:spAutoFit/>
+          </a:bodyPr>
+          <a:lstStyle/>
+          <a:p>
+            <a:r>
+              <a:rPr lang="en-US" dirty="0"/>
+              <a:t>5% </a:t>
+            </a:r>
+            <a:r>
+              <a:rPr lang="en-US" dirty="0" err="1"/>
+              <a:t>Bajji</a:t>
+            </a:r>
+            <a:endParaRPr lang="en-US" dirty="0"/>
+          </a:p>
+        </p:txBody>
+      </p:sp>
+      <p:sp>
+        <p:nvSpPr>
+          <p:cNvPr id="13" name="TextBox 12">
+            <a:extLst>
+              <a:ext uri="{FF2B5EF4-FFF2-40B4-BE49-F238E27FC236}">
+                <a16:creationId xmlns:a16="http://schemas.microsoft.com/office/drawing/2014/main" id="{4F96EAAA-D3AF-99D5-67C9-4EDC953EBF63}"/>
+              </a:ext>
+            </a:extLst>
+          </p:cNvPr>
+          <p:cNvSpPr txBox="1"/>
+          <p:nvPr/>
+        </p:nvSpPr>
+        <p:spPr>
+          <a:xfrm>
+            <a:off x="5311312" y="2789321"/>
+            <a:ext cx="540533" cy="369332"/>
+          </a:xfrm>
+          <a:prstGeom prst="rect">
+            <a:avLst/>
+          </a:prstGeom>
+          <a:noFill/>
+        </p:spPr>
+        <p:txBody>
+          <a:bodyPr wrap="none" rtlCol="0">
+            <a:spAutoFit/>
+          </a:bodyPr>
+          <a:lstStyle/>
+          <a:p>
+            <a:r>
+              <a:rPr lang="en-US" dirty="0"/>
+              <a:t>C_1</a:t>
+            </a:r>
+          </a:p>
+        </p:txBody>
+      </p:sp>
+      <p:sp>
+        <p:nvSpPr>
+          <p:cNvPr id="14" name="TextBox 13">
+            <a:extLst>
+              <a:ext uri="{FF2B5EF4-FFF2-40B4-BE49-F238E27FC236}">
+                <a16:creationId xmlns:a16="http://schemas.microsoft.com/office/drawing/2014/main" id="{72877A92-F08E-5D05-58EC-DBAC53E5343D}"/>
+              </a:ext>
+            </a:extLst>
+          </p:cNvPr>
+          <p:cNvSpPr txBox="1"/>
+          <p:nvPr/>
+        </p:nvSpPr>
+        <p:spPr>
+          <a:xfrm>
+            <a:off x="6096271" y="2889791"/>
+            <a:ext cx="540533" cy="369332"/>
+          </a:xfrm>
+          <a:prstGeom prst="rect">
+            <a:avLst/>
+          </a:prstGeom>
+          <a:noFill/>
+        </p:spPr>
+        <p:txBody>
+          <a:bodyPr wrap="none" rtlCol="0">
+            <a:spAutoFit/>
+          </a:bodyPr>
+          <a:lstStyle/>
+          <a:p>
+            <a:r>
+              <a:rPr lang="en-US" dirty="0"/>
+              <a:t>C_2</a:t>
+            </a:r>
+          </a:p>
+        </p:txBody>
+      </p:sp>
+      <mc:AlternateContent xmlns:mc="http://schemas.openxmlformats.org/markup-compatibility/2006">
+        <mc:Choice xmlns:a14="http://schemas.microsoft.com/office/drawing/2010/main" Requires="a14">
+          <p:sp>
+            <p:nvSpPr>
+              <p:cNvPr id="16" name="TextBox 15">
+                <a:extLst>
+                  <a:ext uri="{FF2B5EF4-FFF2-40B4-BE49-F238E27FC236}">
+                    <a16:creationId xmlns:a16="http://schemas.microsoft.com/office/drawing/2014/main" id="{28F7FD81-8765-3EF3-A226-A144B0E93A2A}"/>
+                  </a:ext>
+                </a:extLst>
+              </p:cNvPr>
+              <p:cNvSpPr txBox="1"/>
+              <p:nvPr/>
+            </p:nvSpPr>
+            <p:spPr>
+              <a:xfrm>
+                <a:off x="8070209" y="2030136"/>
+                <a:ext cx="3033203" cy="618374"/>
+              </a:xfrm>
+              <a:prstGeom prst="rect">
+                <a:avLst/>
+              </a:prstGeom>
+              <a:noFill/>
+            </p:spPr>
+            <p:txBody>
+              <a:bodyPr wrap="none" rtlCol="0">
+                <a:spAutoFit/>
+              </a:bodyPr>
+              <a:lstStyle/>
+              <a:p>
+                <a14:m>
+                  <m:oMathPara xmlns:m="http://schemas.openxmlformats.org/officeDocument/2006/math">
+                    <m:oMathParaPr>
+                      <m:jc m:val="centerGroup"/>
+                    </m:oMathParaPr>
+                    <m:oMath xmlns:m="http://schemas.openxmlformats.org/officeDocument/2006/math">
+                      <m:r>
+                        <a:rPr lang="en-US" i="1" dirty="0" smtClean="0">
+                          <a:latin typeface="Cambria Math" panose="02040503050406030204" pitchFamily="18" charset="0"/>
+                        </a:rPr>
+                        <m:t>0.</m:t>
+                      </m:r>
+                      <m:r>
+                        <a:rPr lang="en-US" b="0" i="1" dirty="0" smtClean="0">
+                          <a:latin typeface="Cambria Math" panose="02040503050406030204" pitchFamily="18" charset="0"/>
+                        </a:rPr>
+                        <m:t>25×</m:t>
+                      </m:r>
+                      <m:f>
+                        <m:fPr>
+                          <m:ctrlPr>
+                            <a:rPr lang="en-US" b="0" i="1" dirty="0" smtClean="0">
+                              <a:latin typeface="Cambria Math" panose="02040503050406030204" pitchFamily="18" charset="0"/>
+                            </a:rPr>
+                          </m:ctrlPr>
+                        </m:fPr>
+                        <m:num>
+                          <m:r>
+                            <a:rPr lang="en-US" b="0" i="1" dirty="0" smtClean="0">
+                              <a:latin typeface="Cambria Math" panose="02040503050406030204" pitchFamily="18" charset="0"/>
+                            </a:rPr>
+                            <m:t>5</m:t>
+                          </m:r>
+                        </m:num>
+                        <m:den>
+                          <m:r>
+                            <a:rPr lang="en-US" b="0" i="1" dirty="0" smtClean="0">
+                              <a:latin typeface="Cambria Math" panose="02040503050406030204" pitchFamily="18" charset="0"/>
+                            </a:rPr>
+                            <m:t>25</m:t>
+                          </m:r>
+                        </m:den>
+                      </m:f>
+                      <m:r>
+                        <a:rPr lang="en-US" b="0" i="1" dirty="0" smtClean="0">
+                          <a:latin typeface="Cambria Math" panose="02040503050406030204" pitchFamily="18" charset="0"/>
+                        </a:rPr>
+                        <m:t>+0.75×0=0.05</m:t>
+                      </m:r>
+                    </m:oMath>
+                  </m:oMathPara>
+                </a14:m>
+                <a:endParaRPr lang="en-US" dirty="0"/>
+              </a:p>
+            </p:txBody>
+          </p:sp>
+        </mc:Choice>
+        <mc:Fallback>
+          <p:sp>
+            <p:nvSpPr>
+              <p:cNvPr id="16" name="TextBox 15">
+                <a:extLst>
+                  <a:ext uri="{FF2B5EF4-FFF2-40B4-BE49-F238E27FC236}">
+                    <a16:creationId xmlns:a16="http://schemas.microsoft.com/office/drawing/2014/main" id="{28F7FD81-8765-3EF3-A226-A144B0E93A2A}"/>
+                  </a:ext>
+                </a:extLst>
+              </p:cNvPr>
+              <p:cNvSpPr txBox="1">
+                <a:spLocks noRot="1" noChangeAspect="1" noMove="1" noResize="1" noEditPoints="1" noAdjustHandles="1" noChangeArrowheads="1" noChangeShapeType="1" noTextEdit="1"/>
+              </p:cNvSpPr>
+              <p:nvPr/>
+            </p:nvSpPr>
+            <p:spPr>
+              <a:xfrm>
+                <a:off x="8070209" y="2030136"/>
+                <a:ext cx="3033203" cy="618374"/>
+              </a:xfrm>
+              <a:prstGeom prst="rect">
+                <a:avLst/>
+              </a:prstGeom>
+              <a:blipFill>
+                <a:blip r:embed="rId2"/>
+                <a:stretch>
+                  <a:fillRect/>
+                </a:stretch>
+              </a:blipFill>
+            </p:spPr>
+            <p:txBody>
+              <a:bodyPr/>
+              <a:lstStyle/>
+              <a:p>
+                <a:r>
+                  <a:rPr lang="en-US">
+                    <a:noFill/>
+                  </a:rPr>
+                  <a:t> </a:t>
+                </a:r>
+              </a:p>
+            </p:txBody>
+          </p:sp>
+        </mc:Fallback>
+      </mc:AlternateContent>
+      <p:sp>
+        <p:nvSpPr>
+          <p:cNvPr id="20" name="TextBox 19">
+            <a:extLst>
+              <a:ext uri="{FF2B5EF4-FFF2-40B4-BE49-F238E27FC236}">
+                <a16:creationId xmlns:a16="http://schemas.microsoft.com/office/drawing/2014/main" id="{6B16FBE7-26E7-7A14-381A-F2A19EE528F1}"/>
+              </a:ext>
+            </a:extLst>
+          </p:cNvPr>
+          <p:cNvSpPr txBox="1"/>
+          <p:nvPr/>
+        </p:nvSpPr>
+        <p:spPr>
+          <a:xfrm>
+            <a:off x="6569309" y="3196422"/>
+            <a:ext cx="1454437" cy="369332"/>
+          </a:xfrm>
+          <a:prstGeom prst="rect">
+            <a:avLst/>
+          </a:prstGeom>
+          <a:noFill/>
+        </p:spPr>
+        <p:txBody>
+          <a:bodyPr wrap="none" rtlCol="0">
+            <a:spAutoFit/>
+          </a:bodyPr>
+          <a:lstStyle/>
+          <a:p>
+            <a:r>
+              <a:rPr lang="en-US" dirty="0"/>
+              <a:t>0% Ice Cream</a:t>
+            </a:r>
+          </a:p>
+        </p:txBody>
+      </p:sp>
+      <mc:AlternateContent xmlns:mc="http://schemas.openxmlformats.org/markup-compatibility/2006">
+        <mc:Choice xmlns:a14="http://schemas.microsoft.com/office/drawing/2010/main" Requires="a14">
+          <p:sp>
+            <p:nvSpPr>
+              <p:cNvPr id="21" name="TextBox 20">
+                <a:extLst>
+                  <a:ext uri="{FF2B5EF4-FFF2-40B4-BE49-F238E27FC236}">
+                    <a16:creationId xmlns:a16="http://schemas.microsoft.com/office/drawing/2014/main" id="{C3AFDF20-00F6-630C-68ED-3FBBFDD96A6C}"/>
+                  </a:ext>
+                </a:extLst>
+              </p:cNvPr>
+              <p:cNvSpPr txBox="1"/>
+              <p:nvPr/>
+            </p:nvSpPr>
+            <p:spPr>
+              <a:xfrm>
+                <a:off x="1108881" y="2207493"/>
+                <a:ext cx="1305614" cy="646331"/>
+              </a:xfrm>
+              <a:prstGeom prst="rect">
+                <a:avLst/>
+              </a:prstGeom>
+              <a:noFill/>
+            </p:spPr>
+            <p:txBody>
+              <a:bodyPr wrap="none" rtlCol="0">
+                <a:spAutoFit/>
+              </a:bodyPr>
+              <a:lstStyle/>
+              <a:p>
+                <a14:m>
+                  <m:oMathPara xmlns:m="http://schemas.openxmlformats.org/officeDocument/2006/math">
+                    <m:oMathParaPr>
+                      <m:jc m:val="centerGroup"/>
+                    </m:oMathParaPr>
+                    <m:oMath xmlns:m="http://schemas.openxmlformats.org/officeDocument/2006/math">
+                      <m:sSub>
+                        <m:sSubPr>
+                          <m:ctrlPr>
+                            <a:rPr lang="en-US" b="0" i="1" smtClean="0">
+                              <a:latin typeface="Cambria Math" panose="02040503050406030204" pitchFamily="18" charset="0"/>
+                            </a:rPr>
+                          </m:ctrlPr>
+                        </m:sSubPr>
+                        <m:e>
+                          <m:r>
+                            <a:rPr lang="en-US" b="0" i="1" smtClean="0">
+                              <a:latin typeface="Cambria Math" panose="02040503050406030204" pitchFamily="18" charset="0"/>
+                            </a:rPr>
+                            <m:t>𝐶</m:t>
+                          </m:r>
+                        </m:e>
+                        <m:sub>
+                          <m:r>
+                            <a:rPr lang="en-US" b="0" i="1" smtClean="0">
+                              <a:latin typeface="Cambria Math" panose="02040503050406030204" pitchFamily="18" charset="0"/>
+                            </a:rPr>
+                            <m:t>1</m:t>
+                          </m:r>
+                        </m:sub>
+                      </m:sSub>
+                      <m:r>
+                        <a:rPr lang="en-US" b="0" i="1" smtClean="0">
+                          <a:latin typeface="Cambria Math" panose="02040503050406030204" pitchFamily="18" charset="0"/>
+                        </a:rPr>
+                        <m:t>= </m:t>
+                      </m:r>
+                      <m:r>
+                        <a:rPr lang="en-US" b="0" i="1" smtClean="0">
+                          <a:latin typeface="Cambria Math" panose="02040503050406030204" pitchFamily="18" charset="0"/>
+                        </a:rPr>
+                        <m:t>𝑝</m:t>
+                      </m:r>
+                    </m:oMath>
+                  </m:oMathPara>
+                </a14:m>
+                <a:endParaRPr lang="en-US" b="0" dirty="0"/>
+              </a:p>
+              <a:p>
+                <a14:m>
+                  <m:oMathPara xmlns:m="http://schemas.openxmlformats.org/officeDocument/2006/math">
+                    <m:oMathParaPr>
+                      <m:jc m:val="centerGroup"/>
+                    </m:oMathParaPr>
+                    <m:oMath xmlns:m="http://schemas.openxmlformats.org/officeDocument/2006/math">
+                      <m:sSub>
+                        <m:sSubPr>
+                          <m:ctrlPr>
+                            <a:rPr lang="en-US" b="0" i="1" smtClean="0">
+                              <a:latin typeface="Cambria Math" panose="02040503050406030204" pitchFamily="18" charset="0"/>
+                            </a:rPr>
+                          </m:ctrlPr>
+                        </m:sSubPr>
+                        <m:e>
+                          <m:r>
+                            <a:rPr lang="en-US" b="0" i="1" smtClean="0">
+                              <a:latin typeface="Cambria Math" panose="02040503050406030204" pitchFamily="18" charset="0"/>
+                            </a:rPr>
+                            <m:t>𝐶</m:t>
+                          </m:r>
+                        </m:e>
+                        <m:sub>
+                          <m:r>
+                            <a:rPr lang="en-US" b="0" i="1" smtClean="0">
+                              <a:latin typeface="Cambria Math" panose="02040503050406030204" pitchFamily="18" charset="0"/>
+                            </a:rPr>
+                            <m:t>2</m:t>
+                          </m:r>
+                        </m:sub>
+                      </m:sSub>
+                      <m:r>
+                        <a:rPr lang="en-US" b="0" i="1" smtClean="0">
+                          <a:latin typeface="Cambria Math" panose="02040503050406030204" pitchFamily="18" charset="0"/>
+                        </a:rPr>
+                        <m:t>=1−</m:t>
+                      </m:r>
+                      <m:r>
+                        <a:rPr lang="en-US" b="0" i="1" smtClean="0">
+                          <a:latin typeface="Cambria Math" panose="02040503050406030204" pitchFamily="18" charset="0"/>
+                        </a:rPr>
+                        <m:t>𝑝</m:t>
+                      </m:r>
+                    </m:oMath>
+                  </m:oMathPara>
+                </a14:m>
+                <a:endParaRPr lang="en-US" dirty="0"/>
+              </a:p>
+            </p:txBody>
+          </p:sp>
+        </mc:Choice>
+        <mc:Fallback>
+          <p:sp>
+            <p:nvSpPr>
+              <p:cNvPr id="21" name="TextBox 20">
+                <a:extLst>
+                  <a:ext uri="{FF2B5EF4-FFF2-40B4-BE49-F238E27FC236}">
+                    <a16:creationId xmlns:a16="http://schemas.microsoft.com/office/drawing/2014/main" id="{C3AFDF20-00F6-630C-68ED-3FBBFDD96A6C}"/>
+                  </a:ext>
+                </a:extLst>
+              </p:cNvPr>
+              <p:cNvSpPr txBox="1">
+                <a:spLocks noRot="1" noChangeAspect="1" noMove="1" noResize="1" noEditPoints="1" noAdjustHandles="1" noChangeArrowheads="1" noChangeShapeType="1" noTextEdit="1"/>
+              </p:cNvSpPr>
+              <p:nvPr/>
+            </p:nvSpPr>
+            <p:spPr>
+              <a:xfrm>
+                <a:off x="1108881" y="2207493"/>
+                <a:ext cx="1305614" cy="646331"/>
+              </a:xfrm>
+              <a:prstGeom prst="rect">
+                <a:avLst/>
+              </a:prstGeom>
+              <a:blipFill>
+                <a:blip r:embed="rId3"/>
+                <a:stretch>
+                  <a:fillRect b="-3774"/>
+                </a:stretch>
+              </a:blipFill>
+            </p:spPr>
+            <p:txBody>
+              <a:bodyPr/>
+              <a:lstStyle/>
+              <a:p>
+                <a:r>
+                  <a:rPr lang="en-US">
+                    <a:noFill/>
+                  </a:rPr>
+                  <a:t> </a:t>
+                </a:r>
+              </a:p>
+            </p:txBody>
+          </p:sp>
+        </mc:Fallback>
+      </mc:AlternateContent>
+      <mc:AlternateContent xmlns:mc="http://schemas.openxmlformats.org/markup-compatibility/2006">
+        <mc:Choice xmlns:a14="http://schemas.microsoft.com/office/drawing/2010/main" Requires="a14">
+          <p:sp>
+            <p:nvSpPr>
+              <p:cNvPr id="22" name="TextBox 21">
+                <a:extLst>
+                  <a:ext uri="{FF2B5EF4-FFF2-40B4-BE49-F238E27FC236}">
+                    <a16:creationId xmlns:a16="http://schemas.microsoft.com/office/drawing/2014/main" id="{92D0977F-F433-D4E9-677D-CD73743BB7E3}"/>
+                  </a:ext>
+                </a:extLst>
+              </p:cNvPr>
+              <p:cNvSpPr txBox="1"/>
+              <p:nvPr/>
+            </p:nvSpPr>
+            <p:spPr>
+              <a:xfrm>
+                <a:off x="3495480" y="4425211"/>
+                <a:ext cx="1388329" cy="646331"/>
+              </a:xfrm>
+              <a:prstGeom prst="rect">
+                <a:avLst/>
+              </a:prstGeom>
+              <a:noFill/>
+            </p:spPr>
+            <p:txBody>
+              <a:bodyPr wrap="none" rtlCol="0">
+                <a:spAutoFit/>
+              </a:bodyPr>
+              <a:lstStyle/>
+              <a:p>
+                <a14:m>
+                  <m:oMathPara xmlns:m="http://schemas.openxmlformats.org/officeDocument/2006/math">
+                    <m:oMathParaPr>
+                      <m:jc m:val="centerGroup"/>
+                    </m:oMathParaPr>
+                    <m:oMath xmlns:m="http://schemas.openxmlformats.org/officeDocument/2006/math">
+                      <m:sSub>
+                        <m:sSubPr>
+                          <m:ctrlPr>
+                            <a:rPr lang="en-US" b="0" i="1" smtClean="0">
+                              <a:latin typeface="Cambria Math" panose="02040503050406030204" pitchFamily="18" charset="0"/>
+                            </a:rPr>
+                          </m:ctrlPr>
+                        </m:sSubPr>
+                        <m:e>
+                          <m:r>
+                            <a:rPr lang="en-US" b="0" i="1" smtClean="0">
+                              <a:latin typeface="Cambria Math" panose="02040503050406030204" pitchFamily="18" charset="0"/>
+                            </a:rPr>
+                            <m:t>𝐶</m:t>
+                          </m:r>
+                        </m:e>
+                        <m:sub>
+                          <m:r>
+                            <a:rPr lang="en-US" b="0" i="1" smtClean="0">
+                              <a:latin typeface="Cambria Math" panose="02040503050406030204" pitchFamily="18" charset="0"/>
+                            </a:rPr>
+                            <m:t>𝑠</m:t>
+                          </m:r>
+                          <m:r>
+                            <a:rPr lang="en-US" b="0" i="1" smtClean="0">
+                              <a:latin typeface="Cambria Math" panose="02040503050406030204" pitchFamily="18" charset="0"/>
+                            </a:rPr>
+                            <m:t>1</m:t>
+                          </m:r>
+                        </m:sub>
+                      </m:sSub>
+                      <m:r>
+                        <a:rPr lang="en-US" b="0" i="1" smtClean="0">
+                          <a:latin typeface="Cambria Math" panose="02040503050406030204" pitchFamily="18" charset="0"/>
+                        </a:rPr>
+                        <m:t>=</m:t>
+                      </m:r>
+                      <m:r>
+                        <a:rPr lang="en-US" b="0" i="1" smtClean="0">
+                          <a:latin typeface="Cambria Math" panose="02040503050406030204" pitchFamily="18" charset="0"/>
+                        </a:rPr>
+                        <m:t>𝑞</m:t>
+                      </m:r>
+                    </m:oMath>
+                  </m:oMathPara>
+                </a14:m>
+                <a:endParaRPr lang="en-US" b="0" dirty="0"/>
+              </a:p>
+              <a:p>
+                <a14:m>
+                  <m:oMathPara xmlns:m="http://schemas.openxmlformats.org/officeDocument/2006/math">
+                    <m:oMathParaPr>
+                      <m:jc m:val="centerGroup"/>
+                    </m:oMathParaPr>
+                    <m:oMath xmlns:m="http://schemas.openxmlformats.org/officeDocument/2006/math">
+                      <m:sSub>
+                        <m:sSubPr>
+                          <m:ctrlPr>
+                            <a:rPr lang="en-US" b="0" i="1" smtClean="0">
+                              <a:latin typeface="Cambria Math" panose="02040503050406030204" pitchFamily="18" charset="0"/>
+                            </a:rPr>
+                          </m:ctrlPr>
+                        </m:sSubPr>
+                        <m:e>
+                          <m:r>
+                            <a:rPr lang="en-US" b="0" i="1" smtClean="0">
+                              <a:latin typeface="Cambria Math" panose="02040503050406030204" pitchFamily="18" charset="0"/>
+                            </a:rPr>
+                            <m:t>𝐶</m:t>
+                          </m:r>
+                        </m:e>
+                        <m:sub>
+                          <m:r>
+                            <a:rPr lang="en-US" b="0" i="1" smtClean="0">
+                              <a:latin typeface="Cambria Math" panose="02040503050406030204" pitchFamily="18" charset="0"/>
+                            </a:rPr>
+                            <m:t>𝑠</m:t>
+                          </m:r>
+                          <m:r>
+                            <a:rPr lang="en-US" b="0" i="1" smtClean="0">
+                              <a:latin typeface="Cambria Math" panose="02040503050406030204" pitchFamily="18" charset="0"/>
+                            </a:rPr>
+                            <m:t>2</m:t>
+                          </m:r>
+                        </m:sub>
+                      </m:sSub>
+                      <m:r>
+                        <a:rPr lang="en-US" b="0" i="1" smtClean="0">
+                          <a:latin typeface="Cambria Math" panose="02040503050406030204" pitchFamily="18" charset="0"/>
+                        </a:rPr>
+                        <m:t>=1−</m:t>
+                      </m:r>
+                      <m:r>
+                        <a:rPr lang="en-US" b="0" i="1" smtClean="0">
+                          <a:latin typeface="Cambria Math" panose="02040503050406030204" pitchFamily="18" charset="0"/>
+                        </a:rPr>
+                        <m:t>𝑞</m:t>
+                      </m:r>
+                    </m:oMath>
+                  </m:oMathPara>
+                </a14:m>
+                <a:endParaRPr lang="en-US" dirty="0"/>
+              </a:p>
+            </p:txBody>
+          </p:sp>
+        </mc:Choice>
+        <mc:Fallback>
+          <p:sp>
+            <p:nvSpPr>
+              <p:cNvPr id="22" name="TextBox 21">
+                <a:extLst>
+                  <a:ext uri="{FF2B5EF4-FFF2-40B4-BE49-F238E27FC236}">
+                    <a16:creationId xmlns:a16="http://schemas.microsoft.com/office/drawing/2014/main" id="{92D0977F-F433-D4E9-677D-CD73743BB7E3}"/>
+                  </a:ext>
+                </a:extLst>
+              </p:cNvPr>
+              <p:cNvSpPr txBox="1">
+                <a:spLocks noRot="1" noChangeAspect="1" noMove="1" noResize="1" noEditPoints="1" noAdjustHandles="1" noChangeArrowheads="1" noChangeShapeType="1" noTextEdit="1"/>
+              </p:cNvSpPr>
+              <p:nvPr/>
+            </p:nvSpPr>
+            <p:spPr>
+              <a:xfrm>
+                <a:off x="3495480" y="4425211"/>
+                <a:ext cx="1388329" cy="646331"/>
+              </a:xfrm>
+              <a:prstGeom prst="rect">
+                <a:avLst/>
+              </a:prstGeom>
+              <a:blipFill>
+                <a:blip r:embed="rId4"/>
+                <a:stretch>
+                  <a:fillRect b="-2830"/>
+                </a:stretch>
+              </a:blipFill>
+            </p:spPr>
+            <p:txBody>
+              <a:bodyPr/>
+              <a:lstStyle/>
+              <a:p>
+                <a:r>
+                  <a:rPr lang="en-US">
+                    <a:noFill/>
+                  </a:rPr>
+                  <a:t> </a:t>
+                </a:r>
+              </a:p>
+            </p:txBody>
+          </p:sp>
+        </mc:Fallback>
+      </mc:AlternateContent>
+      <mc:AlternateContent xmlns:mc="http://schemas.openxmlformats.org/markup-compatibility/2006">
+        <mc:Choice xmlns:a14="http://schemas.microsoft.com/office/drawing/2010/main" Requires="a14">
+          <p:sp>
+            <p:nvSpPr>
+              <p:cNvPr id="23" name="TextBox 22">
+                <a:extLst>
+                  <a:ext uri="{FF2B5EF4-FFF2-40B4-BE49-F238E27FC236}">
+                    <a16:creationId xmlns:a16="http://schemas.microsoft.com/office/drawing/2014/main" id="{DA50C9CF-6FE1-9909-C73D-6B318DF1740A}"/>
+                  </a:ext>
+                </a:extLst>
+              </p:cNvPr>
+              <p:cNvSpPr txBox="1"/>
+              <p:nvPr/>
+            </p:nvSpPr>
+            <p:spPr>
+              <a:xfrm>
+                <a:off x="6242806" y="4469865"/>
+                <a:ext cx="1362361" cy="646331"/>
+              </a:xfrm>
+              <a:prstGeom prst="rect">
+                <a:avLst/>
+              </a:prstGeom>
+              <a:noFill/>
+            </p:spPr>
+            <p:txBody>
+              <a:bodyPr wrap="none" rtlCol="0">
+                <a:spAutoFit/>
+              </a:bodyPr>
+              <a:lstStyle/>
+              <a:p>
+                <a14:m>
+                  <m:oMathPara xmlns:m="http://schemas.openxmlformats.org/officeDocument/2006/math">
+                    <m:oMathParaPr>
+                      <m:jc m:val="centerGroup"/>
+                    </m:oMathParaPr>
+                    <m:oMath xmlns:m="http://schemas.openxmlformats.org/officeDocument/2006/math">
+                      <m:sSub>
+                        <m:sSubPr>
+                          <m:ctrlPr>
+                            <a:rPr lang="en-US" b="0" i="1" smtClean="0">
+                              <a:latin typeface="Cambria Math" panose="02040503050406030204" pitchFamily="18" charset="0"/>
+                            </a:rPr>
+                          </m:ctrlPr>
+                        </m:sSubPr>
+                        <m:e>
+                          <m:r>
+                            <a:rPr lang="en-US" b="0" i="1" smtClean="0">
+                              <a:latin typeface="Cambria Math" panose="02040503050406030204" pitchFamily="18" charset="0"/>
+                            </a:rPr>
+                            <m:t>𝐶</m:t>
+                          </m:r>
+                        </m:e>
+                        <m:sub>
+                          <m:r>
+                            <a:rPr lang="en-US" b="0" i="1" smtClean="0">
+                              <a:latin typeface="Cambria Math" panose="02040503050406030204" pitchFamily="18" charset="0"/>
+                            </a:rPr>
+                            <m:t>𝑡</m:t>
+                          </m:r>
+                          <m:r>
+                            <a:rPr lang="en-US" b="0" i="1" smtClean="0">
+                              <a:latin typeface="Cambria Math" panose="02040503050406030204" pitchFamily="18" charset="0"/>
+                            </a:rPr>
+                            <m:t>1</m:t>
+                          </m:r>
+                        </m:sub>
+                      </m:sSub>
+                      <m:r>
+                        <a:rPr lang="en-US" b="0" i="1" smtClean="0">
+                          <a:latin typeface="Cambria Math" panose="02040503050406030204" pitchFamily="18" charset="0"/>
+                        </a:rPr>
+                        <m:t>=</m:t>
+                      </m:r>
+                      <m:r>
+                        <a:rPr lang="en-US" b="0" i="1" smtClean="0">
+                          <a:latin typeface="Cambria Math" panose="02040503050406030204" pitchFamily="18" charset="0"/>
+                        </a:rPr>
+                        <m:t>𝑟</m:t>
+                      </m:r>
+                    </m:oMath>
+                  </m:oMathPara>
+                </a14:m>
+                <a:endParaRPr lang="en-US" b="0" dirty="0"/>
+              </a:p>
+              <a:p>
+                <a14:m>
+                  <m:oMathPara xmlns:m="http://schemas.openxmlformats.org/officeDocument/2006/math">
+                    <m:oMathParaPr>
+                      <m:jc m:val="centerGroup"/>
+                    </m:oMathParaPr>
+                    <m:oMath xmlns:m="http://schemas.openxmlformats.org/officeDocument/2006/math">
+                      <m:sSub>
+                        <m:sSubPr>
+                          <m:ctrlPr>
+                            <a:rPr lang="en-US" b="0" i="1" smtClean="0">
+                              <a:latin typeface="Cambria Math" panose="02040503050406030204" pitchFamily="18" charset="0"/>
+                            </a:rPr>
+                          </m:ctrlPr>
+                        </m:sSubPr>
+                        <m:e>
+                          <m:r>
+                            <a:rPr lang="en-US" b="0" i="1" smtClean="0">
+                              <a:latin typeface="Cambria Math" panose="02040503050406030204" pitchFamily="18" charset="0"/>
+                            </a:rPr>
+                            <m:t>𝐶</m:t>
+                          </m:r>
+                        </m:e>
+                        <m:sub>
+                          <m:r>
+                            <a:rPr lang="en-US" b="0" i="1" smtClean="0">
+                              <a:latin typeface="Cambria Math" panose="02040503050406030204" pitchFamily="18" charset="0"/>
+                            </a:rPr>
+                            <m:t>𝑡</m:t>
+                          </m:r>
+                          <m:r>
+                            <a:rPr lang="en-US" b="0" i="1" smtClean="0">
+                              <a:latin typeface="Cambria Math" panose="02040503050406030204" pitchFamily="18" charset="0"/>
+                            </a:rPr>
+                            <m:t>2</m:t>
+                          </m:r>
+                        </m:sub>
+                      </m:sSub>
+                      <m:r>
+                        <a:rPr lang="en-US" b="0" i="1" smtClean="0">
+                          <a:latin typeface="Cambria Math" panose="02040503050406030204" pitchFamily="18" charset="0"/>
+                        </a:rPr>
+                        <m:t>=1−</m:t>
+                      </m:r>
+                      <m:r>
+                        <a:rPr lang="en-US" b="0" i="1" smtClean="0">
+                          <a:latin typeface="Cambria Math" panose="02040503050406030204" pitchFamily="18" charset="0"/>
+                        </a:rPr>
+                        <m:t>𝑟</m:t>
+                      </m:r>
+                    </m:oMath>
+                  </m:oMathPara>
+                </a14:m>
+                <a:endParaRPr lang="en-US" dirty="0"/>
+              </a:p>
+            </p:txBody>
+          </p:sp>
+        </mc:Choice>
+        <mc:Fallback>
+          <p:sp>
+            <p:nvSpPr>
+              <p:cNvPr id="23" name="TextBox 22">
+                <a:extLst>
+                  <a:ext uri="{FF2B5EF4-FFF2-40B4-BE49-F238E27FC236}">
+                    <a16:creationId xmlns:a16="http://schemas.microsoft.com/office/drawing/2014/main" id="{DA50C9CF-6FE1-9909-C73D-6B318DF1740A}"/>
+                  </a:ext>
+                </a:extLst>
+              </p:cNvPr>
+              <p:cNvSpPr txBox="1">
+                <a:spLocks noRot="1" noChangeAspect="1" noMove="1" noResize="1" noEditPoints="1" noAdjustHandles="1" noChangeArrowheads="1" noChangeShapeType="1" noTextEdit="1"/>
+              </p:cNvSpPr>
+              <p:nvPr/>
+            </p:nvSpPr>
+            <p:spPr>
+              <a:xfrm>
+                <a:off x="6242806" y="4469865"/>
+                <a:ext cx="1362361" cy="646331"/>
+              </a:xfrm>
+              <a:prstGeom prst="rect">
+                <a:avLst/>
+              </a:prstGeom>
+              <a:blipFill>
+                <a:blip r:embed="rId5"/>
+                <a:stretch>
+                  <a:fillRect/>
+                </a:stretch>
+              </a:blipFill>
+            </p:spPr>
+            <p:txBody>
+              <a:bodyPr/>
+              <a:lstStyle/>
+              <a:p>
+                <a:r>
+                  <a:rPr lang="en-US">
+                    <a:noFill/>
+                  </a:rPr>
+                  <a:t> </a:t>
+                </a:r>
+              </a:p>
+            </p:txBody>
+          </p:sp>
+        </mc:Fallback>
+      </mc:AlternateContent>
+      <mc:AlternateContent xmlns:mc="http://schemas.openxmlformats.org/markup-compatibility/2006">
+        <mc:Choice xmlns:a14="http://schemas.microsoft.com/office/drawing/2010/main" Requires="a14">
+          <p:sp>
+            <p:nvSpPr>
+              <p:cNvPr id="24" name="TextBox 23">
+                <a:extLst>
+                  <a:ext uri="{FF2B5EF4-FFF2-40B4-BE49-F238E27FC236}">
+                    <a16:creationId xmlns:a16="http://schemas.microsoft.com/office/drawing/2014/main" id="{BEFCA15E-7767-84A0-0FBC-DC1B9F346F8B}"/>
+                  </a:ext>
+                </a:extLst>
+              </p:cNvPr>
+              <p:cNvSpPr txBox="1"/>
+              <p:nvPr/>
+            </p:nvSpPr>
+            <p:spPr>
+              <a:xfrm>
+                <a:off x="4077050" y="5287964"/>
+                <a:ext cx="370935" cy="369332"/>
+              </a:xfrm>
+              <a:prstGeom prst="rect">
+                <a:avLst/>
+              </a:prstGeom>
+              <a:noFill/>
+            </p:spPr>
+            <p:txBody>
+              <a:bodyPr wrap="none" rtlCol="0">
+                <a:spAutoFit/>
+              </a:bodyPr>
+              <a:lstStyle/>
+              <a:p>
+                <a14:m>
+                  <m:oMathPara xmlns:m="http://schemas.openxmlformats.org/officeDocument/2006/math">
+                    <m:oMathParaPr>
+                      <m:jc m:val="centerGroup"/>
+                    </m:oMathParaPr>
+                    <m:oMath xmlns:m="http://schemas.openxmlformats.org/officeDocument/2006/math">
+                      <m:r>
+                        <a:rPr lang="en-US" i="1" dirty="0" smtClean="0">
+                          <a:latin typeface="Cambria Math" panose="02040503050406030204" pitchFamily="18" charset="0"/>
+                        </a:rPr>
+                        <m:t>𝑓</m:t>
+                      </m:r>
+                    </m:oMath>
+                  </m:oMathPara>
+                </a14:m>
+                <a:endParaRPr lang="en-US" dirty="0"/>
+              </a:p>
+            </p:txBody>
+          </p:sp>
+        </mc:Choice>
+        <mc:Fallback>
+          <p:sp>
+            <p:nvSpPr>
+              <p:cNvPr id="24" name="TextBox 23">
+                <a:extLst>
+                  <a:ext uri="{FF2B5EF4-FFF2-40B4-BE49-F238E27FC236}">
+                    <a16:creationId xmlns:a16="http://schemas.microsoft.com/office/drawing/2014/main" id="{BEFCA15E-7767-84A0-0FBC-DC1B9F346F8B}"/>
+                  </a:ext>
+                </a:extLst>
+              </p:cNvPr>
+              <p:cNvSpPr txBox="1">
+                <a:spLocks noRot="1" noChangeAspect="1" noMove="1" noResize="1" noEditPoints="1" noAdjustHandles="1" noChangeArrowheads="1" noChangeShapeType="1" noTextEdit="1"/>
+              </p:cNvSpPr>
+              <p:nvPr/>
+            </p:nvSpPr>
+            <p:spPr>
+              <a:xfrm>
+                <a:off x="4077050" y="5287964"/>
+                <a:ext cx="370935" cy="369332"/>
+              </a:xfrm>
+              <a:prstGeom prst="rect">
+                <a:avLst/>
+              </a:prstGeom>
+              <a:blipFill>
+                <a:blip r:embed="rId6"/>
+                <a:stretch>
+                  <a:fillRect b="-13115"/>
+                </a:stretch>
+              </a:blipFill>
+            </p:spPr>
+            <p:txBody>
+              <a:bodyPr/>
+              <a:lstStyle/>
+              <a:p>
+                <a:r>
+                  <a:rPr lang="en-US">
+                    <a:noFill/>
+                  </a:rPr>
+                  <a:t> </a:t>
+                </a:r>
+              </a:p>
+            </p:txBody>
+          </p:sp>
+        </mc:Fallback>
+      </mc:AlternateContent>
+      <mc:AlternateContent xmlns:mc="http://schemas.openxmlformats.org/markup-compatibility/2006">
+        <mc:Choice xmlns:a14="http://schemas.microsoft.com/office/drawing/2010/main" Requires="a14">
+          <p:sp>
+            <p:nvSpPr>
+              <p:cNvPr id="25" name="TextBox 24">
+                <a:extLst>
+                  <a:ext uri="{FF2B5EF4-FFF2-40B4-BE49-F238E27FC236}">
+                    <a16:creationId xmlns:a16="http://schemas.microsoft.com/office/drawing/2014/main" id="{033B8675-A299-8757-02B1-50B214C5B836}"/>
+                  </a:ext>
+                </a:extLst>
+              </p:cNvPr>
+              <p:cNvSpPr txBox="1"/>
+              <p:nvPr/>
+            </p:nvSpPr>
+            <p:spPr>
+              <a:xfrm>
+                <a:off x="6660076" y="5117521"/>
+                <a:ext cx="774892" cy="369332"/>
+              </a:xfrm>
+              <a:prstGeom prst="rect">
+                <a:avLst/>
+              </a:prstGeom>
+              <a:noFill/>
+            </p:spPr>
+            <p:txBody>
+              <a:bodyPr wrap="none" rtlCol="0">
+                <a:spAutoFit/>
+              </a:bodyPr>
+              <a:lstStyle/>
+              <a:p>
+                <a14:m>
+                  <m:oMathPara xmlns:m="http://schemas.openxmlformats.org/officeDocument/2006/math">
+                    <m:oMathParaPr>
+                      <m:jc m:val="centerGroup"/>
+                    </m:oMathParaPr>
+                    <m:oMath xmlns:m="http://schemas.openxmlformats.org/officeDocument/2006/math">
+                      <m:r>
+                        <a:rPr lang="en-US" b="0" i="1" dirty="0" smtClean="0">
+                          <a:latin typeface="Cambria Math" panose="02040503050406030204" pitchFamily="18" charset="0"/>
+                        </a:rPr>
+                        <m:t>1−</m:t>
+                      </m:r>
+                      <m:r>
+                        <a:rPr lang="en-US" i="1" dirty="0" smtClean="0">
+                          <a:latin typeface="Cambria Math" panose="02040503050406030204" pitchFamily="18" charset="0"/>
+                        </a:rPr>
+                        <m:t>𝑓</m:t>
+                      </m:r>
+                    </m:oMath>
+                  </m:oMathPara>
+                </a14:m>
+                <a:endParaRPr lang="en-US" dirty="0"/>
+              </a:p>
+            </p:txBody>
+          </p:sp>
+        </mc:Choice>
+        <mc:Fallback>
+          <p:sp>
+            <p:nvSpPr>
+              <p:cNvPr id="25" name="TextBox 24">
+                <a:extLst>
+                  <a:ext uri="{FF2B5EF4-FFF2-40B4-BE49-F238E27FC236}">
+                    <a16:creationId xmlns:a16="http://schemas.microsoft.com/office/drawing/2014/main" id="{033B8675-A299-8757-02B1-50B214C5B836}"/>
+                  </a:ext>
+                </a:extLst>
+              </p:cNvPr>
+              <p:cNvSpPr txBox="1">
+                <a:spLocks noRot="1" noChangeAspect="1" noMove="1" noResize="1" noEditPoints="1" noAdjustHandles="1" noChangeArrowheads="1" noChangeShapeType="1" noTextEdit="1"/>
+              </p:cNvSpPr>
+              <p:nvPr/>
+            </p:nvSpPr>
+            <p:spPr>
+              <a:xfrm>
+                <a:off x="6660076" y="5117521"/>
+                <a:ext cx="774892" cy="369332"/>
+              </a:xfrm>
+              <a:prstGeom prst="rect">
+                <a:avLst/>
+              </a:prstGeom>
+              <a:blipFill>
+                <a:blip r:embed="rId7"/>
+                <a:stretch>
+                  <a:fillRect b="-13115"/>
+                </a:stretch>
+              </a:blipFill>
+            </p:spPr>
+            <p:txBody>
+              <a:bodyPr/>
+              <a:lstStyle/>
+              <a:p>
+                <a:r>
+                  <a:rPr lang="en-US">
+                    <a:noFill/>
+                  </a:rPr>
+                  <a:t> </a:t>
+                </a:r>
+              </a:p>
+            </p:txBody>
+          </p:sp>
+        </mc:Fallback>
+      </mc:AlternateContent>
+      <mc:AlternateContent xmlns:mc="http://schemas.openxmlformats.org/markup-compatibility/2006">
+        <mc:Choice xmlns:a14="http://schemas.microsoft.com/office/drawing/2010/main" Requires="a14">
+          <p:sp>
+            <p:nvSpPr>
+              <p:cNvPr id="26" name="TextBox 25">
+                <a:extLst>
+                  <a:ext uri="{FF2B5EF4-FFF2-40B4-BE49-F238E27FC236}">
+                    <a16:creationId xmlns:a16="http://schemas.microsoft.com/office/drawing/2014/main" id="{F1B5A7C3-9AA8-5B9E-8D65-173AD7CC4767}"/>
+                  </a:ext>
+                </a:extLst>
+              </p:cNvPr>
+              <p:cNvSpPr txBox="1"/>
+              <p:nvPr/>
+            </p:nvSpPr>
+            <p:spPr>
+              <a:xfrm>
+                <a:off x="798472" y="2812673"/>
+                <a:ext cx="2615909" cy="710194"/>
+              </a:xfrm>
+              <a:prstGeom prst="rect">
+                <a:avLst/>
+              </a:prstGeom>
+              <a:noFill/>
+            </p:spPr>
+            <p:txBody>
+              <a:bodyPr wrap="none" rtlCol="0">
+                <a:spAutoFit/>
+              </a:bodyPr>
+              <a:lstStyle/>
+              <a:p>
+                <a14:m>
+                  <m:oMathPara xmlns:m="http://schemas.openxmlformats.org/officeDocument/2006/math">
+                    <m:oMathParaPr>
+                      <m:jc m:val="centerGroup"/>
+                    </m:oMathParaPr>
+                    <m:oMath xmlns:m="http://schemas.openxmlformats.org/officeDocument/2006/math">
+                      <m:sSub>
+                        <m:sSubPr>
+                          <m:ctrlPr>
+                            <a:rPr lang="en-US" b="0" i="1" smtClean="0">
+                              <a:latin typeface="Cambria Math" panose="02040503050406030204" pitchFamily="18" charset="0"/>
+                            </a:rPr>
+                          </m:ctrlPr>
+                        </m:sSubPr>
+                        <m:e>
+                          <m:r>
+                            <a:rPr lang="en-US" b="0" i="1" smtClean="0">
+                              <a:latin typeface="Cambria Math" panose="02040503050406030204" pitchFamily="18" charset="0"/>
+                            </a:rPr>
+                            <m:t>𝑃</m:t>
+                          </m:r>
+                        </m:e>
+                        <m:sub>
+                          <m:r>
+                            <a:rPr lang="en-US" b="0" i="1" smtClean="0">
+                              <a:latin typeface="Cambria Math" panose="02040503050406030204" pitchFamily="18" charset="0"/>
+                            </a:rPr>
+                            <m:t>𝐿</m:t>
+                          </m:r>
+                        </m:sub>
+                      </m:sSub>
+                      <m:r>
+                        <a:rPr lang="en-US" b="0" i="1" smtClean="0">
+                          <a:latin typeface="Cambria Math" panose="02040503050406030204" pitchFamily="18" charset="0"/>
+                        </a:rPr>
+                        <m:t>=</m:t>
+                      </m:r>
+                      <m:d>
+                        <m:dPr>
+                          <m:begChr m:val="{"/>
+                          <m:endChr m:val=""/>
+                          <m:ctrlPr>
+                            <a:rPr lang="en-US" b="0" i="1" smtClean="0">
+                              <a:latin typeface="Cambria Math" panose="02040503050406030204" pitchFamily="18" charset="0"/>
+                            </a:rPr>
+                          </m:ctrlPr>
+                        </m:dPr>
+                        <m:e>
+                          <m:eqArr>
+                            <m:eqArrPr>
+                              <m:ctrlPr>
+                                <a:rPr lang="en-US" b="0" i="1" smtClean="0">
+                                  <a:latin typeface="Cambria Math" panose="02040503050406030204" pitchFamily="18" charset="0"/>
+                                </a:rPr>
+                              </m:ctrlPr>
+                            </m:eqArrPr>
+                            <m:e>
+                              <m:r>
+                                <a:rPr lang="en-US" b="0" i="1" smtClean="0">
+                                  <a:latin typeface="Cambria Math" panose="02040503050406030204" pitchFamily="18" charset="0"/>
+                                </a:rPr>
+                                <m:t>𝑝</m:t>
+                              </m:r>
+                              <m:r>
+                                <a:rPr lang="en-US" b="0" i="1" smtClean="0">
+                                  <a:latin typeface="Cambria Math" panose="02040503050406030204" pitchFamily="18" charset="0"/>
+                                </a:rPr>
+                                <m:t> </m:t>
+                              </m:r>
+                              <m:r>
+                                <a:rPr lang="en-US" b="0" i="1" smtClean="0">
+                                  <a:latin typeface="Cambria Math" panose="02040503050406030204" pitchFamily="18" charset="0"/>
+                                </a:rPr>
+                                <m:t>𝑓𝑜𝑟</m:t>
+                              </m:r>
+                              <m:r>
+                                <a:rPr lang="en-US" b="0" i="1" smtClean="0">
+                                  <a:latin typeface="Cambria Math" panose="02040503050406030204" pitchFamily="18" charset="0"/>
+                                </a:rPr>
+                                <m:t>  </m:t>
+                              </m:r>
+                              <m:r>
+                                <a:rPr lang="en-US" b="0" i="1" smtClean="0">
+                                  <a:latin typeface="Cambria Math" panose="02040503050406030204" pitchFamily="18" charset="0"/>
+                                </a:rPr>
+                                <m:t>𝑝</m:t>
+                              </m:r>
+                              <m:r>
+                                <a:rPr lang="en-US" b="0" i="1" smtClean="0">
+                                  <a:latin typeface="Cambria Math" panose="02040503050406030204" pitchFamily="18" charset="0"/>
+                                </a:rPr>
+                                <m:t>&lt;0.5</m:t>
+                              </m:r>
+                            </m:e>
+                            <m:e>
+                              <m:r>
+                                <a:rPr lang="en-US" b="0" i="1" smtClean="0">
+                                  <a:latin typeface="Cambria Math" panose="02040503050406030204" pitchFamily="18" charset="0"/>
+                                </a:rPr>
+                                <m:t>1−</m:t>
+                              </m:r>
+                              <m:r>
+                                <a:rPr lang="en-US" b="0" i="1" smtClean="0">
+                                  <a:latin typeface="Cambria Math" panose="02040503050406030204" pitchFamily="18" charset="0"/>
+                                </a:rPr>
+                                <m:t>𝑝</m:t>
+                              </m:r>
+                              <m:r>
+                                <a:rPr lang="en-US" b="0" i="1" smtClean="0">
+                                  <a:latin typeface="Cambria Math" panose="02040503050406030204" pitchFamily="18" charset="0"/>
+                                </a:rPr>
+                                <m:t> </m:t>
+                              </m:r>
+                              <m:r>
+                                <a:rPr lang="en-US" b="0" i="1" smtClean="0">
+                                  <a:latin typeface="Cambria Math" panose="02040503050406030204" pitchFamily="18" charset="0"/>
+                                </a:rPr>
+                                <m:t>𝑓𝑜𝑟</m:t>
+                              </m:r>
+                              <m:r>
+                                <a:rPr lang="en-US" b="0" i="1" smtClean="0">
+                                  <a:latin typeface="Cambria Math" panose="02040503050406030204" pitchFamily="18" charset="0"/>
+                                </a:rPr>
+                                <m:t> </m:t>
+                              </m:r>
+                              <m:r>
+                                <a:rPr lang="en-US" b="0" i="1" smtClean="0">
+                                  <a:latin typeface="Cambria Math" panose="02040503050406030204" pitchFamily="18" charset="0"/>
+                                </a:rPr>
+                                <m:t>𝑝</m:t>
+                              </m:r>
+                              <m:r>
+                                <a:rPr lang="en-US" b="0" i="1" smtClean="0">
+                                  <a:latin typeface="Cambria Math" panose="02040503050406030204" pitchFamily="18" charset="0"/>
+                                </a:rPr>
+                                <m:t>≥0.5</m:t>
+                              </m:r>
+                            </m:e>
+                          </m:eqArr>
+                        </m:e>
+                      </m:d>
+                    </m:oMath>
+                  </m:oMathPara>
+                </a14:m>
+                <a:endParaRPr lang="en-US" dirty="0"/>
+              </a:p>
+            </p:txBody>
+          </p:sp>
+        </mc:Choice>
+        <mc:Fallback>
+          <p:sp>
+            <p:nvSpPr>
+              <p:cNvPr id="26" name="TextBox 25">
+                <a:extLst>
+                  <a:ext uri="{FF2B5EF4-FFF2-40B4-BE49-F238E27FC236}">
+                    <a16:creationId xmlns:a16="http://schemas.microsoft.com/office/drawing/2014/main" id="{F1B5A7C3-9AA8-5B9E-8D65-173AD7CC4767}"/>
+                  </a:ext>
+                </a:extLst>
+              </p:cNvPr>
+              <p:cNvSpPr txBox="1">
+                <a:spLocks noRot="1" noChangeAspect="1" noMove="1" noResize="1" noEditPoints="1" noAdjustHandles="1" noChangeArrowheads="1" noChangeShapeType="1" noTextEdit="1"/>
+              </p:cNvSpPr>
+              <p:nvPr/>
+            </p:nvSpPr>
+            <p:spPr>
+              <a:xfrm>
+                <a:off x="798472" y="2812673"/>
+                <a:ext cx="2615909" cy="710194"/>
+              </a:xfrm>
+              <a:prstGeom prst="rect">
+                <a:avLst/>
+              </a:prstGeom>
+              <a:blipFill>
+                <a:blip r:embed="rId8"/>
+                <a:stretch>
+                  <a:fillRect/>
+                </a:stretch>
+              </a:blipFill>
+            </p:spPr>
+            <p:txBody>
+              <a:bodyPr/>
+              <a:lstStyle/>
+              <a:p>
+                <a:r>
+                  <a:rPr lang="en-US">
+                    <a:noFill/>
+                  </a:rPr>
+                  <a:t> </a:t>
+                </a:r>
+              </a:p>
+            </p:txBody>
+          </p:sp>
+        </mc:Fallback>
+      </mc:AlternateContent>
+      <mc:AlternateContent xmlns:mc="http://schemas.openxmlformats.org/markup-compatibility/2006">
+        <mc:Choice xmlns:a14="http://schemas.microsoft.com/office/drawing/2010/main" Requires="a14">
+          <p:sp>
+            <p:nvSpPr>
+              <p:cNvPr id="27" name="TextBox 26">
+                <a:extLst>
+                  <a:ext uri="{FF2B5EF4-FFF2-40B4-BE49-F238E27FC236}">
+                    <a16:creationId xmlns:a16="http://schemas.microsoft.com/office/drawing/2014/main" id="{620639E5-75CD-2A06-40A0-BB7D66D97428}"/>
+                  </a:ext>
+                </a:extLst>
+              </p:cNvPr>
+              <p:cNvSpPr txBox="1"/>
+              <p:nvPr/>
+            </p:nvSpPr>
+            <p:spPr>
+              <a:xfrm>
+                <a:off x="3171841" y="5890188"/>
+                <a:ext cx="7113742" cy="710194"/>
+              </a:xfrm>
+              <a:prstGeom prst="rect">
+                <a:avLst/>
+              </a:prstGeom>
+              <a:noFill/>
+            </p:spPr>
+            <p:txBody>
+              <a:bodyPr wrap="none" rtlCol="0">
+                <a:spAutoFit/>
+              </a:bodyPr>
+              <a:lstStyle/>
+              <a:p>
+                <a14:m>
+                  <m:oMathPara xmlns:m="http://schemas.openxmlformats.org/officeDocument/2006/math">
+                    <m:oMathParaPr>
+                      <m:jc m:val="centerGroup"/>
+                    </m:oMathParaPr>
+                    <m:oMath xmlns:m="http://schemas.openxmlformats.org/officeDocument/2006/math">
+                      <m:sSub>
+                        <m:sSubPr>
+                          <m:ctrlPr>
+                            <a:rPr lang="en-US" b="0" i="1" smtClean="0">
+                              <a:latin typeface="Cambria Math" panose="02040503050406030204" pitchFamily="18" charset="0"/>
+                            </a:rPr>
+                          </m:ctrlPr>
+                        </m:sSubPr>
+                        <m:e>
+                          <m:r>
+                            <a:rPr lang="en-US" b="0" i="1" smtClean="0">
+                              <a:latin typeface="Cambria Math" panose="02040503050406030204" pitchFamily="18" charset="0"/>
+                            </a:rPr>
+                            <m:t>𝑓</m:t>
+                          </m:r>
+                          <m:r>
+                            <a:rPr lang="en-US" b="0" i="1" smtClean="0">
+                              <a:latin typeface="Cambria Math" panose="02040503050406030204" pitchFamily="18" charset="0"/>
+                            </a:rPr>
+                            <m:t>𝑆</m:t>
+                          </m:r>
+                        </m:e>
+                        <m:sub>
+                          <m:r>
+                            <a:rPr lang="en-US" b="0" i="1" smtClean="0">
+                              <a:latin typeface="Cambria Math" panose="02040503050406030204" pitchFamily="18" charset="0"/>
+                            </a:rPr>
+                            <m:t>𝐿</m:t>
+                          </m:r>
+                        </m:sub>
+                      </m:sSub>
+                      <m:r>
+                        <a:rPr lang="en-US" b="0" i="1" smtClean="0">
+                          <a:latin typeface="Cambria Math" panose="02040503050406030204" pitchFamily="18" charset="0"/>
+                        </a:rPr>
+                        <m:t>+</m:t>
+                      </m:r>
+                      <m:d>
+                        <m:dPr>
+                          <m:ctrlPr>
+                            <a:rPr lang="en-US" b="0" i="1" smtClean="0">
+                              <a:latin typeface="Cambria Math" panose="02040503050406030204" pitchFamily="18" charset="0"/>
+                            </a:rPr>
+                          </m:ctrlPr>
+                        </m:dPr>
+                        <m:e>
+                          <m:r>
+                            <a:rPr lang="en-US" b="0" i="1" smtClean="0">
+                              <a:latin typeface="Cambria Math" panose="02040503050406030204" pitchFamily="18" charset="0"/>
+                            </a:rPr>
+                            <m:t>1−</m:t>
+                          </m:r>
+                          <m:r>
+                            <a:rPr lang="en-US" b="0" i="1" smtClean="0">
+                              <a:latin typeface="Cambria Math" panose="02040503050406030204" pitchFamily="18" charset="0"/>
+                            </a:rPr>
+                            <m:t>𝑓</m:t>
+                          </m:r>
+                        </m:e>
+                      </m:d>
+                      <m:sSub>
+                        <m:sSubPr>
+                          <m:ctrlPr>
+                            <a:rPr lang="en-US" b="0" i="1" smtClean="0">
+                              <a:latin typeface="Cambria Math" panose="02040503050406030204" pitchFamily="18" charset="0"/>
+                            </a:rPr>
+                          </m:ctrlPr>
+                        </m:sSubPr>
+                        <m:e>
+                          <m:r>
+                            <a:rPr lang="en-US" b="0" i="1" smtClean="0">
+                              <a:latin typeface="Cambria Math" panose="02040503050406030204" pitchFamily="18" charset="0"/>
+                            </a:rPr>
+                            <m:t>𝑅</m:t>
+                          </m:r>
+                        </m:e>
+                        <m:sub>
+                          <m:r>
+                            <a:rPr lang="en-US" b="0" i="1" smtClean="0">
+                              <a:latin typeface="Cambria Math" panose="02040503050406030204" pitchFamily="18" charset="0"/>
+                            </a:rPr>
+                            <m:t>𝐿</m:t>
+                          </m:r>
+                        </m:sub>
+                      </m:sSub>
+                      <m:r>
+                        <a:rPr lang="en-US" b="0" i="1" smtClean="0">
+                          <a:latin typeface="Cambria Math" panose="02040503050406030204" pitchFamily="18" charset="0"/>
+                        </a:rPr>
+                        <m:t> =</m:t>
+                      </m:r>
+                      <m:r>
+                        <a:rPr lang="en-US" b="0" i="1" smtClean="0">
+                          <a:latin typeface="Cambria Math" panose="02040503050406030204" pitchFamily="18" charset="0"/>
+                        </a:rPr>
+                        <m:t>𝑓</m:t>
+                      </m:r>
+                      <m:d>
+                        <m:dPr>
+                          <m:begChr m:val="{"/>
+                          <m:endChr m:val=""/>
+                          <m:ctrlPr>
+                            <a:rPr lang="en-US" b="0" i="1" smtClean="0">
+                              <a:latin typeface="Cambria Math" panose="02040503050406030204" pitchFamily="18" charset="0"/>
+                            </a:rPr>
+                          </m:ctrlPr>
+                        </m:dPr>
+                        <m:e>
+                          <m:eqArr>
+                            <m:eqArrPr>
+                              <m:ctrlPr>
+                                <a:rPr lang="en-US" b="0" i="1" smtClean="0">
+                                  <a:latin typeface="Cambria Math" panose="02040503050406030204" pitchFamily="18" charset="0"/>
+                                </a:rPr>
+                              </m:ctrlPr>
+                            </m:eqArrPr>
+                            <m:e>
+                              <m:r>
+                                <a:rPr lang="en-US" b="0" i="1" smtClean="0">
+                                  <a:latin typeface="Cambria Math" panose="02040503050406030204" pitchFamily="18" charset="0"/>
+                                </a:rPr>
+                                <m:t>𝑞</m:t>
+                              </m:r>
+                              <m:r>
+                                <a:rPr lang="en-US" b="0" i="1" smtClean="0">
+                                  <a:latin typeface="Cambria Math" panose="02040503050406030204" pitchFamily="18" charset="0"/>
+                                </a:rPr>
+                                <m:t> </m:t>
+                              </m:r>
+                              <m:r>
+                                <a:rPr lang="en-US" b="0" i="1" smtClean="0">
+                                  <a:latin typeface="Cambria Math" panose="02040503050406030204" pitchFamily="18" charset="0"/>
+                                </a:rPr>
+                                <m:t>𝑓𝑜𝑟</m:t>
+                              </m:r>
+                              <m:r>
+                                <a:rPr lang="en-US" b="0" i="1" smtClean="0">
+                                  <a:latin typeface="Cambria Math" panose="02040503050406030204" pitchFamily="18" charset="0"/>
+                                </a:rPr>
+                                <m:t>  </m:t>
+                              </m:r>
+                              <m:r>
+                                <a:rPr lang="en-US" b="0" i="1" smtClean="0">
+                                  <a:latin typeface="Cambria Math" panose="02040503050406030204" pitchFamily="18" charset="0"/>
+                                </a:rPr>
+                                <m:t>𝑞</m:t>
+                              </m:r>
+                              <m:r>
+                                <a:rPr lang="en-US" b="0" i="1" smtClean="0">
+                                  <a:latin typeface="Cambria Math" panose="02040503050406030204" pitchFamily="18" charset="0"/>
+                                </a:rPr>
+                                <m:t>&lt;0.5</m:t>
+                              </m:r>
+                            </m:e>
+                            <m:e>
+                              <m:r>
+                                <a:rPr lang="en-US" b="0" i="1" smtClean="0">
+                                  <a:latin typeface="Cambria Math" panose="02040503050406030204" pitchFamily="18" charset="0"/>
+                                </a:rPr>
+                                <m:t>1−</m:t>
+                              </m:r>
+                              <m:r>
+                                <a:rPr lang="en-US" b="0" i="1" smtClean="0">
+                                  <a:latin typeface="Cambria Math" panose="02040503050406030204" pitchFamily="18" charset="0"/>
+                                </a:rPr>
+                                <m:t>𝑞</m:t>
+                              </m:r>
+                              <m:r>
+                                <a:rPr lang="en-US" b="0" i="1" smtClean="0">
+                                  <a:latin typeface="Cambria Math" panose="02040503050406030204" pitchFamily="18" charset="0"/>
+                                </a:rPr>
+                                <m:t> </m:t>
+                              </m:r>
+                              <m:r>
+                                <a:rPr lang="en-US" b="0" i="1" smtClean="0">
+                                  <a:latin typeface="Cambria Math" panose="02040503050406030204" pitchFamily="18" charset="0"/>
+                                </a:rPr>
+                                <m:t>𝑓𝑜𝑟</m:t>
+                              </m:r>
+                              <m:r>
+                                <a:rPr lang="en-US" b="0" i="1" smtClean="0">
+                                  <a:latin typeface="Cambria Math" panose="02040503050406030204" pitchFamily="18" charset="0"/>
+                                </a:rPr>
+                                <m:t> </m:t>
+                              </m:r>
+                              <m:r>
+                                <a:rPr lang="en-US" b="0" i="1" smtClean="0">
+                                  <a:latin typeface="Cambria Math" panose="02040503050406030204" pitchFamily="18" charset="0"/>
+                                </a:rPr>
+                                <m:t>𝑞</m:t>
+                              </m:r>
+                              <m:r>
+                                <a:rPr lang="en-US" b="0" i="1" smtClean="0">
+                                  <a:latin typeface="Cambria Math" panose="02040503050406030204" pitchFamily="18" charset="0"/>
+                                </a:rPr>
+                                <m:t>≥0.5</m:t>
+                              </m:r>
+                            </m:e>
+                          </m:eqArr>
+                        </m:e>
+                      </m:d>
+                      <m:r>
+                        <a:rPr lang="en-US" b="0" i="1" smtClean="0">
+                          <a:latin typeface="Cambria Math" panose="02040503050406030204" pitchFamily="18" charset="0"/>
+                        </a:rPr>
+                        <m:t>+</m:t>
+                      </m:r>
+                      <m:d>
+                        <m:dPr>
+                          <m:ctrlPr>
+                            <a:rPr lang="en-US" b="0" i="1" smtClean="0">
+                              <a:latin typeface="Cambria Math" panose="02040503050406030204" pitchFamily="18" charset="0"/>
+                            </a:rPr>
+                          </m:ctrlPr>
+                        </m:dPr>
+                        <m:e>
+                          <m:r>
+                            <a:rPr lang="en-US" b="0" i="1" smtClean="0">
+                              <a:latin typeface="Cambria Math" panose="02040503050406030204" pitchFamily="18" charset="0"/>
+                            </a:rPr>
+                            <m:t>1−</m:t>
+                          </m:r>
+                          <m:r>
+                            <a:rPr lang="en-US" b="0" i="1" smtClean="0">
+                              <a:latin typeface="Cambria Math" panose="02040503050406030204" pitchFamily="18" charset="0"/>
+                            </a:rPr>
+                            <m:t>𝑓</m:t>
+                          </m:r>
+                        </m:e>
+                      </m:d>
+                      <m:d>
+                        <m:dPr>
+                          <m:begChr m:val="{"/>
+                          <m:endChr m:val=""/>
+                          <m:ctrlPr>
+                            <a:rPr lang="en-US" i="1">
+                              <a:latin typeface="Cambria Math" panose="02040503050406030204" pitchFamily="18" charset="0"/>
+                            </a:rPr>
+                          </m:ctrlPr>
+                        </m:dPr>
+                        <m:e>
+                          <m:eqArr>
+                            <m:eqArrPr>
+                              <m:ctrlPr>
+                                <a:rPr lang="en-US" i="1">
+                                  <a:latin typeface="Cambria Math" panose="02040503050406030204" pitchFamily="18" charset="0"/>
+                                </a:rPr>
+                              </m:ctrlPr>
+                            </m:eqArrPr>
+                            <m:e>
+                              <m:r>
+                                <a:rPr lang="en-US" b="0" i="1" smtClean="0">
+                                  <a:latin typeface="Cambria Math" panose="02040503050406030204" pitchFamily="18" charset="0"/>
+                                </a:rPr>
+                                <m:t>𝑟</m:t>
+                              </m:r>
+                              <m:r>
+                                <a:rPr lang="en-US" i="1">
+                                  <a:latin typeface="Cambria Math" panose="02040503050406030204" pitchFamily="18" charset="0"/>
+                                </a:rPr>
+                                <m:t> </m:t>
+                              </m:r>
+                              <m:r>
+                                <a:rPr lang="en-US" i="1">
+                                  <a:latin typeface="Cambria Math" panose="02040503050406030204" pitchFamily="18" charset="0"/>
+                                </a:rPr>
+                                <m:t>𝑓𝑜𝑟</m:t>
+                              </m:r>
+                              <m:r>
+                                <a:rPr lang="en-US" i="1">
+                                  <a:latin typeface="Cambria Math" panose="02040503050406030204" pitchFamily="18" charset="0"/>
+                                </a:rPr>
+                                <m:t>  </m:t>
+                              </m:r>
+                              <m:r>
+                                <a:rPr lang="en-US" b="0" i="1" smtClean="0">
+                                  <a:latin typeface="Cambria Math" panose="02040503050406030204" pitchFamily="18" charset="0"/>
+                                </a:rPr>
+                                <m:t>𝑟</m:t>
+                              </m:r>
+                              <m:r>
+                                <a:rPr lang="en-US" i="1">
+                                  <a:latin typeface="Cambria Math" panose="02040503050406030204" pitchFamily="18" charset="0"/>
+                                </a:rPr>
+                                <m:t>&lt;0.5</m:t>
+                              </m:r>
+                            </m:e>
+                            <m:e>
+                              <m:r>
+                                <a:rPr lang="en-US" i="1">
+                                  <a:latin typeface="Cambria Math" panose="02040503050406030204" pitchFamily="18" charset="0"/>
+                                </a:rPr>
+                                <m:t>1−</m:t>
+                              </m:r>
+                              <m:r>
+                                <a:rPr lang="en-US" b="0" i="1" smtClean="0">
+                                  <a:latin typeface="Cambria Math" panose="02040503050406030204" pitchFamily="18" charset="0"/>
+                                </a:rPr>
+                                <m:t>𝑟</m:t>
+                              </m:r>
+                              <m:r>
+                                <a:rPr lang="en-US" i="1">
+                                  <a:latin typeface="Cambria Math" panose="02040503050406030204" pitchFamily="18" charset="0"/>
+                                </a:rPr>
+                                <m:t> </m:t>
+                              </m:r>
+                              <m:r>
+                                <a:rPr lang="en-US" i="1">
+                                  <a:latin typeface="Cambria Math" panose="02040503050406030204" pitchFamily="18" charset="0"/>
+                                </a:rPr>
+                                <m:t>𝑓𝑜𝑟</m:t>
+                              </m:r>
+                              <m:r>
+                                <a:rPr lang="en-US" i="1">
+                                  <a:latin typeface="Cambria Math" panose="02040503050406030204" pitchFamily="18" charset="0"/>
+                                </a:rPr>
+                                <m:t> </m:t>
+                              </m:r>
+                              <m:r>
+                                <a:rPr lang="en-US" b="0" i="1" smtClean="0">
+                                  <a:latin typeface="Cambria Math" panose="02040503050406030204" pitchFamily="18" charset="0"/>
+                                </a:rPr>
+                                <m:t>𝑟</m:t>
+                              </m:r>
+                              <m:r>
+                                <a:rPr lang="en-US" i="1">
+                                  <a:latin typeface="Cambria Math" panose="02040503050406030204" pitchFamily="18" charset="0"/>
+                                </a:rPr>
+                                <m:t>≥0.5</m:t>
+                              </m:r>
+                            </m:e>
+                          </m:eqArr>
+                        </m:e>
+                      </m:d>
+                    </m:oMath>
+                  </m:oMathPara>
+                </a14:m>
+                <a:endParaRPr lang="en-US" dirty="0"/>
+              </a:p>
+            </p:txBody>
+          </p:sp>
+        </mc:Choice>
+        <mc:Fallback>
+          <p:sp>
+            <p:nvSpPr>
+              <p:cNvPr id="27" name="TextBox 26">
+                <a:extLst>
+                  <a:ext uri="{FF2B5EF4-FFF2-40B4-BE49-F238E27FC236}">
+                    <a16:creationId xmlns:a16="http://schemas.microsoft.com/office/drawing/2014/main" id="{620639E5-75CD-2A06-40A0-BB7D66D97428}"/>
+                  </a:ext>
+                </a:extLst>
+              </p:cNvPr>
+              <p:cNvSpPr txBox="1">
+                <a:spLocks noRot="1" noChangeAspect="1" noMove="1" noResize="1" noEditPoints="1" noAdjustHandles="1" noChangeArrowheads="1" noChangeShapeType="1" noTextEdit="1"/>
+              </p:cNvSpPr>
+              <p:nvPr/>
+            </p:nvSpPr>
+            <p:spPr>
+              <a:xfrm>
+                <a:off x="3171841" y="5890188"/>
+                <a:ext cx="7113742" cy="710194"/>
+              </a:xfrm>
+              <a:prstGeom prst="rect">
+                <a:avLst/>
+              </a:prstGeom>
+              <a:blipFill>
+                <a:blip r:embed="rId9"/>
+                <a:stretch>
+                  <a:fillRect/>
+                </a:stretch>
+              </a:blipFill>
+            </p:spPr>
+            <p:txBody>
+              <a:bodyPr/>
+              <a:lstStyle/>
+              <a:p>
+                <a:r>
+                  <a:rPr lang="en-US">
+                    <a:noFill/>
+                  </a:rPr>
+                  <a:t> </a:t>
+                </a:r>
+              </a:p>
+            </p:txBody>
+          </p:sp>
+        </mc:Fallback>
+      </mc:AlternateContent>
+      <mc:AlternateContent xmlns:mc="http://schemas.openxmlformats.org/markup-compatibility/2006">
+        <mc:Choice xmlns:a14="http://schemas.microsoft.com/office/drawing/2010/main" Requires="a14">
+          <p:sp>
+            <p:nvSpPr>
+              <p:cNvPr id="28" name="TextBox 27">
+                <a:extLst>
+                  <a:ext uri="{FF2B5EF4-FFF2-40B4-BE49-F238E27FC236}">
+                    <a16:creationId xmlns:a16="http://schemas.microsoft.com/office/drawing/2014/main" id="{7999A3B9-CC65-86EA-3644-BB4EE6ED646A}"/>
+                  </a:ext>
+                </a:extLst>
+              </p:cNvPr>
+              <p:cNvSpPr txBox="1"/>
+              <p:nvPr/>
+            </p:nvSpPr>
+            <p:spPr>
+              <a:xfrm>
+                <a:off x="7605167" y="3744250"/>
+                <a:ext cx="3841501" cy="646331"/>
+              </a:xfrm>
+              <a:prstGeom prst="rect">
+                <a:avLst/>
+              </a:prstGeom>
+              <a:noFill/>
+            </p:spPr>
+            <p:txBody>
+              <a:bodyPr wrap="none" rtlCol="0">
+                <a:spAutoFit/>
+              </a:bodyPr>
+              <a:lstStyle/>
+              <a:p>
+                <a14:m>
+                  <m:oMathPara xmlns:m="http://schemas.openxmlformats.org/officeDocument/2006/math">
+                    <m:oMathParaPr>
+                      <m:jc m:val="centerGroup"/>
+                    </m:oMathParaPr>
+                    <m:oMath xmlns:m="http://schemas.openxmlformats.org/officeDocument/2006/math">
+                      <m:r>
+                        <a:rPr lang="en-US" b="0" i="1" smtClean="0">
+                          <a:latin typeface="Cambria Math" panose="02040503050406030204" pitchFamily="18" charset="0"/>
+                        </a:rPr>
+                        <m:t>𝑓𝑞</m:t>
+                      </m:r>
+                      <m:r>
+                        <a:rPr lang="en-US" b="0" i="1" smtClean="0">
+                          <a:latin typeface="Cambria Math" panose="02040503050406030204" pitchFamily="18" charset="0"/>
+                        </a:rPr>
+                        <m:t>+</m:t>
+                      </m:r>
+                      <m:d>
+                        <m:dPr>
+                          <m:ctrlPr>
+                            <a:rPr lang="en-US" b="0" i="1" smtClean="0">
+                              <a:latin typeface="Cambria Math" panose="02040503050406030204" pitchFamily="18" charset="0"/>
+                            </a:rPr>
+                          </m:ctrlPr>
+                        </m:dPr>
+                        <m:e>
+                          <m:r>
+                            <a:rPr lang="en-US" b="0" i="1" smtClean="0">
+                              <a:latin typeface="Cambria Math" panose="02040503050406030204" pitchFamily="18" charset="0"/>
+                            </a:rPr>
+                            <m:t>1−</m:t>
+                          </m:r>
+                          <m:r>
+                            <a:rPr lang="en-US" b="0" i="1" smtClean="0">
+                              <a:latin typeface="Cambria Math" panose="02040503050406030204" pitchFamily="18" charset="0"/>
+                            </a:rPr>
+                            <m:t>𝑓</m:t>
+                          </m:r>
+                        </m:e>
+                      </m:d>
+                      <m:r>
+                        <a:rPr lang="en-US" b="0" i="1" smtClean="0">
+                          <a:latin typeface="Cambria Math" panose="02040503050406030204" pitchFamily="18" charset="0"/>
+                        </a:rPr>
+                        <m:t>𝑟</m:t>
+                      </m:r>
+                      <m:r>
+                        <a:rPr lang="en-US" b="0" i="1" smtClean="0">
+                          <a:latin typeface="Cambria Math" panose="02040503050406030204" pitchFamily="18" charset="0"/>
+                        </a:rPr>
+                        <m:t>=</m:t>
+                      </m:r>
+                      <m:r>
+                        <a:rPr lang="en-US" b="0" i="1" smtClean="0">
+                          <a:latin typeface="Cambria Math" panose="02040503050406030204" pitchFamily="18" charset="0"/>
+                        </a:rPr>
+                        <m:t>𝑝</m:t>
+                      </m:r>
+                    </m:oMath>
+                  </m:oMathPara>
+                </a14:m>
+                <a:endParaRPr lang="en-US" b="0" dirty="0"/>
+              </a:p>
+              <a:p>
+                <a14:m>
+                  <m:oMathPara xmlns:m="http://schemas.openxmlformats.org/officeDocument/2006/math">
+                    <m:oMathParaPr>
+                      <m:jc m:val="centerGroup"/>
+                    </m:oMathParaPr>
+                    <m:oMath xmlns:m="http://schemas.openxmlformats.org/officeDocument/2006/math">
+                      <m:r>
+                        <a:rPr lang="en-US" b="0" i="1" smtClean="0">
+                          <a:latin typeface="Cambria Math" panose="02040503050406030204" pitchFamily="18" charset="0"/>
+                        </a:rPr>
+                        <m:t>𝑓</m:t>
+                      </m:r>
+                      <m:d>
+                        <m:dPr>
+                          <m:ctrlPr>
+                            <a:rPr lang="en-US" b="0" i="1" smtClean="0">
+                              <a:latin typeface="Cambria Math" panose="02040503050406030204" pitchFamily="18" charset="0"/>
+                            </a:rPr>
+                          </m:ctrlPr>
+                        </m:dPr>
+                        <m:e>
+                          <m:r>
+                            <a:rPr lang="en-US" b="0" i="1" smtClean="0">
+                              <a:latin typeface="Cambria Math" panose="02040503050406030204" pitchFamily="18" charset="0"/>
+                            </a:rPr>
+                            <m:t>1−</m:t>
+                          </m:r>
+                          <m:r>
+                            <a:rPr lang="en-US" b="0" i="1" smtClean="0">
+                              <a:latin typeface="Cambria Math" panose="02040503050406030204" pitchFamily="18" charset="0"/>
+                            </a:rPr>
+                            <m:t>𝑞</m:t>
+                          </m:r>
+                        </m:e>
+                      </m:d>
+                      <m:r>
+                        <a:rPr lang="en-US" b="0" i="1" smtClean="0">
+                          <a:latin typeface="Cambria Math" panose="02040503050406030204" pitchFamily="18" charset="0"/>
+                        </a:rPr>
+                        <m:t>+</m:t>
+                      </m:r>
+                      <m:d>
+                        <m:dPr>
+                          <m:ctrlPr>
+                            <a:rPr lang="en-US" b="0" i="1" smtClean="0">
+                              <a:latin typeface="Cambria Math" panose="02040503050406030204" pitchFamily="18" charset="0"/>
+                            </a:rPr>
+                          </m:ctrlPr>
+                        </m:dPr>
+                        <m:e>
+                          <m:r>
+                            <a:rPr lang="en-US" b="0" i="1" smtClean="0">
+                              <a:latin typeface="Cambria Math" panose="02040503050406030204" pitchFamily="18" charset="0"/>
+                            </a:rPr>
+                            <m:t>1−</m:t>
+                          </m:r>
+                          <m:r>
+                            <a:rPr lang="en-US" b="0" i="1" smtClean="0">
+                              <a:latin typeface="Cambria Math" panose="02040503050406030204" pitchFamily="18" charset="0"/>
+                            </a:rPr>
+                            <m:t>𝑓</m:t>
+                          </m:r>
+                        </m:e>
+                      </m:d>
+                      <m:d>
+                        <m:dPr>
+                          <m:ctrlPr>
+                            <a:rPr lang="en-US" b="0" i="1" smtClean="0">
+                              <a:latin typeface="Cambria Math" panose="02040503050406030204" pitchFamily="18" charset="0"/>
+                            </a:rPr>
+                          </m:ctrlPr>
+                        </m:dPr>
+                        <m:e>
+                          <m:r>
+                            <a:rPr lang="en-US" b="0" i="1" smtClean="0">
+                              <a:latin typeface="Cambria Math" panose="02040503050406030204" pitchFamily="18" charset="0"/>
+                            </a:rPr>
+                            <m:t>1−</m:t>
+                          </m:r>
+                          <m:r>
+                            <a:rPr lang="en-US" b="0" i="1" smtClean="0">
+                              <a:latin typeface="Cambria Math" panose="02040503050406030204" pitchFamily="18" charset="0"/>
+                            </a:rPr>
+                            <m:t>𝑟</m:t>
+                          </m:r>
+                        </m:e>
+                      </m:d>
+                      <m:r>
+                        <a:rPr lang="en-US" b="0" i="1" smtClean="0">
+                          <a:latin typeface="Cambria Math" panose="02040503050406030204" pitchFamily="18" charset="0"/>
+                        </a:rPr>
+                        <m:t>=(1−</m:t>
+                      </m:r>
+                      <m:r>
+                        <a:rPr lang="en-US" b="0" i="1" smtClean="0">
+                          <a:latin typeface="Cambria Math" panose="02040503050406030204" pitchFamily="18" charset="0"/>
+                        </a:rPr>
+                        <m:t>𝑝</m:t>
+                      </m:r>
+                      <m:r>
+                        <a:rPr lang="en-US" b="0" i="1" smtClean="0">
+                          <a:latin typeface="Cambria Math" panose="02040503050406030204" pitchFamily="18" charset="0"/>
+                        </a:rPr>
+                        <m:t>)</m:t>
+                      </m:r>
+                    </m:oMath>
+                  </m:oMathPara>
+                </a14:m>
+                <a:endParaRPr lang="en-US" dirty="0"/>
+              </a:p>
+            </p:txBody>
+          </p:sp>
+        </mc:Choice>
+        <mc:Fallback>
+          <p:sp>
+            <p:nvSpPr>
+              <p:cNvPr id="28" name="TextBox 27">
+                <a:extLst>
+                  <a:ext uri="{FF2B5EF4-FFF2-40B4-BE49-F238E27FC236}">
+                    <a16:creationId xmlns:a16="http://schemas.microsoft.com/office/drawing/2014/main" id="{7999A3B9-CC65-86EA-3644-BB4EE6ED646A}"/>
+                  </a:ext>
+                </a:extLst>
+              </p:cNvPr>
+              <p:cNvSpPr txBox="1">
+                <a:spLocks noRot="1" noChangeAspect="1" noMove="1" noResize="1" noEditPoints="1" noAdjustHandles="1" noChangeArrowheads="1" noChangeShapeType="1" noTextEdit="1"/>
+              </p:cNvSpPr>
+              <p:nvPr/>
+            </p:nvSpPr>
+            <p:spPr>
+              <a:xfrm>
+                <a:off x="7605167" y="3744250"/>
+                <a:ext cx="3841501" cy="646331"/>
+              </a:xfrm>
+              <a:prstGeom prst="rect">
+                <a:avLst/>
+              </a:prstGeom>
+              <a:blipFill>
+                <a:blip r:embed="rId10"/>
+                <a:stretch>
+                  <a:fillRect b="-7547"/>
+                </a:stretch>
+              </a:blipFill>
+            </p:spPr>
+            <p:txBody>
+              <a:bodyPr/>
+              <a:lstStyle/>
+              <a:p>
+                <a:r>
+                  <a:rPr lang="en-US">
+                    <a:noFill/>
+                  </a:rPr>
+                  <a:t> </a:t>
+                </a:r>
+              </a:p>
+            </p:txBody>
+          </p:sp>
+        </mc:Fallback>
+      </mc:AlternateContent>
+    </p:spTree>
+    <p:extLst>
+      <p:ext uri="{BB962C8B-B14F-4D97-AF65-F5344CB8AC3E}">
+        <p14:creationId xmlns:p14="http://schemas.microsoft.com/office/powerpoint/2010/main" val="458976005"/>
+      </p:ext>
+    </p:extLst>
+  </p:cSld>
+  <p:clrMapOvr>
+    <a:masterClrMapping/>
+  </p:clrMapOvr>
+</p:sld>
+</file>
+
+<file path=ppt/slides/slide23.xml><?xml version="1.0" encoding="utf-8"?>
+<p:sld xmlns:a="http://schemas.openxmlformats.org/drawingml/2006/main" xmlns:r="http://schemas.openxmlformats.org/officeDocument/2006/relationships" xmlns:p="http://schemas.openxmlformats.org/presentationml/2006/main">
+  <p:cSld>
+    <p:spTree>
+      <p:nvGrpSpPr>
+        <p:cNvPr id="1" name=""/>
+        <p:cNvGrpSpPr/>
+        <p:nvPr/>
+      </p:nvGrpSpPr>
+      <p:grpSpPr>
+        <a:xfrm>
+          <a:off x="0" y="0"/>
+          <a:ext cx="0" cy="0"/>
+          <a:chOff x="0" y="0"/>
+          <a:chExt cx="0" cy="0"/>
+        </a:xfrm>
+      </p:grpSpPr>
+      <p:sp>
+        <p:nvSpPr>
+          <p:cNvPr id="2" name="Title 1">
+            <a:extLst>
+              <a:ext uri="{FF2B5EF4-FFF2-40B4-BE49-F238E27FC236}">
                 <a16:creationId xmlns:a16="http://schemas.microsoft.com/office/drawing/2014/main" id="{575301D9-40F1-2CA2-D120-12BD23B2401C}"/>
               </a:ext>
             </a:extLst>
@@ -29850,7 +32073,7 @@
 </p:sld>
 </file>
 
-<file path=ppt/slides/slide23.xml><?xml version="1.0" encoding="utf-8"?>
+<file path=ppt/slides/slide24.xml><?xml version="1.0" encoding="utf-8"?>
 <p:sld xmlns:a="http://schemas.openxmlformats.org/drawingml/2006/main" xmlns:r="http://schemas.openxmlformats.org/officeDocument/2006/relationships" xmlns:p="http://schemas.openxmlformats.org/presentationml/2006/main">
   <p:cSld>
     <p:spTree>
@@ -29895,8 +32118,8 @@
           </a:p>
         </p:txBody>
       </p:sp>
-      <mc:AlternateContent xmlns:mc="http://schemas.openxmlformats.org/markup-compatibility/2006">
-        <mc:Choice xmlns:a14="http://schemas.microsoft.com/office/drawing/2010/main" Requires="a14">
+      <mc:AlternateContent xmlns:mc="http://schemas.openxmlformats.org/markup-compatibility/2006" xmlns:a14="http://schemas.microsoft.com/office/drawing/2010/main">
+        <mc:Choice Requires="a14">
           <p:sp>
             <p:nvSpPr>
               <p:cNvPr id="3" name="Content Placeholder 2">
@@ -30443,7 +32666,7 @@
             </p:txBody>
           </p:sp>
         </mc:Choice>
-        <mc:Fallback>
+        <mc:Fallback xmlns="">
           <p:sp>
             <p:nvSpPr>
               <p:cNvPr id="3" name="Content Placeholder 2">
@@ -30496,7 +32719,7 @@
 </p:sld>
 </file>
 
-<file path=ppt/slides/slide24.xml><?xml version="1.0" encoding="utf-8"?>
+<file path=ppt/slides/slide25.xml><?xml version="1.0" encoding="utf-8"?>
 <p:sld xmlns:a="http://schemas.openxmlformats.org/drawingml/2006/main" xmlns:r="http://schemas.openxmlformats.org/officeDocument/2006/relationships" xmlns:p="http://schemas.openxmlformats.org/presentationml/2006/main">
   <p:cSld>
     <p:spTree>
@@ -30541,8 +32764,8 @@
           </a:p>
         </p:txBody>
       </p:sp>
-      <mc:AlternateContent xmlns:mc="http://schemas.openxmlformats.org/markup-compatibility/2006">
-        <mc:Choice xmlns:a14="http://schemas.microsoft.com/office/drawing/2010/main" Requires="a14">
+      <mc:AlternateContent xmlns:mc="http://schemas.openxmlformats.org/markup-compatibility/2006" xmlns:a14="http://schemas.microsoft.com/office/drawing/2010/main">
+        <mc:Choice Requires="a14">
           <p:sp>
             <p:nvSpPr>
               <p:cNvPr id="3" name="Content Placeholder 2">
@@ -31215,7 +33438,7 @@
             </p:txBody>
           </p:sp>
         </mc:Choice>
-        <mc:Fallback>
+        <mc:Fallback xmlns="">
           <p:sp>
             <p:nvSpPr>
               <p:cNvPr id="3" name="Content Placeholder 2">
@@ -31268,7 +33491,7 @@
 </p:sld>
 </file>
 
-<file path=ppt/slides/slide25.xml><?xml version="1.0" encoding="utf-8"?>
+<file path=ppt/slides/slide26.xml><?xml version="1.0" encoding="utf-8"?>
 <p:sld xmlns:a="http://schemas.openxmlformats.org/drawingml/2006/main" xmlns:r="http://schemas.openxmlformats.org/officeDocument/2006/relationships" xmlns:p="http://schemas.openxmlformats.org/presentationml/2006/main">
   <p:cSld>
     <p:spTree>
@@ -31351,7 +33574,7 @@
 </p:sld>
 </file>
 
-<file path=ppt/slides/slide26.xml><?xml version="1.0" encoding="utf-8"?>
+<file path=ppt/slides/slide27.xml><?xml version="1.0" encoding="utf-8"?>
 <p:sld xmlns:a="http://schemas.openxmlformats.org/drawingml/2006/main" xmlns:r="http://schemas.openxmlformats.org/officeDocument/2006/relationships" xmlns:p="http://schemas.openxmlformats.org/presentationml/2006/main">
   <p:cSld>
     <p:spTree>

</xml_diff>

<commit_message>
Add Why Misclassification Error is not sensitive
</commit_message>
<xml_diff>
--- a/DecisionTrees/DecisionTrees.pptx
+++ b/DecisionTrees/DecisionTrees.pptx
@@ -8556,7 +8556,7 @@
           <a:p>
             <a:fld id="{7E292AB8-5F8F-4402-9592-F9413DCC0C16}" type="datetimeFigureOut">
               <a:rPr lang="en-US" smtClean="0"/>
-              <a:t>7/10/2023</a:t>
+              <a:t>7/13/2023</a:t>
             </a:fld>
             <a:endParaRPr lang="en-US"/>
           </a:p>
@@ -8754,7 +8754,7 @@
           <a:p>
             <a:fld id="{7E292AB8-5F8F-4402-9592-F9413DCC0C16}" type="datetimeFigureOut">
               <a:rPr lang="en-US" smtClean="0"/>
-              <a:t>7/10/2023</a:t>
+              <a:t>7/13/2023</a:t>
             </a:fld>
             <a:endParaRPr lang="en-US"/>
           </a:p>
@@ -8962,7 +8962,7 @@
           <a:p>
             <a:fld id="{7E292AB8-5F8F-4402-9592-F9413DCC0C16}" type="datetimeFigureOut">
               <a:rPr lang="en-US" smtClean="0"/>
-              <a:t>7/10/2023</a:t>
+              <a:t>7/13/2023</a:t>
             </a:fld>
             <a:endParaRPr lang="en-US"/>
           </a:p>
@@ -9160,7 +9160,7 @@
           <a:p>
             <a:fld id="{7E292AB8-5F8F-4402-9592-F9413DCC0C16}" type="datetimeFigureOut">
               <a:rPr lang="en-US" smtClean="0"/>
-              <a:t>7/10/2023</a:t>
+              <a:t>7/13/2023</a:t>
             </a:fld>
             <a:endParaRPr lang="en-US"/>
           </a:p>
@@ -9435,7 +9435,7 @@
           <a:p>
             <a:fld id="{7E292AB8-5F8F-4402-9592-F9413DCC0C16}" type="datetimeFigureOut">
               <a:rPr lang="en-US" smtClean="0"/>
-              <a:t>7/10/2023</a:t>
+              <a:t>7/13/2023</a:t>
             </a:fld>
             <a:endParaRPr lang="en-US"/>
           </a:p>
@@ -9700,7 +9700,7 @@
           <a:p>
             <a:fld id="{7E292AB8-5F8F-4402-9592-F9413DCC0C16}" type="datetimeFigureOut">
               <a:rPr lang="en-US" smtClean="0"/>
-              <a:t>7/10/2023</a:t>
+              <a:t>7/13/2023</a:t>
             </a:fld>
             <a:endParaRPr lang="en-US"/>
           </a:p>
@@ -10112,7 +10112,7 @@
           <a:p>
             <a:fld id="{7E292AB8-5F8F-4402-9592-F9413DCC0C16}" type="datetimeFigureOut">
               <a:rPr lang="en-US" smtClean="0"/>
-              <a:t>7/10/2023</a:t>
+              <a:t>7/13/2023</a:t>
             </a:fld>
             <a:endParaRPr lang="en-US"/>
           </a:p>
@@ -10253,7 +10253,7 @@
           <a:p>
             <a:fld id="{7E292AB8-5F8F-4402-9592-F9413DCC0C16}" type="datetimeFigureOut">
               <a:rPr lang="en-US" smtClean="0"/>
-              <a:t>7/10/2023</a:t>
+              <a:t>7/13/2023</a:t>
             </a:fld>
             <a:endParaRPr lang="en-US"/>
           </a:p>
@@ -10366,7 +10366,7 @@
           <a:p>
             <a:fld id="{7E292AB8-5F8F-4402-9592-F9413DCC0C16}" type="datetimeFigureOut">
               <a:rPr lang="en-US" smtClean="0"/>
-              <a:t>7/10/2023</a:t>
+              <a:t>7/13/2023</a:t>
             </a:fld>
             <a:endParaRPr lang="en-US"/>
           </a:p>
@@ -10677,7 +10677,7 @@
           <a:p>
             <a:fld id="{7E292AB8-5F8F-4402-9592-F9413DCC0C16}" type="datetimeFigureOut">
               <a:rPr lang="en-US" smtClean="0"/>
-              <a:t>7/10/2023</a:t>
+              <a:t>7/13/2023</a:t>
             </a:fld>
             <a:endParaRPr lang="en-US"/>
           </a:p>
@@ -10965,7 +10965,7 @@
           <a:p>
             <a:fld id="{7E292AB8-5F8F-4402-9592-F9413DCC0C16}" type="datetimeFigureOut">
               <a:rPr lang="en-US" smtClean="0"/>
-              <a:t>7/10/2023</a:t>
+              <a:t>7/13/2023</a:t>
             </a:fld>
             <a:endParaRPr lang="en-US"/>
           </a:p>
@@ -11206,7 +11206,7 @@
           <a:p>
             <a:fld id="{7E292AB8-5F8F-4402-9592-F9413DCC0C16}" type="datetimeFigureOut">
               <a:rPr lang="en-US" smtClean="0"/>
-              <a:t>7/10/2023</a:t>
+              <a:t>7/13/2023</a:t>
             </a:fld>
             <a:endParaRPr lang="en-US"/>
           </a:p>
@@ -24039,10 +24039,9 @@
             <a:p>
               <a:pPr algn="ctr"/>
               <a:r>
-                <a:rPr lang="en-US" dirty="0" err="1"/>
+                <a:rPr lang="en-US" dirty="0"/>
                 <a:t>Bajji</a:t>
               </a:r>
-              <a:endParaRPr lang="en-US" dirty="0"/>
             </a:p>
           </p:txBody>
         </p:sp>
@@ -25769,10 +25768,9 @@
             <a:p>
               <a:pPr algn="ctr"/>
               <a:r>
-                <a:rPr lang="en-US" dirty="0" err="1"/>
+                <a:rPr lang="en-US" dirty="0"/>
                 <a:t>Bajji</a:t>
               </a:r>
-              <a:endParaRPr lang="en-US" dirty="0"/>
             </a:p>
           </p:txBody>
         </p:sp>
@@ -26698,10 +26696,9 @@
             <a:p>
               <a:pPr algn="ctr"/>
               <a:r>
-                <a:rPr lang="en-US" dirty="0" err="1"/>
+                <a:rPr lang="en-US" dirty="0"/>
                 <a:t>Bajji</a:t>
               </a:r>
-              <a:endParaRPr lang="en-US" dirty="0"/>
             </a:p>
           </p:txBody>
         </p:sp>
@@ -28099,10 +28096,9 @@
             <a:p>
               <a:pPr algn="ctr"/>
               <a:r>
-                <a:rPr lang="en-US" dirty="0" err="1"/>
+                <a:rPr lang="en-US" dirty="0"/>
                 <a:t>Bajji</a:t>
               </a:r>
-              <a:endParaRPr lang="en-US" dirty="0"/>
             </a:p>
           </p:txBody>
         </p:sp>
@@ -28294,13 +28290,13 @@
           <a:p>
             <a:r>
               <a:rPr lang="en-US" dirty="0"/>
-              <a:t>#Ice Cream 60</a:t>
+              <a:t>#Ice Cream 80</a:t>
             </a:r>
           </a:p>
           <a:p>
             <a:r>
               <a:rPr lang="en-US" dirty="0"/>
-              <a:t>#Bajji 40</a:t>
+              <a:t>#Bajji 20</a:t>
             </a:r>
           </a:p>
         </p:txBody>
@@ -28352,13 +28348,13 @@
           <a:p>
             <a:r>
               <a:rPr lang="en-US" dirty="0"/>
-              <a:t>#Ice Cream 55</a:t>
+              <a:t>#Ice Cream 40</a:t>
             </a:r>
           </a:p>
           <a:p>
             <a:r>
               <a:rPr lang="en-US" dirty="0"/>
-              <a:t>#Bajji 6</a:t>
+              <a:t>#Bajji 5</a:t>
             </a:r>
           </a:p>
         </p:txBody>
@@ -28377,8 +28373,8 @@
         </p:nvSpPr>
         <p:spPr>
           <a:xfrm>
-            <a:off x="3226285" y="4607305"/>
-            <a:ext cx="1404744" cy="646331"/>
+            <a:off x="3109266" y="4607305"/>
+            <a:ext cx="1521763" cy="646331"/>
           </a:xfrm>
           <a:prstGeom prst="rect">
             <a:avLst/>
@@ -28411,20 +28407,20 @@
             <a:pPr algn="r"/>
             <a:r>
               <a:rPr lang="en-US" dirty="0"/>
-              <a:t>#Ice Cream 5</a:t>
+              <a:t>#Ice Cream 40</a:t>
             </a:r>
           </a:p>
           <a:p>
             <a:pPr algn="r"/>
             <a:r>
               <a:rPr lang="en-US" dirty="0"/>
-              <a:t>#Bajji 34</a:t>
+              <a:t>#Bajji 15</a:t>
             </a:r>
           </a:p>
         </p:txBody>
       </p:sp>
-      <mc:AlternateContent xmlns:mc="http://schemas.openxmlformats.org/markup-compatibility/2006" xmlns:a14="http://schemas.microsoft.com/office/drawing/2010/main">
-        <mc:Choice Requires="a14">
+      <mc:AlternateContent xmlns:mc="http://schemas.openxmlformats.org/markup-compatibility/2006">
+        <mc:Choice xmlns:a14="http://schemas.microsoft.com/office/drawing/2010/main" Requires="a14">
           <p:sp>
             <p:nvSpPr>
               <p:cNvPr id="26" name="TextBox 25">
@@ -28440,7 +28436,7 @@
             <p:spPr>
               <a:xfrm>
                 <a:off x="1089165" y="6337128"/>
-                <a:ext cx="1019831" cy="485774"/>
+                <a:ext cx="1019831" cy="489686"/>
               </a:xfrm>
               <a:prstGeom prst="rect">
                 <a:avLst/>
@@ -28469,18 +28465,18 @@
                       </m:fPr>
                       <m:num>
                         <m:r>
-                          <a:rPr lang="en-US" b="0" i="1" smtClean="0">
+                          <a:rPr lang="en-AU" b="0" i="1" smtClean="0">
                             <a:latin typeface="Cambria Math" panose="02040503050406030204" pitchFamily="18" charset="0"/>
                           </a:rPr>
-                          <m:t>6</m:t>
+                          <m:t>5</m:t>
                         </m:r>
                       </m:num>
                       <m:den>
                         <m:r>
-                          <a:rPr lang="en-US" b="0" i="1" smtClean="0">
+                          <a:rPr lang="en-AU" b="0" i="1" smtClean="0">
                             <a:latin typeface="Cambria Math" panose="02040503050406030204" pitchFamily="18" charset="0"/>
                           </a:rPr>
-                          <m:t>61</m:t>
+                          <m:t>45</m:t>
                         </m:r>
                       </m:den>
                     </m:f>
@@ -28491,7 +28487,7 @@
             </p:txBody>
           </p:sp>
         </mc:Choice>
-        <mc:Fallback xmlns="">
+        <mc:Fallback>
           <p:sp>
             <p:nvSpPr>
               <p:cNvPr id="26" name="TextBox 25">
@@ -28509,7 +28505,7 @@
             <p:spPr>
               <a:xfrm>
                 <a:off x="1089165" y="6337128"/>
-                <a:ext cx="1019831" cy="485774"/>
+                <a:ext cx="1019831" cy="489686"/>
               </a:xfrm>
               <a:prstGeom prst="rect">
                 <a:avLst/>
@@ -28517,7 +28513,7 @@
               <a:blipFill>
                 <a:blip r:embed="rId3"/>
                 <a:stretch>
-                  <a:fillRect l="-5389" b="-8861"/>
+                  <a:fillRect l="-5389" b="-7500"/>
                 </a:stretch>
               </a:blipFill>
             </p:spPr>
@@ -28526,7 +28522,7 @@
               <a:lstStyle/>
               <a:p>
                 <a:r>
-                  <a:rPr lang="en-US">
+                  <a:rPr lang="en-AU">
                     <a:noFill/>
                   </a:rPr>
                   <a:t> </a:t>
@@ -28536,8 +28532,8 @@
           </p:sp>
         </mc:Fallback>
       </mc:AlternateContent>
-      <mc:AlternateContent xmlns:mc="http://schemas.openxmlformats.org/markup-compatibility/2006" xmlns:a14="http://schemas.microsoft.com/office/drawing/2010/main">
-        <mc:Choice Requires="a14">
+      <mc:AlternateContent xmlns:mc="http://schemas.openxmlformats.org/markup-compatibility/2006">
+        <mc:Choice xmlns:a14="http://schemas.microsoft.com/office/drawing/2010/main" Requires="a14">
           <p:sp>
             <p:nvSpPr>
               <p:cNvPr id="27" name="TextBox 26">
@@ -28553,7 +28549,7 @@
             <p:spPr>
               <a:xfrm>
                 <a:off x="2706529" y="6335301"/>
-                <a:ext cx="1015021" cy="489429"/>
+                <a:ext cx="1019831" cy="489686"/>
               </a:xfrm>
               <a:prstGeom prst="rect">
                 <a:avLst/>
@@ -28582,18 +28578,18 @@
                       </m:fPr>
                       <m:num>
                         <m:r>
-                          <a:rPr lang="en-US" b="0" i="1" smtClean="0">
+                          <a:rPr lang="en-AU" b="0" i="1" smtClean="0">
                             <a:latin typeface="Cambria Math" panose="02040503050406030204" pitchFamily="18" charset="0"/>
                           </a:rPr>
-                          <m:t>5</m:t>
+                          <m:t>15</m:t>
                         </m:r>
                       </m:num>
                       <m:den>
                         <m:r>
-                          <a:rPr lang="en-US" b="0" i="1" smtClean="0">
+                          <a:rPr lang="en-AU" b="0" i="1" smtClean="0">
                             <a:latin typeface="Cambria Math" panose="02040503050406030204" pitchFamily="18" charset="0"/>
                           </a:rPr>
-                          <m:t>39</m:t>
+                          <m:t>55</m:t>
                         </m:r>
                       </m:den>
                     </m:f>
@@ -28604,7 +28600,7 @@
             </p:txBody>
           </p:sp>
         </mc:Choice>
-        <mc:Fallback xmlns="">
+        <mc:Fallback>
           <p:sp>
             <p:nvSpPr>
               <p:cNvPr id="27" name="TextBox 26">
@@ -28622,7 +28618,7 @@
             <p:spPr>
               <a:xfrm>
                 <a:off x="2706529" y="6335301"/>
-                <a:ext cx="1015021" cy="489429"/>
+                <a:ext cx="1019831" cy="489686"/>
               </a:xfrm>
               <a:prstGeom prst="rect">
                 <a:avLst/>
@@ -28630,7 +28626,7 @@
               <a:blipFill>
                 <a:blip r:embed="rId4"/>
                 <a:stretch>
-                  <a:fillRect l="-5422" b="-6173"/>
+                  <a:fillRect l="-5389" b="-6173"/>
                 </a:stretch>
               </a:blipFill>
             </p:spPr>
@@ -28639,7 +28635,7 @@
               <a:lstStyle/>
               <a:p>
                 <a:r>
-                  <a:rPr lang="en-US">
+                  <a:rPr lang="en-AU">
                     <a:noFill/>
                   </a:rPr>
                   <a:t> </a:t>
@@ -28649,8 +28645,8 @@
           </p:sp>
         </mc:Fallback>
       </mc:AlternateContent>
-      <mc:AlternateContent xmlns:mc="http://schemas.openxmlformats.org/markup-compatibility/2006" xmlns:a14="http://schemas.microsoft.com/office/drawing/2010/main">
-        <mc:Choice Requires="a14">
+      <mc:AlternateContent xmlns:mc="http://schemas.openxmlformats.org/markup-compatibility/2006">
+        <mc:Choice xmlns:a14="http://schemas.microsoft.com/office/drawing/2010/main" Requires="a14">
           <p:sp>
             <p:nvSpPr>
               <p:cNvPr id="28" name="TextBox 27">
@@ -28695,10 +28691,16 @@
                       </m:fPr>
                       <m:num>
                         <m:r>
+                          <a:rPr lang="en-AU" b="0" i="1" smtClean="0">
+                            <a:latin typeface="Cambria Math" panose="02040503050406030204" pitchFamily="18" charset="0"/>
+                          </a:rPr>
+                          <m:t>2</m:t>
+                        </m:r>
+                        <m:r>
                           <a:rPr lang="en-US" b="0" i="1" smtClean="0">
                             <a:latin typeface="Cambria Math" panose="02040503050406030204" pitchFamily="18" charset="0"/>
                           </a:rPr>
-                          <m:t>40</m:t>
+                          <m:t>0</m:t>
                         </m:r>
                       </m:num>
                       <m:den>
@@ -28717,7 +28719,7 @@
             </p:txBody>
           </p:sp>
         </mc:Choice>
-        <mc:Fallback xmlns="">
+        <mc:Fallback>
           <p:sp>
             <p:nvSpPr>
               <p:cNvPr id="28" name="TextBox 27">
@@ -28752,7 +28754,7 @@
               <a:lstStyle/>
               <a:p>
                 <a:r>
-                  <a:rPr lang="en-US">
+                  <a:rPr lang="en-AU">
                     <a:noFill/>
                   </a:rPr>
                   <a:t> </a:t>
@@ -29028,10 +29030,9 @@
             <a:p>
               <a:pPr algn="ctr"/>
               <a:r>
-                <a:rPr lang="en-US" dirty="0" err="1"/>
+                <a:rPr lang="en-US" dirty="0"/>
                 <a:t>Bajji</a:t>
               </a:r>
-              <a:endParaRPr lang="en-US" dirty="0"/>
             </a:p>
           </p:txBody>
         </p:sp>
@@ -29223,13 +29224,13 @@
           <a:p>
             <a:r>
               <a:rPr lang="en-US" dirty="0"/>
-              <a:t>#Ice Cream 60</a:t>
+              <a:t>#Ice Cream 80</a:t>
             </a:r>
           </a:p>
           <a:p>
             <a:r>
               <a:rPr lang="en-US" dirty="0"/>
-              <a:t>#Bajji 40</a:t>
+              <a:t>#Bajji 20</a:t>
             </a:r>
           </a:p>
         </p:txBody>
@@ -29270,7 +29271,7 @@
           <a:p>
             <a:r>
               <a:rPr lang="en-US" dirty="0"/>
-              <a:t>#Bajji 15</a:t>
+              <a:t>#Bajji 10</a:t>
             </a:r>
           </a:p>
         </p:txBody>
@@ -29306,20 +29307,20 @@
             <a:pPr algn="r"/>
             <a:r>
               <a:rPr lang="en-US" dirty="0"/>
-              <a:t>#Ice Cream 25</a:t>
+              <a:t>#Ice Cream 45</a:t>
             </a:r>
           </a:p>
           <a:p>
             <a:pPr algn="r"/>
             <a:r>
               <a:rPr lang="en-US" dirty="0"/>
-              <a:t>#Bajji 25</a:t>
+              <a:t>#Bajji 10</a:t>
             </a:r>
           </a:p>
         </p:txBody>
       </p:sp>
-      <mc:AlternateContent xmlns:mc="http://schemas.openxmlformats.org/markup-compatibility/2006" xmlns:a14="http://schemas.microsoft.com/office/drawing/2010/main">
-        <mc:Choice Requires="a14">
+      <mc:AlternateContent xmlns:mc="http://schemas.openxmlformats.org/markup-compatibility/2006">
+        <mc:Choice xmlns:a14="http://schemas.microsoft.com/office/drawing/2010/main" Requires="a14">
           <p:sp>
             <p:nvSpPr>
               <p:cNvPr id="43" name="TextBox 42">
@@ -29367,15 +29368,21 @@
                           <a:rPr lang="en-US" b="0" i="1" smtClean="0">
                             <a:latin typeface="Cambria Math" panose="02040503050406030204" pitchFamily="18" charset="0"/>
                           </a:rPr>
-                          <m:t>15</m:t>
+                          <m:t>1</m:t>
+                        </m:r>
+                        <m:r>
+                          <a:rPr lang="en-AU" b="0" i="1" smtClean="0">
+                            <a:latin typeface="Cambria Math" panose="02040503050406030204" pitchFamily="18" charset="0"/>
+                          </a:rPr>
+                          <m:t>0</m:t>
                         </m:r>
                       </m:num>
                       <m:den>
                         <m:r>
-                          <a:rPr lang="en-US" b="0" i="1" smtClean="0">
+                          <a:rPr lang="en-AU" b="0" i="1" smtClean="0">
                             <a:latin typeface="Cambria Math" panose="02040503050406030204" pitchFamily="18" charset="0"/>
                           </a:rPr>
-                          <m:t>50</m:t>
+                          <m:t>45</m:t>
                         </m:r>
                       </m:den>
                     </m:f>
@@ -29386,7 +29393,7 @@
             </p:txBody>
           </p:sp>
         </mc:Choice>
-        <mc:Fallback xmlns="">
+        <mc:Fallback>
           <p:sp>
             <p:nvSpPr>
               <p:cNvPr id="43" name="TextBox 42">
@@ -29421,7 +29428,7 @@
               <a:lstStyle/>
               <a:p>
                 <a:r>
-                  <a:rPr lang="en-US">
+                  <a:rPr lang="en-AU">
                     <a:noFill/>
                   </a:rPr>
                   <a:t> </a:t>
@@ -29431,8 +29438,8 @@
           </p:sp>
         </mc:Fallback>
       </mc:AlternateContent>
-      <mc:AlternateContent xmlns:mc="http://schemas.openxmlformats.org/markup-compatibility/2006" xmlns:a14="http://schemas.microsoft.com/office/drawing/2010/main">
-        <mc:Choice Requires="a14">
+      <mc:AlternateContent xmlns:mc="http://schemas.openxmlformats.org/markup-compatibility/2006">
+        <mc:Choice xmlns:a14="http://schemas.microsoft.com/office/drawing/2010/main" Requires="a14">
           <p:sp>
             <p:nvSpPr>
               <p:cNvPr id="44" name="TextBox 43">
@@ -29448,7 +29455,7 @@
             <p:spPr>
               <a:xfrm>
                 <a:off x="9619167" y="6335301"/>
-                <a:ext cx="1015021" cy="489429"/>
+                <a:ext cx="1019831" cy="485774"/>
               </a:xfrm>
               <a:prstGeom prst="rect">
                 <a:avLst/>
@@ -29477,10 +29484,10 @@
                       </m:fPr>
                       <m:num>
                         <m:r>
-                          <a:rPr lang="en-US" b="0" i="1" smtClean="0">
+                          <a:rPr lang="en-AU" b="0" i="1" smtClean="0">
                             <a:latin typeface="Cambria Math" panose="02040503050406030204" pitchFamily="18" charset="0"/>
                           </a:rPr>
-                          <m:t>25</m:t>
+                          <m:t>10</m:t>
                         </m:r>
                       </m:num>
                       <m:den>
@@ -29488,7 +29495,13 @@
                           <a:rPr lang="en-US" b="0" i="1" smtClean="0">
                             <a:latin typeface="Cambria Math" panose="02040503050406030204" pitchFamily="18" charset="0"/>
                           </a:rPr>
-                          <m:t>50</m:t>
+                          <m:t>5</m:t>
+                        </m:r>
+                        <m:r>
+                          <a:rPr lang="en-AU" b="0" i="1" smtClean="0">
+                            <a:latin typeface="Cambria Math" panose="02040503050406030204" pitchFamily="18" charset="0"/>
+                          </a:rPr>
+                          <m:t>5</m:t>
                         </m:r>
                       </m:den>
                     </m:f>
@@ -29499,7 +29512,7 @@
             </p:txBody>
           </p:sp>
         </mc:Choice>
-        <mc:Fallback xmlns="">
+        <mc:Fallback>
           <p:sp>
             <p:nvSpPr>
               <p:cNvPr id="44" name="TextBox 43">
@@ -29517,7 +29530,7 @@
             <p:spPr>
               <a:xfrm>
                 <a:off x="9619167" y="6335301"/>
-                <a:ext cx="1015021" cy="489429"/>
+                <a:ext cx="1019831" cy="485774"/>
               </a:xfrm>
               <a:prstGeom prst="rect">
                 <a:avLst/>
@@ -29525,7 +29538,7 @@
               <a:blipFill>
                 <a:blip r:embed="rId7"/>
                 <a:stretch>
-                  <a:fillRect l="-5422" b="-6173"/>
+                  <a:fillRect l="-5389" b="-7500"/>
                 </a:stretch>
               </a:blipFill>
             </p:spPr>
@@ -29534,7 +29547,7 @@
               <a:lstStyle/>
               <a:p>
                 <a:r>
-                  <a:rPr lang="en-US">
+                  <a:rPr lang="en-AU">
                     <a:noFill/>
                   </a:rPr>
                   <a:t> </a:t>
@@ -29544,8 +29557,8 @@
           </p:sp>
         </mc:Fallback>
       </mc:AlternateContent>
-      <mc:AlternateContent xmlns:mc="http://schemas.openxmlformats.org/markup-compatibility/2006" xmlns:a14="http://schemas.microsoft.com/office/drawing/2010/main">
-        <mc:Choice Requires="a14">
+      <mc:AlternateContent xmlns:mc="http://schemas.openxmlformats.org/markup-compatibility/2006">
+        <mc:Choice xmlns:a14="http://schemas.microsoft.com/office/drawing/2010/main" Requires="a14">
           <p:sp>
             <p:nvSpPr>
               <p:cNvPr id="45" name="TextBox 44">
@@ -29561,7 +29574,7 @@
             <p:spPr>
               <a:xfrm>
                 <a:off x="7394104" y="3176144"/>
-                <a:ext cx="1117614" cy="485774"/>
+                <a:ext cx="1117614" cy="485197"/>
               </a:xfrm>
               <a:prstGeom prst="rect">
                 <a:avLst/>
@@ -29590,10 +29603,10 @@
                       </m:fPr>
                       <m:num>
                         <m:r>
-                          <a:rPr lang="en-US" b="0" i="1" smtClean="0">
+                          <a:rPr lang="en-AU" b="0" i="1" smtClean="0">
                             <a:latin typeface="Cambria Math" panose="02040503050406030204" pitchFamily="18" charset="0"/>
                           </a:rPr>
-                          <m:t>40</m:t>
+                          <m:t>20</m:t>
                         </m:r>
                       </m:num>
                       <m:den>
@@ -29612,7 +29625,7 @@
             </p:txBody>
           </p:sp>
         </mc:Choice>
-        <mc:Fallback xmlns="">
+        <mc:Fallback>
           <p:sp>
             <p:nvSpPr>
               <p:cNvPr id="45" name="TextBox 44">
@@ -29630,7 +29643,7 @@
             <p:spPr>
               <a:xfrm>
                 <a:off x="7394104" y="3176144"/>
-                <a:ext cx="1117614" cy="485774"/>
+                <a:ext cx="1117614" cy="485197"/>
               </a:xfrm>
               <a:prstGeom prst="rect">
                 <a:avLst/>
@@ -29647,7 +29660,7 @@
               <a:lstStyle/>
               <a:p>
                 <a:r>
-                  <a:rPr lang="en-US">
+                  <a:rPr lang="en-AU">
                     <a:noFill/>
                   </a:rPr>
                   <a:t> </a:t>
@@ -29742,7 +29755,7 @@
             <a:pPr algn="ctr"/>
             <a:r>
               <a:rPr lang="en-US" dirty="0"/>
-              <a:t>0.226</a:t>
+              <a:t>0.2</a:t>
             </a:r>
           </a:p>
         </p:txBody>
@@ -29832,7 +29845,7 @@
             <a:pPr algn="ctr"/>
             <a:r>
               <a:rPr lang="en-US" dirty="0"/>
-              <a:t>0.8</a:t>
+              <a:t>0.2</a:t>
             </a:r>
           </a:p>
         </p:txBody>
@@ -29895,8 +29908,8 @@
           </a:p>
         </p:txBody>
       </p:sp>
-      <mc:AlternateContent xmlns:mc="http://schemas.openxmlformats.org/markup-compatibility/2006">
-        <mc:Choice xmlns:a14="http://schemas.microsoft.com/office/drawing/2010/main" Requires="a14">
+      <mc:AlternateContent xmlns:mc="http://schemas.openxmlformats.org/markup-compatibility/2006" xmlns:a14="http://schemas.microsoft.com/office/drawing/2010/main">
+        <mc:Choice Requires="a14">
           <p:sp>
             <p:nvSpPr>
               <p:cNvPr id="3" name="Content Placeholder 2">
@@ -30443,7 +30456,7 @@
             </p:txBody>
           </p:sp>
         </mc:Choice>
-        <mc:Fallback>
+        <mc:Fallback xmlns="">
           <p:sp>
             <p:nvSpPr>
               <p:cNvPr id="3" name="Content Placeholder 2">
@@ -30541,8 +30554,8 @@
           </a:p>
         </p:txBody>
       </p:sp>
-      <mc:AlternateContent xmlns:mc="http://schemas.openxmlformats.org/markup-compatibility/2006">
-        <mc:Choice xmlns:a14="http://schemas.microsoft.com/office/drawing/2010/main" Requires="a14">
+      <mc:AlternateContent xmlns:mc="http://schemas.openxmlformats.org/markup-compatibility/2006" xmlns:a14="http://schemas.microsoft.com/office/drawing/2010/main">
+        <mc:Choice Requires="a14">
           <p:sp>
             <p:nvSpPr>
               <p:cNvPr id="3" name="Content Placeholder 2">
@@ -31215,7 +31228,7 @@
             </p:txBody>
           </p:sp>
         </mc:Choice>
-        <mc:Fallback>
+        <mc:Fallback xmlns="">
           <p:sp>
             <p:nvSpPr>
               <p:cNvPr id="3" name="Content Placeholder 2">

</xml_diff>

<commit_message>
Examples of Entropy Computation
</commit_message>
<xml_diff>
--- a/DecisionTrees/DecisionTrees.pptx
+++ b/DecisionTrees/DecisionTrees.pptx
@@ -33,10 +33,12 @@
     <p:sldId id="291" r:id="rId27"/>
     <p:sldId id="293" r:id="rId28"/>
     <p:sldId id="294" r:id="rId29"/>
-    <p:sldId id="295" r:id="rId30"/>
-    <p:sldId id="262" r:id="rId31"/>
-    <p:sldId id="278" r:id="rId32"/>
-    <p:sldId id="279" r:id="rId33"/>
+    <p:sldId id="297" r:id="rId30"/>
+    <p:sldId id="295" r:id="rId31"/>
+    <p:sldId id="262" r:id="rId32"/>
+    <p:sldId id="296" r:id="rId33"/>
+    <p:sldId id="278" r:id="rId34"/>
+    <p:sldId id="279" r:id="rId35"/>
   </p:sldIdLst>
   <p:sldSz cx="12192000" cy="6858000"/>
   <p:notesSz cx="6858000" cy="9144000"/>
@@ -8562,7 +8564,7 @@
           <a:p>
             <a:fld id="{7E292AB8-5F8F-4402-9592-F9413DCC0C16}" type="datetimeFigureOut">
               <a:rPr lang="en-US" smtClean="0"/>
-              <a:t>7/13/2023</a:t>
+              <a:t>7/16/2023</a:t>
             </a:fld>
             <a:endParaRPr lang="en-US"/>
           </a:p>
@@ -8760,7 +8762,7 @@
           <a:p>
             <a:fld id="{7E292AB8-5F8F-4402-9592-F9413DCC0C16}" type="datetimeFigureOut">
               <a:rPr lang="en-US" smtClean="0"/>
-              <a:t>7/13/2023</a:t>
+              <a:t>7/16/2023</a:t>
             </a:fld>
             <a:endParaRPr lang="en-US"/>
           </a:p>
@@ -8968,7 +8970,7 @@
           <a:p>
             <a:fld id="{7E292AB8-5F8F-4402-9592-F9413DCC0C16}" type="datetimeFigureOut">
               <a:rPr lang="en-US" smtClean="0"/>
-              <a:t>7/13/2023</a:t>
+              <a:t>7/16/2023</a:t>
             </a:fld>
             <a:endParaRPr lang="en-US"/>
           </a:p>
@@ -9166,7 +9168,7 @@
           <a:p>
             <a:fld id="{7E292AB8-5F8F-4402-9592-F9413DCC0C16}" type="datetimeFigureOut">
               <a:rPr lang="en-US" smtClean="0"/>
-              <a:t>7/13/2023</a:t>
+              <a:t>7/16/2023</a:t>
             </a:fld>
             <a:endParaRPr lang="en-US"/>
           </a:p>
@@ -9441,7 +9443,7 @@
           <a:p>
             <a:fld id="{7E292AB8-5F8F-4402-9592-F9413DCC0C16}" type="datetimeFigureOut">
               <a:rPr lang="en-US" smtClean="0"/>
-              <a:t>7/13/2023</a:t>
+              <a:t>7/16/2023</a:t>
             </a:fld>
             <a:endParaRPr lang="en-US"/>
           </a:p>
@@ -9706,7 +9708,7 @@
           <a:p>
             <a:fld id="{7E292AB8-5F8F-4402-9592-F9413DCC0C16}" type="datetimeFigureOut">
               <a:rPr lang="en-US" smtClean="0"/>
-              <a:t>7/13/2023</a:t>
+              <a:t>7/16/2023</a:t>
             </a:fld>
             <a:endParaRPr lang="en-US"/>
           </a:p>
@@ -10118,7 +10120,7 @@
           <a:p>
             <a:fld id="{7E292AB8-5F8F-4402-9592-F9413DCC0C16}" type="datetimeFigureOut">
               <a:rPr lang="en-US" smtClean="0"/>
-              <a:t>7/13/2023</a:t>
+              <a:t>7/16/2023</a:t>
             </a:fld>
             <a:endParaRPr lang="en-US"/>
           </a:p>
@@ -10259,7 +10261,7 @@
           <a:p>
             <a:fld id="{7E292AB8-5F8F-4402-9592-F9413DCC0C16}" type="datetimeFigureOut">
               <a:rPr lang="en-US" smtClean="0"/>
-              <a:t>7/13/2023</a:t>
+              <a:t>7/16/2023</a:t>
             </a:fld>
             <a:endParaRPr lang="en-US"/>
           </a:p>
@@ -10372,7 +10374,7 @@
           <a:p>
             <a:fld id="{7E292AB8-5F8F-4402-9592-F9413DCC0C16}" type="datetimeFigureOut">
               <a:rPr lang="en-US" smtClean="0"/>
-              <a:t>7/13/2023</a:t>
+              <a:t>7/16/2023</a:t>
             </a:fld>
             <a:endParaRPr lang="en-US"/>
           </a:p>
@@ -10683,7 +10685,7 @@
           <a:p>
             <a:fld id="{7E292AB8-5F8F-4402-9592-F9413DCC0C16}" type="datetimeFigureOut">
               <a:rPr lang="en-US" smtClean="0"/>
-              <a:t>7/13/2023</a:t>
+              <a:t>7/16/2023</a:t>
             </a:fld>
             <a:endParaRPr lang="en-US"/>
           </a:p>
@@ -10971,7 +10973,7 @@
           <a:p>
             <a:fld id="{7E292AB8-5F8F-4402-9592-F9413DCC0C16}" type="datetimeFigureOut">
               <a:rPr lang="en-US" smtClean="0"/>
-              <a:t>7/13/2023</a:t>
+              <a:t>7/16/2023</a:t>
             </a:fld>
             <a:endParaRPr lang="en-US"/>
           </a:p>
@@ -11212,7 +11214,7 @@
           <a:p>
             <a:fld id="{7E292AB8-5F8F-4402-9592-F9413DCC0C16}" type="datetimeFigureOut">
               <a:rPr lang="en-US" smtClean="0"/>
-              <a:t>7/13/2023</a:t>
+              <a:t>7/16/2023</a:t>
             </a:fld>
             <a:endParaRPr lang="en-US"/>
           </a:p>
@@ -26464,8 +26466,8 @@
           </mc:Fallback>
         </mc:AlternateContent>
       </p:grpSp>
-      <mc:AlternateContent xmlns:mc="http://schemas.openxmlformats.org/markup-compatibility/2006">
-        <mc:Choice xmlns:a14="http://schemas.microsoft.com/office/drawing/2010/main" Requires="a14">
+      <mc:AlternateContent xmlns:mc="http://schemas.openxmlformats.org/markup-compatibility/2006" xmlns:a14="http://schemas.microsoft.com/office/drawing/2010/main">
+        <mc:Choice Requires="a14">
           <p:sp>
             <p:nvSpPr>
               <p:cNvPr id="47" name="TextBox 46">
@@ -26917,7 +26919,7 @@
             </p:txBody>
           </p:sp>
         </mc:Choice>
-        <mc:Fallback>
+        <mc:Fallback xmlns="">
           <p:sp>
             <p:nvSpPr>
               <p:cNvPr id="47" name="TextBox 46">
@@ -28243,8 +28245,8 @@
           </mc:Fallback>
         </mc:AlternateContent>
       </p:grpSp>
-      <mc:AlternateContent xmlns:mc="http://schemas.openxmlformats.org/markup-compatibility/2006">
-        <mc:Choice xmlns:a14="http://schemas.microsoft.com/office/drawing/2010/main" Requires="a14">
+      <mc:AlternateContent xmlns:mc="http://schemas.openxmlformats.org/markup-compatibility/2006" xmlns:a14="http://schemas.microsoft.com/office/drawing/2010/main">
+        <mc:Choice Requires="a14">
           <p:sp>
             <p:nvSpPr>
               <p:cNvPr id="47" name="TextBox 46">
@@ -28696,7 +28698,7 @@
             </p:txBody>
           </p:sp>
         </mc:Choice>
-        <mc:Fallback>
+        <mc:Fallback xmlns="">
           <p:sp>
             <p:nvSpPr>
               <p:cNvPr id="47" name="TextBox 46">
@@ -28958,8 +28960,8 @@
           </a:fontRef>
         </p:style>
       </p:cxnSp>
-      <mc:AlternateContent xmlns:mc="http://schemas.openxmlformats.org/markup-compatibility/2006">
-        <mc:Choice xmlns:a14="http://schemas.microsoft.com/office/drawing/2010/main" Requires="a14">
+      <mc:AlternateContent xmlns:mc="http://schemas.openxmlformats.org/markup-compatibility/2006" xmlns:a14="http://schemas.microsoft.com/office/drawing/2010/main">
+        <mc:Choice Requires="a14">
           <p:sp>
             <p:nvSpPr>
               <p:cNvPr id="8" name="TextBox 7">
@@ -29007,7 +29009,7 @@
             </p:txBody>
           </p:sp>
         </mc:Choice>
-        <mc:Fallback>
+        <mc:Fallback xmlns="">
           <p:sp>
             <p:nvSpPr>
               <p:cNvPr id="8" name="TextBox 7">
@@ -29052,8 +29054,8 @@
           </p:sp>
         </mc:Fallback>
       </mc:AlternateContent>
-      <mc:AlternateContent xmlns:mc="http://schemas.openxmlformats.org/markup-compatibility/2006">
-        <mc:Choice xmlns:a14="http://schemas.microsoft.com/office/drawing/2010/main" Requires="a14">
+      <mc:AlternateContent xmlns:mc="http://schemas.openxmlformats.org/markup-compatibility/2006" xmlns:a14="http://schemas.microsoft.com/office/drawing/2010/main">
+        <mc:Choice Requires="a14">
           <p:sp>
             <p:nvSpPr>
               <p:cNvPr id="9" name="TextBox 8">
@@ -29088,6 +29090,7 @@
                 </a:r>
               </a:p>
               <a:p>
+                <a:pPr/>
                 <a14:m>
                   <m:oMathPara xmlns:m="http://schemas.openxmlformats.org/officeDocument/2006/math">
                     <m:oMathParaPr>
@@ -29114,7 +29117,7 @@
             </p:txBody>
           </p:sp>
         </mc:Choice>
-        <mc:Fallback>
+        <mc:Fallback xmlns="">
           <p:sp>
             <p:nvSpPr>
               <p:cNvPr id="9" name="TextBox 8">
@@ -29159,8 +29162,8 @@
           </p:sp>
         </mc:Fallback>
       </mc:AlternateContent>
-      <mc:AlternateContent xmlns:mc="http://schemas.openxmlformats.org/markup-compatibility/2006">
-        <mc:Choice xmlns:a14="http://schemas.microsoft.com/office/drawing/2010/main" Requires="a14">
+      <mc:AlternateContent xmlns:mc="http://schemas.openxmlformats.org/markup-compatibility/2006" xmlns:a14="http://schemas.microsoft.com/office/drawing/2010/main">
+        <mc:Choice Requires="a14">
           <p:sp>
             <p:nvSpPr>
               <p:cNvPr id="10" name="Oval 9">
@@ -29260,7 +29263,7 @@
             </p:txBody>
           </p:sp>
         </mc:Choice>
-        <mc:Fallback>
+        <mc:Fallback xmlns="">
           <p:sp>
             <p:nvSpPr>
               <p:cNvPr id="10" name="Oval 9">
@@ -29305,8 +29308,8 @@
           </p:sp>
         </mc:Fallback>
       </mc:AlternateContent>
-      <mc:AlternateContent xmlns:mc="http://schemas.openxmlformats.org/markup-compatibility/2006">
-        <mc:Choice xmlns:a14="http://schemas.microsoft.com/office/drawing/2010/main" Requires="a14">
+      <mc:AlternateContent xmlns:mc="http://schemas.openxmlformats.org/markup-compatibility/2006" xmlns:a14="http://schemas.microsoft.com/office/drawing/2010/main">
+        <mc:Choice Requires="a14">
           <p:sp>
             <p:nvSpPr>
               <p:cNvPr id="15" name="Oval 14">
@@ -29386,7 +29389,7 @@
             </p:txBody>
           </p:sp>
         </mc:Choice>
-        <mc:Fallback>
+        <mc:Fallback xmlns="">
           <p:sp>
             <p:nvSpPr>
               <p:cNvPr id="15" name="Oval 14">
@@ -29466,8 +29469,8 @@
           </a:p>
         </p:txBody>
       </p:sp>
-      <mc:AlternateContent xmlns:mc="http://schemas.openxmlformats.org/markup-compatibility/2006">
-        <mc:Choice xmlns:a14="http://schemas.microsoft.com/office/drawing/2010/main" Requires="a14">
+      <mc:AlternateContent xmlns:mc="http://schemas.openxmlformats.org/markup-compatibility/2006" xmlns:a14="http://schemas.microsoft.com/office/drawing/2010/main">
+        <mc:Choice Requires="a14">
           <p:sp>
             <p:nvSpPr>
               <p:cNvPr id="28" name="TextBox 27">
@@ -29658,7 +29661,7 @@
             </p:txBody>
           </p:sp>
         </mc:Choice>
-        <mc:Fallback>
+        <mc:Fallback xmlns="">
           <p:sp>
             <p:nvSpPr>
               <p:cNvPr id="28" name="TextBox 27">
@@ -29703,8 +29706,8 @@
           </p:sp>
         </mc:Fallback>
       </mc:AlternateContent>
-      <mc:AlternateContent xmlns:mc="http://schemas.openxmlformats.org/markup-compatibility/2006">
-        <mc:Choice xmlns:a14="http://schemas.microsoft.com/office/drawing/2010/main" Requires="a14">
+      <mc:AlternateContent xmlns:mc="http://schemas.openxmlformats.org/markup-compatibility/2006" xmlns:a14="http://schemas.microsoft.com/office/drawing/2010/main">
+        <mc:Choice Requires="a14">
           <p:sp>
             <p:nvSpPr>
               <p:cNvPr id="13" name="Content Placeholder 12">
@@ -30081,7 +30084,7 @@
             </p:txBody>
           </p:sp>
         </mc:Choice>
-        <mc:Fallback>
+        <mc:Fallback xmlns="">
           <p:sp>
             <p:nvSpPr>
               <p:cNvPr id="13" name="Content Placeholder 12">
@@ -30125,8 +30128,8 @@
           </p:sp>
         </mc:Fallback>
       </mc:AlternateContent>
-      <mc:AlternateContent xmlns:mc="http://schemas.openxmlformats.org/markup-compatibility/2006">
-        <mc:Choice xmlns:a14="http://schemas.microsoft.com/office/drawing/2010/main" Requires="a14">
+      <mc:AlternateContent xmlns:mc="http://schemas.openxmlformats.org/markup-compatibility/2006" xmlns:a14="http://schemas.microsoft.com/office/drawing/2010/main">
+        <mc:Choice Requires="a14">
           <p:sp>
             <p:nvSpPr>
               <p:cNvPr id="17" name="TextBox 16">
@@ -30317,7 +30320,7 @@
             </p:txBody>
           </p:sp>
         </mc:Choice>
-        <mc:Fallback>
+        <mc:Fallback xmlns="">
           <p:sp>
             <p:nvSpPr>
               <p:cNvPr id="17" name="TextBox 16">
@@ -30362,8 +30365,8 @@
           </p:sp>
         </mc:Fallback>
       </mc:AlternateContent>
-      <mc:AlternateContent xmlns:mc="http://schemas.openxmlformats.org/markup-compatibility/2006">
-        <mc:Choice xmlns:a14="http://schemas.microsoft.com/office/drawing/2010/main" Requires="a14">
+      <mc:AlternateContent xmlns:mc="http://schemas.openxmlformats.org/markup-compatibility/2006" xmlns:a14="http://schemas.microsoft.com/office/drawing/2010/main">
+        <mc:Choice Requires="a14">
           <p:sp>
             <p:nvSpPr>
               <p:cNvPr id="20" name="TextBox 19">
@@ -30392,6 +30395,7 @@
               </a:bodyPr>
               <a:lstStyle/>
               <a:p>
+                <a:pPr/>
                 <a14:m>
                   <m:oMathPara xmlns:m="http://schemas.openxmlformats.org/officeDocument/2006/math">
                     <m:oMathParaPr>
@@ -30553,7 +30557,7 @@
             </p:txBody>
           </p:sp>
         </mc:Choice>
-        <mc:Fallback>
+        <mc:Fallback xmlns="">
           <p:sp>
             <p:nvSpPr>
               <p:cNvPr id="20" name="TextBox 19">
@@ -30598,8 +30602,8 @@
           </p:sp>
         </mc:Fallback>
       </mc:AlternateContent>
-      <mc:AlternateContent xmlns:mc="http://schemas.openxmlformats.org/markup-compatibility/2006">
-        <mc:Choice xmlns:a14="http://schemas.microsoft.com/office/drawing/2010/main" Requires="a14">
+      <mc:AlternateContent xmlns:mc="http://schemas.openxmlformats.org/markup-compatibility/2006" xmlns:a14="http://schemas.microsoft.com/office/drawing/2010/main">
+        <mc:Choice Requires="a14">
           <p:sp>
             <p:nvSpPr>
               <p:cNvPr id="29" name="TextBox 28">
@@ -31039,7 +31043,7 @@
             </p:txBody>
           </p:sp>
         </mc:Choice>
-        <mc:Fallback>
+        <mc:Fallback xmlns="">
           <p:sp>
             <p:nvSpPr>
               <p:cNvPr id="29" name="TextBox 28">
@@ -31084,8 +31088,8 @@
           </p:sp>
         </mc:Fallback>
       </mc:AlternateContent>
-      <mc:AlternateContent xmlns:mc="http://schemas.openxmlformats.org/markup-compatibility/2006">
-        <mc:Choice xmlns:a14="http://schemas.microsoft.com/office/drawing/2010/main" Requires="a14">
+      <mc:AlternateContent xmlns:mc="http://schemas.openxmlformats.org/markup-compatibility/2006" xmlns:a14="http://schemas.microsoft.com/office/drawing/2010/main">
+        <mc:Choice Requires="a14">
           <p:sp>
             <p:nvSpPr>
               <p:cNvPr id="30" name="TextBox 29">
@@ -32230,7 +32234,7 @@
             </p:txBody>
           </p:sp>
         </mc:Choice>
-        <mc:Fallback>
+        <mc:Fallback xmlns="">
           <p:sp>
             <p:nvSpPr>
               <p:cNvPr id="30" name="TextBox 29">
@@ -33424,8 +33428,8 @@
           </a:p>
         </p:txBody>
       </p:sp>
-      <mc:AlternateContent xmlns:mc="http://schemas.openxmlformats.org/markup-compatibility/2006">
-        <mc:Choice xmlns:a14="http://schemas.microsoft.com/office/drawing/2010/main" Requires="a14">
+      <mc:AlternateContent xmlns:mc="http://schemas.openxmlformats.org/markup-compatibility/2006" xmlns:a14="http://schemas.microsoft.com/office/drawing/2010/main">
+        <mc:Choice Requires="a14">
           <p:sp>
             <p:nvSpPr>
               <p:cNvPr id="44" name="Rectangle: Rounded Corners 43">
@@ -33505,6 +33509,7 @@
                 </a:endParaRPr>
               </a:p>
               <a:p>
+                <a:pPr/>
                 <a14:m>
                   <m:oMathPara xmlns:m="http://schemas.openxmlformats.org/officeDocument/2006/math">
                     <m:oMathParaPr>
@@ -33569,6 +33574,7 @@
                 </a:endParaRPr>
               </a:p>
               <a:p>
+                <a:pPr/>
                 <a14:m>
                   <m:oMathPara xmlns:m="http://schemas.openxmlformats.org/officeDocument/2006/math">
                     <m:oMathParaPr>
@@ -33635,7 +33641,7 @@
             </p:txBody>
           </p:sp>
         </mc:Choice>
-        <mc:Fallback>
+        <mc:Fallback xmlns="">
           <p:sp>
             <p:nvSpPr>
               <p:cNvPr id="44" name="Rectangle: Rounded Corners 43">
@@ -33785,8 +33791,8 @@
             </a:fontRef>
           </p:style>
         </p:cxnSp>
-        <mc:AlternateContent xmlns:mc="http://schemas.openxmlformats.org/markup-compatibility/2006">
-          <mc:Choice xmlns:a14="http://schemas.microsoft.com/office/drawing/2010/main" Requires="a14">
+        <mc:AlternateContent xmlns:mc="http://schemas.openxmlformats.org/markup-compatibility/2006" xmlns:a14="http://schemas.microsoft.com/office/drawing/2010/main">
+          <mc:Choice Requires="a14">
             <p:sp>
               <p:nvSpPr>
                 <p:cNvPr id="7" name="TextBox 6">
@@ -33815,6 +33821,7 @@
                 </a:bodyPr>
                 <a:lstStyle/>
                 <a:p>
+                  <a:pPr/>
                   <a14:m>
                     <m:oMathPara xmlns:m="http://schemas.openxmlformats.org/officeDocument/2006/math">
                       <m:oMathParaPr>
@@ -33835,7 +33842,7 @@
               </p:txBody>
             </p:sp>
           </mc:Choice>
-          <mc:Fallback>
+          <mc:Fallback xmlns="">
             <p:sp>
               <p:nvSpPr>
                 <p:cNvPr id="7" name="TextBox 6">
@@ -34338,8 +34345,8 @@
             </a:p>
           </p:txBody>
         </p:sp>
-        <mc:AlternateContent xmlns:mc="http://schemas.openxmlformats.org/markup-compatibility/2006">
-          <mc:Choice xmlns:a14="http://schemas.microsoft.com/office/drawing/2010/main" Requires="a14">
+        <mc:AlternateContent xmlns:mc="http://schemas.openxmlformats.org/markup-compatibility/2006" xmlns:a14="http://schemas.microsoft.com/office/drawing/2010/main">
+          <mc:Choice Requires="a14">
             <p:sp>
               <p:nvSpPr>
                 <p:cNvPr id="40" name="TextBox 39">
@@ -34368,6 +34375,7 @@
                 </a:bodyPr>
                 <a:lstStyle/>
                 <a:p>
+                  <a:pPr/>
                   <a14:m>
                     <m:oMathPara xmlns:m="http://schemas.openxmlformats.org/officeDocument/2006/math">
                       <m:oMathParaPr>
@@ -34388,7 +34396,7 @@
               </p:txBody>
             </p:sp>
           </mc:Choice>
-          <mc:Fallback>
+          <mc:Fallback xmlns="">
             <p:sp>
               <p:nvSpPr>
                 <p:cNvPr id="40" name="TextBox 39">
@@ -34433,8 +34441,8 @@
             </p:sp>
           </mc:Fallback>
         </mc:AlternateContent>
-        <mc:AlternateContent xmlns:mc="http://schemas.openxmlformats.org/markup-compatibility/2006">
-          <mc:Choice xmlns:a14="http://schemas.microsoft.com/office/drawing/2010/main" Requires="a14">
+        <mc:AlternateContent xmlns:mc="http://schemas.openxmlformats.org/markup-compatibility/2006" xmlns:a14="http://schemas.microsoft.com/office/drawing/2010/main">
+          <mc:Choice Requires="a14">
             <p:sp>
               <p:nvSpPr>
                 <p:cNvPr id="41" name="TextBox 40">
@@ -34463,6 +34471,7 @@
                 </a:bodyPr>
                 <a:lstStyle/>
                 <a:p>
+                  <a:pPr/>
                   <a14:m>
                     <m:oMathPara xmlns:m="http://schemas.openxmlformats.org/officeDocument/2006/math">
                       <m:oMathParaPr>
@@ -34483,7 +34492,7 @@
               </p:txBody>
             </p:sp>
           </mc:Choice>
-          <mc:Fallback>
+          <mc:Fallback xmlns="">
             <p:sp>
               <p:nvSpPr>
                 <p:cNvPr id="41" name="TextBox 40">
@@ -34528,8 +34537,8 @@
             </p:sp>
           </mc:Fallback>
         </mc:AlternateContent>
-        <mc:AlternateContent xmlns:mc="http://schemas.openxmlformats.org/markup-compatibility/2006">
-          <mc:Choice xmlns:a14="http://schemas.microsoft.com/office/drawing/2010/main" Requires="a14">
+        <mc:AlternateContent xmlns:mc="http://schemas.openxmlformats.org/markup-compatibility/2006" xmlns:a14="http://schemas.microsoft.com/office/drawing/2010/main">
+          <mc:Choice Requires="a14">
             <p:sp>
               <p:nvSpPr>
                 <p:cNvPr id="42" name="TextBox 41">
@@ -34558,6 +34567,7 @@
                 </a:bodyPr>
                 <a:lstStyle/>
                 <a:p>
+                  <a:pPr/>
                   <a14:m>
                     <m:oMathPara xmlns:m="http://schemas.openxmlformats.org/officeDocument/2006/math">
                       <m:oMathParaPr>
@@ -34578,7 +34588,7 @@
               </p:txBody>
             </p:sp>
           </mc:Choice>
-          <mc:Fallback>
+          <mc:Fallback xmlns="">
             <p:sp>
               <p:nvSpPr>
                 <p:cNvPr id="42" name="TextBox 41">
@@ -34762,8 +34772,8 @@
           </a:fontRef>
         </p:style>
       </p:cxnSp>
-      <mc:AlternateContent xmlns:mc="http://schemas.openxmlformats.org/markup-compatibility/2006">
-        <mc:Choice xmlns:a14="http://schemas.microsoft.com/office/drawing/2010/main" Requires="a14">
+      <mc:AlternateContent xmlns:mc="http://schemas.openxmlformats.org/markup-compatibility/2006" xmlns:a14="http://schemas.microsoft.com/office/drawing/2010/main">
+        <mc:Choice Requires="a14">
           <p:sp>
             <p:nvSpPr>
               <p:cNvPr id="7" name="TextBox 6">
@@ -34813,7 +34823,7 @@
             </p:txBody>
           </p:sp>
         </mc:Choice>
-        <mc:Fallback>
+        <mc:Fallback xmlns="">
           <p:sp>
             <p:nvSpPr>
               <p:cNvPr id="7" name="TextBox 6">
@@ -35270,8 +35280,8 @@
           </a:p>
         </p:txBody>
       </p:sp>
-      <mc:AlternateContent xmlns:mc="http://schemas.openxmlformats.org/markup-compatibility/2006">
-        <mc:Choice xmlns:a14="http://schemas.microsoft.com/office/drawing/2010/main" Requires="a14">
+      <mc:AlternateContent xmlns:mc="http://schemas.openxmlformats.org/markup-compatibility/2006" xmlns:a14="http://schemas.microsoft.com/office/drawing/2010/main">
+        <mc:Choice Requires="a14">
           <p:sp>
             <p:nvSpPr>
               <p:cNvPr id="41" name="TextBox 40">
@@ -35321,7 +35331,7 @@
             </p:txBody>
           </p:sp>
         </mc:Choice>
-        <mc:Fallback>
+        <mc:Fallback xmlns="">
           <p:sp>
             <p:nvSpPr>
               <p:cNvPr id="41" name="TextBox 40">
@@ -35366,8 +35376,8 @@
           </p:sp>
         </mc:Fallback>
       </mc:AlternateContent>
-      <mc:AlternateContent xmlns:mc="http://schemas.openxmlformats.org/markup-compatibility/2006">
-        <mc:Choice xmlns:a14="http://schemas.microsoft.com/office/drawing/2010/main" Requires="a14">
+      <mc:AlternateContent xmlns:mc="http://schemas.openxmlformats.org/markup-compatibility/2006" xmlns:a14="http://schemas.microsoft.com/office/drawing/2010/main">
+        <mc:Choice Requires="a14">
           <p:sp>
             <p:nvSpPr>
               <p:cNvPr id="42" name="TextBox 41">
@@ -35417,7 +35427,7 @@
             </p:txBody>
           </p:sp>
         </mc:Choice>
-        <mc:Fallback>
+        <mc:Fallback xmlns="">
           <p:sp>
             <p:nvSpPr>
               <p:cNvPr id="42" name="TextBox 41">
@@ -35508,8 +35518,8 @@
           </a:p>
         </p:txBody>
       </p:sp>
-      <mc:AlternateContent xmlns:mc="http://schemas.openxmlformats.org/markup-compatibility/2006">
-        <mc:Choice xmlns:a14="http://schemas.microsoft.com/office/drawing/2010/main" Requires="a14">
+      <mc:AlternateContent xmlns:mc="http://schemas.openxmlformats.org/markup-compatibility/2006" xmlns:a14="http://schemas.microsoft.com/office/drawing/2010/main">
+        <mc:Choice Requires="a14">
           <p:sp>
             <p:nvSpPr>
               <p:cNvPr id="12" name="Rectangle: Rounded Corners 11">
@@ -35589,6 +35599,7 @@
                 </a:endParaRPr>
               </a:p>
               <a:p>
+                <a:pPr/>
                 <a14:m>
                   <m:oMathPara xmlns:m="http://schemas.openxmlformats.org/officeDocument/2006/math">
                     <m:oMathParaPr>
@@ -35700,7 +35711,7 @@
             </p:txBody>
           </p:sp>
         </mc:Choice>
-        <mc:Fallback>
+        <mc:Fallback xmlns="">
           <p:sp>
             <p:nvSpPr>
               <p:cNvPr id="12" name="Rectangle: Rounded Corners 11">
@@ -35878,8 +35889,8 @@
           </a:fontRef>
         </p:style>
       </p:cxnSp>
-      <mc:AlternateContent xmlns:mc="http://schemas.openxmlformats.org/markup-compatibility/2006">
-        <mc:Choice xmlns:a14="http://schemas.microsoft.com/office/drawing/2010/main" Requires="a14">
+      <mc:AlternateContent xmlns:mc="http://schemas.openxmlformats.org/markup-compatibility/2006" xmlns:a14="http://schemas.microsoft.com/office/drawing/2010/main">
+        <mc:Choice Requires="a14">
           <p:sp>
             <p:nvSpPr>
               <p:cNvPr id="18" name="TextBox 17">
@@ -35929,7 +35940,7 @@
             </p:txBody>
           </p:sp>
         </mc:Choice>
-        <mc:Fallback>
+        <mc:Fallback xmlns="">
           <p:sp>
             <p:nvSpPr>
               <p:cNvPr id="18" name="TextBox 17">
@@ -35974,8 +35985,8 @@
           </p:sp>
         </mc:Fallback>
       </mc:AlternateContent>
-      <mc:AlternateContent xmlns:mc="http://schemas.openxmlformats.org/markup-compatibility/2006">
-        <mc:Choice xmlns:a14="http://schemas.microsoft.com/office/drawing/2010/main" Requires="a14">
+      <mc:AlternateContent xmlns:mc="http://schemas.openxmlformats.org/markup-compatibility/2006" xmlns:a14="http://schemas.microsoft.com/office/drawing/2010/main">
+        <mc:Choice Requires="a14">
           <p:sp>
             <p:nvSpPr>
               <p:cNvPr id="20" name="TextBox 19">
@@ -36025,7 +36036,7 @@
             </p:txBody>
           </p:sp>
         </mc:Choice>
-        <mc:Fallback>
+        <mc:Fallback xmlns="">
           <p:sp>
             <p:nvSpPr>
               <p:cNvPr id="20" name="TextBox 19">
@@ -36070,8 +36081,8 @@
           </p:sp>
         </mc:Fallback>
       </mc:AlternateContent>
-      <mc:AlternateContent xmlns:mc="http://schemas.openxmlformats.org/markup-compatibility/2006">
-        <mc:Choice xmlns:a14="http://schemas.microsoft.com/office/drawing/2010/main" Requires="a14">
+      <mc:AlternateContent xmlns:mc="http://schemas.openxmlformats.org/markup-compatibility/2006" xmlns:a14="http://schemas.microsoft.com/office/drawing/2010/main">
+        <mc:Choice Requires="a14">
           <p:sp>
             <p:nvSpPr>
               <p:cNvPr id="21" name="TextBox 20">
@@ -36121,7 +36132,7 @@
             </p:txBody>
           </p:sp>
         </mc:Choice>
-        <mc:Fallback>
+        <mc:Fallback xmlns="">
           <p:sp>
             <p:nvSpPr>
               <p:cNvPr id="21" name="TextBox 20">
@@ -36270,8 +36281,8 @@
           </a:p>
         </p:txBody>
       </p:sp>
-      <mc:AlternateContent xmlns:mc="http://schemas.openxmlformats.org/markup-compatibility/2006">
-        <mc:Choice xmlns:a14="http://schemas.microsoft.com/office/drawing/2010/main" Requires="a14">
+      <mc:AlternateContent xmlns:mc="http://schemas.openxmlformats.org/markup-compatibility/2006" xmlns:a14="http://schemas.microsoft.com/office/drawing/2010/main">
+        <mc:Choice Requires="a14">
           <p:sp>
             <p:nvSpPr>
               <p:cNvPr id="12" name="Rectangle: Rounded Corners 11">
@@ -36502,7 +36513,7 @@
             </p:txBody>
           </p:sp>
         </mc:Choice>
-        <mc:Fallback>
+        <mc:Fallback xmlns="">
           <p:sp>
             <p:nvSpPr>
               <p:cNvPr id="12" name="Rectangle: Rounded Corners 11">
@@ -36552,8 +36563,8 @@
           </p:sp>
         </mc:Fallback>
       </mc:AlternateContent>
-      <mc:AlternateContent xmlns:mc="http://schemas.openxmlformats.org/markup-compatibility/2006">
-        <mc:Choice xmlns:a14="http://schemas.microsoft.com/office/drawing/2010/main" Requires="a14">
+      <mc:AlternateContent xmlns:mc="http://schemas.openxmlformats.org/markup-compatibility/2006" xmlns:a14="http://schemas.microsoft.com/office/drawing/2010/main">
+        <mc:Choice Requires="a14">
           <p:sp>
             <p:nvSpPr>
               <p:cNvPr id="3" name="Rectangle: Rounded Corners 2">
@@ -36939,7 +36950,6 @@
                 <a:endParaRPr lang="en-US" sz="2800" b="0" dirty="0"/>
               </a:p>
               <a:p>
-                <a:pPr/>
                 <a:endParaRPr lang="en-US" sz="2800" dirty="0"/>
               </a:p>
               <a:p>
@@ -37030,7 +37040,6 @@
                 </a:endParaRPr>
               </a:p>
               <a:p>
-                <a:pPr/>
                 <a:endParaRPr lang="en-US" sz="2800" b="0" dirty="0"/>
               </a:p>
               <a:p>
@@ -37039,7 +37048,7 @@
             </p:txBody>
           </p:sp>
         </mc:Choice>
-        <mc:Fallback>
+        <mc:Fallback xmlns="">
           <p:sp>
             <p:nvSpPr>
               <p:cNvPr id="3" name="Rectangle: Rounded Corners 2">
@@ -37164,8 +37173,8 @@
           </p:nvSpPr>
           <p:spPr>
             <a:xfrm>
-              <a:off x="7970883" y="4343400"/>
-              <a:ext cx="2763793" cy="2057400"/>
+              <a:off x="7972426" y="4343400"/>
+              <a:ext cx="2762250" cy="2057400"/>
             </a:xfrm>
             <a:custGeom>
               <a:avLst/>
@@ -37390,6 +37399,24 @@
                 <a:gd name="connsiteY1" fmla="*/ 1774825 h 2057400"/>
                 <a:gd name="connsiteX2" fmla="*/ 2763793 w 2763793"/>
                 <a:gd name="connsiteY2" fmla="*/ 2057400 h 2057400"/>
+                <a:gd name="connsiteX0" fmla="*/ 1543 w 2763793"/>
+                <a:gd name="connsiteY0" fmla="*/ 0 h 2057400"/>
+                <a:gd name="connsiteX1" fmla="*/ 585743 w 2763793"/>
+                <a:gd name="connsiteY1" fmla="*/ 1774825 h 2057400"/>
+                <a:gd name="connsiteX2" fmla="*/ 2763793 w 2763793"/>
+                <a:gd name="connsiteY2" fmla="*/ 2057400 h 2057400"/>
+                <a:gd name="connsiteX0" fmla="*/ 1976 w 2764226"/>
+                <a:gd name="connsiteY0" fmla="*/ 0 h 2057400"/>
+                <a:gd name="connsiteX1" fmla="*/ 586176 w 2764226"/>
+                <a:gd name="connsiteY1" fmla="*/ 1774825 h 2057400"/>
+                <a:gd name="connsiteX2" fmla="*/ 2764226 w 2764226"/>
+                <a:gd name="connsiteY2" fmla="*/ 2057400 h 2057400"/>
+                <a:gd name="connsiteX0" fmla="*/ 0 w 2762250"/>
+                <a:gd name="connsiteY0" fmla="*/ 0 h 2057400"/>
+                <a:gd name="connsiteX1" fmla="*/ 584200 w 2762250"/>
+                <a:gd name="connsiteY1" fmla="*/ 1774825 h 2057400"/>
+                <a:gd name="connsiteX2" fmla="*/ 2762250 w 2762250"/>
+                <a:gd name="connsiteY2" fmla="*/ 2057400 h 2057400"/>
               </a:gdLst>
               <a:ahLst/>
               <a:cxnLst>
@@ -37405,19 +37432,19 @@
               </a:cxnLst>
               <a:rect l="l" t="t" r="r" b="b"/>
               <a:pathLst>
-                <a:path w="2763793" h="2057400">
+                <a:path w="2762250" h="2057400">
                   <a:moveTo>
-                    <a:pt x="1543" y="0"/>
+                    <a:pt x="0" y="0"/>
                   </a:moveTo>
                   <a:cubicBezTo>
-                    <a:pt x="6305" y="1269206"/>
-                    <a:pt x="-82016" y="1550780"/>
-                    <a:pt x="585743" y="1774825"/>
+                    <a:pt x="11906" y="1269206"/>
+                    <a:pt x="-88321" y="1565067"/>
+                    <a:pt x="584200" y="1774825"/>
                   </a:cubicBezTo>
                   <a:cubicBezTo>
-                    <a:pt x="1150943" y="1964460"/>
-                    <a:pt x="2310033" y="1998530"/>
-                    <a:pt x="2763793" y="2057400"/>
+                    <a:pt x="1149400" y="1964460"/>
+                    <a:pt x="2296583" y="2024724"/>
+                    <a:pt x="2762250" y="2057400"/>
                   </a:cubicBezTo>
                 </a:path>
               </a:pathLst>
@@ -37578,8 +37605,8 @@
           </a:p>
         </p:txBody>
       </p:sp>
-      <mc:AlternateContent xmlns:mc="http://schemas.openxmlformats.org/markup-compatibility/2006">
-        <mc:Choice xmlns:a14="http://schemas.microsoft.com/office/drawing/2010/main" Requires="a14">
+      <mc:AlternateContent xmlns:mc="http://schemas.openxmlformats.org/markup-compatibility/2006" xmlns:a14="http://schemas.microsoft.com/office/drawing/2010/main">
+        <mc:Choice Requires="a14">
           <p:sp>
             <p:nvSpPr>
               <p:cNvPr id="12" name="Rectangle: Rounded Corners 11">
@@ -37632,6 +37659,7 @@
                 </a:r>
               </a:p>
               <a:p>
+                <a:pPr/>
                 <a14:m>
                   <m:oMathPara xmlns:m="http://schemas.openxmlformats.org/officeDocument/2006/math">
                     <m:oMathParaPr>
@@ -37814,7 +37842,7 @@
             </p:txBody>
           </p:sp>
         </mc:Choice>
-        <mc:Fallback>
+        <mc:Fallback xmlns="">
           <p:sp>
             <p:nvSpPr>
               <p:cNvPr id="12" name="Rectangle: Rounded Corners 11">
@@ -37864,8 +37892,8 @@
           </p:sp>
         </mc:Fallback>
       </mc:AlternateContent>
-      <mc:AlternateContent xmlns:mc="http://schemas.openxmlformats.org/markup-compatibility/2006">
-        <mc:Choice xmlns:a14="http://schemas.microsoft.com/office/drawing/2010/main" Requires="a14">
+      <mc:AlternateContent xmlns:mc="http://schemas.openxmlformats.org/markup-compatibility/2006" xmlns:a14="http://schemas.microsoft.com/office/drawing/2010/main">
+        <mc:Choice Requires="a14">
           <p:sp>
             <p:nvSpPr>
               <p:cNvPr id="3" name="Rectangle: Rounded Corners 2">
@@ -37917,6 +37945,7 @@
                 </a:r>
               </a:p>
               <a:p>
+                <a:pPr/>
                 <a14:m>
                   <m:oMathPara xmlns:m="http://schemas.openxmlformats.org/officeDocument/2006/math">
                     <m:oMathParaPr>
@@ -38121,7 +38150,7 @@
             </p:txBody>
           </p:sp>
         </mc:Choice>
-        <mc:Fallback>
+        <mc:Fallback xmlns="">
           <p:sp>
             <p:nvSpPr>
               <p:cNvPr id="3" name="Rectangle: Rounded Corners 2">
@@ -38171,8 +38200,8 @@
           </p:sp>
         </mc:Fallback>
       </mc:AlternateContent>
-      <mc:AlternateContent xmlns:mc="http://schemas.openxmlformats.org/markup-compatibility/2006">
-        <mc:Choice xmlns:a14="http://schemas.microsoft.com/office/drawing/2010/main" Requires="a14">
+      <mc:AlternateContent xmlns:mc="http://schemas.openxmlformats.org/markup-compatibility/2006" xmlns:a14="http://schemas.microsoft.com/office/drawing/2010/main">
+        <mc:Choice Requires="a14">
           <p:sp>
             <p:nvSpPr>
               <p:cNvPr id="5" name="TextBox 4">
@@ -38223,7 +38252,7 @@
             </p:txBody>
           </p:sp>
         </mc:Choice>
-        <mc:Fallback>
+        <mc:Fallback xmlns="">
           <p:sp>
             <p:nvSpPr>
               <p:cNvPr id="5" name="TextBox 4">
@@ -38321,35 +38350,7 @@
           <a:p>
             <a:r>
               <a:rPr lang="en-US" dirty="0"/>
-              <a:t>Entropy</a:t>
-            </a:r>
-          </a:p>
-        </p:txBody>
-      </p:sp>
-      <p:sp>
-        <p:nvSpPr>
-          <p:cNvPr id="4" name="Text Placeholder 3">
-            <a:extLst>
-              <a:ext uri="{FF2B5EF4-FFF2-40B4-BE49-F238E27FC236}">
-                <a16:creationId xmlns:a16="http://schemas.microsoft.com/office/drawing/2014/main" id="{43FA7199-386A-8F97-7498-055025C6AC4E}"/>
-              </a:ext>
-            </a:extLst>
-          </p:cNvPr>
-          <p:cNvSpPr>
-            <a:spLocks noGrp="1"/>
-          </p:cNvSpPr>
-          <p:nvPr>
-            <p:ph type="body" idx="1"/>
-          </p:nvPr>
-        </p:nvSpPr>
-        <p:spPr/>
-        <p:txBody>
-          <a:bodyPr/>
-          <a:lstStyle/>
-          <a:p>
-            <a:r>
-              <a:rPr lang="en-US" dirty="0"/>
-              <a:t>Discrete Examples</a:t>
+              <a:t>Entropy: Discrete</a:t>
             </a:r>
           </a:p>
         </p:txBody>
@@ -38370,102 +38371,1493 @@
             <p:ph sz="half" idx="2"/>
           </p:nvPr>
         </p:nvSpPr>
-        <p:spPr/>
+        <p:spPr>
+          <a:xfrm>
+            <a:off x="6678347" y="326250"/>
+            <a:ext cx="5370778" cy="1892226"/>
+          </a:xfrm>
+        </p:spPr>
         <p:txBody>
-          <a:bodyPr/>
+          <a:bodyPr>
+            <a:normAutofit fontScale="77500" lnSpcReduction="20000"/>
+          </a:bodyPr>
           <a:lstStyle/>
           <a:p>
             <a:r>
               <a:rPr lang="en-US" dirty="0"/>
-              <a:t>Fair Coin</a:t>
+              <a:t>Entropy the expected surprise is high, i.e.,  when the “coin is fair”. </a:t>
             </a:r>
           </a:p>
           <a:p>
-            <a:endParaRPr lang="en-US" dirty="0"/>
-          </a:p>
-          <a:p>
-            <a:endParaRPr lang="en-US" dirty="0"/>
+            <a:pPr lvl="1"/>
+            <a:r>
+              <a:rPr lang="en-US" dirty="0"/>
+              <a:t>When the classifier is giving mixed signal.</a:t>
+            </a:r>
           </a:p>
           <a:p>
             <a:r>
               <a:rPr lang="en-US" dirty="0"/>
-              <a:t>Biased Coin</a:t>
+              <a:t>Entropy is low when the expected surprise is low, i.e.,  when the “coin is unfair”. </a:t>
+            </a:r>
+          </a:p>
+          <a:p>
+            <a:pPr lvl="1"/>
+            <a:r>
+              <a:rPr lang="en-US" dirty="0"/>
+              <a:t>When the classifier is giving a pure signal. </a:t>
+            </a:r>
+          </a:p>
+        </p:txBody>
+      </p:sp>
+      <p:pic>
+        <p:nvPicPr>
+          <p:cNvPr id="19" name="Picture 18">
+            <a:extLst>
+              <a:ext uri="{FF2B5EF4-FFF2-40B4-BE49-F238E27FC236}">
+                <a16:creationId xmlns:a16="http://schemas.microsoft.com/office/drawing/2014/main" id="{95DD7FDB-98DE-FCBD-3875-8F2B897A4525}"/>
+              </a:ext>
+            </a:extLst>
+          </p:cNvPr>
+          <p:cNvPicPr>
+            <a:picLocks noChangeAspect="1"/>
+          </p:cNvPicPr>
+          <p:nvPr/>
+        </p:nvPicPr>
+        <p:blipFill>
+          <a:blip r:embed="rId2"/>
+          <a:stretch>
+            <a:fillRect/>
+          </a:stretch>
+        </p:blipFill>
+        <p:spPr>
+          <a:xfrm>
+            <a:off x="8483676" y="2673063"/>
+            <a:ext cx="3638784" cy="3516600"/>
+          </a:xfrm>
+          <a:prstGeom prst="rect">
+            <a:avLst/>
+          </a:prstGeom>
+        </p:spPr>
+      </p:pic>
+      <p:sp>
+        <p:nvSpPr>
+          <p:cNvPr id="20" name="TextBox 19">
+            <a:extLst>
+              <a:ext uri="{FF2B5EF4-FFF2-40B4-BE49-F238E27FC236}">
+                <a16:creationId xmlns:a16="http://schemas.microsoft.com/office/drawing/2014/main" id="{60539730-E29C-901E-1BD1-5FE78A043732}"/>
+              </a:ext>
+            </a:extLst>
+          </p:cNvPr>
+          <p:cNvSpPr txBox="1"/>
+          <p:nvPr/>
+        </p:nvSpPr>
+        <p:spPr>
+          <a:xfrm>
+            <a:off x="8332833" y="2562885"/>
+            <a:ext cx="301686" cy="369332"/>
+          </a:xfrm>
+          <a:prstGeom prst="rect">
+            <a:avLst/>
+          </a:prstGeom>
+          <a:noFill/>
+        </p:spPr>
+        <p:txBody>
+          <a:bodyPr wrap="none" rtlCol="0">
+            <a:spAutoFit/>
+          </a:bodyPr>
+          <a:lstStyle/>
+          <a:p>
+            <a:r>
+              <a:rPr lang="en-US" dirty="0"/>
+              <a:t>1</a:t>
             </a:r>
           </a:p>
         </p:txBody>
       </p:sp>
       <p:sp>
         <p:nvSpPr>
-          <p:cNvPr id="5" name="Text Placeholder 4">
+          <p:cNvPr id="21" name="TextBox 20">
             <a:extLst>
               <a:ext uri="{FF2B5EF4-FFF2-40B4-BE49-F238E27FC236}">
-                <a16:creationId xmlns:a16="http://schemas.microsoft.com/office/drawing/2014/main" id="{3E9490F1-4106-1B72-40C1-3400EB620C62}"/>
+                <a16:creationId xmlns:a16="http://schemas.microsoft.com/office/drawing/2014/main" id="{D309EFC1-31BF-0049-5B69-089DCBB50516}"/>
               </a:ext>
             </a:extLst>
           </p:cNvPr>
-          <p:cNvSpPr>
-            <a:spLocks noGrp="1"/>
-          </p:cNvSpPr>
-          <p:nvPr>
-            <p:ph type="body" sz="quarter" idx="3"/>
-          </p:nvPr>
+          <p:cNvSpPr txBox="1"/>
+          <p:nvPr/>
         </p:nvSpPr>
-        <p:spPr/>
+        <p:spPr>
+          <a:xfrm>
+            <a:off x="8332833" y="5864781"/>
+            <a:ext cx="301686" cy="369332"/>
+          </a:xfrm>
+          <a:prstGeom prst="rect">
+            <a:avLst/>
+          </a:prstGeom>
+          <a:noFill/>
+        </p:spPr>
         <p:txBody>
-          <a:bodyPr/>
+          <a:bodyPr wrap="none" rtlCol="0">
+            <a:spAutoFit/>
+          </a:bodyPr>
           <a:lstStyle/>
           <a:p>
             <a:r>
               <a:rPr lang="en-US" dirty="0"/>
-              <a:t>Continuous Examples</a:t>
+              <a:t>0</a:t>
             </a:r>
           </a:p>
         </p:txBody>
       </p:sp>
       <p:sp>
         <p:nvSpPr>
-          <p:cNvPr id="6" name="Content Placeholder 5">
+          <p:cNvPr id="24" name="TextBox 23">
             <a:extLst>
               <a:ext uri="{FF2B5EF4-FFF2-40B4-BE49-F238E27FC236}">
-                <a16:creationId xmlns:a16="http://schemas.microsoft.com/office/drawing/2014/main" id="{461AEA97-A412-A567-4D5E-87CB6989B2F8}"/>
+                <a16:creationId xmlns:a16="http://schemas.microsoft.com/office/drawing/2014/main" id="{2B01AEA8-E721-D8FE-A699-357F8BAB7A57}"/>
               </a:ext>
             </a:extLst>
           </p:cNvPr>
-          <p:cNvSpPr>
-            <a:spLocks noGrp="1"/>
-          </p:cNvSpPr>
-          <p:nvPr>
-            <p:ph sz="quarter" idx="4"/>
-          </p:nvPr>
+          <p:cNvSpPr txBox="1"/>
+          <p:nvPr/>
         </p:nvSpPr>
-        <p:spPr/>
+        <p:spPr>
+          <a:xfrm rot="16200000">
+            <a:off x="7481313" y="4223328"/>
+            <a:ext cx="2004726" cy="461665"/>
+          </a:xfrm>
+          <a:prstGeom prst="rect">
+            <a:avLst/>
+          </a:prstGeom>
+          <a:noFill/>
+        </p:spPr>
         <p:txBody>
-          <a:bodyPr/>
+          <a:bodyPr wrap="square" rtlCol="0">
+            <a:spAutoFit/>
+          </a:bodyPr>
+          <a:lstStyle/>
+          <a:p>
+            <a:pPr algn="ctr"/>
+            <a:r>
+              <a:rPr lang="en-US" sz="2400" dirty="0"/>
+              <a:t>Entropy</a:t>
+            </a:r>
+          </a:p>
+        </p:txBody>
+      </p:sp>
+      <p:sp>
+        <p:nvSpPr>
+          <p:cNvPr id="25" name="TextBox 24">
+            <a:extLst>
+              <a:ext uri="{FF2B5EF4-FFF2-40B4-BE49-F238E27FC236}">
+                <a16:creationId xmlns:a16="http://schemas.microsoft.com/office/drawing/2014/main" id="{3DBAE380-37DF-C890-154F-4F802F5DB3E8}"/>
+              </a:ext>
+            </a:extLst>
+          </p:cNvPr>
+          <p:cNvSpPr txBox="1"/>
+          <p:nvPr/>
+        </p:nvSpPr>
+        <p:spPr>
+          <a:xfrm>
+            <a:off x="8049287" y="6159625"/>
+            <a:ext cx="4507563" cy="461665"/>
+          </a:xfrm>
+          <a:prstGeom prst="rect">
+            <a:avLst/>
+          </a:prstGeom>
+          <a:noFill/>
+        </p:spPr>
+        <p:txBody>
+          <a:bodyPr wrap="square" rtlCol="0">
+            <a:spAutoFit/>
+          </a:bodyPr>
+          <a:lstStyle/>
+          <a:p>
+            <a:pPr algn="ctr"/>
+            <a:r>
+              <a:rPr lang="en-US" sz="2400" dirty="0"/>
+              <a:t>Probability of Heads p</a:t>
+            </a:r>
+          </a:p>
+        </p:txBody>
+      </p:sp>
+      <p:sp>
+        <p:nvSpPr>
+          <p:cNvPr id="26" name="TextBox 25">
+            <a:extLst>
+              <a:ext uri="{FF2B5EF4-FFF2-40B4-BE49-F238E27FC236}">
+                <a16:creationId xmlns:a16="http://schemas.microsoft.com/office/drawing/2014/main" id="{EC5016B1-BE46-A047-22A2-23A967B55309}"/>
+              </a:ext>
+            </a:extLst>
+          </p:cNvPr>
+          <p:cNvSpPr txBox="1"/>
+          <p:nvPr/>
+        </p:nvSpPr>
+        <p:spPr>
+          <a:xfrm>
+            <a:off x="8483676" y="6027222"/>
+            <a:ext cx="301686" cy="369332"/>
+          </a:xfrm>
+          <a:prstGeom prst="rect">
+            <a:avLst/>
+          </a:prstGeom>
+          <a:noFill/>
+        </p:spPr>
+        <p:txBody>
+          <a:bodyPr wrap="none" rtlCol="0">
+            <a:spAutoFit/>
+          </a:bodyPr>
           <a:lstStyle/>
           <a:p>
             <a:r>
               <a:rPr lang="en-US" dirty="0"/>
-              <a:t>Uniform Distribution</a:t>
-            </a:r>
-          </a:p>
-          <a:p>
-            <a:endParaRPr lang="en-US" dirty="0"/>
-          </a:p>
-          <a:p>
-            <a:endParaRPr lang="en-US" dirty="0"/>
-          </a:p>
-          <a:p>
-            <a:r>
-              <a:rPr lang="en-US" dirty="0"/>
-              <a:t>Normal Distribution</a:t>
+              <a:t>0</a:t>
             </a:r>
           </a:p>
         </p:txBody>
       </p:sp>
+      <p:sp>
+        <p:nvSpPr>
+          <p:cNvPr id="27" name="TextBox 26">
+            <a:extLst>
+              <a:ext uri="{FF2B5EF4-FFF2-40B4-BE49-F238E27FC236}">
+                <a16:creationId xmlns:a16="http://schemas.microsoft.com/office/drawing/2014/main" id="{C89FC3AD-0718-07C1-E38A-E5BFCE5295EC}"/>
+              </a:ext>
+            </a:extLst>
+          </p:cNvPr>
+          <p:cNvSpPr txBox="1"/>
+          <p:nvPr/>
+        </p:nvSpPr>
+        <p:spPr>
+          <a:xfrm>
+            <a:off x="11820774" y="6027222"/>
+            <a:ext cx="301686" cy="369332"/>
+          </a:xfrm>
+          <a:prstGeom prst="rect">
+            <a:avLst/>
+          </a:prstGeom>
+          <a:noFill/>
+        </p:spPr>
+        <p:txBody>
+          <a:bodyPr wrap="none" rtlCol="0">
+            <a:spAutoFit/>
+          </a:bodyPr>
+          <a:lstStyle/>
+          <a:p>
+            <a:r>
+              <a:rPr lang="en-US" dirty="0"/>
+              <a:t>1</a:t>
+            </a:r>
+          </a:p>
+        </p:txBody>
+      </p:sp>
+      <p:cxnSp>
+        <p:nvCxnSpPr>
+          <p:cNvPr id="34" name="Straight Arrow Connector 33">
+            <a:extLst>
+              <a:ext uri="{FF2B5EF4-FFF2-40B4-BE49-F238E27FC236}">
+                <a16:creationId xmlns:a16="http://schemas.microsoft.com/office/drawing/2014/main" id="{D0690BB2-D314-E2B4-174F-1CE49C8B89E8}"/>
+              </a:ext>
+            </a:extLst>
+          </p:cNvPr>
+          <p:cNvCxnSpPr>
+            <a:cxnSpLocks/>
+          </p:cNvCxnSpPr>
+          <p:nvPr/>
+        </p:nvCxnSpPr>
+        <p:spPr>
+          <a:xfrm>
+            <a:off x="5953125" y="5743575"/>
+            <a:ext cx="2681394" cy="0"/>
+          </a:xfrm>
+          <a:prstGeom prst="straightConnector1">
+            <a:avLst/>
+          </a:prstGeom>
+          <a:ln w="12700">
+            <a:tailEnd type="triangle"/>
+          </a:ln>
+        </p:spPr>
+        <p:style>
+          <a:lnRef idx="1">
+            <a:schemeClr val="accent1"/>
+          </a:lnRef>
+          <a:fillRef idx="0">
+            <a:schemeClr val="accent1"/>
+          </a:fillRef>
+          <a:effectRef idx="0">
+            <a:schemeClr val="accent1"/>
+          </a:effectRef>
+          <a:fontRef idx="minor">
+            <a:schemeClr val="tx1"/>
+          </a:fontRef>
+        </p:style>
+      </p:cxnSp>
+      <mc:AlternateContent xmlns:mc="http://schemas.openxmlformats.org/markup-compatibility/2006">
+        <mc:Choice xmlns:a14="http://schemas.microsoft.com/office/drawing/2010/main" Requires="a14">
+          <p:sp>
+            <p:nvSpPr>
+              <p:cNvPr id="37" name="Content Placeholder 2">
+                <a:extLst>
+                  <a:ext uri="{FF2B5EF4-FFF2-40B4-BE49-F238E27FC236}">
+                    <a16:creationId xmlns:a16="http://schemas.microsoft.com/office/drawing/2014/main" id="{90D14C01-82D2-7ADF-3806-D57EA0D314C7}"/>
+                  </a:ext>
+                </a:extLst>
+              </p:cNvPr>
+              <p:cNvSpPr txBox="1">
+                <a:spLocks/>
+              </p:cNvSpPr>
+              <p:nvPr/>
+            </p:nvSpPr>
+            <p:spPr>
+              <a:xfrm>
+                <a:off x="992188" y="1843088"/>
+                <a:ext cx="6284912" cy="4498975"/>
+              </a:xfrm>
+              <a:prstGeom prst="rect">
+                <a:avLst/>
+              </a:prstGeom>
+            </p:spPr>
+            <p:txBody>
+              <a:bodyPr vert="horz" lIns="91440" tIns="45720" rIns="91440" bIns="45720" rtlCol="0">
+                <a:normAutofit fontScale="92500" lnSpcReduction="10000"/>
+              </a:bodyPr>
+              <a:lstStyle>
+                <a:lvl1pPr marL="228600" indent="-228600" algn="l" defTabSz="914400" rtl="0" eaLnBrk="1" latinLnBrk="0" hangingPunct="1">
+                  <a:lnSpc>
+                    <a:spcPct val="90000"/>
+                  </a:lnSpc>
+                  <a:spcBef>
+                    <a:spcPts val="1000"/>
+                  </a:spcBef>
+                  <a:buFont typeface="Arial" panose="020B0604020202020204" pitchFamily="34" charset="0"/>
+                  <a:buChar char="•"/>
+                  <a:defRPr sz="2800" kern="1200">
+                    <a:solidFill>
+                      <a:schemeClr val="tx1"/>
+                    </a:solidFill>
+                    <a:latin typeface="+mn-lt"/>
+                    <a:ea typeface="+mn-ea"/>
+                    <a:cs typeface="+mn-cs"/>
+                  </a:defRPr>
+                </a:lvl1pPr>
+                <a:lvl2pPr marL="685800" indent="-228600" algn="l" defTabSz="914400" rtl="0" eaLnBrk="1" latinLnBrk="0" hangingPunct="1">
+                  <a:lnSpc>
+                    <a:spcPct val="90000"/>
+                  </a:lnSpc>
+                  <a:spcBef>
+                    <a:spcPts val="500"/>
+                  </a:spcBef>
+                  <a:buFont typeface="Arial" panose="020B0604020202020204" pitchFamily="34" charset="0"/>
+                  <a:buChar char="•"/>
+                  <a:defRPr sz="2400" kern="1200">
+                    <a:solidFill>
+                      <a:schemeClr val="tx1"/>
+                    </a:solidFill>
+                    <a:latin typeface="+mn-lt"/>
+                    <a:ea typeface="+mn-ea"/>
+                    <a:cs typeface="+mn-cs"/>
+                  </a:defRPr>
+                </a:lvl2pPr>
+                <a:lvl3pPr marL="1143000" indent="-228600" algn="l" defTabSz="914400" rtl="0" eaLnBrk="1" latinLnBrk="0" hangingPunct="1">
+                  <a:lnSpc>
+                    <a:spcPct val="90000"/>
+                  </a:lnSpc>
+                  <a:spcBef>
+                    <a:spcPts val="500"/>
+                  </a:spcBef>
+                  <a:buFont typeface="Arial" panose="020B0604020202020204" pitchFamily="34" charset="0"/>
+                  <a:buChar char="•"/>
+                  <a:defRPr sz="2000" kern="1200">
+                    <a:solidFill>
+                      <a:schemeClr val="tx1"/>
+                    </a:solidFill>
+                    <a:latin typeface="+mn-lt"/>
+                    <a:ea typeface="+mn-ea"/>
+                    <a:cs typeface="+mn-cs"/>
+                  </a:defRPr>
+                </a:lvl3pPr>
+                <a:lvl4pPr marL="1600200" indent="-228600" algn="l" defTabSz="914400" rtl="0" eaLnBrk="1" latinLnBrk="0" hangingPunct="1">
+                  <a:lnSpc>
+                    <a:spcPct val="90000"/>
+                  </a:lnSpc>
+                  <a:spcBef>
+                    <a:spcPts val="500"/>
+                  </a:spcBef>
+                  <a:buFont typeface="Arial" panose="020B0604020202020204" pitchFamily="34" charset="0"/>
+                  <a:buChar char="•"/>
+                  <a:defRPr sz="1800" kern="1200">
+                    <a:solidFill>
+                      <a:schemeClr val="tx1"/>
+                    </a:solidFill>
+                    <a:latin typeface="+mn-lt"/>
+                    <a:ea typeface="+mn-ea"/>
+                    <a:cs typeface="+mn-cs"/>
+                  </a:defRPr>
+                </a:lvl4pPr>
+                <a:lvl5pPr marL="2057400" indent="-228600" algn="l" defTabSz="914400" rtl="0" eaLnBrk="1" latinLnBrk="0" hangingPunct="1">
+                  <a:lnSpc>
+                    <a:spcPct val="90000"/>
+                  </a:lnSpc>
+                  <a:spcBef>
+                    <a:spcPts val="500"/>
+                  </a:spcBef>
+                  <a:buFont typeface="Arial" panose="020B0604020202020204" pitchFamily="34" charset="0"/>
+                  <a:buChar char="•"/>
+                  <a:defRPr sz="1800" kern="1200">
+                    <a:solidFill>
+                      <a:schemeClr val="tx1"/>
+                    </a:solidFill>
+                    <a:latin typeface="+mn-lt"/>
+                    <a:ea typeface="+mn-ea"/>
+                    <a:cs typeface="+mn-cs"/>
+                  </a:defRPr>
+                </a:lvl5pPr>
+                <a:lvl6pPr marL="2514600" indent="-228600" algn="l" defTabSz="914400" rtl="0" eaLnBrk="1" latinLnBrk="0" hangingPunct="1">
+                  <a:lnSpc>
+                    <a:spcPct val="90000"/>
+                  </a:lnSpc>
+                  <a:spcBef>
+                    <a:spcPts val="500"/>
+                  </a:spcBef>
+                  <a:buFont typeface="Arial" panose="020B0604020202020204" pitchFamily="34" charset="0"/>
+                  <a:buChar char="•"/>
+                  <a:defRPr sz="1800" kern="1200">
+                    <a:solidFill>
+                      <a:schemeClr val="tx1"/>
+                    </a:solidFill>
+                    <a:latin typeface="+mn-lt"/>
+                    <a:ea typeface="+mn-ea"/>
+                    <a:cs typeface="+mn-cs"/>
+                  </a:defRPr>
+                </a:lvl6pPr>
+                <a:lvl7pPr marL="2971800" indent="-228600" algn="l" defTabSz="914400" rtl="0" eaLnBrk="1" latinLnBrk="0" hangingPunct="1">
+                  <a:lnSpc>
+                    <a:spcPct val="90000"/>
+                  </a:lnSpc>
+                  <a:spcBef>
+                    <a:spcPts val="500"/>
+                  </a:spcBef>
+                  <a:buFont typeface="Arial" panose="020B0604020202020204" pitchFamily="34" charset="0"/>
+                  <a:buChar char="•"/>
+                  <a:defRPr sz="1800" kern="1200">
+                    <a:solidFill>
+                      <a:schemeClr val="tx1"/>
+                    </a:solidFill>
+                    <a:latin typeface="+mn-lt"/>
+                    <a:ea typeface="+mn-ea"/>
+                    <a:cs typeface="+mn-cs"/>
+                  </a:defRPr>
+                </a:lvl7pPr>
+                <a:lvl8pPr marL="3429000" indent="-228600" algn="l" defTabSz="914400" rtl="0" eaLnBrk="1" latinLnBrk="0" hangingPunct="1">
+                  <a:lnSpc>
+                    <a:spcPct val="90000"/>
+                  </a:lnSpc>
+                  <a:spcBef>
+                    <a:spcPts val="500"/>
+                  </a:spcBef>
+                  <a:buFont typeface="Arial" panose="020B0604020202020204" pitchFamily="34" charset="0"/>
+                  <a:buChar char="•"/>
+                  <a:defRPr sz="1800" kern="1200">
+                    <a:solidFill>
+                      <a:schemeClr val="tx1"/>
+                    </a:solidFill>
+                    <a:latin typeface="+mn-lt"/>
+                    <a:ea typeface="+mn-ea"/>
+                    <a:cs typeface="+mn-cs"/>
+                  </a:defRPr>
+                </a:lvl8pPr>
+                <a:lvl9pPr marL="3886200" indent="-228600" algn="l" defTabSz="914400" rtl="0" eaLnBrk="1" latinLnBrk="0" hangingPunct="1">
+                  <a:lnSpc>
+                    <a:spcPct val="90000"/>
+                  </a:lnSpc>
+                  <a:spcBef>
+                    <a:spcPts val="500"/>
+                  </a:spcBef>
+                  <a:buFont typeface="Arial" panose="020B0604020202020204" pitchFamily="34" charset="0"/>
+                  <a:buChar char="•"/>
+                  <a:defRPr sz="1800" kern="1200">
+                    <a:solidFill>
+                      <a:schemeClr val="tx1"/>
+                    </a:solidFill>
+                    <a:latin typeface="+mn-lt"/>
+                    <a:ea typeface="+mn-ea"/>
+                    <a:cs typeface="+mn-cs"/>
+                  </a:defRPr>
+                </a:lvl9pPr>
+              </a:lstStyle>
+              <a:p>
+                <a:r>
+                  <a:rPr lang="en-US" dirty="0"/>
+                  <a:t>Fair Coin</a:t>
+                </a:r>
+              </a:p>
+              <a:p>
+                <a:pPr marL="457200" lvl="1" indent="0">
+                  <a:buFont typeface="Arial" panose="020B0604020202020204" pitchFamily="34" charset="0"/>
+                  <a:buNone/>
+                </a:pPr>
+                <a14:m>
+                  <m:oMathPara xmlns:m="http://schemas.openxmlformats.org/officeDocument/2006/math">
+                    <m:oMathParaPr>
+                      <m:jc m:val="centerGroup"/>
+                    </m:oMathParaPr>
+                    <m:oMath xmlns:m="http://schemas.openxmlformats.org/officeDocument/2006/math">
+                      <m:r>
+                        <a:rPr lang="en-US" i="1" smtClean="0">
+                          <a:latin typeface="Cambria Math" panose="02040503050406030204" pitchFamily="18" charset="0"/>
+                        </a:rPr>
+                        <m:t>𝑝</m:t>
+                      </m:r>
+                      <m:d>
+                        <m:dPr>
+                          <m:ctrlPr>
+                            <a:rPr lang="en-US" i="1" smtClean="0">
+                              <a:latin typeface="Cambria Math" panose="02040503050406030204" pitchFamily="18" charset="0"/>
+                            </a:rPr>
+                          </m:ctrlPr>
+                        </m:dPr>
+                        <m:e>
+                          <m:r>
+                            <a:rPr lang="en-US" i="1" smtClean="0">
+                              <a:latin typeface="Cambria Math" panose="02040503050406030204" pitchFamily="18" charset="0"/>
+                            </a:rPr>
+                            <m:t>𝐻</m:t>
+                          </m:r>
+                        </m:e>
+                      </m:d>
+                      <m:r>
+                        <a:rPr lang="en-US" i="1" smtClean="0">
+                          <a:latin typeface="Cambria Math" panose="02040503050406030204" pitchFamily="18" charset="0"/>
+                        </a:rPr>
+                        <m:t>=0.5, </m:t>
+                      </m:r>
+                      <m:r>
+                        <a:rPr lang="en-US" i="1" smtClean="0">
+                          <a:latin typeface="Cambria Math" panose="02040503050406030204" pitchFamily="18" charset="0"/>
+                        </a:rPr>
+                        <m:t>𝑝</m:t>
+                      </m:r>
+                      <m:d>
+                        <m:dPr>
+                          <m:ctrlPr>
+                            <a:rPr lang="en-US" i="1" smtClean="0">
+                              <a:latin typeface="Cambria Math" panose="02040503050406030204" pitchFamily="18" charset="0"/>
+                            </a:rPr>
+                          </m:ctrlPr>
+                        </m:dPr>
+                        <m:e>
+                          <m:r>
+                            <a:rPr lang="en-US" i="1" smtClean="0">
+                              <a:latin typeface="Cambria Math" panose="02040503050406030204" pitchFamily="18" charset="0"/>
+                            </a:rPr>
+                            <m:t>𝑇</m:t>
+                          </m:r>
+                        </m:e>
+                      </m:d>
+                      <m:r>
+                        <a:rPr lang="en-US" i="1" smtClean="0">
+                          <a:latin typeface="Cambria Math" panose="02040503050406030204" pitchFamily="18" charset="0"/>
+                        </a:rPr>
+                        <m:t>=0.5</m:t>
+                      </m:r>
+                    </m:oMath>
+                  </m:oMathPara>
+                </a14:m>
+                <a:endParaRPr lang="en-US" dirty="0"/>
+              </a:p>
+              <a:p>
+                <a:pPr marL="457200" lvl="1" indent="0">
+                  <a:buFont typeface="Arial" panose="020B0604020202020204" pitchFamily="34" charset="0"/>
+                  <a:buNone/>
+                </a:pPr>
+                <a:endParaRPr lang="en-US" dirty="0"/>
+              </a:p>
+              <a:p>
+                <a:pPr marL="457200" lvl="1" indent="0">
+                  <a:buFont typeface="Arial" panose="020B0604020202020204" pitchFamily="34" charset="0"/>
+                  <a:buNone/>
+                </a:pPr>
+                <a14:m>
+                  <m:oMathPara xmlns:m="http://schemas.openxmlformats.org/officeDocument/2006/math">
+                    <m:oMathParaPr>
+                      <m:jc m:val="centerGroup"/>
+                    </m:oMathParaPr>
+                    <m:oMath xmlns:m="http://schemas.openxmlformats.org/officeDocument/2006/math">
+                      <m:r>
+                        <a:rPr lang="en-US" i="1" smtClean="0">
+                          <a:latin typeface="Cambria Math" panose="02040503050406030204" pitchFamily="18" charset="0"/>
+                        </a:rPr>
+                        <m:t>𝑆</m:t>
+                      </m:r>
+                      <m:r>
+                        <a:rPr lang="en-US" i="1" smtClean="0">
+                          <a:latin typeface="Cambria Math" panose="02040503050406030204" pitchFamily="18" charset="0"/>
+                        </a:rPr>
+                        <m:t>=−</m:t>
+                      </m:r>
+                      <m:r>
+                        <a:rPr lang="en-US" i="1" smtClean="0">
+                          <a:latin typeface="Cambria Math" panose="02040503050406030204" pitchFamily="18" charset="0"/>
+                        </a:rPr>
+                        <m:t>𝑃</m:t>
+                      </m:r>
+                      <m:d>
+                        <m:dPr>
+                          <m:ctrlPr>
+                            <a:rPr lang="en-US" i="1" smtClean="0">
+                              <a:latin typeface="Cambria Math" panose="02040503050406030204" pitchFamily="18" charset="0"/>
+                            </a:rPr>
+                          </m:ctrlPr>
+                        </m:dPr>
+                        <m:e>
+                          <m:r>
+                            <a:rPr lang="en-US" i="1" smtClean="0">
+                              <a:latin typeface="Cambria Math" panose="02040503050406030204" pitchFamily="18" charset="0"/>
+                            </a:rPr>
+                            <m:t>𝐻</m:t>
+                          </m:r>
+                        </m:e>
+                      </m:d>
+                      <m:func>
+                        <m:funcPr>
+                          <m:ctrlPr>
+                            <a:rPr lang="en-US" i="1" smtClean="0">
+                              <a:latin typeface="Cambria Math" panose="02040503050406030204" pitchFamily="18" charset="0"/>
+                            </a:rPr>
+                          </m:ctrlPr>
+                        </m:funcPr>
+                        <m:fName>
+                          <m:sSub>
+                            <m:sSubPr>
+                              <m:ctrlPr>
+                                <a:rPr lang="en-US" i="1" smtClean="0">
+                                  <a:latin typeface="Cambria Math" panose="02040503050406030204" pitchFamily="18" charset="0"/>
+                                </a:rPr>
+                              </m:ctrlPr>
+                            </m:sSubPr>
+                            <m:e>
+                              <m:r>
+                                <m:rPr>
+                                  <m:sty m:val="p"/>
+                                </m:rPr>
+                                <a:rPr lang="en-US" smtClean="0">
+                                  <a:latin typeface="Cambria Math" panose="02040503050406030204" pitchFamily="18" charset="0"/>
+                                </a:rPr>
+                                <m:t>log</m:t>
+                              </m:r>
+                            </m:e>
+                            <m:sub>
+                              <m:r>
+                                <a:rPr lang="en-US" i="1" smtClean="0">
+                                  <a:latin typeface="Cambria Math" panose="02040503050406030204" pitchFamily="18" charset="0"/>
+                                </a:rPr>
+                                <m:t>2</m:t>
+                              </m:r>
+                            </m:sub>
+                          </m:sSub>
+                        </m:fName>
+                        <m:e>
+                          <m:r>
+                            <a:rPr lang="en-US" i="1" smtClean="0">
+                              <a:latin typeface="Cambria Math" panose="02040503050406030204" pitchFamily="18" charset="0"/>
+                            </a:rPr>
+                            <m:t>𝑃</m:t>
+                          </m:r>
+                          <m:d>
+                            <m:dPr>
+                              <m:ctrlPr>
+                                <a:rPr lang="en-US" i="1" smtClean="0">
+                                  <a:latin typeface="Cambria Math" panose="02040503050406030204" pitchFamily="18" charset="0"/>
+                                </a:rPr>
+                              </m:ctrlPr>
+                            </m:dPr>
+                            <m:e>
+                              <m:r>
+                                <a:rPr lang="en-US" i="1" smtClean="0">
+                                  <a:latin typeface="Cambria Math" panose="02040503050406030204" pitchFamily="18" charset="0"/>
+                                </a:rPr>
+                                <m:t>𝐻</m:t>
+                              </m:r>
+                            </m:e>
+                          </m:d>
+                        </m:e>
+                      </m:func>
+                      <m:r>
+                        <a:rPr lang="en-US" i="1" smtClean="0">
+                          <a:latin typeface="Cambria Math" panose="02040503050406030204" pitchFamily="18" charset="0"/>
+                        </a:rPr>
+                        <m:t>−</m:t>
+                      </m:r>
+                      <m:r>
+                        <a:rPr lang="en-US" i="1" smtClean="0">
+                          <a:latin typeface="Cambria Math" panose="02040503050406030204" pitchFamily="18" charset="0"/>
+                        </a:rPr>
+                        <m:t>𝑃</m:t>
+                      </m:r>
+                      <m:d>
+                        <m:dPr>
+                          <m:ctrlPr>
+                            <a:rPr lang="en-US" i="1" smtClean="0">
+                              <a:latin typeface="Cambria Math" panose="02040503050406030204" pitchFamily="18" charset="0"/>
+                            </a:rPr>
+                          </m:ctrlPr>
+                        </m:dPr>
+                        <m:e>
+                          <m:r>
+                            <a:rPr lang="en-US" i="1" smtClean="0">
+                              <a:latin typeface="Cambria Math" panose="02040503050406030204" pitchFamily="18" charset="0"/>
+                            </a:rPr>
+                            <m:t>𝑇</m:t>
+                          </m:r>
+                        </m:e>
+                      </m:d>
+                      <m:func>
+                        <m:funcPr>
+                          <m:ctrlPr>
+                            <a:rPr lang="en-US" i="1" smtClean="0">
+                              <a:latin typeface="Cambria Math" panose="02040503050406030204" pitchFamily="18" charset="0"/>
+                            </a:rPr>
+                          </m:ctrlPr>
+                        </m:funcPr>
+                        <m:fName>
+                          <m:sSub>
+                            <m:sSubPr>
+                              <m:ctrlPr>
+                                <a:rPr lang="en-US" i="1" smtClean="0">
+                                  <a:latin typeface="Cambria Math" panose="02040503050406030204" pitchFamily="18" charset="0"/>
+                                </a:rPr>
+                              </m:ctrlPr>
+                            </m:sSubPr>
+                            <m:e>
+                              <m:r>
+                                <m:rPr>
+                                  <m:sty m:val="p"/>
+                                </m:rPr>
+                                <a:rPr lang="en-US" smtClean="0">
+                                  <a:latin typeface="Cambria Math" panose="02040503050406030204" pitchFamily="18" charset="0"/>
+                                </a:rPr>
+                                <m:t>log</m:t>
+                              </m:r>
+                            </m:e>
+                            <m:sub>
+                              <m:r>
+                                <a:rPr lang="en-US" i="1" smtClean="0">
+                                  <a:latin typeface="Cambria Math" panose="02040503050406030204" pitchFamily="18" charset="0"/>
+                                </a:rPr>
+                                <m:t>2</m:t>
+                              </m:r>
+                            </m:sub>
+                          </m:sSub>
+                        </m:fName>
+                        <m:e>
+                          <m:r>
+                            <a:rPr lang="en-US" i="1" smtClean="0">
+                              <a:latin typeface="Cambria Math" panose="02040503050406030204" pitchFamily="18" charset="0"/>
+                            </a:rPr>
+                            <m:t>𝑃</m:t>
+                          </m:r>
+                          <m:d>
+                            <m:dPr>
+                              <m:ctrlPr>
+                                <a:rPr lang="en-US" i="1" smtClean="0">
+                                  <a:latin typeface="Cambria Math" panose="02040503050406030204" pitchFamily="18" charset="0"/>
+                                </a:rPr>
+                              </m:ctrlPr>
+                            </m:dPr>
+                            <m:e>
+                              <m:r>
+                                <a:rPr lang="en-US" i="1" smtClean="0">
+                                  <a:latin typeface="Cambria Math" panose="02040503050406030204" pitchFamily="18" charset="0"/>
+                                </a:rPr>
+                                <m:t>𝑇</m:t>
+                              </m:r>
+                            </m:e>
+                          </m:d>
+                        </m:e>
+                      </m:func>
+                    </m:oMath>
+                  </m:oMathPara>
+                </a14:m>
+                <a:endParaRPr lang="en-US" dirty="0"/>
+              </a:p>
+              <a:p>
+                <a:pPr marL="457200" lvl="1" indent="0">
+                  <a:buFont typeface="Arial" panose="020B0604020202020204" pitchFamily="34" charset="0"/>
+                  <a:buNone/>
+                </a:pPr>
+                <a:br>
+                  <a:rPr lang="en-US" dirty="0"/>
+                </a:br>
+                <a14:m>
+                  <m:oMathPara xmlns:m="http://schemas.openxmlformats.org/officeDocument/2006/math">
+                    <m:oMathParaPr>
+                      <m:jc m:val="centerGroup"/>
+                    </m:oMathParaPr>
+                    <m:oMath xmlns:m="http://schemas.openxmlformats.org/officeDocument/2006/math">
+                      <m:r>
+                        <a:rPr lang="en-US" i="1" smtClean="0">
+                          <a:latin typeface="Cambria Math" panose="02040503050406030204" pitchFamily="18" charset="0"/>
+                        </a:rPr>
+                        <m:t>𝑆</m:t>
+                      </m:r>
+                      <m:r>
+                        <a:rPr lang="en-US" i="1" smtClean="0">
+                          <a:latin typeface="Cambria Math" panose="02040503050406030204" pitchFamily="18" charset="0"/>
+                        </a:rPr>
+                        <m:t>=−2×0.5</m:t>
+                      </m:r>
+                      <m:func>
+                        <m:funcPr>
+                          <m:ctrlPr>
+                            <a:rPr lang="en-US" i="1" smtClean="0">
+                              <a:latin typeface="Cambria Math" panose="02040503050406030204" pitchFamily="18" charset="0"/>
+                            </a:rPr>
+                          </m:ctrlPr>
+                        </m:funcPr>
+                        <m:fName>
+                          <m:sSub>
+                            <m:sSubPr>
+                              <m:ctrlPr>
+                                <a:rPr lang="en-US" i="1" smtClean="0">
+                                  <a:latin typeface="Cambria Math" panose="02040503050406030204" pitchFamily="18" charset="0"/>
+                                </a:rPr>
+                              </m:ctrlPr>
+                            </m:sSubPr>
+                            <m:e>
+                              <m:r>
+                                <m:rPr>
+                                  <m:sty m:val="p"/>
+                                </m:rPr>
+                                <a:rPr lang="en-US" smtClean="0">
+                                  <a:latin typeface="Cambria Math" panose="02040503050406030204" pitchFamily="18" charset="0"/>
+                                </a:rPr>
+                                <m:t>log</m:t>
+                              </m:r>
+                            </m:e>
+                            <m:sub>
+                              <m:r>
+                                <a:rPr lang="en-US" i="1" smtClean="0">
+                                  <a:latin typeface="Cambria Math" panose="02040503050406030204" pitchFamily="18" charset="0"/>
+                                </a:rPr>
+                                <m:t>2</m:t>
+                              </m:r>
+                            </m:sub>
+                          </m:sSub>
+                        </m:fName>
+                        <m:e>
+                          <m:r>
+                            <a:rPr lang="en-US" i="1" smtClean="0">
+                              <a:latin typeface="Cambria Math" panose="02040503050406030204" pitchFamily="18" charset="0"/>
+                            </a:rPr>
+                            <m:t>0.5</m:t>
+                          </m:r>
+                        </m:e>
+                      </m:func>
+                      <m:r>
+                        <a:rPr lang="en-US" i="1" smtClean="0">
+                          <a:latin typeface="Cambria Math" panose="02040503050406030204" pitchFamily="18" charset="0"/>
+                        </a:rPr>
+                        <m:t>=1</m:t>
+                      </m:r>
+                    </m:oMath>
+                  </m:oMathPara>
+                </a14:m>
+                <a:endParaRPr lang="en-US" dirty="0"/>
+              </a:p>
+              <a:p>
+                <a:pPr marL="457200" lvl="1" indent="0">
+                  <a:buFont typeface="Arial" panose="020B0604020202020204" pitchFamily="34" charset="0"/>
+                  <a:buNone/>
+                </a:pPr>
+                <a:endParaRPr lang="en-US" dirty="0"/>
+              </a:p>
+              <a:p>
+                <a:r>
+                  <a:rPr lang="en-US" dirty="0"/>
+                  <a:t>Biased Coin</a:t>
+                </a:r>
+              </a:p>
+              <a:p>
+                <a:pPr marL="457200" lvl="1" indent="0">
+                  <a:buFont typeface="Arial" panose="020B0604020202020204" pitchFamily="34" charset="0"/>
+                  <a:buNone/>
+                </a:pPr>
+                <a14:m>
+                  <m:oMathPara xmlns:m="http://schemas.openxmlformats.org/officeDocument/2006/math">
+                    <m:oMathParaPr>
+                      <m:jc m:val="centerGroup"/>
+                    </m:oMathParaPr>
+                    <m:oMath xmlns:m="http://schemas.openxmlformats.org/officeDocument/2006/math">
+                      <m:r>
+                        <a:rPr lang="en-US" i="1" smtClean="0">
+                          <a:latin typeface="Cambria Math" panose="02040503050406030204" pitchFamily="18" charset="0"/>
+                        </a:rPr>
+                        <m:t>𝑝</m:t>
+                      </m:r>
+                      <m:d>
+                        <m:dPr>
+                          <m:ctrlPr>
+                            <a:rPr lang="en-US" i="1" smtClean="0">
+                              <a:latin typeface="Cambria Math" panose="02040503050406030204" pitchFamily="18" charset="0"/>
+                            </a:rPr>
+                          </m:ctrlPr>
+                        </m:dPr>
+                        <m:e>
+                          <m:r>
+                            <a:rPr lang="en-US" i="1" smtClean="0">
+                              <a:latin typeface="Cambria Math" panose="02040503050406030204" pitchFamily="18" charset="0"/>
+                            </a:rPr>
+                            <m:t>𝐻</m:t>
+                          </m:r>
+                        </m:e>
+                      </m:d>
+                      <m:r>
+                        <a:rPr lang="en-US" i="1" smtClean="0">
+                          <a:latin typeface="Cambria Math" panose="02040503050406030204" pitchFamily="18" charset="0"/>
+                        </a:rPr>
+                        <m:t>=</m:t>
+                      </m:r>
+                      <m:r>
+                        <a:rPr lang="en-US" i="1" smtClean="0">
+                          <a:latin typeface="Cambria Math" panose="02040503050406030204" pitchFamily="18" charset="0"/>
+                        </a:rPr>
+                        <m:t>𝑝</m:t>
+                      </m:r>
+                      <m:r>
+                        <a:rPr lang="en-US" i="1" smtClean="0">
+                          <a:latin typeface="Cambria Math" panose="02040503050406030204" pitchFamily="18" charset="0"/>
+                        </a:rPr>
+                        <m:t>, </m:t>
+                      </m:r>
+                      <m:r>
+                        <a:rPr lang="en-US" i="1" smtClean="0">
+                          <a:latin typeface="Cambria Math" panose="02040503050406030204" pitchFamily="18" charset="0"/>
+                        </a:rPr>
+                        <m:t>𝑝</m:t>
+                      </m:r>
+                      <m:d>
+                        <m:dPr>
+                          <m:ctrlPr>
+                            <a:rPr lang="en-US" i="1" smtClean="0">
+                              <a:latin typeface="Cambria Math" panose="02040503050406030204" pitchFamily="18" charset="0"/>
+                            </a:rPr>
+                          </m:ctrlPr>
+                        </m:dPr>
+                        <m:e>
+                          <m:r>
+                            <a:rPr lang="en-US" i="1" smtClean="0">
+                              <a:latin typeface="Cambria Math" panose="02040503050406030204" pitchFamily="18" charset="0"/>
+                            </a:rPr>
+                            <m:t>𝑇</m:t>
+                          </m:r>
+                        </m:e>
+                      </m:d>
+                      <m:r>
+                        <a:rPr lang="en-US" i="1" smtClean="0">
+                          <a:latin typeface="Cambria Math" panose="02040503050406030204" pitchFamily="18" charset="0"/>
+                        </a:rPr>
+                        <m:t>=1−</m:t>
+                      </m:r>
+                      <m:r>
+                        <a:rPr lang="en-US" i="1" smtClean="0">
+                          <a:latin typeface="Cambria Math" panose="02040503050406030204" pitchFamily="18" charset="0"/>
+                        </a:rPr>
+                        <m:t>𝑝</m:t>
+                      </m:r>
+                    </m:oMath>
+                  </m:oMathPara>
+                </a14:m>
+                <a:endParaRPr lang="en-US" dirty="0"/>
+              </a:p>
+              <a:p>
+                <a:pPr marL="457200" lvl="1" indent="0">
+                  <a:buFont typeface="Arial" panose="020B0604020202020204" pitchFamily="34" charset="0"/>
+                  <a:buNone/>
+                </a:pPr>
+                <a:endParaRPr lang="en-US" dirty="0"/>
+              </a:p>
+              <a:p>
+                <a:pPr marL="457200" lvl="1" indent="0">
+                  <a:buFont typeface="Arial" panose="020B0604020202020204" pitchFamily="34" charset="0"/>
+                  <a:buNone/>
+                </a:pPr>
+                <a14:m>
+                  <m:oMathPara xmlns:m="http://schemas.openxmlformats.org/officeDocument/2006/math">
+                    <m:oMathParaPr>
+                      <m:jc m:val="centerGroup"/>
+                    </m:oMathParaPr>
+                    <m:oMath xmlns:m="http://schemas.openxmlformats.org/officeDocument/2006/math">
+                      <m:r>
+                        <a:rPr lang="en-US" i="1" smtClean="0">
+                          <a:latin typeface="Cambria Math" panose="02040503050406030204" pitchFamily="18" charset="0"/>
+                        </a:rPr>
+                        <m:t>𝑆</m:t>
+                      </m:r>
+                      <m:r>
+                        <a:rPr lang="en-US" i="1" smtClean="0">
+                          <a:latin typeface="Cambria Math" panose="02040503050406030204" pitchFamily="18" charset="0"/>
+                        </a:rPr>
+                        <m:t>=−</m:t>
+                      </m:r>
+                      <m:r>
+                        <a:rPr lang="en-US" i="1" smtClean="0">
+                          <a:latin typeface="Cambria Math" panose="02040503050406030204" pitchFamily="18" charset="0"/>
+                        </a:rPr>
+                        <m:t>𝑃</m:t>
+                      </m:r>
+                      <m:d>
+                        <m:dPr>
+                          <m:ctrlPr>
+                            <a:rPr lang="en-US" i="1" smtClean="0">
+                              <a:latin typeface="Cambria Math" panose="02040503050406030204" pitchFamily="18" charset="0"/>
+                            </a:rPr>
+                          </m:ctrlPr>
+                        </m:dPr>
+                        <m:e>
+                          <m:r>
+                            <a:rPr lang="en-US" i="1" smtClean="0">
+                              <a:latin typeface="Cambria Math" panose="02040503050406030204" pitchFamily="18" charset="0"/>
+                            </a:rPr>
+                            <m:t>𝐻</m:t>
+                          </m:r>
+                        </m:e>
+                      </m:d>
+                      <m:func>
+                        <m:funcPr>
+                          <m:ctrlPr>
+                            <a:rPr lang="en-US" i="1" smtClean="0">
+                              <a:latin typeface="Cambria Math" panose="02040503050406030204" pitchFamily="18" charset="0"/>
+                            </a:rPr>
+                          </m:ctrlPr>
+                        </m:funcPr>
+                        <m:fName>
+                          <m:sSub>
+                            <m:sSubPr>
+                              <m:ctrlPr>
+                                <a:rPr lang="en-US" i="1" smtClean="0">
+                                  <a:latin typeface="Cambria Math" panose="02040503050406030204" pitchFamily="18" charset="0"/>
+                                </a:rPr>
+                              </m:ctrlPr>
+                            </m:sSubPr>
+                            <m:e>
+                              <m:r>
+                                <m:rPr>
+                                  <m:sty m:val="p"/>
+                                </m:rPr>
+                                <a:rPr lang="en-US" smtClean="0">
+                                  <a:latin typeface="Cambria Math" panose="02040503050406030204" pitchFamily="18" charset="0"/>
+                                </a:rPr>
+                                <m:t>log</m:t>
+                              </m:r>
+                            </m:e>
+                            <m:sub>
+                              <m:r>
+                                <a:rPr lang="en-US" i="1" smtClean="0">
+                                  <a:latin typeface="Cambria Math" panose="02040503050406030204" pitchFamily="18" charset="0"/>
+                                </a:rPr>
+                                <m:t>2</m:t>
+                              </m:r>
+                            </m:sub>
+                          </m:sSub>
+                        </m:fName>
+                        <m:e>
+                          <m:r>
+                            <a:rPr lang="en-US" i="1" smtClean="0">
+                              <a:latin typeface="Cambria Math" panose="02040503050406030204" pitchFamily="18" charset="0"/>
+                            </a:rPr>
+                            <m:t>𝑃</m:t>
+                          </m:r>
+                          <m:d>
+                            <m:dPr>
+                              <m:ctrlPr>
+                                <a:rPr lang="en-US" i="1" smtClean="0">
+                                  <a:latin typeface="Cambria Math" panose="02040503050406030204" pitchFamily="18" charset="0"/>
+                                </a:rPr>
+                              </m:ctrlPr>
+                            </m:dPr>
+                            <m:e>
+                              <m:r>
+                                <a:rPr lang="en-US" i="1" smtClean="0">
+                                  <a:latin typeface="Cambria Math" panose="02040503050406030204" pitchFamily="18" charset="0"/>
+                                </a:rPr>
+                                <m:t>𝐻</m:t>
+                              </m:r>
+                            </m:e>
+                          </m:d>
+                        </m:e>
+                      </m:func>
+                      <m:r>
+                        <a:rPr lang="en-US" i="1" smtClean="0">
+                          <a:latin typeface="Cambria Math" panose="02040503050406030204" pitchFamily="18" charset="0"/>
+                        </a:rPr>
+                        <m:t>−</m:t>
+                      </m:r>
+                      <m:r>
+                        <a:rPr lang="en-US" i="1" smtClean="0">
+                          <a:latin typeface="Cambria Math" panose="02040503050406030204" pitchFamily="18" charset="0"/>
+                        </a:rPr>
+                        <m:t>𝑃</m:t>
+                      </m:r>
+                      <m:d>
+                        <m:dPr>
+                          <m:ctrlPr>
+                            <a:rPr lang="en-US" i="1" smtClean="0">
+                              <a:latin typeface="Cambria Math" panose="02040503050406030204" pitchFamily="18" charset="0"/>
+                            </a:rPr>
+                          </m:ctrlPr>
+                        </m:dPr>
+                        <m:e>
+                          <m:r>
+                            <a:rPr lang="en-US" i="1" smtClean="0">
+                              <a:latin typeface="Cambria Math" panose="02040503050406030204" pitchFamily="18" charset="0"/>
+                            </a:rPr>
+                            <m:t>𝑇</m:t>
+                          </m:r>
+                        </m:e>
+                      </m:d>
+                      <m:func>
+                        <m:funcPr>
+                          <m:ctrlPr>
+                            <a:rPr lang="en-US" i="1" smtClean="0">
+                              <a:latin typeface="Cambria Math" panose="02040503050406030204" pitchFamily="18" charset="0"/>
+                            </a:rPr>
+                          </m:ctrlPr>
+                        </m:funcPr>
+                        <m:fName>
+                          <m:sSub>
+                            <m:sSubPr>
+                              <m:ctrlPr>
+                                <a:rPr lang="en-US" i="1" smtClean="0">
+                                  <a:latin typeface="Cambria Math" panose="02040503050406030204" pitchFamily="18" charset="0"/>
+                                </a:rPr>
+                              </m:ctrlPr>
+                            </m:sSubPr>
+                            <m:e>
+                              <m:r>
+                                <m:rPr>
+                                  <m:sty m:val="p"/>
+                                </m:rPr>
+                                <a:rPr lang="en-US" smtClean="0">
+                                  <a:latin typeface="Cambria Math" panose="02040503050406030204" pitchFamily="18" charset="0"/>
+                                </a:rPr>
+                                <m:t>log</m:t>
+                              </m:r>
+                            </m:e>
+                            <m:sub>
+                              <m:r>
+                                <a:rPr lang="en-US" i="1" smtClean="0">
+                                  <a:latin typeface="Cambria Math" panose="02040503050406030204" pitchFamily="18" charset="0"/>
+                                </a:rPr>
+                                <m:t>2</m:t>
+                              </m:r>
+                            </m:sub>
+                          </m:sSub>
+                        </m:fName>
+                        <m:e>
+                          <m:r>
+                            <a:rPr lang="en-US" i="1" smtClean="0">
+                              <a:latin typeface="Cambria Math" panose="02040503050406030204" pitchFamily="18" charset="0"/>
+                            </a:rPr>
+                            <m:t>𝑃</m:t>
+                          </m:r>
+                          <m:d>
+                            <m:dPr>
+                              <m:ctrlPr>
+                                <a:rPr lang="en-US" i="1" smtClean="0">
+                                  <a:latin typeface="Cambria Math" panose="02040503050406030204" pitchFamily="18" charset="0"/>
+                                </a:rPr>
+                              </m:ctrlPr>
+                            </m:dPr>
+                            <m:e>
+                              <m:r>
+                                <a:rPr lang="en-US" i="1" smtClean="0">
+                                  <a:latin typeface="Cambria Math" panose="02040503050406030204" pitchFamily="18" charset="0"/>
+                                </a:rPr>
+                                <m:t>𝑇</m:t>
+                              </m:r>
+                            </m:e>
+                          </m:d>
+                        </m:e>
+                      </m:func>
+                    </m:oMath>
+                  </m:oMathPara>
+                </a14:m>
+                <a:endParaRPr lang="en-US" dirty="0"/>
+              </a:p>
+              <a:p>
+                <a:pPr marL="457200" lvl="1" indent="0">
+                  <a:buFont typeface="Arial" panose="020B0604020202020204" pitchFamily="34" charset="0"/>
+                  <a:buNone/>
+                </a:pPr>
+                <a:br>
+                  <a:rPr lang="en-US" dirty="0"/>
+                </a:br>
+                <a14:m>
+                  <m:oMathPara xmlns:m="http://schemas.openxmlformats.org/officeDocument/2006/math">
+                    <m:oMathParaPr>
+                      <m:jc m:val="centerGroup"/>
+                    </m:oMathParaPr>
+                    <m:oMath xmlns:m="http://schemas.openxmlformats.org/officeDocument/2006/math">
+                      <m:r>
+                        <a:rPr lang="en-US" i="1" smtClean="0">
+                          <a:latin typeface="Cambria Math" panose="02040503050406030204" pitchFamily="18" charset="0"/>
+                        </a:rPr>
+                        <m:t>𝑆</m:t>
+                      </m:r>
+                      <m:r>
+                        <a:rPr lang="en-US" i="1" smtClean="0">
+                          <a:latin typeface="Cambria Math" panose="02040503050406030204" pitchFamily="18" charset="0"/>
+                        </a:rPr>
+                        <m:t>=−</m:t>
+                      </m:r>
+                      <m:r>
+                        <a:rPr lang="en-US" i="1" smtClean="0">
+                          <a:latin typeface="Cambria Math" panose="02040503050406030204" pitchFamily="18" charset="0"/>
+                        </a:rPr>
+                        <m:t>𝑝</m:t>
+                      </m:r>
+                      <m:func>
+                        <m:funcPr>
+                          <m:ctrlPr>
+                            <a:rPr lang="en-US" i="1" smtClean="0">
+                              <a:latin typeface="Cambria Math" panose="02040503050406030204" pitchFamily="18" charset="0"/>
+                            </a:rPr>
+                          </m:ctrlPr>
+                        </m:funcPr>
+                        <m:fName>
+                          <m:sSub>
+                            <m:sSubPr>
+                              <m:ctrlPr>
+                                <a:rPr lang="en-US" i="1" smtClean="0">
+                                  <a:latin typeface="Cambria Math" panose="02040503050406030204" pitchFamily="18" charset="0"/>
+                                </a:rPr>
+                              </m:ctrlPr>
+                            </m:sSubPr>
+                            <m:e>
+                              <m:r>
+                                <m:rPr>
+                                  <m:sty m:val="p"/>
+                                </m:rPr>
+                                <a:rPr lang="en-US" smtClean="0">
+                                  <a:latin typeface="Cambria Math" panose="02040503050406030204" pitchFamily="18" charset="0"/>
+                                </a:rPr>
+                                <m:t>log</m:t>
+                              </m:r>
+                            </m:e>
+                            <m:sub>
+                              <m:r>
+                                <a:rPr lang="en-US" i="1" smtClean="0">
+                                  <a:latin typeface="Cambria Math" panose="02040503050406030204" pitchFamily="18" charset="0"/>
+                                </a:rPr>
+                                <m:t>2</m:t>
+                              </m:r>
+                            </m:sub>
+                          </m:sSub>
+                        </m:fName>
+                        <m:e>
+                          <m:r>
+                            <a:rPr lang="en-US" i="1" smtClean="0">
+                              <a:latin typeface="Cambria Math" panose="02040503050406030204" pitchFamily="18" charset="0"/>
+                            </a:rPr>
+                            <m:t>𝑝</m:t>
+                          </m:r>
+                        </m:e>
+                      </m:func>
+                      <m:r>
+                        <a:rPr lang="en-US" i="1" smtClean="0">
+                          <a:latin typeface="Cambria Math" panose="02040503050406030204" pitchFamily="18" charset="0"/>
+                        </a:rPr>
+                        <m:t>−</m:t>
+                      </m:r>
+                      <m:d>
+                        <m:dPr>
+                          <m:ctrlPr>
+                            <a:rPr lang="en-US" i="1" smtClean="0">
+                              <a:latin typeface="Cambria Math" panose="02040503050406030204" pitchFamily="18" charset="0"/>
+                            </a:rPr>
+                          </m:ctrlPr>
+                        </m:dPr>
+                        <m:e>
+                          <m:r>
+                            <a:rPr lang="en-US" i="1" smtClean="0">
+                              <a:latin typeface="Cambria Math" panose="02040503050406030204" pitchFamily="18" charset="0"/>
+                            </a:rPr>
+                            <m:t>1−</m:t>
+                          </m:r>
+                          <m:r>
+                            <a:rPr lang="en-US" i="1" smtClean="0">
+                              <a:latin typeface="Cambria Math" panose="02040503050406030204" pitchFamily="18" charset="0"/>
+                            </a:rPr>
+                            <m:t>𝑝</m:t>
+                          </m:r>
+                        </m:e>
+                      </m:d>
+                      <m:func>
+                        <m:funcPr>
+                          <m:ctrlPr>
+                            <a:rPr lang="en-US" i="1" smtClean="0">
+                              <a:latin typeface="Cambria Math" panose="02040503050406030204" pitchFamily="18" charset="0"/>
+                            </a:rPr>
+                          </m:ctrlPr>
+                        </m:funcPr>
+                        <m:fName>
+                          <m:sSub>
+                            <m:sSubPr>
+                              <m:ctrlPr>
+                                <a:rPr lang="en-US" i="1" smtClean="0">
+                                  <a:latin typeface="Cambria Math" panose="02040503050406030204" pitchFamily="18" charset="0"/>
+                                </a:rPr>
+                              </m:ctrlPr>
+                            </m:sSubPr>
+                            <m:e>
+                              <m:r>
+                                <m:rPr>
+                                  <m:sty m:val="p"/>
+                                </m:rPr>
+                                <a:rPr lang="en-US" smtClean="0">
+                                  <a:latin typeface="Cambria Math" panose="02040503050406030204" pitchFamily="18" charset="0"/>
+                                </a:rPr>
+                                <m:t>log</m:t>
+                              </m:r>
+                            </m:e>
+                            <m:sub>
+                              <m:r>
+                                <a:rPr lang="en-US" i="1" smtClean="0">
+                                  <a:latin typeface="Cambria Math" panose="02040503050406030204" pitchFamily="18" charset="0"/>
+                                </a:rPr>
+                                <m:t>2</m:t>
+                              </m:r>
+                            </m:sub>
+                          </m:sSub>
+                        </m:fName>
+                        <m:e>
+                          <m:d>
+                            <m:dPr>
+                              <m:ctrlPr>
+                                <a:rPr lang="en-US" i="1" smtClean="0">
+                                  <a:latin typeface="Cambria Math" panose="02040503050406030204" pitchFamily="18" charset="0"/>
+                                </a:rPr>
+                              </m:ctrlPr>
+                            </m:dPr>
+                            <m:e>
+                              <m:r>
+                                <a:rPr lang="en-US" i="1" smtClean="0">
+                                  <a:latin typeface="Cambria Math" panose="02040503050406030204" pitchFamily="18" charset="0"/>
+                                </a:rPr>
+                                <m:t>1−</m:t>
+                              </m:r>
+                              <m:r>
+                                <a:rPr lang="en-US" i="1" smtClean="0">
+                                  <a:latin typeface="Cambria Math" panose="02040503050406030204" pitchFamily="18" charset="0"/>
+                                </a:rPr>
+                                <m:t>𝑝</m:t>
+                              </m:r>
+                            </m:e>
+                          </m:d>
+                        </m:e>
+                      </m:func>
+                    </m:oMath>
+                  </m:oMathPara>
+                </a14:m>
+                <a:endParaRPr lang="en-US" dirty="0"/>
+              </a:p>
+              <a:p>
+                <a:endParaRPr lang="en-US" dirty="0"/>
+              </a:p>
+            </p:txBody>
+          </p:sp>
+        </mc:Choice>
+        <mc:Fallback>
+          <p:sp>
+            <p:nvSpPr>
+              <p:cNvPr id="37" name="Content Placeholder 2">
+                <a:extLst>
+                  <a:ext uri="{FF2B5EF4-FFF2-40B4-BE49-F238E27FC236}">
+                    <a16:creationId xmlns:a16="http://schemas.microsoft.com/office/drawing/2014/main" id="{90D14C01-82D2-7ADF-3806-D57EA0D314C7}"/>
+                  </a:ext>
+                </a:extLst>
+              </p:cNvPr>
+              <p:cNvSpPr txBox="1">
+                <a:spLocks noRot="1" noChangeAspect="1" noMove="1" noResize="1" noEditPoints="1" noAdjustHandles="1" noChangeArrowheads="1" noChangeShapeType="1" noTextEdit="1"/>
+              </p:cNvSpPr>
+              <p:nvPr/>
+            </p:nvSpPr>
+            <p:spPr>
+              <a:xfrm>
+                <a:off x="992188" y="1843088"/>
+                <a:ext cx="6284912" cy="4498975"/>
+              </a:xfrm>
+              <a:prstGeom prst="rect">
+                <a:avLst/>
+              </a:prstGeom>
+              <a:blipFill>
+                <a:blip r:embed="rId3"/>
+                <a:stretch>
+                  <a:fillRect l="-1552" t="-2710"/>
+                </a:stretch>
+              </a:blipFill>
+            </p:spPr>
+            <p:txBody>
+              <a:bodyPr/>
+              <a:lstStyle/>
+              <a:p>
+                <a:r>
+                  <a:rPr lang="en-US">
+                    <a:noFill/>
+                  </a:rPr>
+                  <a:t> </a:t>
+                </a:r>
+              </a:p>
+            </p:txBody>
+          </p:sp>
+        </mc:Fallback>
+      </mc:AlternateContent>
+      <p:cxnSp>
+        <p:nvCxnSpPr>
+          <p:cNvPr id="39" name="Connector: Elbow 38">
+            <a:extLst>
+              <a:ext uri="{FF2B5EF4-FFF2-40B4-BE49-F238E27FC236}">
+                <a16:creationId xmlns:a16="http://schemas.microsoft.com/office/drawing/2014/main" id="{1B018123-42A5-6580-7179-6CD178B85FC0}"/>
+              </a:ext>
+            </a:extLst>
+          </p:cNvPr>
+          <p:cNvCxnSpPr>
+            <a:cxnSpLocks/>
+          </p:cNvCxnSpPr>
+          <p:nvPr/>
+        </p:nvCxnSpPr>
+        <p:spPr>
+          <a:xfrm>
+            <a:off x="5543550" y="2350967"/>
+            <a:ext cx="4759518" cy="368013"/>
+          </a:xfrm>
+          <a:prstGeom prst="bentConnector2">
+            <a:avLst/>
+          </a:prstGeom>
+          <a:ln w="12700">
+            <a:tailEnd type="triangle"/>
+          </a:ln>
+        </p:spPr>
+        <p:style>
+          <a:lnRef idx="1">
+            <a:schemeClr val="accent1"/>
+          </a:lnRef>
+          <a:fillRef idx="0">
+            <a:schemeClr val="accent1"/>
+          </a:fillRef>
+          <a:effectRef idx="0">
+            <a:schemeClr val="accent1"/>
+          </a:effectRef>
+          <a:fontRef idx="minor">
+            <a:schemeClr val="tx1"/>
+          </a:fontRef>
+        </p:style>
+      </p:cxnSp>
     </p:spTree>
     <p:extLst>
       <p:ext uri="{BB962C8B-B14F-4D97-AF65-F5344CB8AC3E}">
-        <p14:creationId xmlns:p14="http://schemas.microsoft.com/office/powerpoint/2010/main" val="1397101542"/>
+        <p14:creationId xmlns:p14="http://schemas.microsoft.com/office/powerpoint/2010/main" val="3599224213"/>
       </p:ext>
     </p:extLst>
   </p:cSld>
@@ -38706,6 +40098,961 @@
           <p:cNvPr id="2" name="Title 1">
             <a:extLst>
               <a:ext uri="{FF2B5EF4-FFF2-40B4-BE49-F238E27FC236}">
+                <a16:creationId xmlns:a16="http://schemas.microsoft.com/office/drawing/2014/main" id="{D1D90605-C51B-A3D5-F252-74CD56BEF664}"/>
+              </a:ext>
+            </a:extLst>
+          </p:cNvPr>
+          <p:cNvSpPr>
+            <a:spLocks noGrp="1"/>
+          </p:cNvSpPr>
+          <p:nvPr>
+            <p:ph type="title"/>
+          </p:nvPr>
+        </p:nvSpPr>
+        <p:spPr/>
+        <p:txBody>
+          <a:bodyPr/>
+          <a:lstStyle/>
+          <a:p>
+            <a:r>
+              <a:rPr lang="en-US" dirty="0"/>
+              <a:t>Entropy: Continuous</a:t>
+            </a:r>
+          </a:p>
+        </p:txBody>
+      </p:sp>
+      <mc:AlternateContent xmlns:mc="http://schemas.openxmlformats.org/markup-compatibility/2006">
+        <mc:Choice xmlns:a14="http://schemas.microsoft.com/office/drawing/2010/main" Requires="a14">
+          <p:sp>
+            <p:nvSpPr>
+              <p:cNvPr id="37" name="Content Placeholder 2">
+                <a:extLst>
+                  <a:ext uri="{FF2B5EF4-FFF2-40B4-BE49-F238E27FC236}">
+                    <a16:creationId xmlns:a16="http://schemas.microsoft.com/office/drawing/2014/main" id="{90D14C01-82D2-7ADF-3806-D57EA0D314C7}"/>
+                  </a:ext>
+                </a:extLst>
+              </p:cNvPr>
+              <p:cNvSpPr txBox="1">
+                <a:spLocks/>
+              </p:cNvSpPr>
+              <p:nvPr/>
+            </p:nvSpPr>
+            <p:spPr>
+              <a:xfrm>
+                <a:off x="992188" y="1843088"/>
+                <a:ext cx="6284912" cy="4553466"/>
+              </a:xfrm>
+              <a:prstGeom prst="rect">
+                <a:avLst/>
+              </a:prstGeom>
+            </p:spPr>
+            <p:txBody>
+              <a:bodyPr vert="horz" lIns="91440" tIns="45720" rIns="91440" bIns="45720" rtlCol="0">
+                <a:normAutofit fontScale="92500"/>
+              </a:bodyPr>
+              <a:lstStyle>
+                <a:lvl1pPr marL="228600" indent="-228600" algn="l" defTabSz="914400" rtl="0" eaLnBrk="1" latinLnBrk="0" hangingPunct="1">
+                  <a:lnSpc>
+                    <a:spcPct val="90000"/>
+                  </a:lnSpc>
+                  <a:spcBef>
+                    <a:spcPts val="1000"/>
+                  </a:spcBef>
+                  <a:buFont typeface="Arial" panose="020B0604020202020204" pitchFamily="34" charset="0"/>
+                  <a:buChar char="•"/>
+                  <a:defRPr sz="2800" kern="1200">
+                    <a:solidFill>
+                      <a:schemeClr val="tx1"/>
+                    </a:solidFill>
+                    <a:latin typeface="+mn-lt"/>
+                    <a:ea typeface="+mn-ea"/>
+                    <a:cs typeface="+mn-cs"/>
+                  </a:defRPr>
+                </a:lvl1pPr>
+                <a:lvl2pPr marL="685800" indent="-228600" algn="l" defTabSz="914400" rtl="0" eaLnBrk="1" latinLnBrk="0" hangingPunct="1">
+                  <a:lnSpc>
+                    <a:spcPct val="90000"/>
+                  </a:lnSpc>
+                  <a:spcBef>
+                    <a:spcPts val="500"/>
+                  </a:spcBef>
+                  <a:buFont typeface="Arial" panose="020B0604020202020204" pitchFamily="34" charset="0"/>
+                  <a:buChar char="•"/>
+                  <a:defRPr sz="2400" kern="1200">
+                    <a:solidFill>
+                      <a:schemeClr val="tx1"/>
+                    </a:solidFill>
+                    <a:latin typeface="+mn-lt"/>
+                    <a:ea typeface="+mn-ea"/>
+                    <a:cs typeface="+mn-cs"/>
+                  </a:defRPr>
+                </a:lvl2pPr>
+                <a:lvl3pPr marL="1143000" indent="-228600" algn="l" defTabSz="914400" rtl="0" eaLnBrk="1" latinLnBrk="0" hangingPunct="1">
+                  <a:lnSpc>
+                    <a:spcPct val="90000"/>
+                  </a:lnSpc>
+                  <a:spcBef>
+                    <a:spcPts val="500"/>
+                  </a:spcBef>
+                  <a:buFont typeface="Arial" panose="020B0604020202020204" pitchFamily="34" charset="0"/>
+                  <a:buChar char="•"/>
+                  <a:defRPr sz="2000" kern="1200">
+                    <a:solidFill>
+                      <a:schemeClr val="tx1"/>
+                    </a:solidFill>
+                    <a:latin typeface="+mn-lt"/>
+                    <a:ea typeface="+mn-ea"/>
+                    <a:cs typeface="+mn-cs"/>
+                  </a:defRPr>
+                </a:lvl3pPr>
+                <a:lvl4pPr marL="1600200" indent="-228600" algn="l" defTabSz="914400" rtl="0" eaLnBrk="1" latinLnBrk="0" hangingPunct="1">
+                  <a:lnSpc>
+                    <a:spcPct val="90000"/>
+                  </a:lnSpc>
+                  <a:spcBef>
+                    <a:spcPts val="500"/>
+                  </a:spcBef>
+                  <a:buFont typeface="Arial" panose="020B0604020202020204" pitchFamily="34" charset="0"/>
+                  <a:buChar char="•"/>
+                  <a:defRPr sz="1800" kern="1200">
+                    <a:solidFill>
+                      <a:schemeClr val="tx1"/>
+                    </a:solidFill>
+                    <a:latin typeface="+mn-lt"/>
+                    <a:ea typeface="+mn-ea"/>
+                    <a:cs typeface="+mn-cs"/>
+                  </a:defRPr>
+                </a:lvl4pPr>
+                <a:lvl5pPr marL="2057400" indent="-228600" algn="l" defTabSz="914400" rtl="0" eaLnBrk="1" latinLnBrk="0" hangingPunct="1">
+                  <a:lnSpc>
+                    <a:spcPct val="90000"/>
+                  </a:lnSpc>
+                  <a:spcBef>
+                    <a:spcPts val="500"/>
+                  </a:spcBef>
+                  <a:buFont typeface="Arial" panose="020B0604020202020204" pitchFamily="34" charset="0"/>
+                  <a:buChar char="•"/>
+                  <a:defRPr sz="1800" kern="1200">
+                    <a:solidFill>
+                      <a:schemeClr val="tx1"/>
+                    </a:solidFill>
+                    <a:latin typeface="+mn-lt"/>
+                    <a:ea typeface="+mn-ea"/>
+                    <a:cs typeface="+mn-cs"/>
+                  </a:defRPr>
+                </a:lvl5pPr>
+                <a:lvl6pPr marL="2514600" indent="-228600" algn="l" defTabSz="914400" rtl="0" eaLnBrk="1" latinLnBrk="0" hangingPunct="1">
+                  <a:lnSpc>
+                    <a:spcPct val="90000"/>
+                  </a:lnSpc>
+                  <a:spcBef>
+                    <a:spcPts val="500"/>
+                  </a:spcBef>
+                  <a:buFont typeface="Arial" panose="020B0604020202020204" pitchFamily="34" charset="0"/>
+                  <a:buChar char="•"/>
+                  <a:defRPr sz="1800" kern="1200">
+                    <a:solidFill>
+                      <a:schemeClr val="tx1"/>
+                    </a:solidFill>
+                    <a:latin typeface="+mn-lt"/>
+                    <a:ea typeface="+mn-ea"/>
+                    <a:cs typeface="+mn-cs"/>
+                  </a:defRPr>
+                </a:lvl6pPr>
+                <a:lvl7pPr marL="2971800" indent="-228600" algn="l" defTabSz="914400" rtl="0" eaLnBrk="1" latinLnBrk="0" hangingPunct="1">
+                  <a:lnSpc>
+                    <a:spcPct val="90000"/>
+                  </a:lnSpc>
+                  <a:spcBef>
+                    <a:spcPts val="500"/>
+                  </a:spcBef>
+                  <a:buFont typeface="Arial" panose="020B0604020202020204" pitchFamily="34" charset="0"/>
+                  <a:buChar char="•"/>
+                  <a:defRPr sz="1800" kern="1200">
+                    <a:solidFill>
+                      <a:schemeClr val="tx1"/>
+                    </a:solidFill>
+                    <a:latin typeface="+mn-lt"/>
+                    <a:ea typeface="+mn-ea"/>
+                    <a:cs typeface="+mn-cs"/>
+                  </a:defRPr>
+                </a:lvl7pPr>
+                <a:lvl8pPr marL="3429000" indent="-228600" algn="l" defTabSz="914400" rtl="0" eaLnBrk="1" latinLnBrk="0" hangingPunct="1">
+                  <a:lnSpc>
+                    <a:spcPct val="90000"/>
+                  </a:lnSpc>
+                  <a:spcBef>
+                    <a:spcPts val="500"/>
+                  </a:spcBef>
+                  <a:buFont typeface="Arial" panose="020B0604020202020204" pitchFamily="34" charset="0"/>
+                  <a:buChar char="•"/>
+                  <a:defRPr sz="1800" kern="1200">
+                    <a:solidFill>
+                      <a:schemeClr val="tx1"/>
+                    </a:solidFill>
+                    <a:latin typeface="+mn-lt"/>
+                    <a:ea typeface="+mn-ea"/>
+                    <a:cs typeface="+mn-cs"/>
+                  </a:defRPr>
+                </a:lvl8pPr>
+                <a:lvl9pPr marL="3886200" indent="-228600" algn="l" defTabSz="914400" rtl="0" eaLnBrk="1" latinLnBrk="0" hangingPunct="1">
+                  <a:lnSpc>
+                    <a:spcPct val="90000"/>
+                  </a:lnSpc>
+                  <a:spcBef>
+                    <a:spcPts val="500"/>
+                  </a:spcBef>
+                  <a:buFont typeface="Arial" panose="020B0604020202020204" pitchFamily="34" charset="0"/>
+                  <a:buChar char="•"/>
+                  <a:defRPr sz="1800" kern="1200">
+                    <a:solidFill>
+                      <a:schemeClr val="tx1"/>
+                    </a:solidFill>
+                    <a:latin typeface="+mn-lt"/>
+                    <a:ea typeface="+mn-ea"/>
+                    <a:cs typeface="+mn-cs"/>
+                  </a:defRPr>
+                </a:lvl9pPr>
+              </a:lstStyle>
+              <a:p>
+                <a:r>
+                  <a:rPr lang="en-US" dirty="0"/>
+                  <a:t>Uniform</a:t>
+                </a:r>
+              </a:p>
+              <a:p>
+                <a:pPr marL="457200" lvl="1" indent="0">
+                  <a:buFont typeface="Arial" panose="020B0604020202020204" pitchFamily="34" charset="0"/>
+                  <a:buNone/>
+                </a:pPr>
+                <a14:m>
+                  <m:oMathPara xmlns:m="http://schemas.openxmlformats.org/officeDocument/2006/math">
+                    <m:oMathParaPr>
+                      <m:jc m:val="centerGroup"/>
+                    </m:oMathParaPr>
+                    <m:oMath xmlns:m="http://schemas.openxmlformats.org/officeDocument/2006/math">
+                      <m:r>
+                        <a:rPr lang="en-US" i="1" smtClean="0">
+                          <a:latin typeface="Cambria Math" panose="02040503050406030204" pitchFamily="18" charset="0"/>
+                        </a:rPr>
+                        <m:t>𝑝</m:t>
+                      </m:r>
+                      <m:d>
+                        <m:dPr>
+                          <m:ctrlPr>
+                            <a:rPr lang="en-US" i="1" smtClean="0">
+                              <a:latin typeface="Cambria Math" panose="02040503050406030204" pitchFamily="18" charset="0"/>
+                            </a:rPr>
+                          </m:ctrlPr>
+                        </m:dPr>
+                        <m:e>
+                          <m:r>
+                            <a:rPr lang="en-US" b="0" i="1" smtClean="0">
+                              <a:latin typeface="Cambria Math" panose="02040503050406030204" pitchFamily="18" charset="0"/>
+                            </a:rPr>
+                            <m:t>𝑥</m:t>
+                          </m:r>
+                        </m:e>
+                      </m:d>
+                      <m:r>
+                        <a:rPr lang="en-US" i="1" smtClean="0">
+                          <a:latin typeface="Cambria Math" panose="02040503050406030204" pitchFamily="18" charset="0"/>
+                        </a:rPr>
+                        <m:t>=</m:t>
+                      </m:r>
+                      <m:r>
+                        <a:rPr lang="en-US" b="0" i="1" smtClean="0">
+                          <a:latin typeface="Cambria Math" panose="02040503050406030204" pitchFamily="18" charset="0"/>
+                        </a:rPr>
+                        <m:t>1 ∀ </m:t>
+                      </m:r>
+                      <m:r>
+                        <a:rPr lang="en-US" b="0" i="1" smtClean="0">
+                          <a:latin typeface="Cambria Math" panose="02040503050406030204" pitchFamily="18" charset="0"/>
+                        </a:rPr>
+                        <m:t>𝑥</m:t>
+                      </m:r>
+                      <m:r>
+                        <a:rPr lang="en-US" b="0" i="1" smtClean="0">
+                          <a:latin typeface="Cambria Math" panose="02040503050406030204" pitchFamily="18" charset="0"/>
+                        </a:rPr>
+                        <m:t>∈[0,1]</m:t>
+                      </m:r>
+                    </m:oMath>
+                  </m:oMathPara>
+                </a14:m>
+                <a:endParaRPr lang="en-US" dirty="0"/>
+              </a:p>
+              <a:p>
+                <a:pPr marL="457200" lvl="1" indent="0">
+                  <a:buFont typeface="Arial" panose="020B0604020202020204" pitchFamily="34" charset="0"/>
+                  <a:buNone/>
+                </a:pPr>
+                <a:endParaRPr lang="en-US" i="1" dirty="0">
+                  <a:latin typeface="Cambria Math" panose="02040503050406030204" pitchFamily="18" charset="0"/>
+                </a:endParaRPr>
+              </a:p>
+              <a:p>
+                <a:pPr marL="457200" lvl="1" indent="0">
+                  <a:buFont typeface="Arial" panose="020B0604020202020204" pitchFamily="34" charset="0"/>
+                  <a:buNone/>
+                </a:pPr>
+                <a14:m>
+                  <m:oMathPara xmlns:m="http://schemas.openxmlformats.org/officeDocument/2006/math">
+                    <m:oMathParaPr>
+                      <m:jc m:val="centerGroup"/>
+                    </m:oMathParaPr>
+                    <m:oMath xmlns:m="http://schemas.openxmlformats.org/officeDocument/2006/math">
+                      <m:r>
+                        <a:rPr lang="en-US" i="1" smtClean="0">
+                          <a:latin typeface="Cambria Math" panose="02040503050406030204" pitchFamily="18" charset="0"/>
+                        </a:rPr>
+                        <m:t>𝑆</m:t>
+                      </m:r>
+                      <m:r>
+                        <a:rPr lang="en-US" i="1" smtClean="0">
+                          <a:latin typeface="Cambria Math" panose="02040503050406030204" pitchFamily="18" charset="0"/>
+                        </a:rPr>
+                        <m:t>=</m:t>
+                      </m:r>
+                      <m:nary>
+                        <m:naryPr>
+                          <m:ctrlPr>
+                            <a:rPr lang="en-US" b="0" i="1" smtClean="0">
+                              <a:latin typeface="Cambria Math" panose="02040503050406030204" pitchFamily="18" charset="0"/>
+                            </a:rPr>
+                          </m:ctrlPr>
+                        </m:naryPr>
+                        <m:sub>
+                          <m:r>
+                            <a:rPr lang="en-US" b="0" i="1" smtClean="0">
+                              <a:latin typeface="Cambria Math" panose="02040503050406030204" pitchFamily="18" charset="0"/>
+                            </a:rPr>
+                            <m:t>0</m:t>
+                          </m:r>
+                        </m:sub>
+                        <m:sup>
+                          <m:r>
+                            <a:rPr lang="en-US" b="0" i="1" smtClean="0">
+                              <a:latin typeface="Cambria Math" panose="02040503050406030204" pitchFamily="18" charset="0"/>
+                            </a:rPr>
+                            <m:t>1</m:t>
+                          </m:r>
+                        </m:sup>
+                        <m:e>
+                          <m:r>
+                            <a:rPr lang="en-US" b="0" i="1" smtClean="0">
+                              <a:latin typeface="Cambria Math" panose="02040503050406030204" pitchFamily="18" charset="0"/>
+                            </a:rPr>
+                            <m:t>−</m:t>
+                          </m:r>
+                          <m:r>
+                            <a:rPr lang="en-US" b="0" i="1" smtClean="0">
+                              <a:latin typeface="Cambria Math" panose="02040503050406030204" pitchFamily="18" charset="0"/>
+                            </a:rPr>
+                            <m:t>𝑝</m:t>
+                          </m:r>
+                          <m:d>
+                            <m:dPr>
+                              <m:ctrlPr>
+                                <a:rPr lang="en-US" b="0" i="1" smtClean="0">
+                                  <a:latin typeface="Cambria Math" panose="02040503050406030204" pitchFamily="18" charset="0"/>
+                                </a:rPr>
+                              </m:ctrlPr>
+                            </m:dPr>
+                            <m:e>
+                              <m:r>
+                                <a:rPr lang="en-US" b="0" i="1" smtClean="0">
+                                  <a:latin typeface="Cambria Math" panose="02040503050406030204" pitchFamily="18" charset="0"/>
+                                </a:rPr>
+                                <m:t>𝑥</m:t>
+                              </m:r>
+                            </m:e>
+                          </m:d>
+                          <m:func>
+                            <m:funcPr>
+                              <m:ctrlPr>
+                                <a:rPr lang="en-US" b="0" i="1" smtClean="0">
+                                  <a:latin typeface="Cambria Math" panose="02040503050406030204" pitchFamily="18" charset="0"/>
+                                </a:rPr>
+                              </m:ctrlPr>
+                            </m:funcPr>
+                            <m:fName>
+                              <m:sSub>
+                                <m:sSubPr>
+                                  <m:ctrlPr>
+                                    <a:rPr lang="en-US" b="0" i="1" smtClean="0">
+                                      <a:latin typeface="Cambria Math" panose="02040503050406030204" pitchFamily="18" charset="0"/>
+                                    </a:rPr>
+                                  </m:ctrlPr>
+                                </m:sSubPr>
+                                <m:e>
+                                  <m:r>
+                                    <m:rPr>
+                                      <m:sty m:val="p"/>
+                                    </m:rPr>
+                                    <a:rPr lang="en-US" b="0" i="0" smtClean="0">
+                                      <a:latin typeface="Cambria Math" panose="02040503050406030204" pitchFamily="18" charset="0"/>
+                                    </a:rPr>
+                                    <m:t>log</m:t>
+                                  </m:r>
+                                </m:e>
+                                <m:sub>
+                                  <m:r>
+                                    <a:rPr lang="en-US" b="0" i="1" smtClean="0">
+                                      <a:latin typeface="Cambria Math" panose="02040503050406030204" pitchFamily="18" charset="0"/>
+                                    </a:rPr>
+                                    <m:t>2</m:t>
+                                  </m:r>
+                                </m:sub>
+                              </m:sSub>
+                            </m:fName>
+                            <m:e>
+                              <m:d>
+                                <m:dPr>
+                                  <m:ctrlPr>
+                                    <a:rPr lang="en-US" b="0" i="1" smtClean="0">
+                                      <a:latin typeface="Cambria Math" panose="02040503050406030204" pitchFamily="18" charset="0"/>
+                                    </a:rPr>
+                                  </m:ctrlPr>
+                                </m:dPr>
+                                <m:e>
+                                  <m:r>
+                                    <a:rPr lang="en-US" b="0" i="1" smtClean="0">
+                                      <a:latin typeface="Cambria Math" panose="02040503050406030204" pitchFamily="18" charset="0"/>
+                                    </a:rPr>
+                                    <m:t>𝑝</m:t>
+                                  </m:r>
+                                  <m:d>
+                                    <m:dPr>
+                                      <m:ctrlPr>
+                                        <a:rPr lang="en-US" b="0" i="1" smtClean="0">
+                                          <a:latin typeface="Cambria Math" panose="02040503050406030204" pitchFamily="18" charset="0"/>
+                                        </a:rPr>
+                                      </m:ctrlPr>
+                                    </m:dPr>
+                                    <m:e>
+                                      <m:r>
+                                        <a:rPr lang="en-US" b="0" i="1" smtClean="0">
+                                          <a:latin typeface="Cambria Math" panose="02040503050406030204" pitchFamily="18" charset="0"/>
+                                        </a:rPr>
+                                        <m:t>𝑥</m:t>
+                                      </m:r>
+                                    </m:e>
+                                  </m:d>
+                                </m:e>
+                              </m:d>
+                            </m:e>
+                          </m:func>
+                          <m:r>
+                            <a:rPr lang="en-US" b="0" i="1" smtClean="0">
+                              <a:latin typeface="Cambria Math" panose="02040503050406030204" pitchFamily="18" charset="0"/>
+                            </a:rPr>
+                            <m:t>𝑑𝑥</m:t>
+                          </m:r>
+                          <m:r>
+                            <a:rPr lang="en-US" b="0" i="1" smtClean="0">
+                              <a:latin typeface="Cambria Math" panose="02040503050406030204" pitchFamily="18" charset="0"/>
+                            </a:rPr>
+                            <m:t> </m:t>
+                          </m:r>
+                        </m:e>
+                      </m:nary>
+                      <m:r>
+                        <a:rPr lang="en-US" b="0" i="1" smtClean="0">
+                          <a:latin typeface="Cambria Math" panose="02040503050406030204" pitchFamily="18" charset="0"/>
+                        </a:rPr>
+                        <m:t>=0</m:t>
+                      </m:r>
+                    </m:oMath>
+                  </m:oMathPara>
+                </a14:m>
+                <a:br>
+                  <a:rPr lang="en-US" dirty="0"/>
+                </a:br>
+                <a:endParaRPr lang="en-US" dirty="0"/>
+              </a:p>
+              <a:p>
+                <a:r>
+                  <a:rPr lang="en-US" dirty="0"/>
+                  <a:t>Standard Normal</a:t>
+                </a:r>
+              </a:p>
+              <a:p>
+                <a:endParaRPr lang="en-US" dirty="0"/>
+              </a:p>
+              <a:p>
+                <a:pPr marL="457200" lvl="1" indent="0">
+                  <a:buNone/>
+                </a:pPr>
+                <a14:m>
+                  <m:oMathPara xmlns:m="http://schemas.openxmlformats.org/officeDocument/2006/math">
+                    <m:oMathParaPr>
+                      <m:jc m:val="centerGroup"/>
+                    </m:oMathParaPr>
+                    <m:oMath xmlns:m="http://schemas.openxmlformats.org/officeDocument/2006/math">
+                      <m:r>
+                        <a:rPr lang="en-US" i="1" smtClean="0">
+                          <a:latin typeface="Cambria Math" panose="02040503050406030204" pitchFamily="18" charset="0"/>
+                        </a:rPr>
+                        <m:t>𝑝</m:t>
+                      </m:r>
+                      <m:d>
+                        <m:dPr>
+                          <m:ctrlPr>
+                            <a:rPr lang="en-US" i="1" smtClean="0">
+                              <a:latin typeface="Cambria Math" panose="02040503050406030204" pitchFamily="18" charset="0"/>
+                            </a:rPr>
+                          </m:ctrlPr>
+                        </m:dPr>
+                        <m:e>
+                          <m:r>
+                            <a:rPr lang="en-US" b="0" i="1" smtClean="0">
+                              <a:latin typeface="Cambria Math" panose="02040503050406030204" pitchFamily="18" charset="0"/>
+                            </a:rPr>
+                            <m:t>𝑥</m:t>
+                          </m:r>
+                        </m:e>
+                      </m:d>
+                      <m:r>
+                        <a:rPr lang="en-US" b="0" i="1" smtClean="0">
+                          <a:latin typeface="Cambria Math" panose="02040503050406030204" pitchFamily="18" charset="0"/>
+                        </a:rPr>
+                        <m:t>=</m:t>
+                      </m:r>
+                      <m:f>
+                        <m:fPr>
+                          <m:ctrlPr>
+                            <a:rPr lang="en-US" i="1">
+                              <a:latin typeface="Cambria Math" panose="02040503050406030204" pitchFamily="18" charset="0"/>
+                            </a:rPr>
+                          </m:ctrlPr>
+                        </m:fPr>
+                        <m:num>
+                          <m:r>
+                            <a:rPr lang="en-US" i="1">
+                              <a:latin typeface="Cambria Math" panose="02040503050406030204" pitchFamily="18" charset="0"/>
+                            </a:rPr>
+                            <m:t>1</m:t>
+                          </m:r>
+                        </m:num>
+                        <m:den>
+                          <m:rad>
+                            <m:radPr>
+                              <m:degHide m:val="on"/>
+                              <m:ctrlPr>
+                                <a:rPr lang="en-US" i="1">
+                                  <a:latin typeface="Cambria Math" panose="02040503050406030204" pitchFamily="18" charset="0"/>
+                                </a:rPr>
+                              </m:ctrlPr>
+                            </m:radPr>
+                            <m:deg/>
+                            <m:e>
+                              <m:r>
+                                <a:rPr lang="en-US" i="1">
+                                  <a:latin typeface="Cambria Math" panose="02040503050406030204" pitchFamily="18" charset="0"/>
+                                </a:rPr>
+                                <m:t>2</m:t>
+                              </m:r>
+                              <m:r>
+                                <a:rPr lang="en-US" i="1">
+                                  <a:latin typeface="Cambria Math" panose="02040503050406030204" pitchFamily="18" charset="0"/>
+                                </a:rPr>
+                                <m:t>𝜋</m:t>
+                              </m:r>
+                            </m:e>
+                          </m:rad>
+                        </m:den>
+                      </m:f>
+                      <m:r>
+                        <a:rPr lang="en-US" b="0" i="1" smtClean="0">
+                          <a:latin typeface="Cambria Math" panose="02040503050406030204" pitchFamily="18" charset="0"/>
+                        </a:rPr>
+                        <m:t> </m:t>
+                      </m:r>
+                      <m:sSup>
+                        <m:sSupPr>
+                          <m:ctrlPr>
+                            <a:rPr lang="en-US" b="0" i="1" smtClean="0">
+                              <a:latin typeface="Cambria Math" panose="02040503050406030204" pitchFamily="18" charset="0"/>
+                            </a:rPr>
+                          </m:ctrlPr>
+                        </m:sSupPr>
+                        <m:e>
+                          <m:r>
+                            <a:rPr lang="en-US" b="0" i="1" smtClean="0">
+                              <a:latin typeface="Cambria Math" panose="02040503050406030204" pitchFamily="18" charset="0"/>
+                            </a:rPr>
+                            <m:t>𝑒</m:t>
+                          </m:r>
+                        </m:e>
+                        <m:sup>
+                          <m:r>
+                            <a:rPr lang="en-US" b="0" i="1" smtClean="0">
+                              <a:latin typeface="Cambria Math" panose="02040503050406030204" pitchFamily="18" charset="0"/>
+                            </a:rPr>
+                            <m:t>−</m:t>
+                          </m:r>
+                          <m:f>
+                            <m:fPr>
+                              <m:ctrlPr>
+                                <a:rPr lang="en-US" b="0" i="1" smtClean="0">
+                                  <a:latin typeface="Cambria Math" panose="02040503050406030204" pitchFamily="18" charset="0"/>
+                                </a:rPr>
+                              </m:ctrlPr>
+                            </m:fPr>
+                            <m:num>
+                              <m:sSup>
+                                <m:sSupPr>
+                                  <m:ctrlPr>
+                                    <a:rPr lang="en-US" b="0" i="1" smtClean="0">
+                                      <a:latin typeface="Cambria Math" panose="02040503050406030204" pitchFamily="18" charset="0"/>
+                                    </a:rPr>
+                                  </m:ctrlPr>
+                                </m:sSupPr>
+                                <m:e>
+                                  <m:r>
+                                    <a:rPr lang="en-US" b="0" i="1" smtClean="0">
+                                      <a:latin typeface="Cambria Math" panose="02040503050406030204" pitchFamily="18" charset="0"/>
+                                    </a:rPr>
+                                    <m:t>𝑥</m:t>
+                                  </m:r>
+                                </m:e>
+                                <m:sup>
+                                  <m:r>
+                                    <a:rPr lang="en-US" b="0" i="1" smtClean="0">
+                                      <a:latin typeface="Cambria Math" panose="02040503050406030204" pitchFamily="18" charset="0"/>
+                                    </a:rPr>
+                                    <m:t>2</m:t>
+                                  </m:r>
+                                </m:sup>
+                              </m:sSup>
+                            </m:num>
+                            <m:den>
+                              <m:r>
+                                <a:rPr lang="en-US" b="0" i="1" smtClean="0">
+                                  <a:latin typeface="Cambria Math" panose="02040503050406030204" pitchFamily="18" charset="0"/>
+                                </a:rPr>
+                                <m:t>2</m:t>
+                              </m:r>
+                            </m:den>
+                          </m:f>
+                        </m:sup>
+                      </m:sSup>
+                      <m:r>
+                        <a:rPr lang="en-US" b="0" i="1" smtClean="0">
+                          <a:latin typeface="Cambria Math" panose="02040503050406030204" pitchFamily="18" charset="0"/>
+                        </a:rPr>
+                        <m:t> ∀ </m:t>
+                      </m:r>
+                      <m:r>
+                        <a:rPr lang="en-US" b="0" i="1" smtClean="0">
+                          <a:latin typeface="Cambria Math" panose="02040503050406030204" pitchFamily="18" charset="0"/>
+                        </a:rPr>
+                        <m:t>𝑥</m:t>
+                      </m:r>
+                      <m:r>
+                        <a:rPr lang="en-US" b="0" i="1" smtClean="0">
+                          <a:latin typeface="Cambria Math" panose="02040503050406030204" pitchFamily="18" charset="0"/>
+                        </a:rPr>
+                        <m:t>∈</m:t>
+                      </m:r>
+                      <m:d>
+                        <m:dPr>
+                          <m:ctrlPr>
+                            <a:rPr lang="en-US" b="0" i="1" smtClean="0">
+                              <a:latin typeface="Cambria Math" panose="02040503050406030204" pitchFamily="18" charset="0"/>
+                            </a:rPr>
+                          </m:ctrlPr>
+                        </m:dPr>
+                        <m:e>
+                          <m:r>
+                            <a:rPr lang="en-US" b="0" i="1" smtClean="0">
+                              <a:latin typeface="Cambria Math" panose="02040503050406030204" pitchFamily="18" charset="0"/>
+                            </a:rPr>
+                            <m:t>−∞,∞</m:t>
+                          </m:r>
+                        </m:e>
+                      </m:d>
+                    </m:oMath>
+                  </m:oMathPara>
+                </a14:m>
+                <a:endParaRPr lang="en-US" b="0" dirty="0"/>
+              </a:p>
+              <a:p>
+                <a:pPr marL="457200" lvl="1" indent="0">
+                  <a:buNone/>
+                </a:pPr>
+                <a:endParaRPr lang="en-US" dirty="0"/>
+              </a:p>
+              <a:p>
+                <a:pPr marL="457200" lvl="1" indent="0">
+                  <a:buNone/>
+                </a:pPr>
+                <a14:m>
+                  <m:oMathPara xmlns:m="http://schemas.openxmlformats.org/officeDocument/2006/math">
+                    <m:oMathParaPr>
+                      <m:jc m:val="centerGroup"/>
+                    </m:oMathParaPr>
+                    <m:oMath xmlns:m="http://schemas.openxmlformats.org/officeDocument/2006/math">
+                      <m:r>
+                        <a:rPr lang="en-US" i="1">
+                          <a:latin typeface="Cambria Math" panose="02040503050406030204" pitchFamily="18" charset="0"/>
+                        </a:rPr>
+                        <m:t>𝑆</m:t>
+                      </m:r>
+                      <m:r>
+                        <a:rPr lang="en-US" i="1">
+                          <a:latin typeface="Cambria Math" panose="02040503050406030204" pitchFamily="18" charset="0"/>
+                        </a:rPr>
+                        <m:t>=</m:t>
+                      </m:r>
+                      <m:nary>
+                        <m:naryPr>
+                          <m:ctrlPr>
+                            <a:rPr lang="en-US" i="1">
+                              <a:latin typeface="Cambria Math" panose="02040503050406030204" pitchFamily="18" charset="0"/>
+                            </a:rPr>
+                          </m:ctrlPr>
+                        </m:naryPr>
+                        <m:sub>
+                          <m:r>
+                            <a:rPr lang="en-US" b="0" i="1" smtClean="0">
+                              <a:latin typeface="Cambria Math" panose="02040503050406030204" pitchFamily="18" charset="0"/>
+                            </a:rPr>
+                            <m:t>−</m:t>
+                          </m:r>
+                          <m:r>
+                            <a:rPr lang="en-US" b="0" i="1" smtClean="0">
+                              <a:latin typeface="Cambria Math" panose="02040503050406030204" pitchFamily="18" charset="0"/>
+                            </a:rPr>
+                            <m:t>∞</m:t>
+                          </m:r>
+                        </m:sub>
+                        <m:sup>
+                          <m:r>
+                            <a:rPr lang="en-US" b="0" i="1" smtClean="0">
+                              <a:latin typeface="Cambria Math" panose="02040503050406030204" pitchFamily="18" charset="0"/>
+                            </a:rPr>
+                            <m:t>∞</m:t>
+                          </m:r>
+                        </m:sup>
+                        <m:e>
+                          <m:r>
+                            <a:rPr lang="en-US" i="1">
+                              <a:latin typeface="Cambria Math" panose="02040503050406030204" pitchFamily="18" charset="0"/>
+                            </a:rPr>
+                            <m:t>−</m:t>
+                          </m:r>
+                          <m:r>
+                            <a:rPr lang="en-US" i="1">
+                              <a:latin typeface="Cambria Math" panose="02040503050406030204" pitchFamily="18" charset="0"/>
+                            </a:rPr>
+                            <m:t>𝑝</m:t>
+                          </m:r>
+                          <m:d>
+                            <m:dPr>
+                              <m:ctrlPr>
+                                <a:rPr lang="en-US" i="1">
+                                  <a:latin typeface="Cambria Math" panose="02040503050406030204" pitchFamily="18" charset="0"/>
+                                </a:rPr>
+                              </m:ctrlPr>
+                            </m:dPr>
+                            <m:e>
+                              <m:r>
+                                <a:rPr lang="en-US" i="1">
+                                  <a:latin typeface="Cambria Math" panose="02040503050406030204" pitchFamily="18" charset="0"/>
+                                </a:rPr>
+                                <m:t>𝑥</m:t>
+                              </m:r>
+                            </m:e>
+                          </m:d>
+                          <m:func>
+                            <m:funcPr>
+                              <m:ctrlPr>
+                                <a:rPr lang="en-US" i="1">
+                                  <a:latin typeface="Cambria Math" panose="02040503050406030204" pitchFamily="18" charset="0"/>
+                                </a:rPr>
+                              </m:ctrlPr>
+                            </m:funcPr>
+                            <m:fName>
+                              <m:sSub>
+                                <m:sSubPr>
+                                  <m:ctrlPr>
+                                    <a:rPr lang="en-US" i="1">
+                                      <a:latin typeface="Cambria Math" panose="02040503050406030204" pitchFamily="18" charset="0"/>
+                                    </a:rPr>
+                                  </m:ctrlPr>
+                                </m:sSubPr>
+                                <m:e>
+                                  <m:r>
+                                    <m:rPr>
+                                      <m:sty m:val="p"/>
+                                    </m:rPr>
+                                    <a:rPr lang="en-US">
+                                      <a:latin typeface="Cambria Math" panose="02040503050406030204" pitchFamily="18" charset="0"/>
+                                    </a:rPr>
+                                    <m:t>log</m:t>
+                                  </m:r>
+                                </m:e>
+                                <m:sub>
+                                  <m:r>
+                                    <a:rPr lang="en-US" i="1">
+                                      <a:latin typeface="Cambria Math" panose="02040503050406030204" pitchFamily="18" charset="0"/>
+                                    </a:rPr>
+                                    <m:t>2</m:t>
+                                  </m:r>
+                                </m:sub>
+                              </m:sSub>
+                            </m:fName>
+                            <m:e>
+                              <m:d>
+                                <m:dPr>
+                                  <m:ctrlPr>
+                                    <a:rPr lang="en-US" i="1">
+                                      <a:latin typeface="Cambria Math" panose="02040503050406030204" pitchFamily="18" charset="0"/>
+                                    </a:rPr>
+                                  </m:ctrlPr>
+                                </m:dPr>
+                                <m:e>
+                                  <m:r>
+                                    <a:rPr lang="en-US" i="1">
+                                      <a:latin typeface="Cambria Math" panose="02040503050406030204" pitchFamily="18" charset="0"/>
+                                    </a:rPr>
+                                    <m:t>𝑝</m:t>
+                                  </m:r>
+                                  <m:d>
+                                    <m:dPr>
+                                      <m:ctrlPr>
+                                        <a:rPr lang="en-US" i="1">
+                                          <a:latin typeface="Cambria Math" panose="02040503050406030204" pitchFamily="18" charset="0"/>
+                                        </a:rPr>
+                                      </m:ctrlPr>
+                                    </m:dPr>
+                                    <m:e>
+                                      <m:r>
+                                        <a:rPr lang="en-US" i="1">
+                                          <a:latin typeface="Cambria Math" panose="02040503050406030204" pitchFamily="18" charset="0"/>
+                                        </a:rPr>
+                                        <m:t>𝑥</m:t>
+                                      </m:r>
+                                    </m:e>
+                                  </m:d>
+                                </m:e>
+                              </m:d>
+                            </m:e>
+                          </m:func>
+                          <m:r>
+                            <a:rPr lang="en-US" i="1">
+                              <a:latin typeface="Cambria Math" panose="02040503050406030204" pitchFamily="18" charset="0"/>
+                            </a:rPr>
+                            <m:t>𝑑𝑥</m:t>
+                          </m:r>
+                          <m:r>
+                            <a:rPr lang="en-US" i="1">
+                              <a:latin typeface="Cambria Math" panose="02040503050406030204" pitchFamily="18" charset="0"/>
+                            </a:rPr>
+                            <m:t> </m:t>
+                          </m:r>
+                        </m:e>
+                      </m:nary>
+                      <m:r>
+                        <a:rPr lang="en-US" b="0" i="1" smtClean="0">
+                          <a:latin typeface="Cambria Math" panose="02040503050406030204" pitchFamily="18" charset="0"/>
+                        </a:rPr>
+                        <m:t>=1.6208</m:t>
+                      </m:r>
+                    </m:oMath>
+                  </m:oMathPara>
+                </a14:m>
+                <a:endParaRPr lang="en-US" dirty="0"/>
+              </a:p>
+              <a:p>
+                <a:endParaRPr lang="en-US" dirty="0"/>
+              </a:p>
+            </p:txBody>
+          </p:sp>
+        </mc:Choice>
+        <mc:Fallback>
+          <p:sp>
+            <p:nvSpPr>
+              <p:cNvPr id="37" name="Content Placeholder 2">
+                <a:extLst>
+                  <a:ext uri="{FF2B5EF4-FFF2-40B4-BE49-F238E27FC236}">
+                    <a16:creationId xmlns:a16="http://schemas.microsoft.com/office/drawing/2014/main" id="{90D14C01-82D2-7ADF-3806-D57EA0D314C7}"/>
+                  </a:ext>
+                </a:extLst>
+              </p:cNvPr>
+              <p:cNvSpPr txBox="1">
+                <a:spLocks noRot="1" noChangeAspect="1" noMove="1" noResize="1" noEditPoints="1" noAdjustHandles="1" noChangeArrowheads="1" noChangeShapeType="1" noTextEdit="1"/>
+              </p:cNvSpPr>
+              <p:nvPr/>
+            </p:nvSpPr>
+            <p:spPr>
+              <a:xfrm>
+                <a:off x="992188" y="1843088"/>
+                <a:ext cx="6284912" cy="4553466"/>
+              </a:xfrm>
+              <a:prstGeom prst="rect">
+                <a:avLst/>
+              </a:prstGeom>
+              <a:blipFill>
+                <a:blip r:embed="rId2"/>
+                <a:stretch>
+                  <a:fillRect l="-1552" t="-2008"/>
+                </a:stretch>
+              </a:blipFill>
+            </p:spPr>
+            <p:txBody>
+              <a:bodyPr/>
+              <a:lstStyle/>
+              <a:p>
+                <a:r>
+                  <a:rPr lang="en-US">
+                    <a:noFill/>
+                  </a:rPr>
+                  <a:t> </a:t>
+                </a:r>
+              </a:p>
+            </p:txBody>
+          </p:sp>
+        </mc:Fallback>
+      </mc:AlternateContent>
+    </p:spTree>
+    <p:extLst>
+      <p:ext uri="{BB962C8B-B14F-4D97-AF65-F5344CB8AC3E}">
+        <p14:creationId xmlns:p14="http://schemas.microsoft.com/office/powerpoint/2010/main" val="1397101542"/>
+      </p:ext>
+    </p:extLst>
+  </p:cSld>
+  <p:clrMapOvr>
+    <a:masterClrMapping/>
+  </p:clrMapOvr>
+</p:sld>
+</file>
+
+<file path=ppt/slides/slide31.xml><?xml version="1.0" encoding="utf-8"?>
+<p:sld xmlns:a="http://schemas.openxmlformats.org/drawingml/2006/main" xmlns:r="http://schemas.openxmlformats.org/officeDocument/2006/relationships" xmlns:p="http://schemas.openxmlformats.org/presentationml/2006/main">
+  <p:cSld>
+    <p:spTree>
+      <p:nvGrpSpPr>
+        <p:cNvPr id="1" name=""/>
+        <p:cNvGrpSpPr/>
+        <p:nvPr/>
+      </p:nvGrpSpPr>
+      <p:grpSpPr>
+        <a:xfrm>
+          <a:off x="0" y="0"/>
+          <a:ext cx="0" cy="0"/>
+          <a:chOff x="0" y="0"/>
+          <a:chExt cx="0" cy="0"/>
+        </a:xfrm>
+      </p:grpSpPr>
+      <p:sp>
+        <p:nvSpPr>
+          <p:cNvPr id="2" name="Title 1">
+            <a:extLst>
+              <a:ext uri="{FF2B5EF4-FFF2-40B4-BE49-F238E27FC236}">
                 <a16:creationId xmlns:a16="http://schemas.microsoft.com/office/drawing/2014/main" id="{4F1261DB-738A-7255-D20B-EBC43962B8AC}"/>
               </a:ext>
             </a:extLst>
@@ -39456,7 +41803,525 @@
 </p:sld>
 </file>
 
-<file path=ppt/slides/slide31.xml><?xml version="1.0" encoding="utf-8"?>
+<file path=ppt/slides/slide32.xml><?xml version="1.0" encoding="utf-8"?>
+<p:sld xmlns:a="http://schemas.openxmlformats.org/drawingml/2006/main" xmlns:r="http://schemas.openxmlformats.org/officeDocument/2006/relationships" xmlns:p="http://schemas.openxmlformats.org/presentationml/2006/main">
+  <p:cSld>
+    <p:spTree>
+      <p:nvGrpSpPr>
+        <p:cNvPr id="1" name=""/>
+        <p:cNvGrpSpPr/>
+        <p:nvPr/>
+      </p:nvGrpSpPr>
+      <p:grpSpPr>
+        <a:xfrm>
+          <a:off x="0" y="0"/>
+          <a:ext cx="0" cy="0"/>
+          <a:chOff x="0" y="0"/>
+          <a:chExt cx="0" cy="0"/>
+        </a:xfrm>
+      </p:grpSpPr>
+      <p:sp>
+        <p:nvSpPr>
+          <p:cNvPr id="2" name="Title 1">
+            <a:extLst>
+              <a:ext uri="{FF2B5EF4-FFF2-40B4-BE49-F238E27FC236}">
+                <a16:creationId xmlns:a16="http://schemas.microsoft.com/office/drawing/2014/main" id="{D1D90605-C51B-A3D5-F252-74CD56BEF664}"/>
+              </a:ext>
+            </a:extLst>
+          </p:cNvPr>
+          <p:cNvSpPr>
+            <a:spLocks noGrp="1"/>
+          </p:cNvSpPr>
+          <p:nvPr>
+            <p:ph type="title"/>
+          </p:nvPr>
+        </p:nvSpPr>
+        <p:spPr/>
+        <p:txBody>
+          <a:bodyPr/>
+          <a:lstStyle/>
+          <a:p>
+            <a:r>
+              <a:rPr lang="en-US" dirty="0"/>
+              <a:t>Entropy</a:t>
+            </a:r>
+          </a:p>
+        </p:txBody>
+      </p:sp>
+      <p:sp>
+        <p:nvSpPr>
+          <p:cNvPr id="4" name="Text Placeholder 3">
+            <a:extLst>
+              <a:ext uri="{FF2B5EF4-FFF2-40B4-BE49-F238E27FC236}">
+                <a16:creationId xmlns:a16="http://schemas.microsoft.com/office/drawing/2014/main" id="{43FA7199-386A-8F97-7498-055025C6AC4E}"/>
+              </a:ext>
+            </a:extLst>
+          </p:cNvPr>
+          <p:cNvSpPr>
+            <a:spLocks noGrp="1"/>
+          </p:cNvSpPr>
+          <p:nvPr>
+            <p:ph type="body" idx="1"/>
+          </p:nvPr>
+        </p:nvSpPr>
+        <p:spPr/>
+        <p:txBody>
+          <a:bodyPr/>
+          <a:lstStyle/>
+          <a:p>
+            <a:r>
+              <a:rPr lang="en-US" dirty="0"/>
+              <a:t>Discrete Examples</a:t>
+            </a:r>
+          </a:p>
+        </p:txBody>
+      </p:sp>
+      <mc:AlternateContent xmlns:mc="http://schemas.openxmlformats.org/markup-compatibility/2006">
+        <mc:Choice xmlns:a14="http://schemas.microsoft.com/office/drawing/2010/main" Requires="a14">
+          <p:sp>
+            <p:nvSpPr>
+              <p:cNvPr id="3" name="Content Placeholder 2">
+                <a:extLst>
+                  <a:ext uri="{FF2B5EF4-FFF2-40B4-BE49-F238E27FC236}">
+                    <a16:creationId xmlns:a16="http://schemas.microsoft.com/office/drawing/2014/main" id="{0F4489C3-BB2C-7284-DC91-9D703D1478D7}"/>
+                  </a:ext>
+                </a:extLst>
+              </p:cNvPr>
+              <p:cNvSpPr>
+                <a:spLocks noGrp="1"/>
+              </p:cNvSpPr>
+              <p:nvPr>
+                <p:ph sz="half" idx="2"/>
+              </p:nvPr>
+            </p:nvSpPr>
+            <p:spPr/>
+            <p:txBody>
+              <a:bodyPr/>
+              <a:lstStyle/>
+              <a:p>
+                <a:r>
+                  <a:rPr lang="en-US" dirty="0"/>
+                  <a:t>Fair Coin</a:t>
+                </a:r>
+              </a:p>
+              <a:p>
+                <a:pPr marL="457200" lvl="1" indent="0">
+                  <a:buNone/>
+                </a:pPr>
+                <a14:m>
+                  <m:oMathPara xmlns:m="http://schemas.openxmlformats.org/officeDocument/2006/math">
+                    <m:oMathParaPr>
+                      <m:jc m:val="centerGroup"/>
+                    </m:oMathParaPr>
+                    <m:oMath xmlns:m="http://schemas.openxmlformats.org/officeDocument/2006/math">
+                      <m:r>
+                        <a:rPr lang="en-US" b="0" i="1" smtClean="0">
+                          <a:latin typeface="Cambria Math" panose="02040503050406030204" pitchFamily="18" charset="0"/>
+                        </a:rPr>
+                        <m:t>𝑝</m:t>
+                      </m:r>
+                      <m:d>
+                        <m:dPr>
+                          <m:ctrlPr>
+                            <a:rPr lang="en-US" b="0" i="1" smtClean="0">
+                              <a:latin typeface="Cambria Math" panose="02040503050406030204" pitchFamily="18" charset="0"/>
+                            </a:rPr>
+                          </m:ctrlPr>
+                        </m:dPr>
+                        <m:e>
+                          <m:r>
+                            <a:rPr lang="en-US" b="0" i="1" smtClean="0">
+                              <a:latin typeface="Cambria Math" panose="02040503050406030204" pitchFamily="18" charset="0"/>
+                            </a:rPr>
+                            <m:t>𝐻</m:t>
+                          </m:r>
+                        </m:e>
+                      </m:d>
+                      <m:r>
+                        <a:rPr lang="en-US" b="0" i="1" smtClean="0">
+                          <a:latin typeface="Cambria Math" panose="02040503050406030204" pitchFamily="18" charset="0"/>
+                        </a:rPr>
+                        <m:t>=0.5, </m:t>
+                      </m:r>
+                      <m:r>
+                        <a:rPr lang="en-US" b="0" i="1" smtClean="0">
+                          <a:latin typeface="Cambria Math" panose="02040503050406030204" pitchFamily="18" charset="0"/>
+                        </a:rPr>
+                        <m:t>𝑝</m:t>
+                      </m:r>
+                      <m:d>
+                        <m:dPr>
+                          <m:ctrlPr>
+                            <a:rPr lang="en-US" b="0" i="1" smtClean="0">
+                              <a:latin typeface="Cambria Math" panose="02040503050406030204" pitchFamily="18" charset="0"/>
+                            </a:rPr>
+                          </m:ctrlPr>
+                        </m:dPr>
+                        <m:e>
+                          <m:r>
+                            <a:rPr lang="en-US" b="0" i="1" smtClean="0">
+                              <a:latin typeface="Cambria Math" panose="02040503050406030204" pitchFamily="18" charset="0"/>
+                            </a:rPr>
+                            <m:t>𝑇</m:t>
+                          </m:r>
+                        </m:e>
+                      </m:d>
+                      <m:r>
+                        <a:rPr lang="en-US" b="0" i="1" smtClean="0">
+                          <a:latin typeface="Cambria Math" panose="02040503050406030204" pitchFamily="18" charset="0"/>
+                        </a:rPr>
+                        <m:t>=0.5</m:t>
+                      </m:r>
+                    </m:oMath>
+                  </m:oMathPara>
+                </a14:m>
+                <a:endParaRPr lang="en-US" b="0" dirty="0"/>
+              </a:p>
+              <a:p>
+                <a:pPr marL="457200" lvl="1" indent="0">
+                  <a:buNone/>
+                </a:pPr>
+                <a14:m>
+                  <m:oMathPara xmlns:m="http://schemas.openxmlformats.org/officeDocument/2006/math">
+                    <m:oMathParaPr>
+                      <m:jc m:val="centerGroup"/>
+                    </m:oMathParaPr>
+                    <m:oMath xmlns:m="http://schemas.openxmlformats.org/officeDocument/2006/math">
+                      <m:r>
+                        <a:rPr lang="en-US" b="0" i="1" smtClean="0">
+                          <a:latin typeface="Cambria Math" panose="02040503050406030204" pitchFamily="18" charset="0"/>
+                        </a:rPr>
+                        <m:t>𝑆</m:t>
+                      </m:r>
+                      <m:r>
+                        <a:rPr lang="en-US" b="0" i="1" smtClean="0">
+                          <a:latin typeface="Cambria Math" panose="02040503050406030204" pitchFamily="18" charset="0"/>
+                        </a:rPr>
+                        <m:t>=−</m:t>
+                      </m:r>
+                      <m:r>
+                        <a:rPr lang="en-US" b="0" i="1" smtClean="0">
+                          <a:latin typeface="Cambria Math" panose="02040503050406030204" pitchFamily="18" charset="0"/>
+                        </a:rPr>
+                        <m:t>𝑃</m:t>
+                      </m:r>
+                      <m:d>
+                        <m:dPr>
+                          <m:ctrlPr>
+                            <a:rPr lang="en-US" b="0" i="1" smtClean="0">
+                              <a:latin typeface="Cambria Math" panose="02040503050406030204" pitchFamily="18" charset="0"/>
+                            </a:rPr>
+                          </m:ctrlPr>
+                        </m:dPr>
+                        <m:e>
+                          <m:r>
+                            <a:rPr lang="en-US" b="0" i="1" smtClean="0">
+                              <a:latin typeface="Cambria Math" panose="02040503050406030204" pitchFamily="18" charset="0"/>
+                            </a:rPr>
+                            <m:t>𝐻</m:t>
+                          </m:r>
+                        </m:e>
+                      </m:d>
+                      <m:func>
+                        <m:funcPr>
+                          <m:ctrlPr>
+                            <a:rPr lang="en-US" b="0" i="1" smtClean="0">
+                              <a:latin typeface="Cambria Math" panose="02040503050406030204" pitchFamily="18" charset="0"/>
+                            </a:rPr>
+                          </m:ctrlPr>
+                        </m:funcPr>
+                        <m:fName>
+                          <m:sSub>
+                            <m:sSubPr>
+                              <m:ctrlPr>
+                                <a:rPr lang="en-US" b="0" i="1" smtClean="0">
+                                  <a:latin typeface="Cambria Math" panose="02040503050406030204" pitchFamily="18" charset="0"/>
+                                </a:rPr>
+                              </m:ctrlPr>
+                            </m:sSubPr>
+                            <m:e>
+                              <m:r>
+                                <m:rPr>
+                                  <m:sty m:val="p"/>
+                                </m:rPr>
+                                <a:rPr lang="en-US" b="0" i="0" smtClean="0">
+                                  <a:latin typeface="Cambria Math" panose="02040503050406030204" pitchFamily="18" charset="0"/>
+                                </a:rPr>
+                                <m:t>log</m:t>
+                              </m:r>
+                            </m:e>
+                            <m:sub>
+                              <m:r>
+                                <a:rPr lang="en-US" b="0" i="1" smtClean="0">
+                                  <a:latin typeface="Cambria Math" panose="02040503050406030204" pitchFamily="18" charset="0"/>
+                                </a:rPr>
+                                <m:t>2</m:t>
+                              </m:r>
+                            </m:sub>
+                          </m:sSub>
+                        </m:fName>
+                        <m:e>
+                          <m:r>
+                            <a:rPr lang="en-US" b="0" i="1" smtClean="0">
+                              <a:latin typeface="Cambria Math" panose="02040503050406030204" pitchFamily="18" charset="0"/>
+                            </a:rPr>
+                            <m:t>𝑃</m:t>
+                          </m:r>
+                          <m:d>
+                            <m:dPr>
+                              <m:ctrlPr>
+                                <a:rPr lang="en-US" b="0" i="1" smtClean="0">
+                                  <a:latin typeface="Cambria Math" panose="02040503050406030204" pitchFamily="18" charset="0"/>
+                                </a:rPr>
+                              </m:ctrlPr>
+                            </m:dPr>
+                            <m:e>
+                              <m:r>
+                                <a:rPr lang="en-US" b="0" i="1" smtClean="0">
+                                  <a:latin typeface="Cambria Math" panose="02040503050406030204" pitchFamily="18" charset="0"/>
+                                </a:rPr>
+                                <m:t>𝐻</m:t>
+                              </m:r>
+                            </m:e>
+                          </m:d>
+                        </m:e>
+                      </m:func>
+                      <m:r>
+                        <a:rPr lang="en-US" b="0" i="1" smtClean="0">
+                          <a:latin typeface="Cambria Math" panose="02040503050406030204" pitchFamily="18" charset="0"/>
+                        </a:rPr>
+                        <m:t>−</m:t>
+                      </m:r>
+                      <m:r>
+                        <a:rPr lang="en-US" b="0" i="1" smtClean="0">
+                          <a:latin typeface="Cambria Math" panose="02040503050406030204" pitchFamily="18" charset="0"/>
+                        </a:rPr>
+                        <m:t>𝑃</m:t>
+                      </m:r>
+                      <m:d>
+                        <m:dPr>
+                          <m:ctrlPr>
+                            <a:rPr lang="en-US" b="0" i="1" smtClean="0">
+                              <a:latin typeface="Cambria Math" panose="02040503050406030204" pitchFamily="18" charset="0"/>
+                            </a:rPr>
+                          </m:ctrlPr>
+                        </m:dPr>
+                        <m:e>
+                          <m:r>
+                            <a:rPr lang="en-US" b="0" i="1" smtClean="0">
+                              <a:latin typeface="Cambria Math" panose="02040503050406030204" pitchFamily="18" charset="0"/>
+                            </a:rPr>
+                            <m:t>𝑇</m:t>
+                          </m:r>
+                        </m:e>
+                      </m:d>
+                      <m:func>
+                        <m:funcPr>
+                          <m:ctrlPr>
+                            <a:rPr lang="en-US" b="0" i="1" smtClean="0">
+                              <a:latin typeface="Cambria Math" panose="02040503050406030204" pitchFamily="18" charset="0"/>
+                            </a:rPr>
+                          </m:ctrlPr>
+                        </m:funcPr>
+                        <m:fName>
+                          <m:sSub>
+                            <m:sSubPr>
+                              <m:ctrlPr>
+                                <a:rPr lang="en-US" b="0" i="1" smtClean="0">
+                                  <a:latin typeface="Cambria Math" panose="02040503050406030204" pitchFamily="18" charset="0"/>
+                                </a:rPr>
+                              </m:ctrlPr>
+                            </m:sSubPr>
+                            <m:e>
+                              <m:r>
+                                <m:rPr>
+                                  <m:sty m:val="p"/>
+                                </m:rPr>
+                                <a:rPr lang="en-US" b="0" i="0" smtClean="0">
+                                  <a:latin typeface="Cambria Math" panose="02040503050406030204" pitchFamily="18" charset="0"/>
+                                </a:rPr>
+                                <m:t>log</m:t>
+                              </m:r>
+                            </m:e>
+                            <m:sub>
+                              <m:r>
+                                <a:rPr lang="en-US" b="0" i="1" smtClean="0">
+                                  <a:latin typeface="Cambria Math" panose="02040503050406030204" pitchFamily="18" charset="0"/>
+                                </a:rPr>
+                                <m:t>2</m:t>
+                              </m:r>
+                            </m:sub>
+                          </m:sSub>
+                        </m:fName>
+                        <m:e>
+                          <m:r>
+                            <a:rPr lang="en-US" b="0" i="1" smtClean="0">
+                              <a:latin typeface="Cambria Math" panose="02040503050406030204" pitchFamily="18" charset="0"/>
+                            </a:rPr>
+                            <m:t>𝑃</m:t>
+                          </m:r>
+                          <m:r>
+                            <a:rPr lang="en-US" b="0" i="1" smtClean="0">
+                              <a:latin typeface="Cambria Math" panose="02040503050406030204" pitchFamily="18" charset="0"/>
+                            </a:rPr>
+                            <m:t>(</m:t>
+                          </m:r>
+                          <m:r>
+                            <a:rPr lang="en-US" b="0" i="1" smtClean="0">
+                              <a:latin typeface="Cambria Math" panose="02040503050406030204" pitchFamily="18" charset="0"/>
+                            </a:rPr>
+                            <m:t>𝑇</m:t>
+                          </m:r>
+                          <m:r>
+                            <a:rPr lang="en-US" b="0" i="1" smtClean="0">
+                              <a:latin typeface="Cambria Math" panose="02040503050406030204" pitchFamily="18" charset="0"/>
+                            </a:rPr>
+                            <m:t>)</m:t>
+                          </m:r>
+                        </m:e>
+                      </m:func>
+                    </m:oMath>
+                  </m:oMathPara>
+                </a14:m>
+                <a:endParaRPr lang="en-US" dirty="0"/>
+              </a:p>
+              <a:p>
+                <a:endParaRPr lang="en-US" dirty="0"/>
+              </a:p>
+              <a:p>
+                <a:endParaRPr lang="en-US" dirty="0"/>
+              </a:p>
+              <a:p>
+                <a:r>
+                  <a:rPr lang="en-US" dirty="0"/>
+                  <a:t>Biased Coin</a:t>
+                </a:r>
+              </a:p>
+            </p:txBody>
+          </p:sp>
+        </mc:Choice>
+        <mc:Fallback>
+          <p:sp>
+            <p:nvSpPr>
+              <p:cNvPr id="3" name="Content Placeholder 2">
+                <a:extLst>
+                  <a:ext uri="{FF2B5EF4-FFF2-40B4-BE49-F238E27FC236}">
+                    <a16:creationId xmlns:a16="http://schemas.microsoft.com/office/drawing/2014/main" id="{0F4489C3-BB2C-7284-DC91-9D703D1478D7}"/>
+                  </a:ext>
+                </a:extLst>
+              </p:cNvPr>
+              <p:cNvSpPr>
+                <a:spLocks noGrp="1" noRot="1" noChangeAspect="1" noMove="1" noResize="1" noEditPoints="1" noAdjustHandles="1" noChangeArrowheads="1" noChangeShapeType="1" noTextEdit="1"/>
+              </p:cNvSpPr>
+              <p:nvPr>
+                <p:ph sz="half" idx="2"/>
+              </p:nvPr>
+            </p:nvSpPr>
+            <p:spPr>
+              <a:blipFill>
+                <a:blip r:embed="rId2"/>
+                <a:stretch>
+                  <a:fillRect l="-2128" t="-2815"/>
+                </a:stretch>
+              </a:blipFill>
+            </p:spPr>
+            <p:txBody>
+              <a:bodyPr/>
+              <a:lstStyle/>
+              <a:p>
+                <a:r>
+                  <a:rPr lang="en-US">
+                    <a:noFill/>
+                  </a:rPr>
+                  <a:t> </a:t>
+                </a:r>
+              </a:p>
+            </p:txBody>
+          </p:sp>
+        </mc:Fallback>
+      </mc:AlternateContent>
+      <p:sp>
+        <p:nvSpPr>
+          <p:cNvPr id="5" name="Text Placeholder 4">
+            <a:extLst>
+              <a:ext uri="{FF2B5EF4-FFF2-40B4-BE49-F238E27FC236}">
+                <a16:creationId xmlns:a16="http://schemas.microsoft.com/office/drawing/2014/main" id="{3E9490F1-4106-1B72-40C1-3400EB620C62}"/>
+              </a:ext>
+            </a:extLst>
+          </p:cNvPr>
+          <p:cNvSpPr>
+            <a:spLocks noGrp="1"/>
+          </p:cNvSpPr>
+          <p:nvPr>
+            <p:ph type="body" sz="quarter" idx="3"/>
+          </p:nvPr>
+        </p:nvSpPr>
+        <p:spPr/>
+        <p:txBody>
+          <a:bodyPr/>
+          <a:lstStyle/>
+          <a:p>
+            <a:r>
+              <a:rPr lang="en-US" dirty="0"/>
+              <a:t>Continuous Examples</a:t>
+            </a:r>
+          </a:p>
+        </p:txBody>
+      </p:sp>
+      <p:sp>
+        <p:nvSpPr>
+          <p:cNvPr id="6" name="Content Placeholder 5">
+            <a:extLst>
+              <a:ext uri="{FF2B5EF4-FFF2-40B4-BE49-F238E27FC236}">
+                <a16:creationId xmlns:a16="http://schemas.microsoft.com/office/drawing/2014/main" id="{461AEA97-A412-A567-4D5E-87CB6989B2F8}"/>
+              </a:ext>
+            </a:extLst>
+          </p:cNvPr>
+          <p:cNvSpPr>
+            <a:spLocks noGrp="1"/>
+          </p:cNvSpPr>
+          <p:nvPr>
+            <p:ph sz="quarter" idx="4"/>
+          </p:nvPr>
+        </p:nvSpPr>
+        <p:spPr/>
+        <p:txBody>
+          <a:bodyPr/>
+          <a:lstStyle/>
+          <a:p>
+            <a:r>
+              <a:rPr lang="en-US" dirty="0"/>
+              <a:t>Uniform Distribution</a:t>
+            </a:r>
+          </a:p>
+          <a:p>
+            <a:endParaRPr lang="en-US" dirty="0"/>
+          </a:p>
+          <a:p>
+            <a:endParaRPr lang="en-US" dirty="0"/>
+          </a:p>
+          <a:p>
+            <a:r>
+              <a:rPr lang="en-US" dirty="0"/>
+              <a:t>Normal Distribution</a:t>
+            </a:r>
+          </a:p>
+        </p:txBody>
+      </p:sp>
+    </p:spTree>
+    <p:extLst>
+      <p:ext uri="{BB962C8B-B14F-4D97-AF65-F5344CB8AC3E}">
+        <p14:creationId xmlns:p14="http://schemas.microsoft.com/office/powerpoint/2010/main" val="2573824741"/>
+      </p:ext>
+    </p:extLst>
+  </p:cSld>
+  <p:clrMapOvr>
+    <a:masterClrMapping/>
+  </p:clrMapOvr>
+</p:sld>
+</file>
+
+<file path=ppt/slides/slide33.xml><?xml version="1.0" encoding="utf-8"?>
 <p:sld xmlns:a="http://schemas.openxmlformats.org/drawingml/2006/main" xmlns:r="http://schemas.openxmlformats.org/officeDocument/2006/relationships" xmlns:p="http://schemas.openxmlformats.org/presentationml/2006/main">
   <p:cSld>
     <p:spTree>
@@ -39539,7 +42404,7 @@
 </p:sld>
 </file>
 
-<file path=ppt/slides/slide32.xml><?xml version="1.0" encoding="utf-8"?>
+<file path=ppt/slides/slide34.xml><?xml version="1.0" encoding="utf-8"?>
 <p:sld xmlns:a="http://schemas.openxmlformats.org/drawingml/2006/main" xmlns:r="http://schemas.openxmlformats.org/officeDocument/2006/relationships" xmlns:p="http://schemas.openxmlformats.org/presentationml/2006/main">
   <p:cSld>
     <p:spTree>

</xml_diff>